<commit_message>
Update Testing Better with Approvals.pptx
. d updated slides

Co-Authored-By: Llewellyn Falco <llewellyn.falco@gmail.com>
</commit_message>
<xml_diff>
--- a/slides/Testing Better with Approvals.pptx
+++ b/slides/Testing Better with Approvals.pptx
@@ -5,7 +5,7 @@
     <p:sldMasterId id="2147483648" r:id="rId1"/>
   </p:sldMasterIdLst>
   <p:notesMasterIdLst>
-    <p:notesMasterId r:id="rId31"/>
+    <p:notesMasterId r:id="rId33"/>
   </p:notesMasterIdLst>
   <p:sldIdLst>
     <p:sldId id="256" r:id="rId2"/>
@@ -19,24 +19,26 @@
     <p:sldId id="263" r:id="rId10"/>
     <p:sldId id="283" r:id="rId11"/>
     <p:sldId id="284" r:id="rId12"/>
-    <p:sldId id="266" r:id="rId13"/>
-    <p:sldId id="285" r:id="rId14"/>
-    <p:sldId id="286" r:id="rId15"/>
-    <p:sldId id="287" r:id="rId16"/>
-    <p:sldId id="288" r:id="rId17"/>
-    <p:sldId id="268" r:id="rId18"/>
-    <p:sldId id="270" r:id="rId19"/>
-    <p:sldId id="271" r:id="rId20"/>
-    <p:sldId id="273" r:id="rId21"/>
-    <p:sldId id="274" r:id="rId22"/>
-    <p:sldId id="272" r:id="rId23"/>
-    <p:sldId id="277" r:id="rId24"/>
-    <p:sldId id="275" r:id="rId25"/>
-    <p:sldId id="278" r:id="rId26"/>
-    <p:sldId id="276" r:id="rId27"/>
-    <p:sldId id="279" r:id="rId28"/>
-    <p:sldId id="280" r:id="rId29"/>
-    <p:sldId id="281" r:id="rId30"/>
+    <p:sldId id="289" r:id="rId13"/>
+    <p:sldId id="266" r:id="rId14"/>
+    <p:sldId id="285" r:id="rId15"/>
+    <p:sldId id="286" r:id="rId16"/>
+    <p:sldId id="290" r:id="rId17"/>
+    <p:sldId id="287" r:id="rId18"/>
+    <p:sldId id="288" r:id="rId19"/>
+    <p:sldId id="268" r:id="rId20"/>
+    <p:sldId id="270" r:id="rId21"/>
+    <p:sldId id="271" r:id="rId22"/>
+    <p:sldId id="273" r:id="rId23"/>
+    <p:sldId id="274" r:id="rId24"/>
+    <p:sldId id="272" r:id="rId25"/>
+    <p:sldId id="277" r:id="rId26"/>
+    <p:sldId id="275" r:id="rId27"/>
+    <p:sldId id="278" r:id="rId28"/>
+    <p:sldId id="276" r:id="rId29"/>
+    <p:sldId id="279" r:id="rId30"/>
+    <p:sldId id="280" r:id="rId31"/>
+    <p:sldId id="281" r:id="rId32"/>
   </p:sldIdLst>
   <p:sldSz cx="12192000" cy="6858000"/>
   <p:notesSz cx="6858000" cy="9144000"/>
@@ -159,9 +161,11 @@
             <p14:sldId id="263"/>
             <p14:sldId id="283"/>
             <p14:sldId id="284"/>
+            <p14:sldId id="289"/>
             <p14:sldId id="266"/>
             <p14:sldId id="285"/>
             <p14:sldId id="286"/>
+            <p14:sldId id="290"/>
             <p14:sldId id="287"/>
             <p14:sldId id="288"/>
             <p14:sldId id="268"/>
@@ -714,7 +718,7 @@
           <a:p>
             <a:fld id="{FC5BBC2B-72B0-2542-8213-717906F3F32B}" type="slidenum">
               <a:rPr lang="en-US" smtClean="0"/>
-              <a:t>12</a:t>
+              <a:t>13</a:t>
             </a:fld>
             <a:endParaRPr lang="en-US"/>
           </a:p>
@@ -822,7 +826,7 @@
           <a:p>
             <a:fld id="{FC5BBC2B-72B0-2542-8213-717906F3F32B}" type="slidenum">
               <a:rPr lang="en-US" smtClean="0"/>
-              <a:t>13</a:t>
+              <a:t>14</a:t>
             </a:fld>
             <a:endParaRPr lang="en-US"/>
           </a:p>
@@ -930,7 +934,7 @@
           <a:p>
             <a:fld id="{FC5BBC2B-72B0-2542-8213-717906F3F32B}" type="slidenum">
               <a:rPr lang="en-US" smtClean="0"/>
-              <a:t>14</a:t>
+              <a:t>15</a:t>
             </a:fld>
             <a:endParaRPr lang="en-US"/>
           </a:p>
@@ -1038,7 +1042,7 @@
           <a:p>
             <a:fld id="{FC5BBC2B-72B0-2542-8213-717906F3F32B}" type="slidenum">
               <a:rPr lang="en-US" smtClean="0"/>
-              <a:t>15</a:t>
+              <a:t>17</a:t>
             </a:fld>
             <a:endParaRPr lang="en-US"/>
           </a:p>
@@ -1146,7 +1150,7 @@
           <a:p>
             <a:fld id="{FC5BBC2B-72B0-2542-8213-717906F3F32B}" type="slidenum">
               <a:rPr lang="en-US" smtClean="0"/>
-              <a:t>16</a:t>
+              <a:t>18</a:t>
             </a:fld>
             <a:endParaRPr lang="en-US"/>
           </a:p>
@@ -1254,7 +1258,7 @@
           <a:p>
             <a:fld id="{FC5BBC2B-72B0-2542-8213-717906F3F32B}" type="slidenum">
               <a:rPr lang="en-US" smtClean="0"/>
-              <a:t>17</a:t>
+              <a:t>19</a:t>
             </a:fld>
             <a:endParaRPr lang="en-US"/>
           </a:p>
@@ -1362,7 +1366,7 @@
           <a:p>
             <a:fld id="{FC5BBC2B-72B0-2542-8213-717906F3F32B}" type="slidenum">
               <a:rPr lang="en-US" smtClean="0"/>
-              <a:t>18</a:t>
+              <a:t>20</a:t>
             </a:fld>
             <a:endParaRPr lang="en-US"/>
           </a:p>
@@ -1470,7 +1474,7 @@
           <a:p>
             <a:fld id="{FC5BBC2B-72B0-2542-8213-717906F3F32B}" type="slidenum">
               <a:rPr lang="en-US" smtClean="0"/>
-              <a:t>19</a:t>
+              <a:t>21</a:t>
             </a:fld>
             <a:endParaRPr lang="en-US"/>
           </a:p>
@@ -1578,7 +1582,7 @@
           <a:p>
             <a:fld id="{FC5BBC2B-72B0-2542-8213-717906F3F32B}" type="slidenum">
               <a:rPr lang="en-US" smtClean="0"/>
-              <a:t>20</a:t>
+              <a:t>22</a:t>
             </a:fld>
             <a:endParaRPr lang="en-US"/>
           </a:p>
@@ -1686,7 +1690,7 @@
           <a:p>
             <a:fld id="{FC5BBC2B-72B0-2542-8213-717906F3F32B}" type="slidenum">
               <a:rPr lang="en-US" smtClean="0"/>
-              <a:t>21</a:t>
+              <a:t>23</a:t>
             </a:fld>
             <a:endParaRPr lang="en-US"/>
           </a:p>
@@ -1878,7 +1882,7 @@
           <a:p>
             <a:fld id="{FC5BBC2B-72B0-2542-8213-717906F3F32B}" type="slidenum">
               <a:rPr lang="en-US" smtClean="0"/>
-              <a:t>22</a:t>
+              <a:t>24</a:t>
             </a:fld>
             <a:endParaRPr lang="en-US"/>
           </a:p>
@@ -1986,7 +1990,7 @@
           <a:p>
             <a:fld id="{FC5BBC2B-72B0-2542-8213-717906F3F32B}" type="slidenum">
               <a:rPr lang="en-US" smtClean="0"/>
-              <a:t>23</a:t>
+              <a:t>25</a:t>
             </a:fld>
             <a:endParaRPr lang="en-US"/>
           </a:p>
@@ -2094,7 +2098,7 @@
           <a:p>
             <a:fld id="{FC5BBC2B-72B0-2542-8213-717906F3F32B}" type="slidenum">
               <a:rPr lang="en-US" smtClean="0"/>
-              <a:t>24</a:t>
+              <a:t>26</a:t>
             </a:fld>
             <a:endParaRPr lang="en-US"/>
           </a:p>
@@ -2202,7 +2206,7 @@
           <a:p>
             <a:fld id="{FC5BBC2B-72B0-2542-8213-717906F3F32B}" type="slidenum">
               <a:rPr lang="en-US" smtClean="0"/>
-              <a:t>25</a:t>
+              <a:t>27</a:t>
             </a:fld>
             <a:endParaRPr lang="en-US"/>
           </a:p>
@@ -2310,7 +2314,7 @@
           <a:p>
             <a:fld id="{FC5BBC2B-72B0-2542-8213-717906F3F32B}" type="slidenum">
               <a:rPr lang="en-US" smtClean="0"/>
-              <a:t>26</a:t>
+              <a:t>28</a:t>
             </a:fld>
             <a:endParaRPr lang="en-US"/>
           </a:p>
@@ -2418,7 +2422,7 @@
           <a:p>
             <a:fld id="{FC5BBC2B-72B0-2542-8213-717906F3F32B}" type="slidenum">
               <a:rPr lang="en-US" smtClean="0"/>
-              <a:t>27</a:t>
+              <a:t>29</a:t>
             </a:fld>
             <a:endParaRPr lang="en-US"/>
           </a:p>
@@ -2526,7 +2530,7 @@
           <a:p>
             <a:fld id="{FC5BBC2B-72B0-2542-8213-717906F3F32B}" type="slidenum">
               <a:rPr lang="en-US" smtClean="0"/>
-              <a:t>28</a:t>
+              <a:t>30</a:t>
             </a:fld>
             <a:endParaRPr lang="en-US"/>
           </a:p>
@@ -2634,7 +2638,7 @@
           <a:p>
             <a:fld id="{FC5BBC2B-72B0-2542-8213-717906F3F32B}" type="slidenum">
               <a:rPr lang="en-US" smtClean="0"/>
-              <a:t>29</a:t>
+              <a:t>31</a:t>
             </a:fld>
             <a:endParaRPr lang="en-US"/>
           </a:p>
@@ -7139,6 +7143,71 @@
   <p:cSld>
     <p:spTree>
       <p:nvGrpSpPr>
+        <p:cNvPr id="1" name=""/>
+        <p:cNvGrpSpPr/>
+        <p:nvPr/>
+      </p:nvGrpSpPr>
+      <p:grpSpPr>
+        <a:xfrm>
+          <a:off x="0" y="0"/>
+          <a:ext cx="0" cy="0"/>
+          <a:chOff x="0" y="0"/>
+          <a:chExt cx="0" cy="0"/>
+        </a:xfrm>
+      </p:grpSpPr>
+      <p:sp>
+        <p:nvSpPr>
+          <p:cNvPr id="2" name="TextBox 1">
+            <a:extLst>
+              <a:ext uri="{FF2B5EF4-FFF2-40B4-BE49-F238E27FC236}">
+                <a16:creationId xmlns:a16="http://schemas.microsoft.com/office/drawing/2014/main" id="{B08ED9BC-E09B-44E5-8264-4427905745FD}"/>
+              </a:ext>
+            </a:extLst>
+          </p:cNvPr>
+          <p:cNvSpPr txBox="1"/>
+          <p:nvPr/>
+        </p:nvSpPr>
+        <p:spPr>
+          <a:xfrm>
+            <a:off x="1792224" y="1170432"/>
+            <a:ext cx="1368836" cy="369332"/>
+          </a:xfrm>
+          <a:prstGeom prst="rect">
+            <a:avLst/>
+          </a:prstGeom>
+          <a:noFill/>
+        </p:spPr>
+        <p:txBody>
+          <a:bodyPr wrap="none" rtlCol="0">
+            <a:spAutoFit/>
+          </a:bodyPr>
+          <a:lstStyle/>
+          <a:p>
+            <a:r>
+              <a:rPr lang="en-US"/>
+              <a:t>testing circle</a:t>
+            </a:r>
+          </a:p>
+        </p:txBody>
+      </p:sp>
+    </p:spTree>
+    <p:extLst>
+      <p:ext uri="{BB962C8B-B14F-4D97-AF65-F5344CB8AC3E}">
+        <p14:creationId xmlns:p14="http://schemas.microsoft.com/office/powerpoint/2010/main" val="429324516"/>
+      </p:ext>
+    </p:extLst>
+  </p:cSld>
+  <p:clrMapOvr>
+    <a:masterClrMapping/>
+  </p:clrMapOvr>
+</p:sld>
+</file>
+
+<file path=ppt/slides/slide13.xml><?xml version="1.0" encoding="utf-8"?>
+<p:sld xmlns:a="http://schemas.openxmlformats.org/drawingml/2006/main" xmlns:r="http://schemas.openxmlformats.org/officeDocument/2006/relationships" xmlns:p="http://schemas.openxmlformats.org/presentationml/2006/main">
+  <p:cSld>
+    <p:spTree>
+      <p:nvGrpSpPr>
         <p:cNvPr id="1" name="">
           <a:extLst>
             <a:ext uri="{FF2B5EF4-FFF2-40B4-BE49-F238E27FC236}">
@@ -7711,7 +7780,7 @@
 </p:sld>
 </file>
 
-<file path=ppt/slides/slide13.xml><?xml version="1.0" encoding="utf-8"?>
+<file path=ppt/slides/slide14.xml><?xml version="1.0" encoding="utf-8"?>
 <p:sld xmlns:a="http://schemas.openxmlformats.org/drawingml/2006/main" xmlns:r="http://schemas.openxmlformats.org/officeDocument/2006/relationships" xmlns:p="http://schemas.openxmlformats.org/presentationml/2006/main">
   <p:cSld>
     <p:spTree>
@@ -7855,7 +7924,7 @@
 </p:sld>
 </file>
 
-<file path=ppt/slides/slide14.xml><?xml version="1.0" encoding="utf-8"?>
+<file path=ppt/slides/slide15.xml><?xml version="1.0" encoding="utf-8"?>
 <p:sld xmlns:a="http://schemas.openxmlformats.org/drawingml/2006/main" xmlns:r="http://schemas.openxmlformats.org/officeDocument/2006/relationships" xmlns:p="http://schemas.openxmlformats.org/presentationml/2006/main">
   <p:cSld>
     <p:spTree>
@@ -8273,7 +8342,148 @@
 </p:sld>
 </file>
 
-<file path=ppt/slides/slide15.xml><?xml version="1.0" encoding="utf-8"?>
+<file path=ppt/slides/slide16.xml><?xml version="1.0" encoding="utf-8"?>
+<p:sld xmlns:a="http://schemas.openxmlformats.org/drawingml/2006/main" xmlns:r="http://schemas.openxmlformats.org/officeDocument/2006/relationships" xmlns:p="http://schemas.openxmlformats.org/presentationml/2006/main">
+  <p:cSld>
+    <p:spTree>
+      <p:nvGrpSpPr>
+        <p:cNvPr id="1" name=""/>
+        <p:cNvGrpSpPr/>
+        <p:nvPr/>
+      </p:nvGrpSpPr>
+      <p:grpSpPr>
+        <a:xfrm>
+          <a:off x="0" y="0"/>
+          <a:ext cx="0" cy="0"/>
+          <a:chOff x="0" y="0"/>
+          <a:chExt cx="0" cy="0"/>
+        </a:xfrm>
+      </p:grpSpPr>
+      <p:pic>
+        <p:nvPicPr>
+          <p:cNvPr id="1028" name="Picture 4" descr="Silent Movie Silent Film Title Card: Free Download — CopyCatFilms">
+            <a:extLst>
+              <a:ext uri="{FF2B5EF4-FFF2-40B4-BE49-F238E27FC236}">
+                <a16:creationId xmlns:a16="http://schemas.microsoft.com/office/drawing/2014/main" id="{65DC3069-C79D-A5FF-3756-0C1F3F22604B}"/>
+              </a:ext>
+            </a:extLst>
+          </p:cNvPr>
+          <p:cNvPicPr>
+            <a:picLocks noChangeAspect="1" noChangeArrowheads="1"/>
+          </p:cNvPicPr>
+          <p:nvPr/>
+        </p:nvPicPr>
+        <p:blipFill>
+          <a:blip r:embed="rId2">
+            <a:extLst>
+              <a:ext uri="{28A0092B-C50C-407E-A947-70E740481C1C}">
+                <a14:useLocalDpi xmlns:a14="http://schemas.microsoft.com/office/drawing/2010/main" val="0"/>
+              </a:ext>
+            </a:extLst>
+          </a:blip>
+          <a:srcRect/>
+          <a:stretch>
+            <a:fillRect/>
+          </a:stretch>
+        </p:blipFill>
+        <p:spPr bwMode="auto">
+          <a:xfrm>
+            <a:off x="0" y="4261"/>
+            <a:ext cx="12192000" cy="6853739"/>
+          </a:xfrm>
+          <a:prstGeom prst="rect">
+            <a:avLst/>
+          </a:prstGeom>
+          <a:noFill/>
+          <a:extLst>
+            <a:ext uri="{909E8E84-426E-40DD-AFC4-6F175D3DCCD1}">
+              <a14:hiddenFill xmlns:a14="http://schemas.microsoft.com/office/drawing/2010/main">
+                <a:solidFill>
+                  <a:srgbClr val="FFFFFF"/>
+                </a:solidFill>
+              </a14:hiddenFill>
+            </a:ext>
+          </a:extLst>
+        </p:spPr>
+      </p:pic>
+      <p:sp>
+        <p:nvSpPr>
+          <p:cNvPr id="2" name="TextBox 1">
+            <a:extLst>
+              <a:ext uri="{FF2B5EF4-FFF2-40B4-BE49-F238E27FC236}">
+                <a16:creationId xmlns:a16="http://schemas.microsoft.com/office/drawing/2014/main" id="{912AFC77-F5C7-10A1-50CC-05981BE8F9BC}"/>
+              </a:ext>
+            </a:extLst>
+          </p:cNvPr>
+          <p:cNvSpPr txBox="1"/>
+          <p:nvPr/>
+        </p:nvSpPr>
+        <p:spPr>
+          <a:xfrm>
+            <a:off x="3467488" y="2876443"/>
+            <a:ext cx="5494196" cy="769441"/>
+          </a:xfrm>
+          <a:prstGeom prst="rect">
+            <a:avLst/>
+          </a:prstGeom>
+          <a:noFill/>
+        </p:spPr>
+        <p:txBody>
+          <a:bodyPr wrap="none" rtlCol="0">
+            <a:spAutoFit/>
+          </a:bodyPr>
+          <a:lstStyle/>
+          <a:p>
+            <a:pPr algn="ctr"/>
+            <a:r>
+              <a:rPr lang="en-US" sz="4400" b="1">
+                <a:gradFill flip="none" rotWithShape="1">
+                  <a:gsLst>
+                    <a:gs pos="0">
+                      <a:schemeClr val="bg1">
+                        <a:shade val="30000"/>
+                        <a:satMod val="115000"/>
+                      </a:schemeClr>
+                    </a:gs>
+                    <a:gs pos="50000">
+                      <a:schemeClr val="bg1">
+                        <a:shade val="67500"/>
+                        <a:satMod val="115000"/>
+                      </a:schemeClr>
+                    </a:gs>
+                    <a:gs pos="100000">
+                      <a:schemeClr val="bg1">
+                        <a:shade val="100000"/>
+                        <a:satMod val="115000"/>
+                      </a:schemeClr>
+                    </a:gs>
+                  </a:gsLst>
+                  <a:path path="circle">
+                    <a:fillToRect t="100000" r="100000"/>
+                  </a:path>
+                  <a:tileRect l="-100000" b="-100000"/>
+                </a:gradFill>
+                <a:latin typeface="Rockwell" panose="02060603020205020403" pitchFamily="18" charset="77"/>
+              </a:rPr>
+              <a:t>...later that week...</a:t>
+            </a:r>
+          </a:p>
+        </p:txBody>
+      </p:sp>
+    </p:spTree>
+    <p:extLst>
+      <p:ext uri="{BB962C8B-B14F-4D97-AF65-F5344CB8AC3E}">
+        <p14:creationId xmlns:p14="http://schemas.microsoft.com/office/powerpoint/2010/main" val="687934014"/>
+      </p:ext>
+    </p:extLst>
+  </p:cSld>
+  <p:clrMapOvr>
+    <a:masterClrMapping/>
+  </p:clrMapOvr>
+</p:sld>
+</file>
+
+<file path=ppt/slides/slide17.xml><?xml version="1.0" encoding="utf-8"?>
 <p:sld xmlns:a="http://schemas.openxmlformats.org/drawingml/2006/main" xmlns:r="http://schemas.openxmlformats.org/officeDocument/2006/relationships" xmlns:p="http://schemas.openxmlformats.org/presentationml/2006/main">
   <p:cSld>
     <p:spTree>
@@ -9690,7 +9900,7 @@
 </p:sld>
 </file>
 
-<file path=ppt/slides/slide16.xml><?xml version="1.0" encoding="utf-8"?>
+<file path=ppt/slides/slide18.xml><?xml version="1.0" encoding="utf-8"?>
 <p:sld xmlns:a="http://schemas.openxmlformats.org/drawingml/2006/main" xmlns:r="http://schemas.openxmlformats.org/officeDocument/2006/relationships" xmlns:p="http://schemas.openxmlformats.org/presentationml/2006/main">
   <p:cSld>
     <p:spTree>
@@ -10176,7 +10386,7 @@
 </p:sld>
 </file>
 
-<file path=ppt/slides/slide17.xml><?xml version="1.0" encoding="utf-8"?>
+<file path=ppt/slides/slide19.xml><?xml version="1.0" encoding="utf-8"?>
 <p:sld xmlns:a="http://schemas.openxmlformats.org/drawingml/2006/main" xmlns:r="http://schemas.openxmlformats.org/officeDocument/2006/relationships" xmlns:p="http://schemas.openxmlformats.org/presentationml/2006/main">
   <p:cSld>
     <p:spTree>
@@ -10277,7 +10487,144 @@
 </p:sld>
 </file>
 
-<file path=ppt/slides/slide18.xml><?xml version="1.0" encoding="utf-8"?>
+<file path=ppt/slides/slide2.xml><?xml version="1.0" encoding="utf-8"?>
+<p:sld xmlns:a="http://schemas.openxmlformats.org/drawingml/2006/main" xmlns:r="http://schemas.openxmlformats.org/officeDocument/2006/relationships" xmlns:p="http://schemas.openxmlformats.org/presentationml/2006/main">
+  <p:cSld>
+    <p:spTree>
+      <p:nvGrpSpPr>
+        <p:cNvPr id="1" name=""/>
+        <p:cNvGrpSpPr/>
+        <p:nvPr/>
+      </p:nvGrpSpPr>
+      <p:grpSpPr>
+        <a:xfrm>
+          <a:off x="0" y="0"/>
+          <a:ext cx="0" cy="0"/>
+          <a:chOff x="0" y="0"/>
+          <a:chExt cx="0" cy="0"/>
+        </a:xfrm>
+      </p:grpSpPr>
+      <p:sp>
+        <p:nvSpPr>
+          <p:cNvPr id="2" name="Title 1">
+            <a:extLst>
+              <a:ext uri="{FF2B5EF4-FFF2-40B4-BE49-F238E27FC236}">
+                <a16:creationId xmlns:a16="http://schemas.microsoft.com/office/drawing/2014/main" id="{29C471DD-9850-AEF3-E979-3529F726CAD1}"/>
+              </a:ext>
+            </a:extLst>
+          </p:cNvPr>
+          <p:cNvSpPr>
+            <a:spLocks noGrp="1"/>
+          </p:cNvSpPr>
+          <p:nvPr>
+            <p:ph type="title"/>
+          </p:nvPr>
+        </p:nvSpPr>
+        <p:spPr/>
+        <p:txBody>
+          <a:bodyPr/>
+          <a:lstStyle/>
+          <a:p>
+            <a:endParaRPr lang="en-US"/>
+          </a:p>
+        </p:txBody>
+      </p:sp>
+      <p:sp>
+        <p:nvSpPr>
+          <p:cNvPr id="3" name="Content Placeholder 2">
+            <a:extLst>
+              <a:ext uri="{FF2B5EF4-FFF2-40B4-BE49-F238E27FC236}">
+                <a16:creationId xmlns:a16="http://schemas.microsoft.com/office/drawing/2014/main" id="{3187DB28-AC61-27AC-4FFD-0A76E40A3EF1}"/>
+              </a:ext>
+            </a:extLst>
+          </p:cNvPr>
+          <p:cNvSpPr>
+            <a:spLocks noGrp="1"/>
+          </p:cNvSpPr>
+          <p:nvPr>
+            <p:ph idx="1"/>
+          </p:nvPr>
+        </p:nvSpPr>
+        <p:spPr/>
+        <p:txBody>
+          <a:bodyPr/>
+          <a:lstStyle/>
+          <a:p>
+            <a:r>
+              <a:rPr lang="en-US"/>
+              <a:t>Consider paths we took:</a:t>
+            </a:r>
+          </a:p>
+          <a:p>
+            <a:pPr lvl="1"/>
+            <a:r>
+              <a:rPr lang="en-US"/>
+              <a:t>wordy Java tests</a:t>
+            </a:r>
+          </a:p>
+          <a:p>
+            <a:pPr lvl="1"/>
+            <a:r>
+              <a:rPr lang="en-US"/>
+              <a:t>made a printer </a:t>
+            </a:r>
+          </a:p>
+          <a:p>
+            <a:pPr lvl="1"/>
+            <a:r>
+              <a:rPr lang="en-US"/>
+              <a:t>made a good printer – not a json: Json test // TODO the json tests</a:t>
+            </a:r>
+          </a:p>
+          <a:p>
+            <a:pPr lvl="1"/>
+            <a:r>
+              <a:rPr lang="en-US"/>
+              <a:t>made the inlining – makes it easier to read the whole test better</a:t>
+            </a:r>
+          </a:p>
+          <a:p>
+            <a:pPr lvl="1"/>
+            <a:r>
+              <a:rPr lang="en-US"/>
+              <a:t>did multiple conversations</a:t>
+            </a:r>
+          </a:p>
+          <a:p>
+            <a:pPr lvl="1"/>
+            <a:r>
+              <a:rPr lang="en-US"/>
+              <a:t>now we can see individual tests, but we can’t see the big picture – so we moved it to the uber test – can delete the other files</a:t>
+            </a:r>
+          </a:p>
+          <a:p>
+            <a:pPr lvl="1"/>
+            <a:endParaRPr lang="en-US"/>
+          </a:p>
+          <a:p>
+            <a:pPr lvl="1"/>
+            <a:endParaRPr lang="en-US"/>
+          </a:p>
+          <a:p>
+            <a:pPr lvl="1"/>
+            <a:endParaRPr lang="en-US"/>
+          </a:p>
+        </p:txBody>
+      </p:sp>
+    </p:spTree>
+    <p:extLst>
+      <p:ext uri="{BB962C8B-B14F-4D97-AF65-F5344CB8AC3E}">
+        <p14:creationId xmlns:p14="http://schemas.microsoft.com/office/powerpoint/2010/main" val="2442545096"/>
+      </p:ext>
+    </p:extLst>
+  </p:cSld>
+  <p:clrMapOvr>
+    <a:masterClrMapping/>
+  </p:clrMapOvr>
+</p:sld>
+</file>
+
+<file path=ppt/slides/slide20.xml><?xml version="1.0" encoding="utf-8"?>
 <p:sld xmlns:a="http://schemas.openxmlformats.org/drawingml/2006/main" xmlns:r="http://schemas.openxmlformats.org/officeDocument/2006/relationships" xmlns:p="http://schemas.openxmlformats.org/presentationml/2006/main">
   <p:cSld>
     <p:spTree>
@@ -10691,7 +11038,7 @@
 </p:sld>
 </file>
 
-<file path=ppt/slides/slide19.xml><?xml version="1.0" encoding="utf-8"?>
+<file path=ppt/slides/slide21.xml><?xml version="1.0" encoding="utf-8"?>
 <p:sld xmlns:a="http://schemas.openxmlformats.org/drawingml/2006/main" xmlns:r="http://schemas.openxmlformats.org/officeDocument/2006/relationships" xmlns:p="http://schemas.openxmlformats.org/presentationml/2006/main">
   <p:cSld>
     <p:spTree>
@@ -10757,144 +11104,7 @@
 </p:sld>
 </file>
 
-<file path=ppt/slides/slide2.xml><?xml version="1.0" encoding="utf-8"?>
-<p:sld xmlns:a="http://schemas.openxmlformats.org/drawingml/2006/main" xmlns:r="http://schemas.openxmlformats.org/officeDocument/2006/relationships" xmlns:p="http://schemas.openxmlformats.org/presentationml/2006/main">
-  <p:cSld>
-    <p:spTree>
-      <p:nvGrpSpPr>
-        <p:cNvPr id="1" name=""/>
-        <p:cNvGrpSpPr/>
-        <p:nvPr/>
-      </p:nvGrpSpPr>
-      <p:grpSpPr>
-        <a:xfrm>
-          <a:off x="0" y="0"/>
-          <a:ext cx="0" cy="0"/>
-          <a:chOff x="0" y="0"/>
-          <a:chExt cx="0" cy="0"/>
-        </a:xfrm>
-      </p:grpSpPr>
-      <p:sp>
-        <p:nvSpPr>
-          <p:cNvPr id="2" name="Title 1">
-            <a:extLst>
-              <a:ext uri="{FF2B5EF4-FFF2-40B4-BE49-F238E27FC236}">
-                <a16:creationId xmlns:a16="http://schemas.microsoft.com/office/drawing/2014/main" id="{29C471DD-9850-AEF3-E979-3529F726CAD1}"/>
-              </a:ext>
-            </a:extLst>
-          </p:cNvPr>
-          <p:cNvSpPr>
-            <a:spLocks noGrp="1"/>
-          </p:cNvSpPr>
-          <p:nvPr>
-            <p:ph type="title"/>
-          </p:nvPr>
-        </p:nvSpPr>
-        <p:spPr/>
-        <p:txBody>
-          <a:bodyPr/>
-          <a:lstStyle/>
-          <a:p>
-            <a:endParaRPr lang="en-US"/>
-          </a:p>
-        </p:txBody>
-      </p:sp>
-      <p:sp>
-        <p:nvSpPr>
-          <p:cNvPr id="3" name="Content Placeholder 2">
-            <a:extLst>
-              <a:ext uri="{FF2B5EF4-FFF2-40B4-BE49-F238E27FC236}">
-                <a16:creationId xmlns:a16="http://schemas.microsoft.com/office/drawing/2014/main" id="{3187DB28-AC61-27AC-4FFD-0A76E40A3EF1}"/>
-              </a:ext>
-            </a:extLst>
-          </p:cNvPr>
-          <p:cNvSpPr>
-            <a:spLocks noGrp="1"/>
-          </p:cNvSpPr>
-          <p:nvPr>
-            <p:ph idx="1"/>
-          </p:nvPr>
-        </p:nvSpPr>
-        <p:spPr/>
-        <p:txBody>
-          <a:bodyPr/>
-          <a:lstStyle/>
-          <a:p>
-            <a:r>
-              <a:rPr lang="en-US"/>
-              <a:t>Consider paths we took:</a:t>
-            </a:r>
-          </a:p>
-          <a:p>
-            <a:pPr lvl="1"/>
-            <a:r>
-              <a:rPr lang="en-US"/>
-              <a:t>wordy Java tests</a:t>
-            </a:r>
-          </a:p>
-          <a:p>
-            <a:pPr lvl="1"/>
-            <a:r>
-              <a:rPr lang="en-US"/>
-              <a:t>made a printer </a:t>
-            </a:r>
-          </a:p>
-          <a:p>
-            <a:pPr lvl="1"/>
-            <a:r>
-              <a:rPr lang="en-US"/>
-              <a:t>made a good printer – not a json: Json test // TODO the json tests</a:t>
-            </a:r>
-          </a:p>
-          <a:p>
-            <a:pPr lvl="1"/>
-            <a:r>
-              <a:rPr lang="en-US"/>
-              <a:t>made the inlining – makes it easier to read the whole test better</a:t>
-            </a:r>
-          </a:p>
-          <a:p>
-            <a:pPr lvl="1"/>
-            <a:r>
-              <a:rPr lang="en-US"/>
-              <a:t>did multiple conversations</a:t>
-            </a:r>
-          </a:p>
-          <a:p>
-            <a:pPr lvl="1"/>
-            <a:r>
-              <a:rPr lang="en-US"/>
-              <a:t>now we can see individual tests, but we can’t see the big picture – so we moved it to the uber test – can delete the other files</a:t>
-            </a:r>
-          </a:p>
-          <a:p>
-            <a:pPr lvl="1"/>
-            <a:endParaRPr lang="en-US"/>
-          </a:p>
-          <a:p>
-            <a:pPr lvl="1"/>
-            <a:endParaRPr lang="en-US"/>
-          </a:p>
-          <a:p>
-            <a:pPr lvl="1"/>
-            <a:endParaRPr lang="en-US"/>
-          </a:p>
-        </p:txBody>
-      </p:sp>
-    </p:spTree>
-    <p:extLst>
-      <p:ext uri="{BB962C8B-B14F-4D97-AF65-F5344CB8AC3E}">
-        <p14:creationId xmlns:p14="http://schemas.microsoft.com/office/powerpoint/2010/main" val="2442545096"/>
-      </p:ext>
-    </p:extLst>
-  </p:cSld>
-  <p:clrMapOvr>
-    <a:masterClrMapping/>
-  </p:clrMapOvr>
-</p:sld>
-</file>
-
-<file path=ppt/slides/slide20.xml><?xml version="1.0" encoding="utf-8"?>
+<file path=ppt/slides/slide22.xml><?xml version="1.0" encoding="utf-8"?>
 <p:sld xmlns:a="http://schemas.openxmlformats.org/drawingml/2006/main" xmlns:r="http://schemas.openxmlformats.org/officeDocument/2006/relationships" xmlns:p="http://schemas.openxmlformats.org/presentationml/2006/main">
   <p:cSld>
     <p:spTree>
@@ -11308,7 +11518,7 @@
 </p:sld>
 </file>
 
-<file path=ppt/slides/slide21.xml><?xml version="1.0" encoding="utf-8"?>
+<file path=ppt/slides/slide23.xml><?xml version="1.0" encoding="utf-8"?>
 <p:sld xmlns:a="http://schemas.openxmlformats.org/drawingml/2006/main" xmlns:r="http://schemas.openxmlformats.org/officeDocument/2006/relationships" xmlns:p="http://schemas.openxmlformats.org/presentationml/2006/main">
   <p:cSld>
     <p:spTree>
@@ -11714,7 +11924,7 @@
 </p:sld>
 </file>
 
-<file path=ppt/slides/slide22.xml><?xml version="1.0" encoding="utf-8"?>
+<file path=ppt/slides/slide24.xml><?xml version="1.0" encoding="utf-8"?>
 <p:sld xmlns:a="http://schemas.openxmlformats.org/drawingml/2006/main" xmlns:r="http://schemas.openxmlformats.org/officeDocument/2006/relationships" xmlns:p="http://schemas.openxmlformats.org/presentationml/2006/main">
   <p:cSld>
     <p:spTree>
@@ -11943,7 +12153,7 @@
 </p:sld>
 </file>
 
-<file path=ppt/slides/slide23.xml><?xml version="1.0" encoding="utf-8"?>
+<file path=ppt/slides/slide25.xml><?xml version="1.0" encoding="utf-8"?>
 <p:sld xmlns:a="http://schemas.openxmlformats.org/drawingml/2006/main" xmlns:r="http://schemas.openxmlformats.org/officeDocument/2006/relationships" xmlns:p="http://schemas.openxmlformats.org/presentationml/2006/main">
   <p:cSld>
     <p:spTree>
@@ -12169,7 +12379,7 @@
 </p:sld>
 </file>
 
-<file path=ppt/slides/slide24.xml><?xml version="1.0" encoding="utf-8"?>
+<file path=ppt/slides/slide26.xml><?xml version="1.0" encoding="utf-8"?>
 <p:sld xmlns:a="http://schemas.openxmlformats.org/drawingml/2006/main" xmlns:r="http://schemas.openxmlformats.org/officeDocument/2006/relationships" xmlns:p="http://schemas.openxmlformats.org/presentationml/2006/main">
   <p:cSld>
     <p:spTree>
@@ -12235,7 +12445,7 @@
 </p:sld>
 </file>
 
-<file path=ppt/slides/slide25.xml><?xml version="1.0" encoding="utf-8"?>
+<file path=ppt/slides/slide27.xml><?xml version="1.0" encoding="utf-8"?>
 <p:sld xmlns:a="http://schemas.openxmlformats.org/drawingml/2006/main" xmlns:r="http://schemas.openxmlformats.org/officeDocument/2006/relationships" xmlns:p="http://schemas.openxmlformats.org/presentationml/2006/main">
   <p:cSld>
     <p:spTree>
@@ -12464,7 +12674,7 @@
 </p:sld>
 </file>
 
-<file path=ppt/slides/slide26.xml><?xml version="1.0" encoding="utf-8"?>
+<file path=ppt/slides/slide28.xml><?xml version="1.0" encoding="utf-8"?>
 <p:sld xmlns:a="http://schemas.openxmlformats.org/drawingml/2006/main" xmlns:r="http://schemas.openxmlformats.org/officeDocument/2006/relationships" xmlns:p="http://schemas.openxmlformats.org/presentationml/2006/main">
   <p:cSld>
     <p:spTree>
@@ -12652,7 +12862,7 @@
 </p:sld>
 </file>
 
-<file path=ppt/slides/slide27.xml><?xml version="1.0" encoding="utf-8"?>
+<file path=ppt/slides/slide29.xml><?xml version="1.0" encoding="utf-8"?>
 <p:sld xmlns:a="http://schemas.openxmlformats.org/drawingml/2006/main" xmlns:r="http://schemas.openxmlformats.org/officeDocument/2006/relationships" xmlns:p="http://schemas.openxmlformats.org/presentationml/2006/main">
   <p:cSld>
     <p:spTree>
@@ -12756,7 +12966,1583 @@
 </p:sld>
 </file>
 
-<file path=ppt/slides/slide28.xml><?xml version="1.0" encoding="utf-8"?>
+<file path=ppt/slides/slide3.xml><?xml version="1.0" encoding="utf-8"?>
+<p:sld xmlns:a="http://schemas.openxmlformats.org/drawingml/2006/main" xmlns:r="http://schemas.openxmlformats.org/officeDocument/2006/relationships" xmlns:p="http://schemas.openxmlformats.org/presentationml/2006/main">
+  <p:cSld>
+    <p:spTree>
+      <p:nvGrpSpPr>
+        <p:cNvPr id="1" name=""/>
+        <p:cNvGrpSpPr/>
+        <p:nvPr/>
+      </p:nvGrpSpPr>
+      <p:grpSpPr>
+        <a:xfrm>
+          <a:off x="0" y="0"/>
+          <a:ext cx="0" cy="0"/>
+          <a:chOff x="0" y="0"/>
+          <a:chExt cx="0" cy="0"/>
+        </a:xfrm>
+      </p:grpSpPr>
+      <p:sp>
+        <p:nvSpPr>
+          <p:cNvPr id="2" name="Title 1">
+            <a:extLst>
+              <a:ext uri="{FF2B5EF4-FFF2-40B4-BE49-F238E27FC236}">
+                <a16:creationId xmlns:a16="http://schemas.microsoft.com/office/drawing/2014/main" id="{5FDF8E1D-0B99-4C64-504D-96FFBC67709F}"/>
+              </a:ext>
+            </a:extLst>
+          </p:cNvPr>
+          <p:cNvSpPr>
+            <a:spLocks noGrp="1"/>
+          </p:cNvSpPr>
+          <p:nvPr>
+            <p:ph type="title"/>
+          </p:nvPr>
+        </p:nvSpPr>
+        <p:spPr/>
+        <p:txBody>
+          <a:bodyPr/>
+          <a:lstStyle/>
+          <a:p>
+            <a:r>
+              <a:rPr lang="en-US" dirty="0"/>
+              <a:t>Original</a:t>
+            </a:r>
+          </a:p>
+        </p:txBody>
+      </p:sp>
+      <p:sp>
+        <p:nvSpPr>
+          <p:cNvPr id="3" name="Content Placeholder 2">
+            <a:extLst>
+              <a:ext uri="{FF2B5EF4-FFF2-40B4-BE49-F238E27FC236}">
+                <a16:creationId xmlns:a16="http://schemas.microsoft.com/office/drawing/2014/main" id="{3618D96A-1571-1C4D-9574-BEAFBAC5E719}"/>
+              </a:ext>
+            </a:extLst>
+          </p:cNvPr>
+          <p:cNvSpPr>
+            <a:spLocks noGrp="1"/>
+          </p:cNvSpPr>
+          <p:nvPr>
+            <p:ph idx="1"/>
+          </p:nvPr>
+        </p:nvSpPr>
+        <p:spPr>
+          <a:xfrm>
+            <a:off x="838200" y="1825625"/>
+            <a:ext cx="11049000" cy="4351338"/>
+          </a:xfrm>
+        </p:spPr>
+        <p:txBody>
+          <a:bodyPr>
+            <a:noAutofit/>
+          </a:bodyPr>
+          <a:lstStyle/>
+          <a:p>
+            <a:pPr marL="0" indent="0">
+              <a:buNone/>
+            </a:pPr>
+            <a:br>
+              <a:rPr lang="en-US" sz="800" dirty="0">
+                <a:solidFill>
+                  <a:srgbClr val="080808"/>
+                </a:solidFill>
+                <a:effectLst/>
+                <a:latin typeface="Fira Code" pitchFamily="49" charset="0"/>
+                <a:ea typeface="Fira Code" pitchFamily="49" charset="0"/>
+                <a:cs typeface="Fira Code" pitchFamily="49" charset="0"/>
+              </a:rPr>
+            </a:br>
+            <a:r>
+              <a:rPr lang="en-US" sz="800" dirty="0">
+                <a:solidFill>
+                  <a:srgbClr val="9E880D"/>
+                </a:solidFill>
+                <a:effectLst/>
+                <a:latin typeface="Fira Code" pitchFamily="49" charset="0"/>
+                <a:ea typeface="Fira Code" pitchFamily="49" charset="0"/>
+                <a:cs typeface="Fira Code" pitchFamily="49" charset="0"/>
+              </a:rPr>
+              <a:t>@Test</a:t>
+            </a:r>
+            <a:br>
+              <a:rPr lang="en-US" sz="800" dirty="0">
+                <a:solidFill>
+                  <a:srgbClr val="9E880D"/>
+                </a:solidFill>
+                <a:effectLst/>
+                <a:latin typeface="Fira Code" pitchFamily="49" charset="0"/>
+                <a:ea typeface="Fira Code" pitchFamily="49" charset="0"/>
+                <a:cs typeface="Fira Code" pitchFamily="49" charset="0"/>
+              </a:rPr>
+            </a:br>
+            <a:r>
+              <a:rPr lang="en-US" sz="800" dirty="0">
+                <a:solidFill>
+                  <a:srgbClr val="0033B3"/>
+                </a:solidFill>
+                <a:effectLst/>
+                <a:latin typeface="Fira Code" pitchFamily="49" charset="0"/>
+                <a:ea typeface="Fira Code" pitchFamily="49" charset="0"/>
+                <a:cs typeface="Fira Code" pitchFamily="49" charset="0"/>
+              </a:rPr>
+              <a:t>public void </a:t>
+            </a:r>
+            <a:r>
+              <a:rPr lang="en-US" sz="800" dirty="0" err="1">
+                <a:solidFill>
+                  <a:srgbClr val="00627A"/>
+                </a:solidFill>
+                <a:effectLst/>
+                <a:latin typeface="Fira Code" pitchFamily="49" charset="0"/>
+                <a:ea typeface="Fira Code" pitchFamily="49" charset="0"/>
+                <a:cs typeface="Fira Code" pitchFamily="49" charset="0"/>
+              </a:rPr>
+              <a:t>shouldGetCustomerFromService</a:t>
+            </a:r>
+            <a:r>
+              <a:rPr lang="en-US" sz="800" dirty="0">
+                <a:solidFill>
+                  <a:srgbClr val="080808"/>
+                </a:solidFill>
+                <a:effectLst/>
+                <a:latin typeface="Fira Code" pitchFamily="49" charset="0"/>
+                <a:ea typeface="Fira Code" pitchFamily="49" charset="0"/>
+                <a:cs typeface="Fira Code" pitchFamily="49" charset="0"/>
+              </a:rPr>
+              <a:t>() {</a:t>
+            </a:r>
+            <a:br>
+              <a:rPr lang="en-US" sz="800" dirty="0">
+                <a:solidFill>
+                  <a:srgbClr val="080808"/>
+                </a:solidFill>
+                <a:effectLst/>
+                <a:latin typeface="Fira Code" pitchFamily="49" charset="0"/>
+                <a:ea typeface="Fira Code" pitchFamily="49" charset="0"/>
+                <a:cs typeface="Fira Code" pitchFamily="49" charset="0"/>
+              </a:rPr>
+            </a:br>
+            <a:r>
+              <a:rPr lang="en-US" sz="800" dirty="0">
+                <a:solidFill>
+                  <a:srgbClr val="080808"/>
+                </a:solidFill>
+                <a:effectLst/>
+                <a:latin typeface="Fira Code" pitchFamily="49" charset="0"/>
+                <a:ea typeface="Fira Code" pitchFamily="49" charset="0"/>
+                <a:cs typeface="Fira Code" pitchFamily="49" charset="0"/>
+              </a:rPr>
+              <a:t>    </a:t>
+            </a:r>
+            <a:r>
+              <a:rPr lang="en-US" sz="800" i="1" dirty="0">
+                <a:solidFill>
+                  <a:srgbClr val="8C8C8C"/>
+                </a:solidFill>
+                <a:effectLst/>
+                <a:latin typeface="Fira Code" pitchFamily="49" charset="0"/>
+                <a:ea typeface="Fira Code" pitchFamily="49" charset="0"/>
+                <a:cs typeface="Fira Code" pitchFamily="49" charset="0"/>
+              </a:rPr>
+              <a:t>// given</a:t>
+            </a:r>
+            <a:br>
+              <a:rPr lang="en-US" sz="800" i="1" dirty="0">
+                <a:solidFill>
+                  <a:srgbClr val="8C8C8C"/>
+                </a:solidFill>
+                <a:effectLst/>
+                <a:latin typeface="Fira Code" pitchFamily="49" charset="0"/>
+                <a:ea typeface="Fira Code" pitchFamily="49" charset="0"/>
+                <a:cs typeface="Fira Code" pitchFamily="49" charset="0"/>
+              </a:rPr>
+            </a:br>
+            <a:r>
+              <a:rPr lang="en-US" sz="800" i="1" dirty="0">
+                <a:solidFill>
+                  <a:srgbClr val="8C8C8C"/>
+                </a:solidFill>
+                <a:effectLst/>
+                <a:latin typeface="Fira Code" pitchFamily="49" charset="0"/>
+                <a:ea typeface="Fira Code" pitchFamily="49" charset="0"/>
+                <a:cs typeface="Fira Code" pitchFamily="49" charset="0"/>
+              </a:rPr>
+              <a:t>    </a:t>
+            </a:r>
+            <a:r>
+              <a:rPr lang="en-US" sz="800" dirty="0" err="1">
+                <a:solidFill>
+                  <a:srgbClr val="871094"/>
+                </a:solidFill>
+                <a:effectLst/>
+                <a:latin typeface="Fira Code" pitchFamily="49" charset="0"/>
+                <a:ea typeface="Fira Code" pitchFamily="49" charset="0"/>
+                <a:cs typeface="Fira Code" pitchFamily="49" charset="0"/>
+              </a:rPr>
+              <a:t>accountType</a:t>
+            </a:r>
+            <a:r>
+              <a:rPr lang="en-US" sz="800" dirty="0">
+                <a:solidFill>
+                  <a:srgbClr val="871094"/>
+                </a:solidFill>
+                <a:effectLst/>
+                <a:latin typeface="Fira Code" pitchFamily="49" charset="0"/>
+                <a:ea typeface="Fira Code" pitchFamily="49" charset="0"/>
+                <a:cs typeface="Fira Code" pitchFamily="49" charset="0"/>
+              </a:rPr>
+              <a:t> </a:t>
+            </a:r>
+            <a:r>
+              <a:rPr lang="en-US" sz="800" dirty="0">
+                <a:solidFill>
+                  <a:srgbClr val="080808"/>
+                </a:solidFill>
+                <a:effectLst/>
+                <a:latin typeface="Fira Code" pitchFamily="49" charset="0"/>
+                <a:ea typeface="Fira Code" pitchFamily="49" charset="0"/>
+                <a:cs typeface="Fira Code" pitchFamily="49" charset="0"/>
+              </a:rPr>
+              <a:t>= </a:t>
+            </a:r>
+            <a:r>
+              <a:rPr lang="en-US" sz="800" dirty="0" err="1">
+                <a:solidFill>
+                  <a:srgbClr val="000000"/>
+                </a:solidFill>
+                <a:effectLst/>
+                <a:latin typeface="Fira Code" pitchFamily="49" charset="0"/>
+                <a:ea typeface="Fira Code" pitchFamily="49" charset="0"/>
+                <a:cs typeface="Fira Code" pitchFamily="49" charset="0"/>
+              </a:rPr>
+              <a:t>CustomerAccountTypeInfo</a:t>
+            </a:r>
+            <a:r>
+              <a:rPr lang="en-US" sz="800" dirty="0" err="1">
+                <a:solidFill>
+                  <a:srgbClr val="080808"/>
+                </a:solidFill>
+                <a:effectLst/>
+                <a:latin typeface="Fira Code" pitchFamily="49" charset="0"/>
+                <a:ea typeface="Fira Code" pitchFamily="49" charset="0"/>
+                <a:cs typeface="Fira Code" pitchFamily="49" charset="0"/>
+              </a:rPr>
+              <a:t>.</a:t>
+            </a:r>
+            <a:r>
+              <a:rPr lang="en-US" sz="800" i="1" dirty="0" err="1">
+                <a:solidFill>
+                  <a:srgbClr val="080808"/>
+                </a:solidFill>
+                <a:effectLst/>
+                <a:latin typeface="Fira Code" pitchFamily="49" charset="0"/>
+                <a:ea typeface="Fira Code" pitchFamily="49" charset="0"/>
+                <a:cs typeface="Fira Code" pitchFamily="49" charset="0"/>
+              </a:rPr>
+              <a:t>builder</a:t>
+            </a:r>
+            <a:r>
+              <a:rPr lang="en-US" sz="800" dirty="0">
+                <a:solidFill>
+                  <a:srgbClr val="080808"/>
+                </a:solidFill>
+                <a:effectLst/>
+                <a:latin typeface="Fira Code" pitchFamily="49" charset="0"/>
+                <a:ea typeface="Fira Code" pitchFamily="49" charset="0"/>
+                <a:cs typeface="Fira Code" pitchFamily="49" charset="0"/>
+              </a:rPr>
+              <a:t>().</a:t>
+            </a:r>
+            <a:r>
+              <a:rPr lang="en-US" sz="800" dirty="0" err="1">
+                <a:solidFill>
+                  <a:srgbClr val="080808"/>
+                </a:solidFill>
+                <a:effectLst/>
+                <a:latin typeface="Fira Code" pitchFamily="49" charset="0"/>
+                <a:ea typeface="Fira Code" pitchFamily="49" charset="0"/>
+                <a:cs typeface="Fira Code" pitchFamily="49" charset="0"/>
+              </a:rPr>
+              <a:t>account</a:t>
+            </a:r>
+            <a:r>
+              <a:rPr lang="en-US" sz="800" dirty="0">
+                <a:solidFill>
+                  <a:srgbClr val="080808"/>
+                </a:solidFill>
+                <a:effectLst/>
+                <a:latin typeface="Fira Code" pitchFamily="49" charset="0"/>
+                <a:ea typeface="Fira Code" pitchFamily="49" charset="0"/>
+                <a:cs typeface="Fira Code" pitchFamily="49" charset="0"/>
+              </a:rPr>
+              <a:t>(</a:t>
+            </a:r>
+            <a:r>
+              <a:rPr lang="en-US" sz="800" i="1" dirty="0">
+                <a:solidFill>
+                  <a:srgbClr val="871094"/>
+                </a:solidFill>
+                <a:effectLst/>
+                <a:latin typeface="Fira Code" pitchFamily="49" charset="0"/>
+                <a:ea typeface="Fira Code" pitchFamily="49" charset="0"/>
+                <a:cs typeface="Fira Code" pitchFamily="49" charset="0"/>
+              </a:rPr>
+              <a:t>ACCOUNT_ID)</a:t>
+            </a:r>
+            <a:r>
+              <a:rPr lang="en-US" sz="800" i="1" dirty="0">
+                <a:solidFill>
+                  <a:srgbClr val="080808"/>
+                </a:solidFill>
+                <a:latin typeface="Fira Code" pitchFamily="49" charset="0"/>
+                <a:ea typeface="Fira Code" pitchFamily="49" charset="0"/>
+                <a:cs typeface="Fira Code" pitchFamily="49" charset="0"/>
+              </a:rPr>
+              <a:t>.</a:t>
+            </a:r>
+            <a:r>
+              <a:rPr lang="en-US" sz="800" dirty="0" err="1">
+                <a:solidFill>
+                  <a:srgbClr val="080808"/>
+                </a:solidFill>
+                <a:effectLst/>
+                <a:latin typeface="Fira Code" pitchFamily="49" charset="0"/>
+                <a:ea typeface="Fira Code" pitchFamily="49" charset="0"/>
+                <a:cs typeface="Fira Code" pitchFamily="49" charset="0"/>
+              </a:rPr>
+              <a:t>accountType</a:t>
+            </a:r>
+            <a:r>
+              <a:rPr lang="en-US" sz="800" dirty="0">
+                <a:solidFill>
+                  <a:srgbClr val="080808"/>
+                </a:solidFill>
+                <a:effectLst/>
+                <a:latin typeface="Fira Code" pitchFamily="49" charset="0"/>
+                <a:ea typeface="Fira Code" pitchFamily="49" charset="0"/>
+                <a:cs typeface="Fira Code" pitchFamily="49" charset="0"/>
+              </a:rPr>
+              <a:t>(</a:t>
+            </a:r>
+            <a:r>
+              <a:rPr lang="en-US" sz="800" dirty="0">
+                <a:solidFill>
+                  <a:srgbClr val="067D17"/>
+                </a:solidFill>
+                <a:effectLst/>
+                <a:latin typeface="Fira Code" pitchFamily="49" charset="0"/>
+                <a:ea typeface="Fira Code" pitchFamily="49" charset="0"/>
+                <a:cs typeface="Fira Code" pitchFamily="49" charset="0"/>
+              </a:rPr>
+              <a:t>”PERSONAL"</a:t>
+            </a:r>
+            <a:r>
+              <a:rPr lang="en-US" sz="800" dirty="0">
+                <a:solidFill>
+                  <a:srgbClr val="080808"/>
+                </a:solidFill>
+                <a:effectLst/>
+                <a:latin typeface="Fira Code" pitchFamily="49" charset="0"/>
+                <a:ea typeface="Fira Code" pitchFamily="49" charset="0"/>
+                <a:cs typeface="Fira Code" pitchFamily="49" charset="0"/>
+              </a:rPr>
+              <a:t>).</a:t>
+            </a:r>
+            <a:r>
+              <a:rPr lang="en-US" sz="800" dirty="0" err="1">
+                <a:solidFill>
+                  <a:srgbClr val="080808"/>
+                </a:solidFill>
+                <a:effectLst/>
+                <a:latin typeface="Fira Code" pitchFamily="49" charset="0"/>
+                <a:ea typeface="Fira Code" pitchFamily="49" charset="0"/>
+                <a:cs typeface="Fira Code" pitchFamily="49" charset="0"/>
+              </a:rPr>
+              <a:t>subscription</a:t>
+            </a:r>
+            <a:r>
+              <a:rPr lang="en-US" sz="800" dirty="0">
+                <a:solidFill>
+                  <a:srgbClr val="080808"/>
+                </a:solidFill>
+                <a:effectLst/>
+                <a:latin typeface="Fira Code" pitchFamily="49" charset="0"/>
+                <a:ea typeface="Fira Code" pitchFamily="49" charset="0"/>
+                <a:cs typeface="Fira Code" pitchFamily="49" charset="0"/>
+              </a:rPr>
+              <a:t>(</a:t>
+            </a:r>
+            <a:r>
+              <a:rPr lang="en-US" sz="800" dirty="0">
+                <a:solidFill>
+                  <a:srgbClr val="067D17"/>
+                </a:solidFill>
+                <a:effectLst/>
+                <a:latin typeface="Fira Code" pitchFamily="49" charset="0"/>
+                <a:ea typeface="Fira Code" pitchFamily="49" charset="0"/>
+                <a:cs typeface="Fira Code" pitchFamily="49" charset="0"/>
+              </a:rPr>
+              <a:t>”MONTHLY"</a:t>
+            </a:r>
+            <a:r>
+              <a:rPr lang="en-US" sz="800" dirty="0">
+                <a:solidFill>
+                  <a:srgbClr val="080808"/>
+                </a:solidFill>
+                <a:effectLst/>
+                <a:latin typeface="Fira Code" pitchFamily="49" charset="0"/>
+                <a:ea typeface="Fira Code" pitchFamily="49" charset="0"/>
+                <a:cs typeface="Fira Code" pitchFamily="49" charset="0"/>
+              </a:rPr>
+              <a:t>).build();</a:t>
+            </a:r>
+            <a:br>
+              <a:rPr lang="en-US" sz="800" dirty="0">
+                <a:solidFill>
+                  <a:srgbClr val="080808"/>
+                </a:solidFill>
+                <a:effectLst/>
+                <a:latin typeface="Fira Code" pitchFamily="49" charset="0"/>
+                <a:ea typeface="Fira Code" pitchFamily="49" charset="0"/>
+                <a:cs typeface="Fira Code" pitchFamily="49" charset="0"/>
+              </a:rPr>
+            </a:br>
+            <a:r>
+              <a:rPr lang="en-US" sz="800" dirty="0">
+                <a:solidFill>
+                  <a:srgbClr val="080808"/>
+                </a:solidFill>
+                <a:effectLst/>
+                <a:latin typeface="Fira Code" pitchFamily="49" charset="0"/>
+                <a:ea typeface="Fira Code" pitchFamily="49" charset="0"/>
+                <a:cs typeface="Fira Code" pitchFamily="49" charset="0"/>
+              </a:rPr>
+              <a:t>    </a:t>
+            </a:r>
+            <a:r>
+              <a:rPr lang="en-US" sz="800" i="1" dirty="0">
+                <a:solidFill>
+                  <a:srgbClr val="080808"/>
+                </a:solidFill>
+                <a:effectLst/>
+                <a:latin typeface="Fira Code" pitchFamily="49" charset="0"/>
+                <a:ea typeface="Fira Code" pitchFamily="49" charset="0"/>
+                <a:cs typeface="Fira Code" pitchFamily="49" charset="0"/>
+              </a:rPr>
+              <a:t>when</a:t>
+            </a:r>
+            <a:r>
+              <a:rPr lang="en-US" sz="800" dirty="0">
+                <a:solidFill>
+                  <a:srgbClr val="080808"/>
+                </a:solidFill>
+                <a:effectLst/>
+                <a:latin typeface="Fira Code" pitchFamily="49" charset="0"/>
+                <a:ea typeface="Fira Code" pitchFamily="49" charset="0"/>
+                <a:cs typeface="Fira Code" pitchFamily="49" charset="0"/>
+              </a:rPr>
+              <a:t>(</a:t>
+            </a:r>
+            <a:r>
+              <a:rPr lang="en-US" sz="800" dirty="0" err="1">
+                <a:solidFill>
+                  <a:srgbClr val="871094"/>
+                </a:solidFill>
+                <a:effectLst/>
+                <a:latin typeface="Fira Code" pitchFamily="49" charset="0"/>
+                <a:ea typeface="Fira Code" pitchFamily="49" charset="0"/>
+                <a:cs typeface="Fira Code" pitchFamily="49" charset="0"/>
+              </a:rPr>
+              <a:t>responseEntity</a:t>
+            </a:r>
+            <a:r>
+              <a:rPr lang="en-US" sz="800" dirty="0" err="1">
+                <a:solidFill>
+                  <a:srgbClr val="080808"/>
+                </a:solidFill>
+                <a:effectLst/>
+                <a:latin typeface="Fira Code" pitchFamily="49" charset="0"/>
+                <a:ea typeface="Fira Code" pitchFamily="49" charset="0"/>
+                <a:cs typeface="Fira Code" pitchFamily="49" charset="0"/>
+              </a:rPr>
+              <a:t>.getBody</a:t>
+            </a:r>
+            <a:r>
+              <a:rPr lang="en-US" sz="800" dirty="0">
+                <a:solidFill>
+                  <a:srgbClr val="080808"/>
+                </a:solidFill>
+                <a:effectLst/>
+                <a:latin typeface="Fira Code" pitchFamily="49" charset="0"/>
+                <a:ea typeface="Fira Code" pitchFamily="49" charset="0"/>
+                <a:cs typeface="Fira Code" pitchFamily="49" charset="0"/>
+              </a:rPr>
+              <a:t>()).</a:t>
+            </a:r>
+            <a:r>
+              <a:rPr lang="en-US" sz="800" dirty="0" err="1">
+                <a:solidFill>
+                  <a:srgbClr val="080808"/>
+                </a:solidFill>
+                <a:effectLst/>
+                <a:latin typeface="Fira Code" pitchFamily="49" charset="0"/>
+                <a:ea typeface="Fira Code" pitchFamily="49" charset="0"/>
+                <a:cs typeface="Fira Code" pitchFamily="49" charset="0"/>
+              </a:rPr>
+              <a:t>thenReturn</a:t>
+            </a:r>
+            <a:r>
+              <a:rPr lang="en-US" sz="800" dirty="0">
+                <a:solidFill>
+                  <a:srgbClr val="080808"/>
+                </a:solidFill>
+                <a:effectLst/>
+                <a:latin typeface="Fira Code" pitchFamily="49" charset="0"/>
+                <a:ea typeface="Fira Code" pitchFamily="49" charset="0"/>
+                <a:cs typeface="Fira Code" pitchFamily="49" charset="0"/>
+              </a:rPr>
+              <a:t>(</a:t>
+            </a:r>
+            <a:r>
+              <a:rPr lang="en-US" sz="800" dirty="0" err="1">
+                <a:solidFill>
+                  <a:srgbClr val="871094"/>
+                </a:solidFill>
+                <a:effectLst/>
+                <a:latin typeface="Fira Code" pitchFamily="49" charset="0"/>
+                <a:ea typeface="Fira Code" pitchFamily="49" charset="0"/>
+                <a:cs typeface="Fira Code" pitchFamily="49" charset="0"/>
+              </a:rPr>
+              <a:t>accountType</a:t>
+            </a:r>
+            <a:r>
+              <a:rPr lang="en-US" sz="800" dirty="0">
+                <a:solidFill>
+                  <a:srgbClr val="080808"/>
+                </a:solidFill>
+                <a:effectLst/>
+                <a:latin typeface="Fira Code" pitchFamily="49" charset="0"/>
+                <a:ea typeface="Fira Code" pitchFamily="49" charset="0"/>
+                <a:cs typeface="Fira Code" pitchFamily="49" charset="0"/>
+              </a:rPr>
+              <a:t>);</a:t>
+            </a:r>
+            <a:br>
+              <a:rPr lang="en-US" sz="800" dirty="0">
+                <a:solidFill>
+                  <a:srgbClr val="080808"/>
+                </a:solidFill>
+                <a:effectLst/>
+                <a:latin typeface="Fira Code" pitchFamily="49" charset="0"/>
+                <a:ea typeface="Fira Code" pitchFamily="49" charset="0"/>
+                <a:cs typeface="Fira Code" pitchFamily="49" charset="0"/>
+              </a:rPr>
+            </a:br>
+            <a:r>
+              <a:rPr lang="en-US" sz="800" dirty="0">
+                <a:solidFill>
+                  <a:srgbClr val="080808"/>
+                </a:solidFill>
+                <a:effectLst/>
+                <a:latin typeface="Fira Code" pitchFamily="49" charset="0"/>
+                <a:ea typeface="Fira Code" pitchFamily="49" charset="0"/>
+                <a:cs typeface="Fira Code" pitchFamily="49" charset="0"/>
+              </a:rPr>
+              <a:t>    </a:t>
+            </a:r>
+            <a:r>
+              <a:rPr lang="en-US" sz="800" i="1" dirty="0">
+                <a:solidFill>
+                  <a:srgbClr val="8C8C8C"/>
+                </a:solidFill>
+                <a:effectLst/>
+                <a:latin typeface="Fira Code" pitchFamily="49" charset="0"/>
+                <a:ea typeface="Fira Code" pitchFamily="49" charset="0"/>
+                <a:cs typeface="Fira Code" pitchFamily="49" charset="0"/>
+              </a:rPr>
+              <a:t>// when</a:t>
+            </a:r>
+            <a:br>
+              <a:rPr lang="en-US" sz="800" i="1" dirty="0">
+                <a:solidFill>
+                  <a:srgbClr val="8C8C8C"/>
+                </a:solidFill>
+                <a:effectLst/>
+                <a:latin typeface="Fira Code" pitchFamily="49" charset="0"/>
+                <a:ea typeface="Fira Code" pitchFamily="49" charset="0"/>
+                <a:cs typeface="Fira Code" pitchFamily="49" charset="0"/>
+              </a:rPr>
+            </a:br>
+            <a:r>
+              <a:rPr lang="en-US" sz="800" i="1" dirty="0">
+                <a:solidFill>
+                  <a:srgbClr val="8C8C8C"/>
+                </a:solidFill>
+                <a:effectLst/>
+                <a:latin typeface="Fira Code" pitchFamily="49" charset="0"/>
+                <a:ea typeface="Fira Code" pitchFamily="49" charset="0"/>
+                <a:cs typeface="Fira Code" pitchFamily="49" charset="0"/>
+              </a:rPr>
+              <a:t>    </a:t>
+            </a:r>
+            <a:r>
+              <a:rPr lang="en-US" sz="800" dirty="0" err="1">
+                <a:solidFill>
+                  <a:srgbClr val="000000"/>
+                </a:solidFill>
+                <a:effectLst/>
+                <a:latin typeface="Fira Code" pitchFamily="49" charset="0"/>
+                <a:ea typeface="Fira Code" pitchFamily="49" charset="0"/>
+                <a:cs typeface="Fira Code" pitchFamily="49" charset="0"/>
+              </a:rPr>
+              <a:t>CustomerAccount</a:t>
+            </a:r>
+            <a:r>
+              <a:rPr lang="en-US" sz="800" dirty="0">
+                <a:solidFill>
+                  <a:srgbClr val="000000"/>
+                </a:solidFill>
+                <a:effectLst/>
+                <a:latin typeface="Fira Code" pitchFamily="49" charset="0"/>
+                <a:ea typeface="Fira Code" pitchFamily="49" charset="0"/>
+                <a:cs typeface="Fira Code" pitchFamily="49" charset="0"/>
+              </a:rPr>
+              <a:t> result </a:t>
+            </a:r>
+            <a:r>
+              <a:rPr lang="en-US" sz="800" dirty="0">
+                <a:solidFill>
+                  <a:srgbClr val="080808"/>
+                </a:solidFill>
+                <a:effectLst/>
+                <a:latin typeface="Fira Code" pitchFamily="49" charset="0"/>
+                <a:ea typeface="Fira Code" pitchFamily="49" charset="0"/>
+                <a:cs typeface="Fira Code" pitchFamily="49" charset="0"/>
+              </a:rPr>
+              <a:t>= </a:t>
+            </a:r>
+            <a:r>
+              <a:rPr lang="en-US" sz="800" dirty="0" err="1">
+                <a:solidFill>
+                  <a:srgbClr val="871094"/>
+                </a:solidFill>
+                <a:effectLst/>
+                <a:latin typeface="Fira Code" pitchFamily="49" charset="0"/>
+                <a:ea typeface="Fira Code" pitchFamily="49" charset="0"/>
+                <a:cs typeface="Fira Code" pitchFamily="49" charset="0"/>
+              </a:rPr>
+              <a:t>customerService</a:t>
+            </a:r>
+            <a:r>
+              <a:rPr lang="en-US" sz="800" dirty="0" err="1">
+                <a:solidFill>
+                  <a:srgbClr val="080808"/>
+                </a:solidFill>
+                <a:effectLst/>
+                <a:latin typeface="Fira Code" pitchFamily="49" charset="0"/>
+                <a:ea typeface="Fira Code" pitchFamily="49" charset="0"/>
+                <a:cs typeface="Fira Code" pitchFamily="49" charset="0"/>
+              </a:rPr>
+              <a:t>.retrieveAccount</a:t>
+            </a:r>
+            <a:r>
+              <a:rPr lang="en-US" sz="800" dirty="0">
+                <a:solidFill>
+                  <a:srgbClr val="080808"/>
+                </a:solidFill>
+                <a:effectLst/>
+                <a:latin typeface="Fira Code" pitchFamily="49" charset="0"/>
+                <a:ea typeface="Fira Code" pitchFamily="49" charset="0"/>
+                <a:cs typeface="Fira Code" pitchFamily="49" charset="0"/>
+              </a:rPr>
+              <a:t>(</a:t>
+            </a:r>
+            <a:r>
+              <a:rPr lang="en-US" sz="800" i="1" dirty="0">
+                <a:solidFill>
+                  <a:srgbClr val="871094"/>
+                </a:solidFill>
+                <a:effectLst/>
+                <a:latin typeface="Fira Code" pitchFamily="49" charset="0"/>
+                <a:ea typeface="Fira Code" pitchFamily="49" charset="0"/>
+                <a:cs typeface="Fira Code" pitchFamily="49" charset="0"/>
+              </a:rPr>
+              <a:t>ACCOUNT_ID</a:t>
+            </a:r>
+            <a:r>
+              <a:rPr lang="en-US" sz="800" dirty="0">
+                <a:solidFill>
+                  <a:srgbClr val="080808"/>
+                </a:solidFill>
+                <a:effectLst/>
+                <a:latin typeface="Fira Code" pitchFamily="49" charset="0"/>
+                <a:ea typeface="Fira Code" pitchFamily="49" charset="0"/>
+                <a:cs typeface="Fira Code" pitchFamily="49" charset="0"/>
+              </a:rPr>
+              <a:t>);</a:t>
+            </a:r>
+            <a:br>
+              <a:rPr lang="en-US" sz="800" dirty="0">
+                <a:solidFill>
+                  <a:srgbClr val="080808"/>
+                </a:solidFill>
+                <a:effectLst/>
+                <a:latin typeface="Fira Code" pitchFamily="49" charset="0"/>
+                <a:ea typeface="Fira Code" pitchFamily="49" charset="0"/>
+                <a:cs typeface="Fira Code" pitchFamily="49" charset="0"/>
+              </a:rPr>
+            </a:br>
+            <a:r>
+              <a:rPr lang="en-US" sz="800" dirty="0">
+                <a:solidFill>
+                  <a:srgbClr val="080808"/>
+                </a:solidFill>
+                <a:effectLst/>
+                <a:latin typeface="Fira Code" pitchFamily="49" charset="0"/>
+                <a:ea typeface="Fira Code" pitchFamily="49" charset="0"/>
+                <a:cs typeface="Fira Code" pitchFamily="49" charset="0"/>
+              </a:rPr>
+              <a:t>    </a:t>
+            </a:r>
+            <a:r>
+              <a:rPr lang="en-US" sz="800" i="1" dirty="0">
+                <a:solidFill>
+                  <a:srgbClr val="8C8C8C"/>
+                </a:solidFill>
+                <a:effectLst/>
+                <a:latin typeface="Fira Code" pitchFamily="49" charset="0"/>
+                <a:ea typeface="Fira Code" pitchFamily="49" charset="0"/>
+                <a:cs typeface="Fira Code" pitchFamily="49" charset="0"/>
+              </a:rPr>
+              <a:t>// then</a:t>
+            </a:r>
+            <a:br>
+              <a:rPr lang="en-US" sz="800" i="1" dirty="0">
+                <a:solidFill>
+                  <a:srgbClr val="8C8C8C"/>
+                </a:solidFill>
+                <a:effectLst/>
+                <a:latin typeface="Fira Code" pitchFamily="49" charset="0"/>
+                <a:ea typeface="Fira Code" pitchFamily="49" charset="0"/>
+                <a:cs typeface="Fira Code" pitchFamily="49" charset="0"/>
+              </a:rPr>
+            </a:br>
+            <a:r>
+              <a:rPr lang="en-US" sz="800" i="1" dirty="0">
+                <a:solidFill>
+                  <a:srgbClr val="8C8C8C"/>
+                </a:solidFill>
+                <a:effectLst/>
+                <a:latin typeface="Fira Code" pitchFamily="49" charset="0"/>
+                <a:ea typeface="Fira Code" pitchFamily="49" charset="0"/>
+                <a:cs typeface="Fira Code" pitchFamily="49" charset="0"/>
+              </a:rPr>
+              <a:t>    </a:t>
+            </a:r>
+            <a:r>
+              <a:rPr lang="en-US" sz="800" dirty="0" err="1">
+                <a:solidFill>
+                  <a:srgbClr val="000000"/>
+                </a:solidFill>
+                <a:effectLst/>
+                <a:latin typeface="Fira Code" pitchFamily="49" charset="0"/>
+                <a:ea typeface="Fira Code" pitchFamily="49" charset="0"/>
+                <a:cs typeface="Fira Code" pitchFamily="49" charset="0"/>
+              </a:rPr>
+              <a:t>CustomerAccount</a:t>
+            </a:r>
+            <a:r>
+              <a:rPr lang="en-US" sz="800" dirty="0">
+                <a:solidFill>
+                  <a:srgbClr val="000000"/>
+                </a:solidFill>
+                <a:effectLst/>
+                <a:latin typeface="Fira Code" pitchFamily="49" charset="0"/>
+                <a:ea typeface="Fira Code" pitchFamily="49" charset="0"/>
+                <a:cs typeface="Fira Code" pitchFamily="49" charset="0"/>
+              </a:rPr>
+              <a:t> </a:t>
+            </a:r>
+            <a:r>
+              <a:rPr lang="en-US" sz="800" dirty="0" err="1">
+                <a:solidFill>
+                  <a:srgbClr val="000000"/>
+                </a:solidFill>
+                <a:effectLst/>
+                <a:latin typeface="Fira Code" pitchFamily="49" charset="0"/>
+                <a:ea typeface="Fira Code" pitchFamily="49" charset="0"/>
+                <a:cs typeface="Fira Code" pitchFamily="49" charset="0"/>
+              </a:rPr>
+              <a:t>expectedCustomerAccount</a:t>
+            </a:r>
+            <a:r>
+              <a:rPr lang="en-US" sz="800" dirty="0">
+                <a:solidFill>
+                  <a:srgbClr val="000000"/>
+                </a:solidFill>
+                <a:effectLst/>
+                <a:latin typeface="Fira Code" pitchFamily="49" charset="0"/>
+                <a:ea typeface="Fira Code" pitchFamily="49" charset="0"/>
+                <a:cs typeface="Fira Code" pitchFamily="49" charset="0"/>
+              </a:rPr>
+              <a:t> </a:t>
+            </a:r>
+            <a:r>
+              <a:rPr lang="en-US" sz="800" dirty="0">
+                <a:solidFill>
+                  <a:srgbClr val="080808"/>
+                </a:solidFill>
+                <a:effectLst/>
+                <a:latin typeface="Fira Code" pitchFamily="49" charset="0"/>
+                <a:ea typeface="Fira Code" pitchFamily="49" charset="0"/>
+                <a:cs typeface="Fira Code" pitchFamily="49" charset="0"/>
+              </a:rPr>
+              <a:t>= </a:t>
+            </a:r>
+            <a:r>
+              <a:rPr lang="en-US" sz="800" dirty="0">
+                <a:solidFill>
+                  <a:srgbClr val="0033B3"/>
+                </a:solidFill>
+                <a:effectLst/>
+                <a:latin typeface="Fira Code" pitchFamily="49" charset="0"/>
+                <a:ea typeface="Fira Code" pitchFamily="49" charset="0"/>
+                <a:cs typeface="Fira Code" pitchFamily="49" charset="0"/>
+              </a:rPr>
+              <a:t>new </a:t>
+            </a:r>
+            <a:r>
+              <a:rPr lang="en-US" sz="800" dirty="0" err="1">
+                <a:solidFill>
+                  <a:srgbClr val="080808"/>
+                </a:solidFill>
+                <a:effectLst/>
+                <a:latin typeface="Fira Code" pitchFamily="49" charset="0"/>
+                <a:ea typeface="Fira Code" pitchFamily="49" charset="0"/>
+                <a:cs typeface="Fira Code" pitchFamily="49" charset="0"/>
+              </a:rPr>
+              <a:t>CustomerAccount</a:t>
+            </a:r>
+            <a:r>
+              <a:rPr lang="en-US" sz="800" dirty="0">
+                <a:solidFill>
+                  <a:srgbClr val="080808"/>
+                </a:solidFill>
+                <a:effectLst/>
+                <a:latin typeface="Fira Code" pitchFamily="49" charset="0"/>
+                <a:ea typeface="Fira Code" pitchFamily="49" charset="0"/>
+                <a:cs typeface="Fira Code" pitchFamily="49" charset="0"/>
+              </a:rPr>
+              <a:t>(</a:t>
+            </a:r>
+            <a:r>
+              <a:rPr lang="en-US" sz="800" i="1" dirty="0">
+                <a:solidFill>
+                  <a:srgbClr val="871094"/>
+                </a:solidFill>
+                <a:effectLst/>
+                <a:latin typeface="Fira Code" pitchFamily="49" charset="0"/>
+                <a:ea typeface="Fira Code" pitchFamily="49" charset="0"/>
+                <a:cs typeface="Fira Code" pitchFamily="49" charset="0"/>
+              </a:rPr>
+              <a:t>ACCOUNT_ID</a:t>
+            </a:r>
+            <a:r>
+              <a:rPr lang="en-US" sz="800" dirty="0">
+                <a:solidFill>
+                  <a:srgbClr val="080808"/>
+                </a:solidFill>
+                <a:effectLst/>
+                <a:latin typeface="Fira Code" pitchFamily="49" charset="0"/>
+                <a:ea typeface="Fira Code" pitchFamily="49" charset="0"/>
+                <a:cs typeface="Fira Code" pitchFamily="49" charset="0"/>
+              </a:rPr>
+              <a:t>, </a:t>
+            </a:r>
+            <a:r>
+              <a:rPr lang="en-US" sz="800" dirty="0" err="1">
+                <a:solidFill>
+                  <a:srgbClr val="000000"/>
+                </a:solidFill>
+                <a:effectLst/>
+                <a:latin typeface="Fira Code" pitchFamily="49" charset="0"/>
+                <a:ea typeface="Fira Code" pitchFamily="49" charset="0"/>
+                <a:cs typeface="Fira Code" pitchFamily="49" charset="0"/>
+              </a:rPr>
+              <a:t>CustomerPaymentType</a:t>
+            </a:r>
+            <a:r>
+              <a:rPr lang="en-US" sz="800" dirty="0" err="1">
+                <a:solidFill>
+                  <a:srgbClr val="080808"/>
+                </a:solidFill>
+                <a:effectLst/>
+                <a:latin typeface="Fira Code" pitchFamily="49" charset="0"/>
+                <a:ea typeface="Fira Code" pitchFamily="49" charset="0"/>
+                <a:cs typeface="Fira Code" pitchFamily="49" charset="0"/>
+              </a:rPr>
+              <a:t>.</a:t>
+            </a:r>
+            <a:r>
+              <a:rPr lang="en-US" sz="800" i="1" dirty="0" err="1">
+                <a:solidFill>
+                  <a:srgbClr val="871094"/>
+                </a:solidFill>
+                <a:effectLst/>
+                <a:latin typeface="Fira Code" pitchFamily="49" charset="0"/>
+                <a:ea typeface="Fira Code" pitchFamily="49" charset="0"/>
+                <a:cs typeface="Fira Code" pitchFamily="49" charset="0"/>
+              </a:rPr>
+              <a:t>MONTHLY</a:t>
+            </a:r>
+            <a:r>
+              <a:rPr lang="en-US" sz="800" dirty="0">
+                <a:solidFill>
+                  <a:srgbClr val="080808"/>
+                </a:solidFill>
+                <a:effectLst/>
+                <a:latin typeface="Fira Code" pitchFamily="49" charset="0"/>
+                <a:ea typeface="Fira Code" pitchFamily="49" charset="0"/>
+                <a:cs typeface="Fira Code" pitchFamily="49" charset="0"/>
+              </a:rPr>
+              <a:t>, </a:t>
+            </a:r>
+            <a:r>
+              <a:rPr lang="en-US" sz="800" dirty="0">
+                <a:solidFill>
+                  <a:srgbClr val="067D17"/>
+                </a:solidFill>
+                <a:effectLst/>
+                <a:latin typeface="Fira Code" pitchFamily="49" charset="0"/>
+                <a:ea typeface="Fira Code" pitchFamily="49" charset="0"/>
+                <a:cs typeface="Fira Code" pitchFamily="49" charset="0"/>
+              </a:rPr>
+              <a:t>"PERSONAL"</a:t>
+            </a:r>
+            <a:r>
+              <a:rPr lang="en-US" sz="800" dirty="0">
+                <a:solidFill>
+                  <a:srgbClr val="080808"/>
+                </a:solidFill>
+                <a:effectLst/>
+                <a:latin typeface="Fira Code" pitchFamily="49" charset="0"/>
+                <a:ea typeface="Fira Code" pitchFamily="49" charset="0"/>
+                <a:cs typeface="Fira Code" pitchFamily="49" charset="0"/>
+              </a:rPr>
+              <a:t>);</a:t>
+            </a:r>
+            <a:br>
+              <a:rPr lang="en-US" sz="800" dirty="0">
+                <a:solidFill>
+                  <a:srgbClr val="080808"/>
+                </a:solidFill>
+                <a:effectLst/>
+                <a:latin typeface="Fira Code" pitchFamily="49" charset="0"/>
+                <a:ea typeface="Fira Code" pitchFamily="49" charset="0"/>
+                <a:cs typeface="Fira Code" pitchFamily="49" charset="0"/>
+              </a:rPr>
+            </a:br>
+            <a:r>
+              <a:rPr lang="en-US" sz="800" dirty="0">
+                <a:solidFill>
+                  <a:srgbClr val="080808"/>
+                </a:solidFill>
+                <a:effectLst/>
+                <a:latin typeface="Fira Code" pitchFamily="49" charset="0"/>
+                <a:ea typeface="Fira Code" pitchFamily="49" charset="0"/>
+                <a:cs typeface="Fira Code" pitchFamily="49" charset="0"/>
+              </a:rPr>
+              <a:t>    </a:t>
+            </a:r>
+            <a:r>
+              <a:rPr lang="en-US" sz="800" i="1" dirty="0" err="1">
+                <a:solidFill>
+                  <a:srgbClr val="080808"/>
+                </a:solidFill>
+                <a:effectLst/>
+                <a:latin typeface="Fira Code" pitchFamily="49" charset="0"/>
+                <a:ea typeface="Fira Code" pitchFamily="49" charset="0"/>
+                <a:cs typeface="Fira Code" pitchFamily="49" charset="0"/>
+              </a:rPr>
+              <a:t>assertThat</a:t>
+            </a:r>
+            <a:r>
+              <a:rPr lang="en-US" sz="800" dirty="0">
+                <a:solidFill>
+                  <a:srgbClr val="080808"/>
+                </a:solidFill>
+                <a:effectLst/>
+                <a:latin typeface="Fira Code" pitchFamily="49" charset="0"/>
+                <a:ea typeface="Fira Code" pitchFamily="49" charset="0"/>
+                <a:cs typeface="Fira Code" pitchFamily="49" charset="0"/>
+              </a:rPr>
+              <a:t>(</a:t>
+            </a:r>
+            <a:r>
+              <a:rPr lang="en-US" sz="800" dirty="0">
+                <a:solidFill>
+                  <a:srgbClr val="000000"/>
+                </a:solidFill>
+                <a:effectLst/>
+                <a:latin typeface="Fira Code" pitchFamily="49" charset="0"/>
+                <a:ea typeface="Fira Code" pitchFamily="49" charset="0"/>
+                <a:cs typeface="Fira Code" pitchFamily="49" charset="0"/>
+              </a:rPr>
+              <a:t>result</a:t>
+            </a:r>
+            <a:r>
+              <a:rPr lang="en-US" sz="800" dirty="0">
+                <a:solidFill>
+                  <a:srgbClr val="080808"/>
+                </a:solidFill>
+                <a:effectLst/>
+                <a:latin typeface="Fira Code" pitchFamily="49" charset="0"/>
+                <a:ea typeface="Fira Code" pitchFamily="49" charset="0"/>
+                <a:cs typeface="Fira Code" pitchFamily="49" charset="0"/>
+              </a:rPr>
+              <a:t>, </a:t>
+            </a:r>
+            <a:r>
+              <a:rPr lang="en-US" sz="800" i="1" dirty="0">
+                <a:solidFill>
+                  <a:srgbClr val="080808"/>
+                </a:solidFill>
+                <a:effectLst/>
+                <a:latin typeface="Fira Code" pitchFamily="49" charset="0"/>
+                <a:ea typeface="Fira Code" pitchFamily="49" charset="0"/>
+                <a:cs typeface="Fira Code" pitchFamily="49" charset="0"/>
+              </a:rPr>
+              <a:t>is</a:t>
+            </a:r>
+            <a:r>
+              <a:rPr lang="en-US" sz="800" dirty="0">
+                <a:solidFill>
+                  <a:srgbClr val="080808"/>
+                </a:solidFill>
+                <a:effectLst/>
+                <a:latin typeface="Fira Code" pitchFamily="49" charset="0"/>
+                <a:ea typeface="Fira Code" pitchFamily="49" charset="0"/>
+                <a:cs typeface="Fira Code" pitchFamily="49" charset="0"/>
+              </a:rPr>
+              <a:t>(</a:t>
+            </a:r>
+            <a:r>
+              <a:rPr lang="en-US" sz="800" dirty="0" err="1">
+                <a:solidFill>
+                  <a:srgbClr val="000000"/>
+                </a:solidFill>
+                <a:effectLst/>
+                <a:latin typeface="Fira Code" pitchFamily="49" charset="0"/>
+                <a:ea typeface="Fira Code" pitchFamily="49" charset="0"/>
+                <a:cs typeface="Fira Code" pitchFamily="49" charset="0"/>
+              </a:rPr>
+              <a:t>expectedCustomerAccount</a:t>
+            </a:r>
+            <a:r>
+              <a:rPr lang="en-US" sz="800" dirty="0">
+                <a:solidFill>
+                  <a:srgbClr val="080808"/>
+                </a:solidFill>
+                <a:effectLst/>
+                <a:latin typeface="Fira Code" pitchFamily="49" charset="0"/>
+                <a:ea typeface="Fira Code" pitchFamily="49" charset="0"/>
+                <a:cs typeface="Fira Code" pitchFamily="49" charset="0"/>
+              </a:rPr>
+              <a:t>));</a:t>
+            </a:r>
+            <a:br>
+              <a:rPr lang="en-US" sz="800" dirty="0">
+                <a:solidFill>
+                  <a:srgbClr val="080808"/>
+                </a:solidFill>
+                <a:effectLst/>
+                <a:latin typeface="Fira Code" pitchFamily="49" charset="0"/>
+                <a:ea typeface="Fira Code" pitchFamily="49" charset="0"/>
+                <a:cs typeface="Fira Code" pitchFamily="49" charset="0"/>
+              </a:rPr>
+            </a:br>
+            <a:r>
+              <a:rPr lang="en-US" sz="800" dirty="0">
+                <a:solidFill>
+                  <a:srgbClr val="080808"/>
+                </a:solidFill>
+                <a:effectLst/>
+                <a:latin typeface="Fira Code" pitchFamily="49" charset="0"/>
+                <a:ea typeface="Fira Code" pitchFamily="49" charset="0"/>
+                <a:cs typeface="Fira Code" pitchFamily="49" charset="0"/>
+              </a:rPr>
+              <a:t>    </a:t>
+            </a:r>
+            <a:r>
+              <a:rPr lang="en-US" sz="800" i="1" dirty="0">
+                <a:solidFill>
+                  <a:srgbClr val="080808"/>
+                </a:solidFill>
+                <a:effectLst/>
+                <a:latin typeface="Fira Code" pitchFamily="49" charset="0"/>
+                <a:ea typeface="Fira Code" pitchFamily="49" charset="0"/>
+                <a:cs typeface="Fira Code" pitchFamily="49" charset="0"/>
+              </a:rPr>
+              <a:t>verify</a:t>
+            </a:r>
+            <a:r>
+              <a:rPr lang="en-US" sz="800" dirty="0">
+                <a:solidFill>
+                  <a:srgbClr val="080808"/>
+                </a:solidFill>
+                <a:effectLst/>
+                <a:latin typeface="Fira Code" pitchFamily="49" charset="0"/>
+                <a:ea typeface="Fira Code" pitchFamily="49" charset="0"/>
+                <a:cs typeface="Fira Code" pitchFamily="49" charset="0"/>
+              </a:rPr>
+              <a:t>(</a:t>
+            </a:r>
+            <a:r>
+              <a:rPr lang="en-US" sz="800" dirty="0" err="1">
+                <a:solidFill>
+                  <a:srgbClr val="871094"/>
+                </a:solidFill>
+                <a:effectLst/>
+                <a:latin typeface="Fira Code" pitchFamily="49" charset="0"/>
+                <a:ea typeface="Fira Code" pitchFamily="49" charset="0"/>
+                <a:cs typeface="Fira Code" pitchFamily="49" charset="0"/>
+              </a:rPr>
+              <a:t>restTemplate</a:t>
+            </a:r>
+            <a:r>
+              <a:rPr lang="en-US" sz="800" dirty="0">
+                <a:solidFill>
+                  <a:srgbClr val="080808"/>
+                </a:solidFill>
+                <a:effectLst/>
+                <a:latin typeface="Fira Code" pitchFamily="49" charset="0"/>
+                <a:ea typeface="Fira Code" pitchFamily="49" charset="0"/>
+                <a:cs typeface="Fira Code" pitchFamily="49" charset="0"/>
+              </a:rPr>
+              <a:t>, </a:t>
+            </a:r>
+            <a:r>
+              <a:rPr lang="en-US" sz="800" i="1" dirty="0">
+                <a:solidFill>
+                  <a:srgbClr val="080808"/>
+                </a:solidFill>
+                <a:effectLst/>
+                <a:latin typeface="Fira Code" pitchFamily="49" charset="0"/>
+                <a:ea typeface="Fira Code" pitchFamily="49" charset="0"/>
+                <a:cs typeface="Fira Code" pitchFamily="49" charset="0"/>
+              </a:rPr>
+              <a:t>times</a:t>
+            </a:r>
+            <a:r>
+              <a:rPr lang="en-US" sz="800" dirty="0">
+                <a:solidFill>
+                  <a:srgbClr val="080808"/>
+                </a:solidFill>
+                <a:effectLst/>
+                <a:latin typeface="Fira Code" pitchFamily="49" charset="0"/>
+                <a:ea typeface="Fira Code" pitchFamily="49" charset="0"/>
+                <a:cs typeface="Fira Code" pitchFamily="49" charset="0"/>
+              </a:rPr>
+              <a:t>(</a:t>
+            </a:r>
+            <a:r>
+              <a:rPr lang="en-US" sz="800" dirty="0">
+                <a:solidFill>
+                  <a:srgbClr val="1750EB"/>
+                </a:solidFill>
+                <a:effectLst/>
+                <a:latin typeface="Fira Code" pitchFamily="49" charset="0"/>
+                <a:ea typeface="Fira Code" pitchFamily="49" charset="0"/>
+                <a:cs typeface="Fira Code" pitchFamily="49" charset="0"/>
+              </a:rPr>
+              <a:t>1</a:t>
+            </a:r>
+            <a:r>
+              <a:rPr lang="en-US" sz="800" dirty="0">
+                <a:solidFill>
+                  <a:srgbClr val="080808"/>
+                </a:solidFill>
+                <a:effectLst/>
+                <a:latin typeface="Fira Code" pitchFamily="49" charset="0"/>
+                <a:ea typeface="Fira Code" pitchFamily="49" charset="0"/>
+                <a:cs typeface="Fira Code" pitchFamily="49" charset="0"/>
+              </a:rPr>
+              <a:t>)).exchange(</a:t>
+            </a:r>
+            <a:r>
+              <a:rPr lang="en-US" sz="800" dirty="0" err="1">
+                <a:solidFill>
+                  <a:srgbClr val="871094"/>
+                </a:solidFill>
+                <a:effectLst/>
+                <a:latin typeface="Fira Code" pitchFamily="49" charset="0"/>
+                <a:ea typeface="Fira Code" pitchFamily="49" charset="0"/>
+                <a:cs typeface="Fira Code" pitchFamily="49" charset="0"/>
+              </a:rPr>
+              <a:t>calledUrlCaptor</a:t>
+            </a:r>
+            <a:r>
+              <a:rPr lang="en-US" sz="800" dirty="0" err="1">
+                <a:solidFill>
+                  <a:srgbClr val="080808"/>
+                </a:solidFill>
+                <a:effectLst/>
+                <a:latin typeface="Fira Code" pitchFamily="49" charset="0"/>
+                <a:ea typeface="Fira Code" pitchFamily="49" charset="0"/>
+                <a:cs typeface="Fira Code" pitchFamily="49" charset="0"/>
+              </a:rPr>
+              <a:t>.capture</a:t>
+            </a:r>
+            <a:r>
+              <a:rPr lang="en-US" sz="800" dirty="0">
+                <a:solidFill>
+                  <a:srgbClr val="080808"/>
+                </a:solidFill>
+                <a:effectLst/>
+                <a:latin typeface="Fira Code" pitchFamily="49" charset="0"/>
+                <a:ea typeface="Fira Code" pitchFamily="49" charset="0"/>
+                <a:cs typeface="Fira Code" pitchFamily="49" charset="0"/>
+              </a:rPr>
+              <a:t>(), </a:t>
+            </a:r>
+            <a:r>
+              <a:rPr lang="en-US" sz="800" i="1" dirty="0">
+                <a:solidFill>
+                  <a:srgbClr val="080808"/>
+                </a:solidFill>
+                <a:effectLst/>
+                <a:latin typeface="Fira Code" pitchFamily="49" charset="0"/>
+                <a:ea typeface="Fira Code" pitchFamily="49" charset="0"/>
+                <a:cs typeface="Fira Code" pitchFamily="49" charset="0"/>
+              </a:rPr>
+              <a:t>eq</a:t>
+            </a:r>
+            <a:r>
+              <a:rPr lang="en-US" sz="800" dirty="0">
+                <a:solidFill>
+                  <a:srgbClr val="080808"/>
+                </a:solidFill>
+                <a:effectLst/>
+                <a:latin typeface="Fira Code" pitchFamily="49" charset="0"/>
+                <a:ea typeface="Fira Code" pitchFamily="49" charset="0"/>
+                <a:cs typeface="Fira Code" pitchFamily="49" charset="0"/>
+              </a:rPr>
+              <a:t>(</a:t>
+            </a:r>
+            <a:r>
+              <a:rPr lang="en-US" sz="800" dirty="0" err="1">
+                <a:solidFill>
+                  <a:srgbClr val="000000"/>
+                </a:solidFill>
+                <a:effectLst/>
+                <a:latin typeface="Fira Code" pitchFamily="49" charset="0"/>
+                <a:ea typeface="Fira Code" pitchFamily="49" charset="0"/>
+                <a:cs typeface="Fira Code" pitchFamily="49" charset="0"/>
+              </a:rPr>
+              <a:t>HttpMethod</a:t>
+            </a:r>
+            <a:r>
+              <a:rPr lang="en-US" sz="800" dirty="0" err="1">
+                <a:solidFill>
+                  <a:srgbClr val="080808"/>
+                </a:solidFill>
+                <a:effectLst/>
+                <a:latin typeface="Fira Code" pitchFamily="49" charset="0"/>
+                <a:ea typeface="Fira Code" pitchFamily="49" charset="0"/>
+                <a:cs typeface="Fira Code" pitchFamily="49" charset="0"/>
+              </a:rPr>
+              <a:t>.</a:t>
+            </a:r>
+            <a:r>
+              <a:rPr lang="en-US" sz="800" i="1" dirty="0" err="1">
+                <a:solidFill>
+                  <a:srgbClr val="871094"/>
+                </a:solidFill>
+                <a:effectLst/>
+                <a:latin typeface="Fira Code" pitchFamily="49" charset="0"/>
+                <a:ea typeface="Fira Code" pitchFamily="49" charset="0"/>
+                <a:cs typeface="Fira Code" pitchFamily="49" charset="0"/>
+              </a:rPr>
+              <a:t>GET</a:t>
+            </a:r>
+            <a:r>
+              <a:rPr lang="en-US" sz="800" dirty="0">
+                <a:solidFill>
+                  <a:srgbClr val="080808"/>
+                </a:solidFill>
+                <a:effectLst/>
+                <a:latin typeface="Fira Code" pitchFamily="49" charset="0"/>
+                <a:ea typeface="Fira Code" pitchFamily="49" charset="0"/>
+                <a:cs typeface="Fira Code" pitchFamily="49" charset="0"/>
+              </a:rPr>
+              <a:t>), </a:t>
+            </a:r>
+            <a:r>
+              <a:rPr lang="en-US" sz="800" dirty="0" err="1">
+                <a:solidFill>
+                  <a:srgbClr val="871094"/>
+                </a:solidFill>
+                <a:effectLst/>
+                <a:latin typeface="Fira Code" pitchFamily="49" charset="0"/>
+                <a:ea typeface="Fira Code" pitchFamily="49" charset="0"/>
+                <a:cs typeface="Fira Code" pitchFamily="49" charset="0"/>
+              </a:rPr>
+              <a:t>sentHttpEntityCaptor</a:t>
+            </a:r>
+            <a:r>
+              <a:rPr lang="en-US" sz="800" dirty="0" err="1">
+                <a:solidFill>
+                  <a:srgbClr val="080808"/>
+                </a:solidFill>
+                <a:effectLst/>
+                <a:latin typeface="Fira Code" pitchFamily="49" charset="0"/>
+                <a:ea typeface="Fira Code" pitchFamily="49" charset="0"/>
+                <a:cs typeface="Fira Code" pitchFamily="49" charset="0"/>
+              </a:rPr>
+              <a:t>.capture</a:t>
+            </a:r>
+            <a:r>
+              <a:rPr lang="en-US" sz="800" dirty="0">
+                <a:solidFill>
+                  <a:srgbClr val="080808"/>
+                </a:solidFill>
+                <a:effectLst/>
+                <a:latin typeface="Fira Code" pitchFamily="49" charset="0"/>
+                <a:ea typeface="Fira Code" pitchFamily="49" charset="0"/>
+                <a:cs typeface="Fira Code" pitchFamily="49" charset="0"/>
+              </a:rPr>
+              <a:t>(), </a:t>
+            </a:r>
+            <a:r>
+              <a:rPr lang="en-US" sz="800" i="1" dirty="0">
+                <a:solidFill>
+                  <a:srgbClr val="080808"/>
+                </a:solidFill>
+                <a:effectLst/>
+                <a:latin typeface="Fira Code" pitchFamily="49" charset="0"/>
+                <a:ea typeface="Fira Code" pitchFamily="49" charset="0"/>
+                <a:cs typeface="Fira Code" pitchFamily="49" charset="0"/>
+              </a:rPr>
+              <a:t>any</a:t>
+            </a:r>
+            <a:r>
+              <a:rPr lang="en-US" sz="800" dirty="0">
+                <a:solidFill>
+                  <a:srgbClr val="080808"/>
+                </a:solidFill>
+                <a:effectLst/>
+                <a:latin typeface="Fira Code" pitchFamily="49" charset="0"/>
+                <a:ea typeface="Fira Code" pitchFamily="49" charset="0"/>
+                <a:cs typeface="Fira Code" pitchFamily="49" charset="0"/>
+              </a:rPr>
+              <a:t>(</a:t>
+            </a:r>
+            <a:r>
+              <a:rPr lang="en-US" sz="800" dirty="0" err="1">
+                <a:solidFill>
+                  <a:srgbClr val="000000"/>
+                </a:solidFill>
+                <a:effectLst/>
+                <a:latin typeface="Fira Code" pitchFamily="49" charset="0"/>
+                <a:ea typeface="Fira Code" pitchFamily="49" charset="0"/>
+                <a:cs typeface="Fira Code" pitchFamily="49" charset="0"/>
+              </a:rPr>
+              <a:t>Class</a:t>
+            </a:r>
+            <a:r>
+              <a:rPr lang="en-US" sz="800" dirty="0" err="1">
+                <a:solidFill>
+                  <a:srgbClr val="080808"/>
+                </a:solidFill>
+                <a:effectLst/>
+                <a:latin typeface="Fira Code" pitchFamily="49" charset="0"/>
+                <a:ea typeface="Fira Code" pitchFamily="49" charset="0"/>
+                <a:cs typeface="Fira Code" pitchFamily="49" charset="0"/>
+              </a:rPr>
+              <a:t>.</a:t>
+            </a:r>
+            <a:r>
+              <a:rPr lang="en-US" sz="800" dirty="0" err="1">
+                <a:solidFill>
+                  <a:srgbClr val="0033B3"/>
+                </a:solidFill>
+                <a:effectLst/>
+                <a:latin typeface="Fira Code" pitchFamily="49" charset="0"/>
+                <a:ea typeface="Fira Code" pitchFamily="49" charset="0"/>
+                <a:cs typeface="Fira Code" pitchFamily="49" charset="0"/>
+              </a:rPr>
+              <a:t>class</a:t>
+            </a:r>
+            <a:r>
+              <a:rPr lang="en-US" sz="800" dirty="0">
+                <a:solidFill>
+                  <a:srgbClr val="080808"/>
+                </a:solidFill>
+                <a:effectLst/>
+                <a:latin typeface="Fira Code" pitchFamily="49" charset="0"/>
+                <a:ea typeface="Fira Code" pitchFamily="49" charset="0"/>
+                <a:cs typeface="Fira Code" pitchFamily="49" charset="0"/>
+              </a:rPr>
+              <a:t>));</a:t>
+            </a:r>
+            <a:br>
+              <a:rPr lang="en-US" sz="800" dirty="0">
+                <a:solidFill>
+                  <a:srgbClr val="080808"/>
+                </a:solidFill>
+                <a:effectLst/>
+                <a:latin typeface="Fira Code" pitchFamily="49" charset="0"/>
+                <a:ea typeface="Fira Code" pitchFamily="49" charset="0"/>
+                <a:cs typeface="Fira Code" pitchFamily="49" charset="0"/>
+              </a:rPr>
+            </a:br>
+            <a:r>
+              <a:rPr lang="en-US" sz="800" dirty="0">
+                <a:solidFill>
+                  <a:srgbClr val="080808"/>
+                </a:solidFill>
+                <a:effectLst/>
+                <a:latin typeface="Fira Code" pitchFamily="49" charset="0"/>
+                <a:ea typeface="Fira Code" pitchFamily="49" charset="0"/>
+                <a:cs typeface="Fira Code" pitchFamily="49" charset="0"/>
+              </a:rPr>
+              <a:t>    </a:t>
+            </a:r>
+            <a:r>
+              <a:rPr lang="en-US" sz="800" dirty="0" err="1">
+                <a:solidFill>
+                  <a:srgbClr val="080808"/>
+                </a:solidFill>
+                <a:effectLst/>
+                <a:latin typeface="Fira Code" pitchFamily="49" charset="0"/>
+                <a:ea typeface="Fira Code" pitchFamily="49" charset="0"/>
+                <a:cs typeface="Fira Code" pitchFamily="49" charset="0"/>
+              </a:rPr>
+              <a:t>verifyHeadersAreValid</a:t>
+            </a:r>
+            <a:r>
+              <a:rPr lang="en-US" sz="800" dirty="0">
+                <a:solidFill>
+                  <a:srgbClr val="080808"/>
+                </a:solidFill>
+                <a:effectLst/>
+                <a:latin typeface="Fira Code" pitchFamily="49" charset="0"/>
+                <a:ea typeface="Fira Code" pitchFamily="49" charset="0"/>
+                <a:cs typeface="Fira Code" pitchFamily="49" charset="0"/>
+              </a:rPr>
+              <a:t>(</a:t>
+            </a:r>
+            <a:r>
+              <a:rPr lang="en-US" sz="800" dirty="0" err="1">
+                <a:solidFill>
+                  <a:srgbClr val="871094"/>
+                </a:solidFill>
+                <a:effectLst/>
+                <a:latin typeface="Fira Code" pitchFamily="49" charset="0"/>
+                <a:ea typeface="Fira Code" pitchFamily="49" charset="0"/>
+                <a:cs typeface="Fira Code" pitchFamily="49" charset="0"/>
+              </a:rPr>
+              <a:t>sentHttpEntityCaptor</a:t>
+            </a:r>
+            <a:r>
+              <a:rPr lang="en-US" sz="800" dirty="0" err="1">
+                <a:solidFill>
+                  <a:srgbClr val="080808"/>
+                </a:solidFill>
+                <a:effectLst/>
+                <a:latin typeface="Fira Code" pitchFamily="49" charset="0"/>
+                <a:ea typeface="Fira Code" pitchFamily="49" charset="0"/>
+                <a:cs typeface="Fira Code" pitchFamily="49" charset="0"/>
+              </a:rPr>
+              <a:t>.getValue</a:t>
+            </a:r>
+            <a:r>
+              <a:rPr lang="en-US" sz="800" dirty="0">
+                <a:solidFill>
+                  <a:srgbClr val="080808"/>
+                </a:solidFill>
+                <a:effectLst/>
+                <a:latin typeface="Fira Code" pitchFamily="49" charset="0"/>
+                <a:ea typeface="Fira Code" pitchFamily="49" charset="0"/>
+                <a:cs typeface="Fira Code" pitchFamily="49" charset="0"/>
+              </a:rPr>
+              <a:t>().</a:t>
+            </a:r>
+            <a:r>
+              <a:rPr lang="en-US" sz="800" dirty="0" err="1">
+                <a:solidFill>
+                  <a:srgbClr val="080808"/>
+                </a:solidFill>
+                <a:effectLst/>
+                <a:latin typeface="Fira Code" pitchFamily="49" charset="0"/>
+                <a:ea typeface="Fira Code" pitchFamily="49" charset="0"/>
+                <a:cs typeface="Fira Code" pitchFamily="49" charset="0"/>
+              </a:rPr>
+              <a:t>getHeaders</a:t>
+            </a:r>
+            <a:r>
+              <a:rPr lang="en-US" sz="800" dirty="0">
+                <a:solidFill>
+                  <a:srgbClr val="080808"/>
+                </a:solidFill>
+                <a:effectLst/>
+                <a:latin typeface="Fira Code" pitchFamily="49" charset="0"/>
+                <a:ea typeface="Fira Code" pitchFamily="49" charset="0"/>
+                <a:cs typeface="Fira Code" pitchFamily="49" charset="0"/>
+              </a:rPr>
+              <a:t>());</a:t>
+            </a:r>
+            <a:br>
+              <a:rPr lang="en-US" sz="800" dirty="0">
+                <a:solidFill>
+                  <a:srgbClr val="080808"/>
+                </a:solidFill>
+                <a:effectLst/>
+                <a:latin typeface="Fira Code" pitchFamily="49" charset="0"/>
+                <a:ea typeface="Fira Code" pitchFamily="49" charset="0"/>
+                <a:cs typeface="Fira Code" pitchFamily="49" charset="0"/>
+              </a:rPr>
+            </a:br>
+            <a:r>
+              <a:rPr lang="en-US" sz="800" dirty="0">
+                <a:solidFill>
+                  <a:srgbClr val="080808"/>
+                </a:solidFill>
+                <a:effectLst/>
+                <a:latin typeface="Fira Code" pitchFamily="49" charset="0"/>
+                <a:ea typeface="Fira Code" pitchFamily="49" charset="0"/>
+                <a:cs typeface="Fira Code" pitchFamily="49" charset="0"/>
+              </a:rPr>
+              <a:t>}</a:t>
+            </a:r>
+          </a:p>
+          <a:p>
+            <a:pPr marL="0" indent="0">
+              <a:buNone/>
+            </a:pPr>
+            <a:endParaRPr lang="en-US" sz="800" dirty="0">
+              <a:latin typeface="Fira Code" pitchFamily="49" charset="0"/>
+              <a:ea typeface="Fira Code" pitchFamily="49" charset="0"/>
+              <a:cs typeface="Fira Code" pitchFamily="49" charset="0"/>
+            </a:endParaRPr>
+          </a:p>
+        </p:txBody>
+      </p:sp>
+    </p:spTree>
+    <p:extLst>
+      <p:ext uri="{BB962C8B-B14F-4D97-AF65-F5344CB8AC3E}">
+        <p14:creationId xmlns:p14="http://schemas.microsoft.com/office/powerpoint/2010/main" val="379213993"/>
+      </p:ext>
+    </p:extLst>
+  </p:cSld>
+  <p:clrMapOvr>
+    <a:masterClrMapping/>
+  </p:clrMapOvr>
+</p:sld>
+</file>
+
+<file path=ppt/slides/slide30.xml><?xml version="1.0" encoding="utf-8"?>
 <p:sld xmlns:a="http://schemas.openxmlformats.org/drawingml/2006/main" xmlns:r="http://schemas.openxmlformats.org/officeDocument/2006/relationships" xmlns:p="http://schemas.openxmlformats.org/presentationml/2006/main">
   <p:cSld>
     <p:spTree>
@@ -12822,7 +14608,7 @@
 </p:sld>
 </file>
 
-<file path=ppt/slides/slide29.xml><?xml version="1.0" encoding="utf-8"?>
+<file path=ppt/slides/slide31.xml><?xml version="1.0" encoding="utf-8"?>
 <p:sld xmlns:a="http://schemas.openxmlformats.org/drawingml/2006/main" xmlns:r="http://schemas.openxmlformats.org/officeDocument/2006/relationships" xmlns:p="http://schemas.openxmlformats.org/presentationml/2006/main">
   <p:cSld>
     <p:spTree>
@@ -12849,1582 +14635,6 @@
     <p:extLst>
       <p:ext uri="{BB962C8B-B14F-4D97-AF65-F5344CB8AC3E}">
         <p14:creationId xmlns:p14="http://schemas.microsoft.com/office/powerpoint/2010/main" val="974072803"/>
-      </p:ext>
-    </p:extLst>
-  </p:cSld>
-  <p:clrMapOvr>
-    <a:masterClrMapping/>
-  </p:clrMapOvr>
-</p:sld>
-</file>
-
-<file path=ppt/slides/slide3.xml><?xml version="1.0" encoding="utf-8"?>
-<p:sld xmlns:a="http://schemas.openxmlformats.org/drawingml/2006/main" xmlns:r="http://schemas.openxmlformats.org/officeDocument/2006/relationships" xmlns:p="http://schemas.openxmlformats.org/presentationml/2006/main">
-  <p:cSld>
-    <p:spTree>
-      <p:nvGrpSpPr>
-        <p:cNvPr id="1" name=""/>
-        <p:cNvGrpSpPr/>
-        <p:nvPr/>
-      </p:nvGrpSpPr>
-      <p:grpSpPr>
-        <a:xfrm>
-          <a:off x="0" y="0"/>
-          <a:ext cx="0" cy="0"/>
-          <a:chOff x="0" y="0"/>
-          <a:chExt cx="0" cy="0"/>
-        </a:xfrm>
-      </p:grpSpPr>
-      <p:sp>
-        <p:nvSpPr>
-          <p:cNvPr id="2" name="Title 1">
-            <a:extLst>
-              <a:ext uri="{FF2B5EF4-FFF2-40B4-BE49-F238E27FC236}">
-                <a16:creationId xmlns:a16="http://schemas.microsoft.com/office/drawing/2014/main" id="{5FDF8E1D-0B99-4C64-504D-96FFBC67709F}"/>
-              </a:ext>
-            </a:extLst>
-          </p:cNvPr>
-          <p:cNvSpPr>
-            <a:spLocks noGrp="1"/>
-          </p:cNvSpPr>
-          <p:nvPr>
-            <p:ph type="title"/>
-          </p:nvPr>
-        </p:nvSpPr>
-        <p:spPr/>
-        <p:txBody>
-          <a:bodyPr/>
-          <a:lstStyle/>
-          <a:p>
-            <a:r>
-              <a:rPr lang="en-US" dirty="0"/>
-              <a:t>Original</a:t>
-            </a:r>
-          </a:p>
-        </p:txBody>
-      </p:sp>
-      <p:sp>
-        <p:nvSpPr>
-          <p:cNvPr id="3" name="Content Placeholder 2">
-            <a:extLst>
-              <a:ext uri="{FF2B5EF4-FFF2-40B4-BE49-F238E27FC236}">
-                <a16:creationId xmlns:a16="http://schemas.microsoft.com/office/drawing/2014/main" id="{3618D96A-1571-1C4D-9574-BEAFBAC5E719}"/>
-              </a:ext>
-            </a:extLst>
-          </p:cNvPr>
-          <p:cNvSpPr>
-            <a:spLocks noGrp="1"/>
-          </p:cNvSpPr>
-          <p:nvPr>
-            <p:ph idx="1"/>
-          </p:nvPr>
-        </p:nvSpPr>
-        <p:spPr>
-          <a:xfrm>
-            <a:off x="838200" y="1825625"/>
-            <a:ext cx="11049000" cy="4351338"/>
-          </a:xfrm>
-        </p:spPr>
-        <p:txBody>
-          <a:bodyPr>
-            <a:noAutofit/>
-          </a:bodyPr>
-          <a:lstStyle/>
-          <a:p>
-            <a:pPr marL="0" indent="0">
-              <a:buNone/>
-            </a:pPr>
-            <a:br>
-              <a:rPr lang="en-US" sz="800" dirty="0">
-                <a:solidFill>
-                  <a:srgbClr val="080808"/>
-                </a:solidFill>
-                <a:effectLst/>
-                <a:latin typeface="Fira Code" pitchFamily="49" charset="0"/>
-                <a:ea typeface="Fira Code" pitchFamily="49" charset="0"/>
-                <a:cs typeface="Fira Code" pitchFamily="49" charset="0"/>
-              </a:rPr>
-            </a:br>
-            <a:r>
-              <a:rPr lang="en-US" sz="800" dirty="0">
-                <a:solidFill>
-                  <a:srgbClr val="9E880D"/>
-                </a:solidFill>
-                <a:effectLst/>
-                <a:latin typeface="Fira Code" pitchFamily="49" charset="0"/>
-                <a:ea typeface="Fira Code" pitchFamily="49" charset="0"/>
-                <a:cs typeface="Fira Code" pitchFamily="49" charset="0"/>
-              </a:rPr>
-              <a:t>@Test</a:t>
-            </a:r>
-            <a:br>
-              <a:rPr lang="en-US" sz="800" dirty="0">
-                <a:solidFill>
-                  <a:srgbClr val="9E880D"/>
-                </a:solidFill>
-                <a:effectLst/>
-                <a:latin typeface="Fira Code" pitchFamily="49" charset="0"/>
-                <a:ea typeface="Fira Code" pitchFamily="49" charset="0"/>
-                <a:cs typeface="Fira Code" pitchFamily="49" charset="0"/>
-              </a:rPr>
-            </a:br>
-            <a:r>
-              <a:rPr lang="en-US" sz="800" dirty="0">
-                <a:solidFill>
-                  <a:srgbClr val="0033B3"/>
-                </a:solidFill>
-                <a:effectLst/>
-                <a:latin typeface="Fira Code" pitchFamily="49" charset="0"/>
-                <a:ea typeface="Fira Code" pitchFamily="49" charset="0"/>
-                <a:cs typeface="Fira Code" pitchFamily="49" charset="0"/>
-              </a:rPr>
-              <a:t>public void </a:t>
-            </a:r>
-            <a:r>
-              <a:rPr lang="en-US" sz="800" dirty="0" err="1">
-                <a:solidFill>
-                  <a:srgbClr val="00627A"/>
-                </a:solidFill>
-                <a:effectLst/>
-                <a:latin typeface="Fira Code" pitchFamily="49" charset="0"/>
-                <a:ea typeface="Fira Code" pitchFamily="49" charset="0"/>
-                <a:cs typeface="Fira Code" pitchFamily="49" charset="0"/>
-              </a:rPr>
-              <a:t>shouldGetCustomerFromService</a:t>
-            </a:r>
-            <a:r>
-              <a:rPr lang="en-US" sz="800" dirty="0">
-                <a:solidFill>
-                  <a:srgbClr val="080808"/>
-                </a:solidFill>
-                <a:effectLst/>
-                <a:latin typeface="Fira Code" pitchFamily="49" charset="0"/>
-                <a:ea typeface="Fira Code" pitchFamily="49" charset="0"/>
-                <a:cs typeface="Fira Code" pitchFamily="49" charset="0"/>
-              </a:rPr>
-              <a:t>() {</a:t>
-            </a:r>
-            <a:br>
-              <a:rPr lang="en-US" sz="800" dirty="0">
-                <a:solidFill>
-                  <a:srgbClr val="080808"/>
-                </a:solidFill>
-                <a:effectLst/>
-                <a:latin typeface="Fira Code" pitchFamily="49" charset="0"/>
-                <a:ea typeface="Fira Code" pitchFamily="49" charset="0"/>
-                <a:cs typeface="Fira Code" pitchFamily="49" charset="0"/>
-              </a:rPr>
-            </a:br>
-            <a:r>
-              <a:rPr lang="en-US" sz="800" dirty="0">
-                <a:solidFill>
-                  <a:srgbClr val="080808"/>
-                </a:solidFill>
-                <a:effectLst/>
-                <a:latin typeface="Fira Code" pitchFamily="49" charset="0"/>
-                <a:ea typeface="Fira Code" pitchFamily="49" charset="0"/>
-                <a:cs typeface="Fira Code" pitchFamily="49" charset="0"/>
-              </a:rPr>
-              <a:t>    </a:t>
-            </a:r>
-            <a:r>
-              <a:rPr lang="en-US" sz="800" i="1" dirty="0">
-                <a:solidFill>
-                  <a:srgbClr val="8C8C8C"/>
-                </a:solidFill>
-                <a:effectLst/>
-                <a:latin typeface="Fira Code" pitchFamily="49" charset="0"/>
-                <a:ea typeface="Fira Code" pitchFamily="49" charset="0"/>
-                <a:cs typeface="Fira Code" pitchFamily="49" charset="0"/>
-              </a:rPr>
-              <a:t>// given</a:t>
-            </a:r>
-            <a:br>
-              <a:rPr lang="en-US" sz="800" i="1" dirty="0">
-                <a:solidFill>
-                  <a:srgbClr val="8C8C8C"/>
-                </a:solidFill>
-                <a:effectLst/>
-                <a:latin typeface="Fira Code" pitchFamily="49" charset="0"/>
-                <a:ea typeface="Fira Code" pitchFamily="49" charset="0"/>
-                <a:cs typeface="Fira Code" pitchFamily="49" charset="0"/>
-              </a:rPr>
-            </a:br>
-            <a:r>
-              <a:rPr lang="en-US" sz="800" i="1" dirty="0">
-                <a:solidFill>
-                  <a:srgbClr val="8C8C8C"/>
-                </a:solidFill>
-                <a:effectLst/>
-                <a:latin typeface="Fira Code" pitchFamily="49" charset="0"/>
-                <a:ea typeface="Fira Code" pitchFamily="49" charset="0"/>
-                <a:cs typeface="Fira Code" pitchFamily="49" charset="0"/>
-              </a:rPr>
-              <a:t>    </a:t>
-            </a:r>
-            <a:r>
-              <a:rPr lang="en-US" sz="800" dirty="0" err="1">
-                <a:solidFill>
-                  <a:srgbClr val="871094"/>
-                </a:solidFill>
-                <a:effectLst/>
-                <a:latin typeface="Fira Code" pitchFamily="49" charset="0"/>
-                <a:ea typeface="Fira Code" pitchFamily="49" charset="0"/>
-                <a:cs typeface="Fira Code" pitchFamily="49" charset="0"/>
-              </a:rPr>
-              <a:t>accountType</a:t>
-            </a:r>
-            <a:r>
-              <a:rPr lang="en-US" sz="800" dirty="0">
-                <a:solidFill>
-                  <a:srgbClr val="871094"/>
-                </a:solidFill>
-                <a:effectLst/>
-                <a:latin typeface="Fira Code" pitchFamily="49" charset="0"/>
-                <a:ea typeface="Fira Code" pitchFamily="49" charset="0"/>
-                <a:cs typeface="Fira Code" pitchFamily="49" charset="0"/>
-              </a:rPr>
-              <a:t> </a:t>
-            </a:r>
-            <a:r>
-              <a:rPr lang="en-US" sz="800" dirty="0">
-                <a:solidFill>
-                  <a:srgbClr val="080808"/>
-                </a:solidFill>
-                <a:effectLst/>
-                <a:latin typeface="Fira Code" pitchFamily="49" charset="0"/>
-                <a:ea typeface="Fira Code" pitchFamily="49" charset="0"/>
-                <a:cs typeface="Fira Code" pitchFamily="49" charset="0"/>
-              </a:rPr>
-              <a:t>= </a:t>
-            </a:r>
-            <a:r>
-              <a:rPr lang="en-US" sz="800" dirty="0" err="1">
-                <a:solidFill>
-                  <a:srgbClr val="000000"/>
-                </a:solidFill>
-                <a:effectLst/>
-                <a:latin typeface="Fira Code" pitchFamily="49" charset="0"/>
-                <a:ea typeface="Fira Code" pitchFamily="49" charset="0"/>
-                <a:cs typeface="Fira Code" pitchFamily="49" charset="0"/>
-              </a:rPr>
-              <a:t>CustomerAccountTypeInfo</a:t>
-            </a:r>
-            <a:r>
-              <a:rPr lang="en-US" sz="800" dirty="0" err="1">
-                <a:solidFill>
-                  <a:srgbClr val="080808"/>
-                </a:solidFill>
-                <a:effectLst/>
-                <a:latin typeface="Fira Code" pitchFamily="49" charset="0"/>
-                <a:ea typeface="Fira Code" pitchFamily="49" charset="0"/>
-                <a:cs typeface="Fira Code" pitchFamily="49" charset="0"/>
-              </a:rPr>
-              <a:t>.</a:t>
-            </a:r>
-            <a:r>
-              <a:rPr lang="en-US" sz="800" i="1" dirty="0" err="1">
-                <a:solidFill>
-                  <a:srgbClr val="080808"/>
-                </a:solidFill>
-                <a:effectLst/>
-                <a:latin typeface="Fira Code" pitchFamily="49" charset="0"/>
-                <a:ea typeface="Fira Code" pitchFamily="49" charset="0"/>
-                <a:cs typeface="Fira Code" pitchFamily="49" charset="0"/>
-              </a:rPr>
-              <a:t>builder</a:t>
-            </a:r>
-            <a:r>
-              <a:rPr lang="en-US" sz="800" dirty="0">
-                <a:solidFill>
-                  <a:srgbClr val="080808"/>
-                </a:solidFill>
-                <a:effectLst/>
-                <a:latin typeface="Fira Code" pitchFamily="49" charset="0"/>
-                <a:ea typeface="Fira Code" pitchFamily="49" charset="0"/>
-                <a:cs typeface="Fira Code" pitchFamily="49" charset="0"/>
-              </a:rPr>
-              <a:t>().</a:t>
-            </a:r>
-            <a:r>
-              <a:rPr lang="en-US" sz="800" dirty="0" err="1">
-                <a:solidFill>
-                  <a:srgbClr val="080808"/>
-                </a:solidFill>
-                <a:effectLst/>
-                <a:latin typeface="Fira Code" pitchFamily="49" charset="0"/>
-                <a:ea typeface="Fira Code" pitchFamily="49" charset="0"/>
-                <a:cs typeface="Fira Code" pitchFamily="49" charset="0"/>
-              </a:rPr>
-              <a:t>account</a:t>
-            </a:r>
-            <a:r>
-              <a:rPr lang="en-US" sz="800" dirty="0">
-                <a:solidFill>
-                  <a:srgbClr val="080808"/>
-                </a:solidFill>
-                <a:effectLst/>
-                <a:latin typeface="Fira Code" pitchFamily="49" charset="0"/>
-                <a:ea typeface="Fira Code" pitchFamily="49" charset="0"/>
-                <a:cs typeface="Fira Code" pitchFamily="49" charset="0"/>
-              </a:rPr>
-              <a:t>(</a:t>
-            </a:r>
-            <a:r>
-              <a:rPr lang="en-US" sz="800" i="1" dirty="0">
-                <a:solidFill>
-                  <a:srgbClr val="871094"/>
-                </a:solidFill>
-                <a:effectLst/>
-                <a:latin typeface="Fira Code" pitchFamily="49" charset="0"/>
-                <a:ea typeface="Fira Code" pitchFamily="49" charset="0"/>
-                <a:cs typeface="Fira Code" pitchFamily="49" charset="0"/>
-              </a:rPr>
-              <a:t>ACCOUNT_ID)</a:t>
-            </a:r>
-            <a:r>
-              <a:rPr lang="en-US" sz="800" i="1" dirty="0">
-                <a:solidFill>
-                  <a:srgbClr val="080808"/>
-                </a:solidFill>
-                <a:latin typeface="Fira Code" pitchFamily="49" charset="0"/>
-                <a:ea typeface="Fira Code" pitchFamily="49" charset="0"/>
-                <a:cs typeface="Fira Code" pitchFamily="49" charset="0"/>
-              </a:rPr>
-              <a:t>.</a:t>
-            </a:r>
-            <a:r>
-              <a:rPr lang="en-US" sz="800" dirty="0" err="1">
-                <a:solidFill>
-                  <a:srgbClr val="080808"/>
-                </a:solidFill>
-                <a:effectLst/>
-                <a:latin typeface="Fira Code" pitchFamily="49" charset="0"/>
-                <a:ea typeface="Fira Code" pitchFamily="49" charset="0"/>
-                <a:cs typeface="Fira Code" pitchFamily="49" charset="0"/>
-              </a:rPr>
-              <a:t>accountType</a:t>
-            </a:r>
-            <a:r>
-              <a:rPr lang="en-US" sz="800" dirty="0">
-                <a:solidFill>
-                  <a:srgbClr val="080808"/>
-                </a:solidFill>
-                <a:effectLst/>
-                <a:latin typeface="Fira Code" pitchFamily="49" charset="0"/>
-                <a:ea typeface="Fira Code" pitchFamily="49" charset="0"/>
-                <a:cs typeface="Fira Code" pitchFamily="49" charset="0"/>
-              </a:rPr>
-              <a:t>(</a:t>
-            </a:r>
-            <a:r>
-              <a:rPr lang="en-US" sz="800" dirty="0">
-                <a:solidFill>
-                  <a:srgbClr val="067D17"/>
-                </a:solidFill>
-                <a:effectLst/>
-                <a:latin typeface="Fira Code" pitchFamily="49" charset="0"/>
-                <a:ea typeface="Fira Code" pitchFamily="49" charset="0"/>
-                <a:cs typeface="Fira Code" pitchFamily="49" charset="0"/>
-              </a:rPr>
-              <a:t>”PERSONAL"</a:t>
-            </a:r>
-            <a:r>
-              <a:rPr lang="en-US" sz="800" dirty="0">
-                <a:solidFill>
-                  <a:srgbClr val="080808"/>
-                </a:solidFill>
-                <a:effectLst/>
-                <a:latin typeface="Fira Code" pitchFamily="49" charset="0"/>
-                <a:ea typeface="Fira Code" pitchFamily="49" charset="0"/>
-                <a:cs typeface="Fira Code" pitchFamily="49" charset="0"/>
-              </a:rPr>
-              <a:t>).</a:t>
-            </a:r>
-            <a:r>
-              <a:rPr lang="en-US" sz="800" dirty="0" err="1">
-                <a:solidFill>
-                  <a:srgbClr val="080808"/>
-                </a:solidFill>
-                <a:effectLst/>
-                <a:latin typeface="Fira Code" pitchFamily="49" charset="0"/>
-                <a:ea typeface="Fira Code" pitchFamily="49" charset="0"/>
-                <a:cs typeface="Fira Code" pitchFamily="49" charset="0"/>
-              </a:rPr>
-              <a:t>subscription</a:t>
-            </a:r>
-            <a:r>
-              <a:rPr lang="en-US" sz="800" dirty="0">
-                <a:solidFill>
-                  <a:srgbClr val="080808"/>
-                </a:solidFill>
-                <a:effectLst/>
-                <a:latin typeface="Fira Code" pitchFamily="49" charset="0"/>
-                <a:ea typeface="Fira Code" pitchFamily="49" charset="0"/>
-                <a:cs typeface="Fira Code" pitchFamily="49" charset="0"/>
-              </a:rPr>
-              <a:t>(</a:t>
-            </a:r>
-            <a:r>
-              <a:rPr lang="en-US" sz="800" dirty="0">
-                <a:solidFill>
-                  <a:srgbClr val="067D17"/>
-                </a:solidFill>
-                <a:effectLst/>
-                <a:latin typeface="Fira Code" pitchFamily="49" charset="0"/>
-                <a:ea typeface="Fira Code" pitchFamily="49" charset="0"/>
-                <a:cs typeface="Fira Code" pitchFamily="49" charset="0"/>
-              </a:rPr>
-              <a:t>”MONTHLY"</a:t>
-            </a:r>
-            <a:r>
-              <a:rPr lang="en-US" sz="800" dirty="0">
-                <a:solidFill>
-                  <a:srgbClr val="080808"/>
-                </a:solidFill>
-                <a:effectLst/>
-                <a:latin typeface="Fira Code" pitchFamily="49" charset="0"/>
-                <a:ea typeface="Fira Code" pitchFamily="49" charset="0"/>
-                <a:cs typeface="Fira Code" pitchFamily="49" charset="0"/>
-              </a:rPr>
-              <a:t>).build();</a:t>
-            </a:r>
-            <a:br>
-              <a:rPr lang="en-US" sz="800" dirty="0">
-                <a:solidFill>
-                  <a:srgbClr val="080808"/>
-                </a:solidFill>
-                <a:effectLst/>
-                <a:latin typeface="Fira Code" pitchFamily="49" charset="0"/>
-                <a:ea typeface="Fira Code" pitchFamily="49" charset="0"/>
-                <a:cs typeface="Fira Code" pitchFamily="49" charset="0"/>
-              </a:rPr>
-            </a:br>
-            <a:r>
-              <a:rPr lang="en-US" sz="800" dirty="0">
-                <a:solidFill>
-                  <a:srgbClr val="080808"/>
-                </a:solidFill>
-                <a:effectLst/>
-                <a:latin typeface="Fira Code" pitchFamily="49" charset="0"/>
-                <a:ea typeface="Fira Code" pitchFamily="49" charset="0"/>
-                <a:cs typeface="Fira Code" pitchFamily="49" charset="0"/>
-              </a:rPr>
-              <a:t>    </a:t>
-            </a:r>
-            <a:r>
-              <a:rPr lang="en-US" sz="800" i="1" dirty="0">
-                <a:solidFill>
-                  <a:srgbClr val="080808"/>
-                </a:solidFill>
-                <a:effectLst/>
-                <a:latin typeface="Fira Code" pitchFamily="49" charset="0"/>
-                <a:ea typeface="Fira Code" pitchFamily="49" charset="0"/>
-                <a:cs typeface="Fira Code" pitchFamily="49" charset="0"/>
-              </a:rPr>
-              <a:t>when</a:t>
-            </a:r>
-            <a:r>
-              <a:rPr lang="en-US" sz="800" dirty="0">
-                <a:solidFill>
-                  <a:srgbClr val="080808"/>
-                </a:solidFill>
-                <a:effectLst/>
-                <a:latin typeface="Fira Code" pitchFamily="49" charset="0"/>
-                <a:ea typeface="Fira Code" pitchFamily="49" charset="0"/>
-                <a:cs typeface="Fira Code" pitchFamily="49" charset="0"/>
-              </a:rPr>
-              <a:t>(</a:t>
-            </a:r>
-            <a:r>
-              <a:rPr lang="en-US" sz="800" dirty="0" err="1">
-                <a:solidFill>
-                  <a:srgbClr val="871094"/>
-                </a:solidFill>
-                <a:effectLst/>
-                <a:latin typeface="Fira Code" pitchFamily="49" charset="0"/>
-                <a:ea typeface="Fira Code" pitchFamily="49" charset="0"/>
-                <a:cs typeface="Fira Code" pitchFamily="49" charset="0"/>
-              </a:rPr>
-              <a:t>responseEntity</a:t>
-            </a:r>
-            <a:r>
-              <a:rPr lang="en-US" sz="800" dirty="0" err="1">
-                <a:solidFill>
-                  <a:srgbClr val="080808"/>
-                </a:solidFill>
-                <a:effectLst/>
-                <a:latin typeface="Fira Code" pitchFamily="49" charset="0"/>
-                <a:ea typeface="Fira Code" pitchFamily="49" charset="0"/>
-                <a:cs typeface="Fira Code" pitchFamily="49" charset="0"/>
-              </a:rPr>
-              <a:t>.getBody</a:t>
-            </a:r>
-            <a:r>
-              <a:rPr lang="en-US" sz="800" dirty="0">
-                <a:solidFill>
-                  <a:srgbClr val="080808"/>
-                </a:solidFill>
-                <a:effectLst/>
-                <a:latin typeface="Fira Code" pitchFamily="49" charset="0"/>
-                <a:ea typeface="Fira Code" pitchFamily="49" charset="0"/>
-                <a:cs typeface="Fira Code" pitchFamily="49" charset="0"/>
-              </a:rPr>
-              <a:t>()).</a:t>
-            </a:r>
-            <a:r>
-              <a:rPr lang="en-US" sz="800" dirty="0" err="1">
-                <a:solidFill>
-                  <a:srgbClr val="080808"/>
-                </a:solidFill>
-                <a:effectLst/>
-                <a:latin typeface="Fira Code" pitchFamily="49" charset="0"/>
-                <a:ea typeface="Fira Code" pitchFamily="49" charset="0"/>
-                <a:cs typeface="Fira Code" pitchFamily="49" charset="0"/>
-              </a:rPr>
-              <a:t>thenReturn</a:t>
-            </a:r>
-            <a:r>
-              <a:rPr lang="en-US" sz="800" dirty="0">
-                <a:solidFill>
-                  <a:srgbClr val="080808"/>
-                </a:solidFill>
-                <a:effectLst/>
-                <a:latin typeface="Fira Code" pitchFamily="49" charset="0"/>
-                <a:ea typeface="Fira Code" pitchFamily="49" charset="0"/>
-                <a:cs typeface="Fira Code" pitchFamily="49" charset="0"/>
-              </a:rPr>
-              <a:t>(</a:t>
-            </a:r>
-            <a:r>
-              <a:rPr lang="en-US" sz="800" dirty="0" err="1">
-                <a:solidFill>
-                  <a:srgbClr val="871094"/>
-                </a:solidFill>
-                <a:effectLst/>
-                <a:latin typeface="Fira Code" pitchFamily="49" charset="0"/>
-                <a:ea typeface="Fira Code" pitchFamily="49" charset="0"/>
-                <a:cs typeface="Fira Code" pitchFamily="49" charset="0"/>
-              </a:rPr>
-              <a:t>accountType</a:t>
-            </a:r>
-            <a:r>
-              <a:rPr lang="en-US" sz="800" dirty="0">
-                <a:solidFill>
-                  <a:srgbClr val="080808"/>
-                </a:solidFill>
-                <a:effectLst/>
-                <a:latin typeface="Fira Code" pitchFamily="49" charset="0"/>
-                <a:ea typeface="Fira Code" pitchFamily="49" charset="0"/>
-                <a:cs typeface="Fira Code" pitchFamily="49" charset="0"/>
-              </a:rPr>
-              <a:t>);</a:t>
-            </a:r>
-            <a:br>
-              <a:rPr lang="en-US" sz="800" dirty="0">
-                <a:solidFill>
-                  <a:srgbClr val="080808"/>
-                </a:solidFill>
-                <a:effectLst/>
-                <a:latin typeface="Fira Code" pitchFamily="49" charset="0"/>
-                <a:ea typeface="Fira Code" pitchFamily="49" charset="0"/>
-                <a:cs typeface="Fira Code" pitchFamily="49" charset="0"/>
-              </a:rPr>
-            </a:br>
-            <a:r>
-              <a:rPr lang="en-US" sz="800" dirty="0">
-                <a:solidFill>
-                  <a:srgbClr val="080808"/>
-                </a:solidFill>
-                <a:effectLst/>
-                <a:latin typeface="Fira Code" pitchFamily="49" charset="0"/>
-                <a:ea typeface="Fira Code" pitchFamily="49" charset="0"/>
-                <a:cs typeface="Fira Code" pitchFamily="49" charset="0"/>
-              </a:rPr>
-              <a:t>    </a:t>
-            </a:r>
-            <a:r>
-              <a:rPr lang="en-US" sz="800" i="1" dirty="0">
-                <a:solidFill>
-                  <a:srgbClr val="8C8C8C"/>
-                </a:solidFill>
-                <a:effectLst/>
-                <a:latin typeface="Fira Code" pitchFamily="49" charset="0"/>
-                <a:ea typeface="Fira Code" pitchFamily="49" charset="0"/>
-                <a:cs typeface="Fira Code" pitchFamily="49" charset="0"/>
-              </a:rPr>
-              <a:t>// when</a:t>
-            </a:r>
-            <a:br>
-              <a:rPr lang="en-US" sz="800" i="1" dirty="0">
-                <a:solidFill>
-                  <a:srgbClr val="8C8C8C"/>
-                </a:solidFill>
-                <a:effectLst/>
-                <a:latin typeface="Fira Code" pitchFamily="49" charset="0"/>
-                <a:ea typeface="Fira Code" pitchFamily="49" charset="0"/>
-                <a:cs typeface="Fira Code" pitchFamily="49" charset="0"/>
-              </a:rPr>
-            </a:br>
-            <a:r>
-              <a:rPr lang="en-US" sz="800" i="1" dirty="0">
-                <a:solidFill>
-                  <a:srgbClr val="8C8C8C"/>
-                </a:solidFill>
-                <a:effectLst/>
-                <a:latin typeface="Fira Code" pitchFamily="49" charset="0"/>
-                <a:ea typeface="Fira Code" pitchFamily="49" charset="0"/>
-                <a:cs typeface="Fira Code" pitchFamily="49" charset="0"/>
-              </a:rPr>
-              <a:t>    </a:t>
-            </a:r>
-            <a:r>
-              <a:rPr lang="en-US" sz="800" dirty="0" err="1">
-                <a:solidFill>
-                  <a:srgbClr val="000000"/>
-                </a:solidFill>
-                <a:effectLst/>
-                <a:latin typeface="Fira Code" pitchFamily="49" charset="0"/>
-                <a:ea typeface="Fira Code" pitchFamily="49" charset="0"/>
-                <a:cs typeface="Fira Code" pitchFamily="49" charset="0"/>
-              </a:rPr>
-              <a:t>CustomerAccount</a:t>
-            </a:r>
-            <a:r>
-              <a:rPr lang="en-US" sz="800" dirty="0">
-                <a:solidFill>
-                  <a:srgbClr val="000000"/>
-                </a:solidFill>
-                <a:effectLst/>
-                <a:latin typeface="Fira Code" pitchFamily="49" charset="0"/>
-                <a:ea typeface="Fira Code" pitchFamily="49" charset="0"/>
-                <a:cs typeface="Fira Code" pitchFamily="49" charset="0"/>
-              </a:rPr>
-              <a:t> result </a:t>
-            </a:r>
-            <a:r>
-              <a:rPr lang="en-US" sz="800" dirty="0">
-                <a:solidFill>
-                  <a:srgbClr val="080808"/>
-                </a:solidFill>
-                <a:effectLst/>
-                <a:latin typeface="Fira Code" pitchFamily="49" charset="0"/>
-                <a:ea typeface="Fira Code" pitchFamily="49" charset="0"/>
-                <a:cs typeface="Fira Code" pitchFamily="49" charset="0"/>
-              </a:rPr>
-              <a:t>= </a:t>
-            </a:r>
-            <a:r>
-              <a:rPr lang="en-US" sz="800" dirty="0" err="1">
-                <a:solidFill>
-                  <a:srgbClr val="871094"/>
-                </a:solidFill>
-                <a:effectLst/>
-                <a:latin typeface="Fira Code" pitchFamily="49" charset="0"/>
-                <a:ea typeface="Fira Code" pitchFamily="49" charset="0"/>
-                <a:cs typeface="Fira Code" pitchFamily="49" charset="0"/>
-              </a:rPr>
-              <a:t>customerService</a:t>
-            </a:r>
-            <a:r>
-              <a:rPr lang="en-US" sz="800" dirty="0" err="1">
-                <a:solidFill>
-                  <a:srgbClr val="080808"/>
-                </a:solidFill>
-                <a:effectLst/>
-                <a:latin typeface="Fira Code" pitchFamily="49" charset="0"/>
-                <a:ea typeface="Fira Code" pitchFamily="49" charset="0"/>
-                <a:cs typeface="Fira Code" pitchFamily="49" charset="0"/>
-              </a:rPr>
-              <a:t>.retrieveAccount</a:t>
-            </a:r>
-            <a:r>
-              <a:rPr lang="en-US" sz="800" dirty="0">
-                <a:solidFill>
-                  <a:srgbClr val="080808"/>
-                </a:solidFill>
-                <a:effectLst/>
-                <a:latin typeface="Fira Code" pitchFamily="49" charset="0"/>
-                <a:ea typeface="Fira Code" pitchFamily="49" charset="0"/>
-                <a:cs typeface="Fira Code" pitchFamily="49" charset="0"/>
-              </a:rPr>
-              <a:t>(</a:t>
-            </a:r>
-            <a:r>
-              <a:rPr lang="en-US" sz="800" i="1" dirty="0">
-                <a:solidFill>
-                  <a:srgbClr val="871094"/>
-                </a:solidFill>
-                <a:effectLst/>
-                <a:latin typeface="Fira Code" pitchFamily="49" charset="0"/>
-                <a:ea typeface="Fira Code" pitchFamily="49" charset="0"/>
-                <a:cs typeface="Fira Code" pitchFamily="49" charset="0"/>
-              </a:rPr>
-              <a:t>ACCOUNT_ID</a:t>
-            </a:r>
-            <a:r>
-              <a:rPr lang="en-US" sz="800" dirty="0">
-                <a:solidFill>
-                  <a:srgbClr val="080808"/>
-                </a:solidFill>
-                <a:effectLst/>
-                <a:latin typeface="Fira Code" pitchFamily="49" charset="0"/>
-                <a:ea typeface="Fira Code" pitchFamily="49" charset="0"/>
-                <a:cs typeface="Fira Code" pitchFamily="49" charset="0"/>
-              </a:rPr>
-              <a:t>);</a:t>
-            </a:r>
-            <a:br>
-              <a:rPr lang="en-US" sz="800" dirty="0">
-                <a:solidFill>
-                  <a:srgbClr val="080808"/>
-                </a:solidFill>
-                <a:effectLst/>
-                <a:latin typeface="Fira Code" pitchFamily="49" charset="0"/>
-                <a:ea typeface="Fira Code" pitchFamily="49" charset="0"/>
-                <a:cs typeface="Fira Code" pitchFamily="49" charset="0"/>
-              </a:rPr>
-            </a:br>
-            <a:r>
-              <a:rPr lang="en-US" sz="800" dirty="0">
-                <a:solidFill>
-                  <a:srgbClr val="080808"/>
-                </a:solidFill>
-                <a:effectLst/>
-                <a:latin typeface="Fira Code" pitchFamily="49" charset="0"/>
-                <a:ea typeface="Fira Code" pitchFamily="49" charset="0"/>
-                <a:cs typeface="Fira Code" pitchFamily="49" charset="0"/>
-              </a:rPr>
-              <a:t>    </a:t>
-            </a:r>
-            <a:r>
-              <a:rPr lang="en-US" sz="800" i="1" dirty="0">
-                <a:solidFill>
-                  <a:srgbClr val="8C8C8C"/>
-                </a:solidFill>
-                <a:effectLst/>
-                <a:latin typeface="Fira Code" pitchFamily="49" charset="0"/>
-                <a:ea typeface="Fira Code" pitchFamily="49" charset="0"/>
-                <a:cs typeface="Fira Code" pitchFamily="49" charset="0"/>
-              </a:rPr>
-              <a:t>// then</a:t>
-            </a:r>
-            <a:br>
-              <a:rPr lang="en-US" sz="800" i="1" dirty="0">
-                <a:solidFill>
-                  <a:srgbClr val="8C8C8C"/>
-                </a:solidFill>
-                <a:effectLst/>
-                <a:latin typeface="Fira Code" pitchFamily="49" charset="0"/>
-                <a:ea typeface="Fira Code" pitchFamily="49" charset="0"/>
-                <a:cs typeface="Fira Code" pitchFamily="49" charset="0"/>
-              </a:rPr>
-            </a:br>
-            <a:r>
-              <a:rPr lang="en-US" sz="800" i="1" dirty="0">
-                <a:solidFill>
-                  <a:srgbClr val="8C8C8C"/>
-                </a:solidFill>
-                <a:effectLst/>
-                <a:latin typeface="Fira Code" pitchFamily="49" charset="0"/>
-                <a:ea typeface="Fira Code" pitchFamily="49" charset="0"/>
-                <a:cs typeface="Fira Code" pitchFamily="49" charset="0"/>
-              </a:rPr>
-              <a:t>    </a:t>
-            </a:r>
-            <a:r>
-              <a:rPr lang="en-US" sz="800" dirty="0" err="1">
-                <a:solidFill>
-                  <a:srgbClr val="000000"/>
-                </a:solidFill>
-                <a:effectLst/>
-                <a:latin typeface="Fira Code" pitchFamily="49" charset="0"/>
-                <a:ea typeface="Fira Code" pitchFamily="49" charset="0"/>
-                <a:cs typeface="Fira Code" pitchFamily="49" charset="0"/>
-              </a:rPr>
-              <a:t>CustomerAccount</a:t>
-            </a:r>
-            <a:r>
-              <a:rPr lang="en-US" sz="800" dirty="0">
-                <a:solidFill>
-                  <a:srgbClr val="000000"/>
-                </a:solidFill>
-                <a:effectLst/>
-                <a:latin typeface="Fira Code" pitchFamily="49" charset="0"/>
-                <a:ea typeface="Fira Code" pitchFamily="49" charset="0"/>
-                <a:cs typeface="Fira Code" pitchFamily="49" charset="0"/>
-              </a:rPr>
-              <a:t> </a:t>
-            </a:r>
-            <a:r>
-              <a:rPr lang="en-US" sz="800" dirty="0" err="1">
-                <a:solidFill>
-                  <a:srgbClr val="000000"/>
-                </a:solidFill>
-                <a:effectLst/>
-                <a:latin typeface="Fira Code" pitchFamily="49" charset="0"/>
-                <a:ea typeface="Fira Code" pitchFamily="49" charset="0"/>
-                <a:cs typeface="Fira Code" pitchFamily="49" charset="0"/>
-              </a:rPr>
-              <a:t>expectedCustomerAccount</a:t>
-            </a:r>
-            <a:r>
-              <a:rPr lang="en-US" sz="800" dirty="0">
-                <a:solidFill>
-                  <a:srgbClr val="000000"/>
-                </a:solidFill>
-                <a:effectLst/>
-                <a:latin typeface="Fira Code" pitchFamily="49" charset="0"/>
-                <a:ea typeface="Fira Code" pitchFamily="49" charset="0"/>
-                <a:cs typeface="Fira Code" pitchFamily="49" charset="0"/>
-              </a:rPr>
-              <a:t> </a:t>
-            </a:r>
-            <a:r>
-              <a:rPr lang="en-US" sz="800" dirty="0">
-                <a:solidFill>
-                  <a:srgbClr val="080808"/>
-                </a:solidFill>
-                <a:effectLst/>
-                <a:latin typeface="Fira Code" pitchFamily="49" charset="0"/>
-                <a:ea typeface="Fira Code" pitchFamily="49" charset="0"/>
-                <a:cs typeface="Fira Code" pitchFamily="49" charset="0"/>
-              </a:rPr>
-              <a:t>= </a:t>
-            </a:r>
-            <a:r>
-              <a:rPr lang="en-US" sz="800" dirty="0">
-                <a:solidFill>
-                  <a:srgbClr val="0033B3"/>
-                </a:solidFill>
-                <a:effectLst/>
-                <a:latin typeface="Fira Code" pitchFamily="49" charset="0"/>
-                <a:ea typeface="Fira Code" pitchFamily="49" charset="0"/>
-                <a:cs typeface="Fira Code" pitchFamily="49" charset="0"/>
-              </a:rPr>
-              <a:t>new </a:t>
-            </a:r>
-            <a:r>
-              <a:rPr lang="en-US" sz="800" dirty="0" err="1">
-                <a:solidFill>
-                  <a:srgbClr val="080808"/>
-                </a:solidFill>
-                <a:effectLst/>
-                <a:latin typeface="Fira Code" pitchFamily="49" charset="0"/>
-                <a:ea typeface="Fira Code" pitchFamily="49" charset="0"/>
-                <a:cs typeface="Fira Code" pitchFamily="49" charset="0"/>
-              </a:rPr>
-              <a:t>CustomerAccount</a:t>
-            </a:r>
-            <a:r>
-              <a:rPr lang="en-US" sz="800" dirty="0">
-                <a:solidFill>
-                  <a:srgbClr val="080808"/>
-                </a:solidFill>
-                <a:effectLst/>
-                <a:latin typeface="Fira Code" pitchFamily="49" charset="0"/>
-                <a:ea typeface="Fira Code" pitchFamily="49" charset="0"/>
-                <a:cs typeface="Fira Code" pitchFamily="49" charset="0"/>
-              </a:rPr>
-              <a:t>(</a:t>
-            </a:r>
-            <a:r>
-              <a:rPr lang="en-US" sz="800" i="1" dirty="0">
-                <a:solidFill>
-                  <a:srgbClr val="871094"/>
-                </a:solidFill>
-                <a:effectLst/>
-                <a:latin typeface="Fira Code" pitchFamily="49" charset="0"/>
-                <a:ea typeface="Fira Code" pitchFamily="49" charset="0"/>
-                <a:cs typeface="Fira Code" pitchFamily="49" charset="0"/>
-              </a:rPr>
-              <a:t>ACCOUNT_ID</a:t>
-            </a:r>
-            <a:r>
-              <a:rPr lang="en-US" sz="800" dirty="0">
-                <a:solidFill>
-                  <a:srgbClr val="080808"/>
-                </a:solidFill>
-                <a:effectLst/>
-                <a:latin typeface="Fira Code" pitchFamily="49" charset="0"/>
-                <a:ea typeface="Fira Code" pitchFamily="49" charset="0"/>
-                <a:cs typeface="Fira Code" pitchFamily="49" charset="0"/>
-              </a:rPr>
-              <a:t>, </a:t>
-            </a:r>
-            <a:r>
-              <a:rPr lang="en-US" sz="800" dirty="0" err="1">
-                <a:solidFill>
-                  <a:srgbClr val="000000"/>
-                </a:solidFill>
-                <a:effectLst/>
-                <a:latin typeface="Fira Code" pitchFamily="49" charset="0"/>
-                <a:ea typeface="Fira Code" pitchFamily="49" charset="0"/>
-                <a:cs typeface="Fira Code" pitchFamily="49" charset="0"/>
-              </a:rPr>
-              <a:t>CustomerPaymentType</a:t>
-            </a:r>
-            <a:r>
-              <a:rPr lang="en-US" sz="800" dirty="0" err="1">
-                <a:solidFill>
-                  <a:srgbClr val="080808"/>
-                </a:solidFill>
-                <a:effectLst/>
-                <a:latin typeface="Fira Code" pitchFamily="49" charset="0"/>
-                <a:ea typeface="Fira Code" pitchFamily="49" charset="0"/>
-                <a:cs typeface="Fira Code" pitchFamily="49" charset="0"/>
-              </a:rPr>
-              <a:t>.</a:t>
-            </a:r>
-            <a:r>
-              <a:rPr lang="en-US" sz="800" i="1" dirty="0" err="1">
-                <a:solidFill>
-                  <a:srgbClr val="871094"/>
-                </a:solidFill>
-                <a:effectLst/>
-                <a:latin typeface="Fira Code" pitchFamily="49" charset="0"/>
-                <a:ea typeface="Fira Code" pitchFamily="49" charset="0"/>
-                <a:cs typeface="Fira Code" pitchFamily="49" charset="0"/>
-              </a:rPr>
-              <a:t>MONTHLY</a:t>
-            </a:r>
-            <a:r>
-              <a:rPr lang="en-US" sz="800" dirty="0">
-                <a:solidFill>
-                  <a:srgbClr val="080808"/>
-                </a:solidFill>
-                <a:effectLst/>
-                <a:latin typeface="Fira Code" pitchFamily="49" charset="0"/>
-                <a:ea typeface="Fira Code" pitchFamily="49" charset="0"/>
-                <a:cs typeface="Fira Code" pitchFamily="49" charset="0"/>
-              </a:rPr>
-              <a:t>, </a:t>
-            </a:r>
-            <a:r>
-              <a:rPr lang="en-US" sz="800" dirty="0">
-                <a:solidFill>
-                  <a:srgbClr val="067D17"/>
-                </a:solidFill>
-                <a:effectLst/>
-                <a:latin typeface="Fira Code" pitchFamily="49" charset="0"/>
-                <a:ea typeface="Fira Code" pitchFamily="49" charset="0"/>
-                <a:cs typeface="Fira Code" pitchFamily="49" charset="0"/>
-              </a:rPr>
-              <a:t>"PERSONAL"</a:t>
-            </a:r>
-            <a:r>
-              <a:rPr lang="en-US" sz="800" dirty="0">
-                <a:solidFill>
-                  <a:srgbClr val="080808"/>
-                </a:solidFill>
-                <a:effectLst/>
-                <a:latin typeface="Fira Code" pitchFamily="49" charset="0"/>
-                <a:ea typeface="Fira Code" pitchFamily="49" charset="0"/>
-                <a:cs typeface="Fira Code" pitchFamily="49" charset="0"/>
-              </a:rPr>
-              <a:t>);</a:t>
-            </a:r>
-            <a:br>
-              <a:rPr lang="en-US" sz="800" dirty="0">
-                <a:solidFill>
-                  <a:srgbClr val="080808"/>
-                </a:solidFill>
-                <a:effectLst/>
-                <a:latin typeface="Fira Code" pitchFamily="49" charset="0"/>
-                <a:ea typeface="Fira Code" pitchFamily="49" charset="0"/>
-                <a:cs typeface="Fira Code" pitchFamily="49" charset="0"/>
-              </a:rPr>
-            </a:br>
-            <a:r>
-              <a:rPr lang="en-US" sz="800" dirty="0">
-                <a:solidFill>
-                  <a:srgbClr val="080808"/>
-                </a:solidFill>
-                <a:effectLst/>
-                <a:latin typeface="Fira Code" pitchFamily="49" charset="0"/>
-                <a:ea typeface="Fira Code" pitchFamily="49" charset="0"/>
-                <a:cs typeface="Fira Code" pitchFamily="49" charset="0"/>
-              </a:rPr>
-              <a:t>    </a:t>
-            </a:r>
-            <a:r>
-              <a:rPr lang="en-US" sz="800" i="1" dirty="0" err="1">
-                <a:solidFill>
-                  <a:srgbClr val="080808"/>
-                </a:solidFill>
-                <a:effectLst/>
-                <a:latin typeface="Fira Code" pitchFamily="49" charset="0"/>
-                <a:ea typeface="Fira Code" pitchFamily="49" charset="0"/>
-                <a:cs typeface="Fira Code" pitchFamily="49" charset="0"/>
-              </a:rPr>
-              <a:t>assertThat</a:t>
-            </a:r>
-            <a:r>
-              <a:rPr lang="en-US" sz="800" dirty="0">
-                <a:solidFill>
-                  <a:srgbClr val="080808"/>
-                </a:solidFill>
-                <a:effectLst/>
-                <a:latin typeface="Fira Code" pitchFamily="49" charset="0"/>
-                <a:ea typeface="Fira Code" pitchFamily="49" charset="0"/>
-                <a:cs typeface="Fira Code" pitchFamily="49" charset="0"/>
-              </a:rPr>
-              <a:t>(</a:t>
-            </a:r>
-            <a:r>
-              <a:rPr lang="en-US" sz="800" dirty="0">
-                <a:solidFill>
-                  <a:srgbClr val="000000"/>
-                </a:solidFill>
-                <a:effectLst/>
-                <a:latin typeface="Fira Code" pitchFamily="49" charset="0"/>
-                <a:ea typeface="Fira Code" pitchFamily="49" charset="0"/>
-                <a:cs typeface="Fira Code" pitchFamily="49" charset="0"/>
-              </a:rPr>
-              <a:t>result</a:t>
-            </a:r>
-            <a:r>
-              <a:rPr lang="en-US" sz="800" dirty="0">
-                <a:solidFill>
-                  <a:srgbClr val="080808"/>
-                </a:solidFill>
-                <a:effectLst/>
-                <a:latin typeface="Fira Code" pitchFamily="49" charset="0"/>
-                <a:ea typeface="Fira Code" pitchFamily="49" charset="0"/>
-                <a:cs typeface="Fira Code" pitchFamily="49" charset="0"/>
-              </a:rPr>
-              <a:t>, </a:t>
-            </a:r>
-            <a:r>
-              <a:rPr lang="en-US" sz="800" i="1" dirty="0">
-                <a:solidFill>
-                  <a:srgbClr val="080808"/>
-                </a:solidFill>
-                <a:effectLst/>
-                <a:latin typeface="Fira Code" pitchFamily="49" charset="0"/>
-                <a:ea typeface="Fira Code" pitchFamily="49" charset="0"/>
-                <a:cs typeface="Fira Code" pitchFamily="49" charset="0"/>
-              </a:rPr>
-              <a:t>is</a:t>
-            </a:r>
-            <a:r>
-              <a:rPr lang="en-US" sz="800" dirty="0">
-                <a:solidFill>
-                  <a:srgbClr val="080808"/>
-                </a:solidFill>
-                <a:effectLst/>
-                <a:latin typeface="Fira Code" pitchFamily="49" charset="0"/>
-                <a:ea typeface="Fira Code" pitchFamily="49" charset="0"/>
-                <a:cs typeface="Fira Code" pitchFamily="49" charset="0"/>
-              </a:rPr>
-              <a:t>(</a:t>
-            </a:r>
-            <a:r>
-              <a:rPr lang="en-US" sz="800" dirty="0" err="1">
-                <a:solidFill>
-                  <a:srgbClr val="000000"/>
-                </a:solidFill>
-                <a:effectLst/>
-                <a:latin typeface="Fira Code" pitchFamily="49" charset="0"/>
-                <a:ea typeface="Fira Code" pitchFamily="49" charset="0"/>
-                <a:cs typeface="Fira Code" pitchFamily="49" charset="0"/>
-              </a:rPr>
-              <a:t>expectedCustomerAccount</a:t>
-            </a:r>
-            <a:r>
-              <a:rPr lang="en-US" sz="800" dirty="0">
-                <a:solidFill>
-                  <a:srgbClr val="080808"/>
-                </a:solidFill>
-                <a:effectLst/>
-                <a:latin typeface="Fira Code" pitchFamily="49" charset="0"/>
-                <a:ea typeface="Fira Code" pitchFamily="49" charset="0"/>
-                <a:cs typeface="Fira Code" pitchFamily="49" charset="0"/>
-              </a:rPr>
-              <a:t>));</a:t>
-            </a:r>
-            <a:br>
-              <a:rPr lang="en-US" sz="800" dirty="0">
-                <a:solidFill>
-                  <a:srgbClr val="080808"/>
-                </a:solidFill>
-                <a:effectLst/>
-                <a:latin typeface="Fira Code" pitchFamily="49" charset="0"/>
-                <a:ea typeface="Fira Code" pitchFamily="49" charset="0"/>
-                <a:cs typeface="Fira Code" pitchFamily="49" charset="0"/>
-              </a:rPr>
-            </a:br>
-            <a:r>
-              <a:rPr lang="en-US" sz="800" dirty="0">
-                <a:solidFill>
-                  <a:srgbClr val="080808"/>
-                </a:solidFill>
-                <a:effectLst/>
-                <a:latin typeface="Fira Code" pitchFamily="49" charset="0"/>
-                <a:ea typeface="Fira Code" pitchFamily="49" charset="0"/>
-                <a:cs typeface="Fira Code" pitchFamily="49" charset="0"/>
-              </a:rPr>
-              <a:t>    </a:t>
-            </a:r>
-            <a:r>
-              <a:rPr lang="en-US" sz="800" i="1" dirty="0">
-                <a:solidFill>
-                  <a:srgbClr val="080808"/>
-                </a:solidFill>
-                <a:effectLst/>
-                <a:latin typeface="Fira Code" pitchFamily="49" charset="0"/>
-                <a:ea typeface="Fira Code" pitchFamily="49" charset="0"/>
-                <a:cs typeface="Fira Code" pitchFamily="49" charset="0"/>
-              </a:rPr>
-              <a:t>verify</a:t>
-            </a:r>
-            <a:r>
-              <a:rPr lang="en-US" sz="800" dirty="0">
-                <a:solidFill>
-                  <a:srgbClr val="080808"/>
-                </a:solidFill>
-                <a:effectLst/>
-                <a:latin typeface="Fira Code" pitchFamily="49" charset="0"/>
-                <a:ea typeface="Fira Code" pitchFamily="49" charset="0"/>
-                <a:cs typeface="Fira Code" pitchFamily="49" charset="0"/>
-              </a:rPr>
-              <a:t>(</a:t>
-            </a:r>
-            <a:r>
-              <a:rPr lang="en-US" sz="800" dirty="0" err="1">
-                <a:solidFill>
-                  <a:srgbClr val="871094"/>
-                </a:solidFill>
-                <a:effectLst/>
-                <a:latin typeface="Fira Code" pitchFamily="49" charset="0"/>
-                <a:ea typeface="Fira Code" pitchFamily="49" charset="0"/>
-                <a:cs typeface="Fira Code" pitchFamily="49" charset="0"/>
-              </a:rPr>
-              <a:t>restTemplate</a:t>
-            </a:r>
-            <a:r>
-              <a:rPr lang="en-US" sz="800" dirty="0">
-                <a:solidFill>
-                  <a:srgbClr val="080808"/>
-                </a:solidFill>
-                <a:effectLst/>
-                <a:latin typeface="Fira Code" pitchFamily="49" charset="0"/>
-                <a:ea typeface="Fira Code" pitchFamily="49" charset="0"/>
-                <a:cs typeface="Fira Code" pitchFamily="49" charset="0"/>
-              </a:rPr>
-              <a:t>, </a:t>
-            </a:r>
-            <a:r>
-              <a:rPr lang="en-US" sz="800" i="1" dirty="0">
-                <a:solidFill>
-                  <a:srgbClr val="080808"/>
-                </a:solidFill>
-                <a:effectLst/>
-                <a:latin typeface="Fira Code" pitchFamily="49" charset="0"/>
-                <a:ea typeface="Fira Code" pitchFamily="49" charset="0"/>
-                <a:cs typeface="Fira Code" pitchFamily="49" charset="0"/>
-              </a:rPr>
-              <a:t>times</a:t>
-            </a:r>
-            <a:r>
-              <a:rPr lang="en-US" sz="800" dirty="0">
-                <a:solidFill>
-                  <a:srgbClr val="080808"/>
-                </a:solidFill>
-                <a:effectLst/>
-                <a:latin typeface="Fira Code" pitchFamily="49" charset="0"/>
-                <a:ea typeface="Fira Code" pitchFamily="49" charset="0"/>
-                <a:cs typeface="Fira Code" pitchFamily="49" charset="0"/>
-              </a:rPr>
-              <a:t>(</a:t>
-            </a:r>
-            <a:r>
-              <a:rPr lang="en-US" sz="800" dirty="0">
-                <a:solidFill>
-                  <a:srgbClr val="1750EB"/>
-                </a:solidFill>
-                <a:effectLst/>
-                <a:latin typeface="Fira Code" pitchFamily="49" charset="0"/>
-                <a:ea typeface="Fira Code" pitchFamily="49" charset="0"/>
-                <a:cs typeface="Fira Code" pitchFamily="49" charset="0"/>
-              </a:rPr>
-              <a:t>1</a:t>
-            </a:r>
-            <a:r>
-              <a:rPr lang="en-US" sz="800" dirty="0">
-                <a:solidFill>
-                  <a:srgbClr val="080808"/>
-                </a:solidFill>
-                <a:effectLst/>
-                <a:latin typeface="Fira Code" pitchFamily="49" charset="0"/>
-                <a:ea typeface="Fira Code" pitchFamily="49" charset="0"/>
-                <a:cs typeface="Fira Code" pitchFamily="49" charset="0"/>
-              </a:rPr>
-              <a:t>)).exchange(</a:t>
-            </a:r>
-            <a:r>
-              <a:rPr lang="en-US" sz="800" dirty="0" err="1">
-                <a:solidFill>
-                  <a:srgbClr val="871094"/>
-                </a:solidFill>
-                <a:effectLst/>
-                <a:latin typeface="Fira Code" pitchFamily="49" charset="0"/>
-                <a:ea typeface="Fira Code" pitchFamily="49" charset="0"/>
-                <a:cs typeface="Fira Code" pitchFamily="49" charset="0"/>
-              </a:rPr>
-              <a:t>calledUrlCaptor</a:t>
-            </a:r>
-            <a:r>
-              <a:rPr lang="en-US" sz="800" dirty="0" err="1">
-                <a:solidFill>
-                  <a:srgbClr val="080808"/>
-                </a:solidFill>
-                <a:effectLst/>
-                <a:latin typeface="Fira Code" pitchFamily="49" charset="0"/>
-                <a:ea typeface="Fira Code" pitchFamily="49" charset="0"/>
-                <a:cs typeface="Fira Code" pitchFamily="49" charset="0"/>
-              </a:rPr>
-              <a:t>.capture</a:t>
-            </a:r>
-            <a:r>
-              <a:rPr lang="en-US" sz="800" dirty="0">
-                <a:solidFill>
-                  <a:srgbClr val="080808"/>
-                </a:solidFill>
-                <a:effectLst/>
-                <a:latin typeface="Fira Code" pitchFamily="49" charset="0"/>
-                <a:ea typeface="Fira Code" pitchFamily="49" charset="0"/>
-                <a:cs typeface="Fira Code" pitchFamily="49" charset="0"/>
-              </a:rPr>
-              <a:t>(), </a:t>
-            </a:r>
-            <a:r>
-              <a:rPr lang="en-US" sz="800" i="1" dirty="0">
-                <a:solidFill>
-                  <a:srgbClr val="080808"/>
-                </a:solidFill>
-                <a:effectLst/>
-                <a:latin typeface="Fira Code" pitchFamily="49" charset="0"/>
-                <a:ea typeface="Fira Code" pitchFamily="49" charset="0"/>
-                <a:cs typeface="Fira Code" pitchFamily="49" charset="0"/>
-              </a:rPr>
-              <a:t>eq</a:t>
-            </a:r>
-            <a:r>
-              <a:rPr lang="en-US" sz="800" dirty="0">
-                <a:solidFill>
-                  <a:srgbClr val="080808"/>
-                </a:solidFill>
-                <a:effectLst/>
-                <a:latin typeface="Fira Code" pitchFamily="49" charset="0"/>
-                <a:ea typeface="Fira Code" pitchFamily="49" charset="0"/>
-                <a:cs typeface="Fira Code" pitchFamily="49" charset="0"/>
-              </a:rPr>
-              <a:t>(</a:t>
-            </a:r>
-            <a:r>
-              <a:rPr lang="en-US" sz="800" dirty="0" err="1">
-                <a:solidFill>
-                  <a:srgbClr val="000000"/>
-                </a:solidFill>
-                <a:effectLst/>
-                <a:latin typeface="Fira Code" pitchFamily="49" charset="0"/>
-                <a:ea typeface="Fira Code" pitchFamily="49" charset="0"/>
-                <a:cs typeface="Fira Code" pitchFamily="49" charset="0"/>
-              </a:rPr>
-              <a:t>HttpMethod</a:t>
-            </a:r>
-            <a:r>
-              <a:rPr lang="en-US" sz="800" dirty="0" err="1">
-                <a:solidFill>
-                  <a:srgbClr val="080808"/>
-                </a:solidFill>
-                <a:effectLst/>
-                <a:latin typeface="Fira Code" pitchFamily="49" charset="0"/>
-                <a:ea typeface="Fira Code" pitchFamily="49" charset="0"/>
-                <a:cs typeface="Fira Code" pitchFamily="49" charset="0"/>
-              </a:rPr>
-              <a:t>.</a:t>
-            </a:r>
-            <a:r>
-              <a:rPr lang="en-US" sz="800" i="1" dirty="0" err="1">
-                <a:solidFill>
-                  <a:srgbClr val="871094"/>
-                </a:solidFill>
-                <a:effectLst/>
-                <a:latin typeface="Fira Code" pitchFamily="49" charset="0"/>
-                <a:ea typeface="Fira Code" pitchFamily="49" charset="0"/>
-                <a:cs typeface="Fira Code" pitchFamily="49" charset="0"/>
-              </a:rPr>
-              <a:t>GET</a:t>
-            </a:r>
-            <a:r>
-              <a:rPr lang="en-US" sz="800" dirty="0">
-                <a:solidFill>
-                  <a:srgbClr val="080808"/>
-                </a:solidFill>
-                <a:effectLst/>
-                <a:latin typeface="Fira Code" pitchFamily="49" charset="0"/>
-                <a:ea typeface="Fira Code" pitchFamily="49" charset="0"/>
-                <a:cs typeface="Fira Code" pitchFamily="49" charset="0"/>
-              </a:rPr>
-              <a:t>), </a:t>
-            </a:r>
-            <a:r>
-              <a:rPr lang="en-US" sz="800" dirty="0" err="1">
-                <a:solidFill>
-                  <a:srgbClr val="871094"/>
-                </a:solidFill>
-                <a:effectLst/>
-                <a:latin typeface="Fira Code" pitchFamily="49" charset="0"/>
-                <a:ea typeface="Fira Code" pitchFamily="49" charset="0"/>
-                <a:cs typeface="Fira Code" pitchFamily="49" charset="0"/>
-              </a:rPr>
-              <a:t>sentHttpEntityCaptor</a:t>
-            </a:r>
-            <a:r>
-              <a:rPr lang="en-US" sz="800" dirty="0" err="1">
-                <a:solidFill>
-                  <a:srgbClr val="080808"/>
-                </a:solidFill>
-                <a:effectLst/>
-                <a:latin typeface="Fira Code" pitchFamily="49" charset="0"/>
-                <a:ea typeface="Fira Code" pitchFamily="49" charset="0"/>
-                <a:cs typeface="Fira Code" pitchFamily="49" charset="0"/>
-              </a:rPr>
-              <a:t>.capture</a:t>
-            </a:r>
-            <a:r>
-              <a:rPr lang="en-US" sz="800" dirty="0">
-                <a:solidFill>
-                  <a:srgbClr val="080808"/>
-                </a:solidFill>
-                <a:effectLst/>
-                <a:latin typeface="Fira Code" pitchFamily="49" charset="0"/>
-                <a:ea typeface="Fira Code" pitchFamily="49" charset="0"/>
-                <a:cs typeface="Fira Code" pitchFamily="49" charset="0"/>
-              </a:rPr>
-              <a:t>(), </a:t>
-            </a:r>
-            <a:r>
-              <a:rPr lang="en-US" sz="800" i="1" dirty="0">
-                <a:solidFill>
-                  <a:srgbClr val="080808"/>
-                </a:solidFill>
-                <a:effectLst/>
-                <a:latin typeface="Fira Code" pitchFamily="49" charset="0"/>
-                <a:ea typeface="Fira Code" pitchFamily="49" charset="0"/>
-                <a:cs typeface="Fira Code" pitchFamily="49" charset="0"/>
-              </a:rPr>
-              <a:t>any</a:t>
-            </a:r>
-            <a:r>
-              <a:rPr lang="en-US" sz="800" dirty="0">
-                <a:solidFill>
-                  <a:srgbClr val="080808"/>
-                </a:solidFill>
-                <a:effectLst/>
-                <a:latin typeface="Fira Code" pitchFamily="49" charset="0"/>
-                <a:ea typeface="Fira Code" pitchFamily="49" charset="0"/>
-                <a:cs typeface="Fira Code" pitchFamily="49" charset="0"/>
-              </a:rPr>
-              <a:t>(</a:t>
-            </a:r>
-            <a:r>
-              <a:rPr lang="en-US" sz="800" dirty="0" err="1">
-                <a:solidFill>
-                  <a:srgbClr val="000000"/>
-                </a:solidFill>
-                <a:effectLst/>
-                <a:latin typeface="Fira Code" pitchFamily="49" charset="0"/>
-                <a:ea typeface="Fira Code" pitchFamily="49" charset="0"/>
-                <a:cs typeface="Fira Code" pitchFamily="49" charset="0"/>
-              </a:rPr>
-              <a:t>Class</a:t>
-            </a:r>
-            <a:r>
-              <a:rPr lang="en-US" sz="800" dirty="0" err="1">
-                <a:solidFill>
-                  <a:srgbClr val="080808"/>
-                </a:solidFill>
-                <a:effectLst/>
-                <a:latin typeface="Fira Code" pitchFamily="49" charset="0"/>
-                <a:ea typeface="Fira Code" pitchFamily="49" charset="0"/>
-                <a:cs typeface="Fira Code" pitchFamily="49" charset="0"/>
-              </a:rPr>
-              <a:t>.</a:t>
-            </a:r>
-            <a:r>
-              <a:rPr lang="en-US" sz="800" dirty="0" err="1">
-                <a:solidFill>
-                  <a:srgbClr val="0033B3"/>
-                </a:solidFill>
-                <a:effectLst/>
-                <a:latin typeface="Fira Code" pitchFamily="49" charset="0"/>
-                <a:ea typeface="Fira Code" pitchFamily="49" charset="0"/>
-                <a:cs typeface="Fira Code" pitchFamily="49" charset="0"/>
-              </a:rPr>
-              <a:t>class</a:t>
-            </a:r>
-            <a:r>
-              <a:rPr lang="en-US" sz="800" dirty="0">
-                <a:solidFill>
-                  <a:srgbClr val="080808"/>
-                </a:solidFill>
-                <a:effectLst/>
-                <a:latin typeface="Fira Code" pitchFamily="49" charset="0"/>
-                <a:ea typeface="Fira Code" pitchFamily="49" charset="0"/>
-                <a:cs typeface="Fira Code" pitchFamily="49" charset="0"/>
-              </a:rPr>
-              <a:t>));</a:t>
-            </a:r>
-            <a:br>
-              <a:rPr lang="en-US" sz="800" dirty="0">
-                <a:solidFill>
-                  <a:srgbClr val="080808"/>
-                </a:solidFill>
-                <a:effectLst/>
-                <a:latin typeface="Fira Code" pitchFamily="49" charset="0"/>
-                <a:ea typeface="Fira Code" pitchFamily="49" charset="0"/>
-                <a:cs typeface="Fira Code" pitchFamily="49" charset="0"/>
-              </a:rPr>
-            </a:br>
-            <a:r>
-              <a:rPr lang="en-US" sz="800" dirty="0">
-                <a:solidFill>
-                  <a:srgbClr val="080808"/>
-                </a:solidFill>
-                <a:effectLst/>
-                <a:latin typeface="Fira Code" pitchFamily="49" charset="0"/>
-                <a:ea typeface="Fira Code" pitchFamily="49" charset="0"/>
-                <a:cs typeface="Fira Code" pitchFamily="49" charset="0"/>
-              </a:rPr>
-              <a:t>    </a:t>
-            </a:r>
-            <a:r>
-              <a:rPr lang="en-US" sz="800" dirty="0" err="1">
-                <a:solidFill>
-                  <a:srgbClr val="080808"/>
-                </a:solidFill>
-                <a:effectLst/>
-                <a:latin typeface="Fira Code" pitchFamily="49" charset="0"/>
-                <a:ea typeface="Fira Code" pitchFamily="49" charset="0"/>
-                <a:cs typeface="Fira Code" pitchFamily="49" charset="0"/>
-              </a:rPr>
-              <a:t>verifyHeadersAreValid</a:t>
-            </a:r>
-            <a:r>
-              <a:rPr lang="en-US" sz="800" dirty="0">
-                <a:solidFill>
-                  <a:srgbClr val="080808"/>
-                </a:solidFill>
-                <a:effectLst/>
-                <a:latin typeface="Fira Code" pitchFamily="49" charset="0"/>
-                <a:ea typeface="Fira Code" pitchFamily="49" charset="0"/>
-                <a:cs typeface="Fira Code" pitchFamily="49" charset="0"/>
-              </a:rPr>
-              <a:t>(</a:t>
-            </a:r>
-            <a:r>
-              <a:rPr lang="en-US" sz="800" dirty="0" err="1">
-                <a:solidFill>
-                  <a:srgbClr val="871094"/>
-                </a:solidFill>
-                <a:effectLst/>
-                <a:latin typeface="Fira Code" pitchFamily="49" charset="0"/>
-                <a:ea typeface="Fira Code" pitchFamily="49" charset="0"/>
-                <a:cs typeface="Fira Code" pitchFamily="49" charset="0"/>
-              </a:rPr>
-              <a:t>sentHttpEntityCaptor</a:t>
-            </a:r>
-            <a:r>
-              <a:rPr lang="en-US" sz="800" dirty="0" err="1">
-                <a:solidFill>
-                  <a:srgbClr val="080808"/>
-                </a:solidFill>
-                <a:effectLst/>
-                <a:latin typeface="Fira Code" pitchFamily="49" charset="0"/>
-                <a:ea typeface="Fira Code" pitchFamily="49" charset="0"/>
-                <a:cs typeface="Fira Code" pitchFamily="49" charset="0"/>
-              </a:rPr>
-              <a:t>.getValue</a:t>
-            </a:r>
-            <a:r>
-              <a:rPr lang="en-US" sz="800" dirty="0">
-                <a:solidFill>
-                  <a:srgbClr val="080808"/>
-                </a:solidFill>
-                <a:effectLst/>
-                <a:latin typeface="Fira Code" pitchFamily="49" charset="0"/>
-                <a:ea typeface="Fira Code" pitchFamily="49" charset="0"/>
-                <a:cs typeface="Fira Code" pitchFamily="49" charset="0"/>
-              </a:rPr>
-              <a:t>().</a:t>
-            </a:r>
-            <a:r>
-              <a:rPr lang="en-US" sz="800" dirty="0" err="1">
-                <a:solidFill>
-                  <a:srgbClr val="080808"/>
-                </a:solidFill>
-                <a:effectLst/>
-                <a:latin typeface="Fira Code" pitchFamily="49" charset="0"/>
-                <a:ea typeface="Fira Code" pitchFamily="49" charset="0"/>
-                <a:cs typeface="Fira Code" pitchFamily="49" charset="0"/>
-              </a:rPr>
-              <a:t>getHeaders</a:t>
-            </a:r>
-            <a:r>
-              <a:rPr lang="en-US" sz="800" dirty="0">
-                <a:solidFill>
-                  <a:srgbClr val="080808"/>
-                </a:solidFill>
-                <a:effectLst/>
-                <a:latin typeface="Fira Code" pitchFamily="49" charset="0"/>
-                <a:ea typeface="Fira Code" pitchFamily="49" charset="0"/>
-                <a:cs typeface="Fira Code" pitchFamily="49" charset="0"/>
-              </a:rPr>
-              <a:t>());</a:t>
-            </a:r>
-            <a:br>
-              <a:rPr lang="en-US" sz="800" dirty="0">
-                <a:solidFill>
-                  <a:srgbClr val="080808"/>
-                </a:solidFill>
-                <a:effectLst/>
-                <a:latin typeface="Fira Code" pitchFamily="49" charset="0"/>
-                <a:ea typeface="Fira Code" pitchFamily="49" charset="0"/>
-                <a:cs typeface="Fira Code" pitchFamily="49" charset="0"/>
-              </a:rPr>
-            </a:br>
-            <a:r>
-              <a:rPr lang="en-US" sz="800" dirty="0">
-                <a:solidFill>
-                  <a:srgbClr val="080808"/>
-                </a:solidFill>
-                <a:effectLst/>
-                <a:latin typeface="Fira Code" pitchFamily="49" charset="0"/>
-                <a:ea typeface="Fira Code" pitchFamily="49" charset="0"/>
-                <a:cs typeface="Fira Code" pitchFamily="49" charset="0"/>
-              </a:rPr>
-              <a:t>}</a:t>
-            </a:r>
-          </a:p>
-          <a:p>
-            <a:pPr marL="0" indent="0">
-              <a:buNone/>
-            </a:pPr>
-            <a:endParaRPr lang="en-US" sz="800" dirty="0">
-              <a:latin typeface="Fira Code" pitchFamily="49" charset="0"/>
-              <a:ea typeface="Fira Code" pitchFamily="49" charset="0"/>
-              <a:cs typeface="Fira Code" pitchFamily="49" charset="0"/>
-            </a:endParaRPr>
-          </a:p>
-        </p:txBody>
-      </p:sp>
-    </p:spTree>
-    <p:extLst>
-      <p:ext uri="{BB962C8B-B14F-4D97-AF65-F5344CB8AC3E}">
-        <p14:creationId xmlns:p14="http://schemas.microsoft.com/office/powerpoint/2010/main" val="379213993"/>
       </p:ext>
     </p:extLst>
   </p:cSld>

</xml_diff>

<commit_message>
. d modified slides
Co-Authored-By: Llewellyn Falco <llewellyn.falco@gmail.com>
</commit_message>
<xml_diff>
--- a/slides/Testing Better with Approvals.pptx
+++ b/slides/Testing Better with Approvals.pptx
@@ -23614,6 +23614,32 @@
               <a:buFont typeface="+mj-lt"/>
               <a:buAutoNum type="arabicPeriod"/>
             </a:pPr>
+            <a:r>
+              <a:rPr lang="en-US" sz="1200"/>
+              <a:t>everywhere -&gt; single instance -&gt; some can’t convert</a:t>
+            </a:r>
+          </a:p>
+          <a:p>
+            <a:pPr marL="514350" indent="-514350">
+              <a:buFont typeface="+mj-lt"/>
+              <a:buAutoNum type="arabicPeriod"/>
+            </a:pPr>
+            <a:r>
+              <a:rPr lang="en-US" sz="1200"/>
+              <a:t>dual conversations (.and) -&gt; some can’t convert v2 -&gt; setting state</a:t>
+            </a:r>
+          </a:p>
+          <a:p>
+            <a:pPr marL="0" indent="0">
+              <a:buNone/>
+            </a:pPr>
+            <a:endParaRPr lang="en-US" sz="1200"/>
+          </a:p>
+          <a:p>
+            <a:pPr marL="514350" indent="-514350">
+              <a:buFont typeface="+mj-lt"/>
+              <a:buAutoNum type="arabicPeriod"/>
+            </a:pPr>
             <a:endParaRPr lang="en-US" sz="1200"/>
           </a:p>
         </p:txBody>

</xml_diff>

<commit_message>
. d fixed animations in  slides
</commit_message>
<xml_diff>
--- a/slides/Testing Better with Approvals.pptx
+++ b/slides/Testing Better with Approvals.pptx
@@ -304,7 +304,7 @@
           <a:p>
             <a:fld id="{35701875-5BC7-1E49-AF4C-96F7D9E7474C}" type="datetimeFigureOut">
               <a:rPr lang="en-US" smtClean="0"/>
-              <a:t>2/6/24</a:t>
+              <a:t>2/11/24</a:t>
             </a:fld>
             <a:endParaRPr lang="en-US"/>
           </a:p>
@@ -3682,7 +3682,7 @@
           <a:p>
             <a:fld id="{75A66788-8C42-AF46-A5E8-A812D6157D58}" type="datetimeFigureOut">
               <a:rPr lang="en-US" smtClean="0"/>
-              <a:t>2/6/24</a:t>
+              <a:t>2/11/24</a:t>
             </a:fld>
             <a:endParaRPr lang="en-US"/>
           </a:p>
@@ -3880,7 +3880,7 @@
           <a:p>
             <a:fld id="{75A66788-8C42-AF46-A5E8-A812D6157D58}" type="datetimeFigureOut">
               <a:rPr lang="en-US" smtClean="0"/>
-              <a:t>2/6/24</a:t>
+              <a:t>2/11/24</a:t>
             </a:fld>
             <a:endParaRPr lang="en-US"/>
           </a:p>
@@ -4088,7 +4088,7 @@
           <a:p>
             <a:fld id="{75A66788-8C42-AF46-A5E8-A812D6157D58}" type="datetimeFigureOut">
               <a:rPr lang="en-US" smtClean="0"/>
-              <a:t>2/6/24</a:t>
+              <a:t>2/11/24</a:t>
             </a:fld>
             <a:endParaRPr lang="en-US"/>
           </a:p>
@@ -4286,7 +4286,7 @@
           <a:p>
             <a:fld id="{75A66788-8C42-AF46-A5E8-A812D6157D58}" type="datetimeFigureOut">
               <a:rPr lang="en-US" smtClean="0"/>
-              <a:t>2/6/24</a:t>
+              <a:t>2/11/24</a:t>
             </a:fld>
             <a:endParaRPr lang="en-US"/>
           </a:p>
@@ -4561,7 +4561,7 @@
           <a:p>
             <a:fld id="{75A66788-8C42-AF46-A5E8-A812D6157D58}" type="datetimeFigureOut">
               <a:rPr lang="en-US" smtClean="0"/>
-              <a:t>2/6/24</a:t>
+              <a:t>2/11/24</a:t>
             </a:fld>
             <a:endParaRPr lang="en-US"/>
           </a:p>
@@ -4826,7 +4826,7 @@
           <a:p>
             <a:fld id="{75A66788-8C42-AF46-A5E8-A812D6157D58}" type="datetimeFigureOut">
               <a:rPr lang="en-US" smtClean="0"/>
-              <a:t>2/6/24</a:t>
+              <a:t>2/11/24</a:t>
             </a:fld>
             <a:endParaRPr lang="en-US"/>
           </a:p>
@@ -5238,7 +5238,7 @@
           <a:p>
             <a:fld id="{75A66788-8C42-AF46-A5E8-A812D6157D58}" type="datetimeFigureOut">
               <a:rPr lang="en-US" smtClean="0"/>
-              <a:t>2/6/24</a:t>
+              <a:t>2/11/24</a:t>
             </a:fld>
             <a:endParaRPr lang="en-US"/>
           </a:p>
@@ -5379,7 +5379,7 @@
           <a:p>
             <a:fld id="{75A66788-8C42-AF46-A5E8-A812D6157D58}" type="datetimeFigureOut">
               <a:rPr lang="en-US" smtClean="0"/>
-              <a:t>2/6/24</a:t>
+              <a:t>2/11/24</a:t>
             </a:fld>
             <a:endParaRPr lang="en-US"/>
           </a:p>
@@ -5492,7 +5492,7 @@
           <a:p>
             <a:fld id="{75A66788-8C42-AF46-A5E8-A812D6157D58}" type="datetimeFigureOut">
               <a:rPr lang="en-US" smtClean="0"/>
-              <a:t>2/6/24</a:t>
+              <a:t>2/11/24</a:t>
             </a:fld>
             <a:endParaRPr lang="en-US"/>
           </a:p>
@@ -5803,7 +5803,7 @@
           <a:p>
             <a:fld id="{75A66788-8C42-AF46-A5E8-A812D6157D58}" type="datetimeFigureOut">
               <a:rPr lang="en-US" smtClean="0"/>
-              <a:t>2/6/24</a:t>
+              <a:t>2/11/24</a:t>
             </a:fld>
             <a:endParaRPr lang="en-US"/>
           </a:p>
@@ -6091,7 +6091,7 @@
           <a:p>
             <a:fld id="{75A66788-8C42-AF46-A5E8-A812D6157D58}" type="datetimeFigureOut">
               <a:rPr lang="en-US" smtClean="0"/>
-              <a:t>2/6/24</a:t>
+              <a:t>2/11/24</a:t>
             </a:fld>
             <a:endParaRPr lang="en-US"/>
           </a:p>
@@ -6332,7 +6332,7 @@
           <a:p>
             <a:fld id="{75A66788-8C42-AF46-A5E8-A812D6157D58}" type="datetimeFigureOut">
               <a:rPr lang="en-US" smtClean="0"/>
-              <a:t>2/6/24</a:t>
+              <a:t>2/11/24</a:t>
             </a:fld>
             <a:endParaRPr lang="en-US"/>
           </a:p>
@@ -12165,6 +12165,60 @@
                                   </p:childTnLst>
                                 </p:cTn>
                               </p:par>
+                              <p:par>
+                                <p:cTn id="23" presetID="1" presetClass="entr" presetSubtype="0" fill="hold" grpId="0" nodeType="withEffect">
+                                  <p:stCondLst>
+                                    <p:cond delay="0"/>
+                                  </p:stCondLst>
+                                  <p:childTnLst>
+                                    <p:set>
+                                      <p:cBhvr>
+                                        <p:cTn id="24" dur="1" fill="hold">
+                                          <p:stCondLst>
+                                            <p:cond delay="0"/>
+                                          </p:stCondLst>
+                                        </p:cTn>
+                                        <p:tgtEl>
+                                          <p:spTgt spid="9"/>
+                                        </p:tgtEl>
+                                        <p:attrNameLst>
+                                          <p:attrName>style.visibility</p:attrName>
+                                        </p:attrNameLst>
+                                      </p:cBhvr>
+                                      <p:to>
+                                        <p:strVal val="visible"/>
+                                      </p:to>
+                                    </p:set>
+                                  </p:childTnLst>
+                                </p:cTn>
+                              </p:par>
+                              <p:par>
+                                <p:cTn id="25" presetID="1" presetClass="entr" presetSubtype="0" fill="hold" grpId="0" nodeType="withEffect">
+                                  <p:stCondLst>
+                                    <p:cond delay="0"/>
+                                  </p:stCondLst>
+                                  <p:childTnLst>
+                                    <p:set>
+                                      <p:cBhvr>
+                                        <p:cTn id="26" dur="1" fill="hold">
+                                          <p:stCondLst>
+                                            <p:cond delay="0"/>
+                                          </p:stCondLst>
+                                        </p:cTn>
+                                        <p:tgtEl>
+                                          <p:spTgt spid="8"/>
+                                        </p:tgtEl>
+                                        <p:attrNameLst>
+                                          <p:attrName>style.visibility</p:attrName>
+                                        </p:attrNameLst>
+                                      </p:cBhvr>
+                                      <p:to>
+                                        <p:strVal val="visible"/>
+                                      </p:to>
+                                    </p:set>
+                                  </p:childTnLst>
+                                </p:cTn>
+                              </p:par>
                             </p:childTnLst>
                           </p:cTn>
                         </p:par>
@@ -12193,6 +12247,8 @@
       </p:par>
     </p:tnLst>
     <p:bldLst>
+      <p:bldP spid="9" grpId="0" animBg="1"/>
+      <p:bldP spid="8" grpId="0" animBg="1"/>
       <p:bldP spid="3" grpId="0"/>
       <p:bldP spid="4" grpId="0"/>
       <p:bldP spid="6" grpId="0"/>

</xml_diff>

<commit_message>
. d updated slides
Co-Authored-By: Llewellyn Falco <llewellyn.falco@gmail.com>
</commit_message>
<xml_diff>
--- a/slides/Testing Better with Approvals.pptx
+++ b/slides/Testing Better with Approvals.pptx
@@ -16593,7 +16593,7 @@
         <p:spPr>
           <a:xfrm>
             <a:off x="978408" y="1682496"/>
-            <a:ext cx="795411" cy="923330"/>
+            <a:ext cx="5944320" cy="923330"/>
           </a:xfrm>
           <a:prstGeom prst="rect">
             <a:avLst/>
@@ -16612,7 +16612,7 @@
             </a:pPr>
             <a:r>
               <a:rPr lang="en-US"/>
-              <a:t>???</a:t>
+              <a:t>Invest in APIs that make it easier to express test scenarios</a:t>
             </a:r>
           </a:p>
           <a:p>

</xml_diff>

<commit_message>
. r updated slides
Co-Authored-By: Llewellyn Falco <llewellyn.falco@gmail.com>
</commit_message>
<xml_diff>
--- a/slides/Testing Better with Approvals.pptx
+++ b/slides/Testing Better with Approvals.pptx
@@ -238,6 +238,12 @@
 </p:presentation>
 </file>
 
+<file path=ppt/authors.xml><?xml version="1.0" encoding="utf-8"?>
+<p188:authorLst xmlns:a="http://schemas.openxmlformats.org/drawingml/2006/main" xmlns:r="http://schemas.openxmlformats.org/officeDocument/2006/relationships" xmlns:p188="http://schemas.microsoft.com/office/powerpoint/2018/8/main">
+  <p188:author id="{3C3349F8-DC01-FE7D-F7CD-AC66C053D11B}" name="Kesseler, Lada" initials="LK" userId="S::LADA.KESSELER1@T-MOBILE.COM::562dffe2-bbd3-4c93-8d98-a417671b7e15" providerId="AD"/>
+</p188:authorLst>
+</file>
+
 <file path=ppt/notesMasters/notesMaster1.xml><?xml version="1.0" encoding="utf-8"?>
 <p:notesMaster xmlns:a="http://schemas.openxmlformats.org/drawingml/2006/main" xmlns:r="http://schemas.openxmlformats.org/officeDocument/2006/relationships" xmlns:p="http://schemas.openxmlformats.org/presentationml/2006/main">
   <p:cSld>
@@ -320,7 +326,7 @@
           <a:p>
             <a:fld id="{35701875-5BC7-1E49-AF4C-96F7D9E7474C}" type="datetimeFigureOut">
               <a:rPr lang="en-US" smtClean="0"/>
-              <a:t>2/16/24</a:t>
+              <a:t>2/18/24</a:t>
             </a:fld>
             <a:endParaRPr lang="en-US"/>
           </a:p>
@@ -679,6 +685,114 @@
         <p:cNvPr id="1" name="">
           <a:extLst>
             <a:ext uri="{FF2B5EF4-FFF2-40B4-BE49-F238E27FC236}">
+              <a16:creationId xmlns:a16="http://schemas.microsoft.com/office/drawing/2014/main" id="{6771BDD3-1954-AE79-C148-7F69B543C073}"/>
+            </a:ext>
+          </a:extLst>
+        </p:cNvPr>
+        <p:cNvGrpSpPr/>
+        <p:nvPr/>
+      </p:nvGrpSpPr>
+      <p:grpSpPr>
+        <a:xfrm>
+          <a:off x="0" y="0"/>
+          <a:ext cx="0" cy="0"/>
+          <a:chOff x="0" y="0"/>
+          <a:chExt cx="0" cy="0"/>
+        </a:xfrm>
+      </p:grpSpPr>
+      <p:sp>
+        <p:nvSpPr>
+          <p:cNvPr id="2" name="Slide Image Placeholder 1">
+            <a:extLst>
+              <a:ext uri="{FF2B5EF4-FFF2-40B4-BE49-F238E27FC236}">
+                <a16:creationId xmlns:a16="http://schemas.microsoft.com/office/drawing/2014/main" id="{794B5943-AA33-BEF4-3100-93A9E51EA248}"/>
+              </a:ext>
+            </a:extLst>
+          </p:cNvPr>
+          <p:cNvSpPr>
+            <a:spLocks noGrp="1" noRot="1" noChangeAspect="1"/>
+          </p:cNvSpPr>
+          <p:nvPr>
+            <p:ph type="sldImg"/>
+          </p:nvPr>
+        </p:nvSpPr>
+        <p:spPr/>
+      </p:sp>
+      <p:sp>
+        <p:nvSpPr>
+          <p:cNvPr id="3" name="Notes Placeholder 2">
+            <a:extLst>
+              <a:ext uri="{FF2B5EF4-FFF2-40B4-BE49-F238E27FC236}">
+                <a16:creationId xmlns:a16="http://schemas.microsoft.com/office/drawing/2014/main" id="{7F4A7CE2-A51F-95D0-458E-4F149E776A82}"/>
+              </a:ext>
+            </a:extLst>
+          </p:cNvPr>
+          <p:cNvSpPr>
+            <a:spLocks noGrp="1"/>
+          </p:cNvSpPr>
+          <p:nvPr>
+            <p:ph type="body" idx="1"/>
+          </p:nvPr>
+        </p:nvSpPr>
+        <p:spPr/>
+        <p:txBody>
+          <a:bodyPr/>
+          <a:lstStyle/>
+          <a:p>
+            <a:endParaRPr lang="en-US"/>
+          </a:p>
+        </p:txBody>
+      </p:sp>
+      <p:sp>
+        <p:nvSpPr>
+          <p:cNvPr id="4" name="Slide Number Placeholder 3">
+            <a:extLst>
+              <a:ext uri="{FF2B5EF4-FFF2-40B4-BE49-F238E27FC236}">
+                <a16:creationId xmlns:a16="http://schemas.microsoft.com/office/drawing/2014/main" id="{A93C541A-0E80-1D79-01D0-CE09DDD43EAE}"/>
+              </a:ext>
+            </a:extLst>
+          </p:cNvPr>
+          <p:cNvSpPr>
+            <a:spLocks noGrp="1"/>
+          </p:cNvSpPr>
+          <p:nvPr>
+            <p:ph type="sldNum" sz="quarter" idx="5"/>
+          </p:nvPr>
+        </p:nvSpPr>
+        <p:spPr/>
+        <p:txBody>
+          <a:bodyPr/>
+          <a:lstStyle/>
+          <a:p>
+            <a:fld id="{FC5BBC2B-72B0-2542-8213-717906F3F32B}" type="slidenum">
+              <a:rPr lang="en-US" smtClean="0"/>
+              <a:t>21</a:t>
+            </a:fld>
+            <a:endParaRPr lang="en-US"/>
+          </a:p>
+        </p:txBody>
+      </p:sp>
+    </p:spTree>
+    <p:extLst>
+      <p:ext uri="{BB962C8B-B14F-4D97-AF65-F5344CB8AC3E}">
+        <p14:creationId xmlns:p14="http://schemas.microsoft.com/office/powerpoint/2010/main" val="3020680927"/>
+      </p:ext>
+    </p:extLst>
+  </p:cSld>
+  <p:clrMapOvr>
+    <a:masterClrMapping/>
+  </p:clrMapOvr>
+</p:notes>
+</file>
+
+<file path=ppt/notesSlides/notesSlide11.xml><?xml version="1.0" encoding="utf-8"?>
+<p:notes xmlns:a="http://schemas.openxmlformats.org/drawingml/2006/main" xmlns:r="http://schemas.openxmlformats.org/officeDocument/2006/relationships" xmlns:p="http://schemas.openxmlformats.org/presentationml/2006/main">
+  <p:cSld>
+    <p:spTree>
+      <p:nvGrpSpPr>
+        <p:cNvPr id="1" name="">
+          <a:extLst>
+            <a:ext uri="{FF2B5EF4-FFF2-40B4-BE49-F238E27FC236}">
               <a16:creationId xmlns:a16="http://schemas.microsoft.com/office/drawing/2014/main" id="{5DAED346-D5B3-67A5-C5F0-8DF5A03C2BDB}"/>
             </a:ext>
           </a:extLst>
@@ -782,7 +896,7 @@
 </p:notes>
 </file>
 
-<file path=ppt/notesSlides/notesSlide11.xml><?xml version="1.0" encoding="utf-8"?>
+<file path=ppt/notesSlides/notesSlide12.xml><?xml version="1.0" encoding="utf-8"?>
 <p:notes xmlns:a="http://schemas.openxmlformats.org/drawingml/2006/main" xmlns:r="http://schemas.openxmlformats.org/officeDocument/2006/relationships" xmlns:p="http://schemas.openxmlformats.org/presentationml/2006/main">
   <p:cSld>
     <p:spTree>
@@ -890,7 +1004,7 @@
 </p:notes>
 </file>
 
-<file path=ppt/notesSlides/notesSlide12.xml><?xml version="1.0" encoding="utf-8"?>
+<file path=ppt/notesSlides/notesSlide13.xml><?xml version="1.0" encoding="utf-8"?>
 <p:notes xmlns:a="http://schemas.openxmlformats.org/drawingml/2006/main" xmlns:r="http://schemas.openxmlformats.org/officeDocument/2006/relationships" xmlns:p="http://schemas.openxmlformats.org/presentationml/2006/main">
   <p:cSld>
     <p:spTree>
@@ -977,7 +1091,7 @@
 </p:notes>
 </file>
 
-<file path=ppt/notesSlides/notesSlide13.xml><?xml version="1.0" encoding="utf-8"?>
+<file path=ppt/notesSlides/notesSlide14.xml><?xml version="1.0" encoding="utf-8"?>
 <p:notes xmlns:a="http://schemas.openxmlformats.org/drawingml/2006/main" xmlns:r="http://schemas.openxmlformats.org/officeDocument/2006/relationships" xmlns:p="http://schemas.openxmlformats.org/presentationml/2006/main">
   <p:cSld>
     <p:spTree>
@@ -1088,7 +1202,7 @@
 </p:notes>
 </file>
 
-<file path=ppt/notesSlides/notesSlide14.xml><?xml version="1.0" encoding="utf-8"?>
+<file path=ppt/notesSlides/notesSlide15.xml><?xml version="1.0" encoding="utf-8"?>
 <p:notes xmlns:a="http://schemas.openxmlformats.org/drawingml/2006/main" xmlns:r="http://schemas.openxmlformats.org/officeDocument/2006/relationships" xmlns:p="http://schemas.openxmlformats.org/presentationml/2006/main">
   <p:cSld>
     <p:spTree>
@@ -1199,7 +1313,7 @@
 </p:notes>
 </file>
 
-<file path=ppt/notesSlides/notesSlide15.xml><?xml version="1.0" encoding="utf-8"?>
+<file path=ppt/notesSlides/notesSlide16.xml><?xml version="1.0" encoding="utf-8"?>
 <p:notes xmlns:a="http://schemas.openxmlformats.org/drawingml/2006/main" xmlns:r="http://schemas.openxmlformats.org/officeDocument/2006/relationships" xmlns:p="http://schemas.openxmlformats.org/presentationml/2006/main">
   <p:cSld>
     <p:spTree>
@@ -1310,7 +1424,7 @@
 </p:notes>
 </file>
 
-<file path=ppt/notesSlides/notesSlide16.xml><?xml version="1.0" encoding="utf-8"?>
+<file path=ppt/notesSlides/notesSlide17.xml><?xml version="1.0" encoding="utf-8"?>
 <p:notes xmlns:a="http://schemas.openxmlformats.org/drawingml/2006/main" xmlns:r="http://schemas.openxmlformats.org/officeDocument/2006/relationships" xmlns:p="http://schemas.openxmlformats.org/presentationml/2006/main">
   <p:cSld>
     <p:spTree>
@@ -1418,7 +1532,7 @@
 </p:notes>
 </file>
 
-<file path=ppt/notesSlides/notesSlide17.xml><?xml version="1.0" encoding="utf-8"?>
+<file path=ppt/notesSlides/notesSlide18.xml><?xml version="1.0" encoding="utf-8"?>
 <p:notes xmlns:a="http://schemas.openxmlformats.org/drawingml/2006/main" xmlns:r="http://schemas.openxmlformats.org/officeDocument/2006/relationships" xmlns:p="http://schemas.openxmlformats.org/presentationml/2006/main">
   <p:cSld>
     <p:spTree>
@@ -1526,7 +1640,7 @@
 </p:notes>
 </file>
 
-<file path=ppt/notesSlides/notesSlide18.xml><?xml version="1.0" encoding="utf-8"?>
+<file path=ppt/notesSlides/notesSlide19.xml><?xml version="1.0" encoding="utf-8"?>
 <p:notes xmlns:a="http://schemas.openxmlformats.org/drawingml/2006/main" xmlns:r="http://schemas.openxmlformats.org/officeDocument/2006/relationships" xmlns:p="http://schemas.openxmlformats.org/presentationml/2006/main">
   <p:cSld>
     <p:spTree>
@@ -1625,114 +1739,6 @@
     <p:extLst>
       <p:ext uri="{BB962C8B-B14F-4D97-AF65-F5344CB8AC3E}">
         <p14:creationId xmlns:p14="http://schemas.microsoft.com/office/powerpoint/2010/main" val="2474154363"/>
-      </p:ext>
-    </p:extLst>
-  </p:cSld>
-  <p:clrMapOvr>
-    <a:masterClrMapping/>
-  </p:clrMapOvr>
-</p:notes>
-</file>
-
-<file path=ppt/notesSlides/notesSlide19.xml><?xml version="1.0" encoding="utf-8"?>
-<p:notes xmlns:a="http://schemas.openxmlformats.org/drawingml/2006/main" xmlns:r="http://schemas.openxmlformats.org/officeDocument/2006/relationships" xmlns:p="http://schemas.openxmlformats.org/presentationml/2006/main">
-  <p:cSld>
-    <p:spTree>
-      <p:nvGrpSpPr>
-        <p:cNvPr id="1" name="">
-          <a:extLst>
-            <a:ext uri="{FF2B5EF4-FFF2-40B4-BE49-F238E27FC236}">
-              <a16:creationId xmlns:a16="http://schemas.microsoft.com/office/drawing/2014/main" id="{C484C03B-C8ED-111D-410C-CC18F6260669}"/>
-            </a:ext>
-          </a:extLst>
-        </p:cNvPr>
-        <p:cNvGrpSpPr/>
-        <p:nvPr/>
-      </p:nvGrpSpPr>
-      <p:grpSpPr>
-        <a:xfrm>
-          <a:off x="0" y="0"/>
-          <a:ext cx="0" cy="0"/>
-          <a:chOff x="0" y="0"/>
-          <a:chExt cx="0" cy="0"/>
-        </a:xfrm>
-      </p:grpSpPr>
-      <p:sp>
-        <p:nvSpPr>
-          <p:cNvPr id="2" name="Slide Image Placeholder 1">
-            <a:extLst>
-              <a:ext uri="{FF2B5EF4-FFF2-40B4-BE49-F238E27FC236}">
-                <a16:creationId xmlns:a16="http://schemas.microsoft.com/office/drawing/2014/main" id="{B2033D5F-1DDE-948F-815E-B643D4873E71}"/>
-              </a:ext>
-            </a:extLst>
-          </p:cNvPr>
-          <p:cNvSpPr>
-            <a:spLocks noGrp="1" noRot="1" noChangeAspect="1"/>
-          </p:cNvSpPr>
-          <p:nvPr>
-            <p:ph type="sldImg"/>
-          </p:nvPr>
-        </p:nvSpPr>
-        <p:spPr/>
-      </p:sp>
-      <p:sp>
-        <p:nvSpPr>
-          <p:cNvPr id="3" name="Notes Placeholder 2">
-            <a:extLst>
-              <a:ext uri="{FF2B5EF4-FFF2-40B4-BE49-F238E27FC236}">
-                <a16:creationId xmlns:a16="http://schemas.microsoft.com/office/drawing/2014/main" id="{B9F7B20F-57D3-F731-3608-50C8D9FBC98E}"/>
-              </a:ext>
-            </a:extLst>
-          </p:cNvPr>
-          <p:cNvSpPr>
-            <a:spLocks noGrp="1"/>
-          </p:cNvSpPr>
-          <p:nvPr>
-            <p:ph type="body" idx="1"/>
-          </p:nvPr>
-        </p:nvSpPr>
-        <p:spPr/>
-        <p:txBody>
-          <a:bodyPr/>
-          <a:lstStyle/>
-          <a:p>
-            <a:endParaRPr lang="en-US"/>
-          </a:p>
-        </p:txBody>
-      </p:sp>
-      <p:sp>
-        <p:nvSpPr>
-          <p:cNvPr id="4" name="Slide Number Placeholder 3">
-            <a:extLst>
-              <a:ext uri="{FF2B5EF4-FFF2-40B4-BE49-F238E27FC236}">
-                <a16:creationId xmlns:a16="http://schemas.microsoft.com/office/drawing/2014/main" id="{51AA9805-DEAA-96F0-AA83-9EC2749F00EE}"/>
-              </a:ext>
-            </a:extLst>
-          </p:cNvPr>
-          <p:cNvSpPr>
-            <a:spLocks noGrp="1"/>
-          </p:cNvSpPr>
-          <p:nvPr>
-            <p:ph type="sldNum" sz="quarter" idx="5"/>
-          </p:nvPr>
-        </p:nvSpPr>
-        <p:spPr/>
-        <p:txBody>
-          <a:bodyPr/>
-          <a:lstStyle/>
-          <a:p>
-            <a:fld id="{FC5BBC2B-72B0-2542-8213-717906F3F32B}" type="slidenum">
-              <a:rPr lang="en-US" smtClean="0"/>
-              <a:t>37</a:t>
-            </a:fld>
-            <a:endParaRPr lang="en-US"/>
-          </a:p>
-        </p:txBody>
-      </p:sp>
-    </p:spTree>
-    <p:extLst>
-      <p:ext uri="{BB962C8B-B14F-4D97-AF65-F5344CB8AC3E}">
-        <p14:creationId xmlns:p14="http://schemas.microsoft.com/office/powerpoint/2010/main" val="941621636"/>
       </p:ext>
     </p:extLst>
   </p:cSld>
@@ -1837,6 +1843,114 @@
         <p:cNvPr id="1" name="">
           <a:extLst>
             <a:ext uri="{FF2B5EF4-FFF2-40B4-BE49-F238E27FC236}">
+              <a16:creationId xmlns:a16="http://schemas.microsoft.com/office/drawing/2014/main" id="{C484C03B-C8ED-111D-410C-CC18F6260669}"/>
+            </a:ext>
+          </a:extLst>
+        </p:cNvPr>
+        <p:cNvGrpSpPr/>
+        <p:nvPr/>
+      </p:nvGrpSpPr>
+      <p:grpSpPr>
+        <a:xfrm>
+          <a:off x="0" y="0"/>
+          <a:ext cx="0" cy="0"/>
+          <a:chOff x="0" y="0"/>
+          <a:chExt cx="0" cy="0"/>
+        </a:xfrm>
+      </p:grpSpPr>
+      <p:sp>
+        <p:nvSpPr>
+          <p:cNvPr id="2" name="Slide Image Placeholder 1">
+            <a:extLst>
+              <a:ext uri="{FF2B5EF4-FFF2-40B4-BE49-F238E27FC236}">
+                <a16:creationId xmlns:a16="http://schemas.microsoft.com/office/drawing/2014/main" id="{B2033D5F-1DDE-948F-815E-B643D4873E71}"/>
+              </a:ext>
+            </a:extLst>
+          </p:cNvPr>
+          <p:cNvSpPr>
+            <a:spLocks noGrp="1" noRot="1" noChangeAspect="1"/>
+          </p:cNvSpPr>
+          <p:nvPr>
+            <p:ph type="sldImg"/>
+          </p:nvPr>
+        </p:nvSpPr>
+        <p:spPr/>
+      </p:sp>
+      <p:sp>
+        <p:nvSpPr>
+          <p:cNvPr id="3" name="Notes Placeholder 2">
+            <a:extLst>
+              <a:ext uri="{FF2B5EF4-FFF2-40B4-BE49-F238E27FC236}">
+                <a16:creationId xmlns:a16="http://schemas.microsoft.com/office/drawing/2014/main" id="{B9F7B20F-57D3-F731-3608-50C8D9FBC98E}"/>
+              </a:ext>
+            </a:extLst>
+          </p:cNvPr>
+          <p:cNvSpPr>
+            <a:spLocks noGrp="1"/>
+          </p:cNvSpPr>
+          <p:nvPr>
+            <p:ph type="body" idx="1"/>
+          </p:nvPr>
+        </p:nvSpPr>
+        <p:spPr/>
+        <p:txBody>
+          <a:bodyPr/>
+          <a:lstStyle/>
+          <a:p>
+            <a:endParaRPr lang="en-US"/>
+          </a:p>
+        </p:txBody>
+      </p:sp>
+      <p:sp>
+        <p:nvSpPr>
+          <p:cNvPr id="4" name="Slide Number Placeholder 3">
+            <a:extLst>
+              <a:ext uri="{FF2B5EF4-FFF2-40B4-BE49-F238E27FC236}">
+                <a16:creationId xmlns:a16="http://schemas.microsoft.com/office/drawing/2014/main" id="{51AA9805-DEAA-96F0-AA83-9EC2749F00EE}"/>
+              </a:ext>
+            </a:extLst>
+          </p:cNvPr>
+          <p:cNvSpPr>
+            <a:spLocks noGrp="1"/>
+          </p:cNvSpPr>
+          <p:nvPr>
+            <p:ph type="sldNum" sz="quarter" idx="5"/>
+          </p:nvPr>
+        </p:nvSpPr>
+        <p:spPr/>
+        <p:txBody>
+          <a:bodyPr/>
+          <a:lstStyle/>
+          <a:p>
+            <a:fld id="{FC5BBC2B-72B0-2542-8213-717906F3F32B}" type="slidenum">
+              <a:rPr lang="en-US" smtClean="0"/>
+              <a:t>37</a:t>
+            </a:fld>
+            <a:endParaRPr lang="en-US"/>
+          </a:p>
+        </p:txBody>
+      </p:sp>
+    </p:spTree>
+    <p:extLst>
+      <p:ext uri="{BB962C8B-B14F-4D97-AF65-F5344CB8AC3E}">
+        <p14:creationId xmlns:p14="http://schemas.microsoft.com/office/powerpoint/2010/main" val="941621636"/>
+      </p:ext>
+    </p:extLst>
+  </p:cSld>
+  <p:clrMapOvr>
+    <a:masterClrMapping/>
+  </p:clrMapOvr>
+</p:notes>
+</file>
+
+<file path=ppt/notesSlides/notesSlide21.xml><?xml version="1.0" encoding="utf-8"?>
+<p:notes xmlns:a="http://schemas.openxmlformats.org/drawingml/2006/main" xmlns:r="http://schemas.openxmlformats.org/officeDocument/2006/relationships" xmlns:p="http://schemas.openxmlformats.org/presentationml/2006/main">
+  <p:cSld>
+    <p:spTree>
+      <p:nvGrpSpPr>
+        <p:cNvPr id="1" name="">
+          <a:extLst>
+            <a:ext uri="{FF2B5EF4-FFF2-40B4-BE49-F238E27FC236}">
               <a16:creationId xmlns:a16="http://schemas.microsoft.com/office/drawing/2014/main" id="{2B4B2DED-A804-1FB3-EDC5-8598F778A3ED}"/>
             </a:ext>
           </a:extLst>
@@ -1937,7 +2051,7 @@
 </p:notes>
 </file>
 
-<file path=ppt/notesSlides/notesSlide21.xml><?xml version="1.0" encoding="utf-8"?>
+<file path=ppt/notesSlides/notesSlide22.xml><?xml version="1.0" encoding="utf-8"?>
 <p:notes xmlns:a="http://schemas.openxmlformats.org/drawingml/2006/main" xmlns:r="http://schemas.openxmlformats.org/officeDocument/2006/relationships" xmlns:p="http://schemas.openxmlformats.org/presentationml/2006/main">
   <p:cSld>
     <p:spTree>
@@ -2021,7 +2135,7 @@
 </p:notes>
 </file>
 
-<file path=ppt/notesSlides/notesSlide22.xml><?xml version="1.0" encoding="utf-8"?>
+<file path=ppt/notesSlides/notesSlide23.xml><?xml version="1.0" encoding="utf-8"?>
 <p:notes xmlns:a="http://schemas.openxmlformats.org/drawingml/2006/main" xmlns:r="http://schemas.openxmlformats.org/officeDocument/2006/relationships" xmlns:p="http://schemas.openxmlformats.org/presentationml/2006/main">
   <p:cSld>
     <p:spTree>
@@ -2129,7 +2243,7 @@
 </p:notes>
 </file>
 
-<file path=ppt/notesSlides/notesSlide23.xml><?xml version="1.0" encoding="utf-8"?>
+<file path=ppt/notesSlides/notesSlide24.xml><?xml version="1.0" encoding="utf-8"?>
 <p:notes xmlns:a="http://schemas.openxmlformats.org/drawingml/2006/main" xmlns:r="http://schemas.openxmlformats.org/officeDocument/2006/relationships" xmlns:p="http://schemas.openxmlformats.org/presentationml/2006/main">
   <p:cSld>
     <p:spTree>
@@ -2214,6 +2328,124 @@
 </file>
 
 <file path=ppt/notesSlides/notesSlide3.xml><?xml version="1.0" encoding="utf-8"?>
+<p:notes xmlns:a="http://schemas.openxmlformats.org/drawingml/2006/main" xmlns:r="http://schemas.openxmlformats.org/officeDocument/2006/relationships" xmlns:p="http://schemas.openxmlformats.org/presentationml/2006/main">
+  <p:cSld>
+    <p:spTree>
+      <p:nvGrpSpPr>
+        <p:cNvPr id="1" name=""/>
+        <p:cNvGrpSpPr/>
+        <p:nvPr/>
+      </p:nvGrpSpPr>
+      <p:grpSpPr>
+        <a:xfrm>
+          <a:off x="0" y="0"/>
+          <a:ext cx="0" cy="0"/>
+          <a:chOff x="0" y="0"/>
+          <a:chExt cx="0" cy="0"/>
+        </a:xfrm>
+      </p:grpSpPr>
+      <p:sp>
+        <p:nvSpPr>
+          <p:cNvPr id="2" name="Slide Image Placeholder 1"/>
+          <p:cNvSpPr>
+            <a:spLocks noGrp="1" noRot="1" noChangeAspect="1"/>
+          </p:cNvSpPr>
+          <p:nvPr>
+            <p:ph type="sldImg"/>
+          </p:nvPr>
+        </p:nvSpPr>
+        <p:spPr/>
+      </p:sp>
+      <p:sp>
+        <p:nvSpPr>
+          <p:cNvPr id="3" name="Notes Placeholder 2"/>
+          <p:cNvSpPr>
+            <a:spLocks noGrp="1"/>
+          </p:cNvSpPr>
+          <p:nvPr>
+            <p:ph type="body" idx="1"/>
+          </p:nvPr>
+        </p:nvSpPr>
+        <p:spPr/>
+        <p:txBody>
+          <a:bodyPr/>
+          <a:lstStyle/>
+          <a:p>
+            <a:pPr marL="0" marR="0" lvl="0" indent="0" algn="l" defTabSz="914400" rtl="0" eaLnBrk="1" fontAlgn="auto" latinLnBrk="0" hangingPunct="1">
+              <a:lnSpc>
+                <a:spcPct val="100000"/>
+              </a:lnSpc>
+              <a:spcBef>
+                <a:spcPts val="0"/>
+              </a:spcBef>
+              <a:spcAft>
+                <a:spcPts val="0"/>
+              </a:spcAft>
+              <a:buClrTx/>
+              <a:buSzTx/>
+              <a:buFontTx/>
+              <a:buNone/>
+              <a:tabLst/>
+              <a:defRPr/>
+            </a:pPr>
+            <a:r>
+              <a:rPr lang="en-US" i="1">
+                <a:solidFill>
+                  <a:srgbClr val="8C8C8C"/>
+                </a:solidFill>
+                <a:effectLst/>
+              </a:rPr>
+              <a:t>we put the focus on what it is that we're testing, and not the setup of the test</a:t>
+            </a:r>
+            <a:endParaRPr lang="en-US">
+              <a:solidFill>
+                <a:srgbClr val="080808"/>
+              </a:solidFill>
+              <a:effectLst/>
+            </a:endParaRPr>
+          </a:p>
+          <a:p>
+            <a:endParaRPr lang="en-US"/>
+          </a:p>
+        </p:txBody>
+      </p:sp>
+      <p:sp>
+        <p:nvSpPr>
+          <p:cNvPr id="4" name="Slide Number Placeholder 3"/>
+          <p:cNvSpPr>
+            <a:spLocks noGrp="1"/>
+          </p:cNvSpPr>
+          <p:nvPr>
+            <p:ph type="sldNum" sz="quarter" idx="5"/>
+          </p:nvPr>
+        </p:nvSpPr>
+        <p:spPr/>
+        <p:txBody>
+          <a:bodyPr/>
+          <a:lstStyle/>
+          <a:p>
+            <a:fld id="{FC5BBC2B-72B0-2542-8213-717906F3F32B}" type="slidenum">
+              <a:rPr lang="en-US" smtClean="0"/>
+              <a:t>8</a:t>
+            </a:fld>
+            <a:endParaRPr lang="en-US"/>
+          </a:p>
+        </p:txBody>
+      </p:sp>
+    </p:spTree>
+    <p:extLst>
+      <p:ext uri="{BB962C8B-B14F-4D97-AF65-F5344CB8AC3E}">
+        <p14:creationId xmlns:p14="http://schemas.microsoft.com/office/powerpoint/2010/main" val="2955327855"/>
+      </p:ext>
+    </p:extLst>
+  </p:cSld>
+  <p:clrMapOvr>
+    <a:masterClrMapping/>
+  </p:clrMapOvr>
+</p:notes>
+</file>
+
+<file path=ppt/notesSlides/notesSlide4.xml><?xml version="1.0" encoding="utf-8"?>
 <p:notes xmlns:a="http://schemas.openxmlformats.org/drawingml/2006/main" xmlns:r="http://schemas.openxmlformats.org/officeDocument/2006/relationships" xmlns:p="http://schemas.openxmlformats.org/presentationml/2006/main">
   <p:cSld>
     <p:spTree>
@@ -2321,7 +2553,7 @@
 </p:notes>
 </file>
 
-<file path=ppt/notesSlides/notesSlide4.xml><?xml version="1.0" encoding="utf-8"?>
+<file path=ppt/notesSlides/notesSlide5.xml><?xml version="1.0" encoding="utf-8"?>
 <p:notes xmlns:a="http://schemas.openxmlformats.org/drawingml/2006/main" xmlns:r="http://schemas.openxmlformats.org/officeDocument/2006/relationships" xmlns:p="http://schemas.openxmlformats.org/presentationml/2006/main">
   <p:cSld>
     <p:spTree>
@@ -2429,7 +2661,7 @@
 </p:notes>
 </file>
 
-<file path=ppt/notesSlides/notesSlide5.xml><?xml version="1.0" encoding="utf-8"?>
+<file path=ppt/notesSlides/notesSlide6.xml><?xml version="1.0" encoding="utf-8"?>
 <p:notes xmlns:a="http://schemas.openxmlformats.org/drawingml/2006/main" xmlns:r="http://schemas.openxmlformats.org/officeDocument/2006/relationships" xmlns:p="http://schemas.openxmlformats.org/presentationml/2006/main">
   <p:cSld>
     <p:spTree>
@@ -2537,7 +2769,7 @@
 </p:notes>
 </file>
 
-<file path=ppt/notesSlides/notesSlide6.xml><?xml version="1.0" encoding="utf-8"?>
+<file path=ppt/notesSlides/notesSlide7.xml><?xml version="1.0" encoding="utf-8"?>
 <p:notes xmlns:a="http://schemas.openxmlformats.org/drawingml/2006/main" xmlns:r="http://schemas.openxmlformats.org/officeDocument/2006/relationships" xmlns:p="http://schemas.openxmlformats.org/presentationml/2006/main">
   <p:cSld>
     <p:spTree>
@@ -2624,7 +2856,7 @@
 </p:notes>
 </file>
 
-<file path=ppt/notesSlides/notesSlide7.xml><?xml version="1.0" encoding="utf-8"?>
+<file path=ppt/notesSlides/notesSlide8.xml><?xml version="1.0" encoding="utf-8"?>
 <p:notes xmlns:a="http://schemas.openxmlformats.org/drawingml/2006/main" xmlns:r="http://schemas.openxmlformats.org/officeDocument/2006/relationships" xmlns:p="http://schemas.openxmlformats.org/presentationml/2006/main">
   <p:cSld>
     <p:spTree>
@@ -2735,7 +2967,7 @@
 </p:notes>
 </file>
 
-<file path=ppt/notesSlides/notesSlide8.xml><?xml version="1.0" encoding="utf-8"?>
+<file path=ppt/notesSlides/notesSlide9.xml><?xml version="1.0" encoding="utf-8"?>
 <p:notes xmlns:a="http://schemas.openxmlformats.org/drawingml/2006/main" xmlns:r="http://schemas.openxmlformats.org/officeDocument/2006/relationships" xmlns:p="http://schemas.openxmlformats.org/presentationml/2006/main">
   <p:cSld>
     <p:spTree>
@@ -2834,114 +3066,6 @@
     <p:extLst>
       <p:ext uri="{BB962C8B-B14F-4D97-AF65-F5344CB8AC3E}">
         <p14:creationId xmlns:p14="http://schemas.microsoft.com/office/powerpoint/2010/main" val="3121600577"/>
-      </p:ext>
-    </p:extLst>
-  </p:cSld>
-  <p:clrMapOvr>
-    <a:masterClrMapping/>
-  </p:clrMapOvr>
-</p:notes>
-</file>
-
-<file path=ppt/notesSlides/notesSlide9.xml><?xml version="1.0" encoding="utf-8"?>
-<p:notes xmlns:a="http://schemas.openxmlformats.org/drawingml/2006/main" xmlns:r="http://schemas.openxmlformats.org/officeDocument/2006/relationships" xmlns:p="http://schemas.openxmlformats.org/presentationml/2006/main">
-  <p:cSld>
-    <p:spTree>
-      <p:nvGrpSpPr>
-        <p:cNvPr id="1" name="">
-          <a:extLst>
-            <a:ext uri="{FF2B5EF4-FFF2-40B4-BE49-F238E27FC236}">
-              <a16:creationId xmlns:a16="http://schemas.microsoft.com/office/drawing/2014/main" id="{6771BDD3-1954-AE79-C148-7F69B543C073}"/>
-            </a:ext>
-          </a:extLst>
-        </p:cNvPr>
-        <p:cNvGrpSpPr/>
-        <p:nvPr/>
-      </p:nvGrpSpPr>
-      <p:grpSpPr>
-        <a:xfrm>
-          <a:off x="0" y="0"/>
-          <a:ext cx="0" cy="0"/>
-          <a:chOff x="0" y="0"/>
-          <a:chExt cx="0" cy="0"/>
-        </a:xfrm>
-      </p:grpSpPr>
-      <p:sp>
-        <p:nvSpPr>
-          <p:cNvPr id="2" name="Slide Image Placeholder 1">
-            <a:extLst>
-              <a:ext uri="{FF2B5EF4-FFF2-40B4-BE49-F238E27FC236}">
-                <a16:creationId xmlns:a16="http://schemas.microsoft.com/office/drawing/2014/main" id="{794B5943-AA33-BEF4-3100-93A9E51EA248}"/>
-              </a:ext>
-            </a:extLst>
-          </p:cNvPr>
-          <p:cNvSpPr>
-            <a:spLocks noGrp="1" noRot="1" noChangeAspect="1"/>
-          </p:cNvSpPr>
-          <p:nvPr>
-            <p:ph type="sldImg"/>
-          </p:nvPr>
-        </p:nvSpPr>
-        <p:spPr/>
-      </p:sp>
-      <p:sp>
-        <p:nvSpPr>
-          <p:cNvPr id="3" name="Notes Placeholder 2">
-            <a:extLst>
-              <a:ext uri="{FF2B5EF4-FFF2-40B4-BE49-F238E27FC236}">
-                <a16:creationId xmlns:a16="http://schemas.microsoft.com/office/drawing/2014/main" id="{7F4A7CE2-A51F-95D0-458E-4F149E776A82}"/>
-              </a:ext>
-            </a:extLst>
-          </p:cNvPr>
-          <p:cNvSpPr>
-            <a:spLocks noGrp="1"/>
-          </p:cNvSpPr>
-          <p:nvPr>
-            <p:ph type="body" idx="1"/>
-          </p:nvPr>
-        </p:nvSpPr>
-        <p:spPr/>
-        <p:txBody>
-          <a:bodyPr/>
-          <a:lstStyle/>
-          <a:p>
-            <a:endParaRPr lang="en-US"/>
-          </a:p>
-        </p:txBody>
-      </p:sp>
-      <p:sp>
-        <p:nvSpPr>
-          <p:cNvPr id="4" name="Slide Number Placeholder 3">
-            <a:extLst>
-              <a:ext uri="{FF2B5EF4-FFF2-40B4-BE49-F238E27FC236}">
-                <a16:creationId xmlns:a16="http://schemas.microsoft.com/office/drawing/2014/main" id="{A93C541A-0E80-1D79-01D0-CE09DDD43EAE}"/>
-              </a:ext>
-            </a:extLst>
-          </p:cNvPr>
-          <p:cNvSpPr>
-            <a:spLocks noGrp="1"/>
-          </p:cNvSpPr>
-          <p:nvPr>
-            <p:ph type="sldNum" sz="quarter" idx="5"/>
-          </p:nvPr>
-        </p:nvSpPr>
-        <p:spPr/>
-        <p:txBody>
-          <a:bodyPr/>
-          <a:lstStyle/>
-          <a:p>
-            <a:fld id="{FC5BBC2B-72B0-2542-8213-717906F3F32B}" type="slidenum">
-              <a:rPr lang="en-US" smtClean="0"/>
-              <a:t>21</a:t>
-            </a:fld>
-            <a:endParaRPr lang="en-US"/>
-          </a:p>
-        </p:txBody>
-      </p:sp>
-    </p:spTree>
-    <p:extLst>
-      <p:ext uri="{BB962C8B-B14F-4D97-AF65-F5344CB8AC3E}">
-        <p14:creationId xmlns:p14="http://schemas.microsoft.com/office/powerpoint/2010/main" val="3020680927"/>
       </p:ext>
     </p:extLst>
   </p:cSld>
@@ -3098,7 +3222,7 @@
           <a:p>
             <a:fld id="{75A66788-8C42-AF46-A5E8-A812D6157D58}" type="datetimeFigureOut">
               <a:rPr lang="en-US" smtClean="0"/>
-              <a:t>2/16/24</a:t>
+              <a:t>2/18/24</a:t>
             </a:fld>
             <a:endParaRPr lang="en-US"/>
           </a:p>
@@ -3296,7 +3420,7 @@
           <a:p>
             <a:fld id="{75A66788-8C42-AF46-A5E8-A812D6157D58}" type="datetimeFigureOut">
               <a:rPr lang="en-US" smtClean="0"/>
-              <a:t>2/16/24</a:t>
+              <a:t>2/18/24</a:t>
             </a:fld>
             <a:endParaRPr lang="en-US"/>
           </a:p>
@@ -3504,7 +3628,7 @@
           <a:p>
             <a:fld id="{75A66788-8C42-AF46-A5E8-A812D6157D58}" type="datetimeFigureOut">
               <a:rPr lang="en-US" smtClean="0"/>
-              <a:t>2/16/24</a:t>
+              <a:t>2/18/24</a:t>
             </a:fld>
             <a:endParaRPr lang="en-US"/>
           </a:p>
@@ -3702,7 +3826,7 @@
           <a:p>
             <a:fld id="{75A66788-8C42-AF46-A5E8-A812D6157D58}" type="datetimeFigureOut">
               <a:rPr lang="en-US" smtClean="0"/>
-              <a:t>2/16/24</a:t>
+              <a:t>2/18/24</a:t>
             </a:fld>
             <a:endParaRPr lang="en-US"/>
           </a:p>
@@ -3977,7 +4101,7 @@
           <a:p>
             <a:fld id="{75A66788-8C42-AF46-A5E8-A812D6157D58}" type="datetimeFigureOut">
               <a:rPr lang="en-US" smtClean="0"/>
-              <a:t>2/16/24</a:t>
+              <a:t>2/18/24</a:t>
             </a:fld>
             <a:endParaRPr lang="en-US"/>
           </a:p>
@@ -4242,7 +4366,7 @@
           <a:p>
             <a:fld id="{75A66788-8C42-AF46-A5E8-A812D6157D58}" type="datetimeFigureOut">
               <a:rPr lang="en-US" smtClean="0"/>
-              <a:t>2/16/24</a:t>
+              <a:t>2/18/24</a:t>
             </a:fld>
             <a:endParaRPr lang="en-US"/>
           </a:p>
@@ -4654,7 +4778,7 @@
           <a:p>
             <a:fld id="{75A66788-8C42-AF46-A5E8-A812D6157D58}" type="datetimeFigureOut">
               <a:rPr lang="en-US" smtClean="0"/>
-              <a:t>2/16/24</a:t>
+              <a:t>2/18/24</a:t>
             </a:fld>
             <a:endParaRPr lang="en-US"/>
           </a:p>
@@ -4795,7 +4919,7 @@
           <a:p>
             <a:fld id="{75A66788-8C42-AF46-A5E8-A812D6157D58}" type="datetimeFigureOut">
               <a:rPr lang="en-US" smtClean="0"/>
-              <a:t>2/16/24</a:t>
+              <a:t>2/18/24</a:t>
             </a:fld>
             <a:endParaRPr lang="en-US"/>
           </a:p>
@@ -4908,7 +5032,7 @@
           <a:p>
             <a:fld id="{75A66788-8C42-AF46-A5E8-A812D6157D58}" type="datetimeFigureOut">
               <a:rPr lang="en-US" smtClean="0"/>
-              <a:t>2/16/24</a:t>
+              <a:t>2/18/24</a:t>
             </a:fld>
             <a:endParaRPr lang="en-US"/>
           </a:p>
@@ -5219,7 +5343,7 @@
           <a:p>
             <a:fld id="{75A66788-8C42-AF46-A5E8-A812D6157D58}" type="datetimeFigureOut">
               <a:rPr lang="en-US" smtClean="0"/>
-              <a:t>2/16/24</a:t>
+              <a:t>2/18/24</a:t>
             </a:fld>
             <a:endParaRPr lang="en-US"/>
           </a:p>
@@ -5507,7 +5631,7 @@
           <a:p>
             <a:fld id="{75A66788-8C42-AF46-A5E8-A812D6157D58}" type="datetimeFigureOut">
               <a:rPr lang="en-US" smtClean="0"/>
-              <a:t>2/16/24</a:t>
+              <a:t>2/18/24</a:t>
             </a:fld>
             <a:endParaRPr lang="en-US"/>
           </a:p>
@@ -5748,7 +5872,7 @@
           <a:p>
             <a:fld id="{75A66788-8C42-AF46-A5E8-A812D6157D58}" type="datetimeFigureOut">
               <a:rPr lang="en-US" smtClean="0"/>
-              <a:t>2/16/24</a:t>
+              <a:t>2/18/24</a:t>
             </a:fld>
             <a:endParaRPr lang="en-US"/>
           </a:p>
@@ -10635,7 +10759,9 @@
               </a:rPr>
               <a:t>[Customer]: hi</a:t>
             </a:r>
-            <a:br>
+          </a:p>
+          <a:p>
+            <a:r>
               <a:rPr lang="en-US" sz="1200">
                 <a:solidFill>
                   <a:srgbClr val="080808"/>
@@ -10645,8 +10771,9 @@
                 <a:ea typeface="Fira Code" pitchFamily="49" charset="0"/>
                 <a:cs typeface="Fira Code" pitchFamily="49" charset="0"/>
               </a:rPr>
-            </a:br>
-            <a:r>
+              <a:t>[     Bot]: Hi there! I'm your virtual assistant.</a:t>
+            </a:r>
+            <a:br>
               <a:rPr lang="en-US" sz="1200">
                 <a:solidFill>
                   <a:srgbClr val="080808"/>
@@ -10656,9 +10783,8 @@
                 <a:ea typeface="Fira Code" pitchFamily="49" charset="0"/>
                 <a:cs typeface="Fira Code" pitchFamily="49" charset="0"/>
               </a:rPr>
-              <a:t>[     Bot]: Hi there! I'm your virtual assistant.</a:t>
-            </a:r>
-            <a:br>
+            </a:br>
+            <a:r>
               <a:rPr lang="en-US" sz="1200">
                 <a:solidFill>
                   <a:srgbClr val="080808"/>
@@ -10668,8 +10794,9 @@
                 <a:ea typeface="Fira Code" pitchFamily="49" charset="0"/>
                 <a:cs typeface="Fira Code" pitchFamily="49" charset="0"/>
               </a:rPr>
-            </a:br>
-            <a:r>
+              <a:t>[     Bot]: What would you like to do today?</a:t>
+            </a:r>
+            <a:br>
               <a:rPr lang="en-US" sz="1200">
                 <a:solidFill>
                   <a:srgbClr val="080808"/>
@@ -10679,9 +10806,8 @@
                 <a:ea typeface="Fira Code" pitchFamily="49" charset="0"/>
                 <a:cs typeface="Fira Code" pitchFamily="49" charset="0"/>
               </a:rPr>
-              <a:t>[     Bot]: What would you like to do today?</a:t>
-            </a:r>
-            <a:br>
+            </a:br>
+            <a:r>
               <a:rPr lang="en-US" sz="1200">
                 <a:solidFill>
                   <a:srgbClr val="080808"/>
@@ -10691,8 +10817,9 @@
                 <a:ea typeface="Fira Code" pitchFamily="49" charset="0"/>
                 <a:cs typeface="Fira Code" pitchFamily="49" charset="0"/>
               </a:rPr>
-            </a:br>
-            <a:r>
+              <a:t>[Customer]: hi</a:t>
+            </a:r>
+            <a:br>
               <a:rPr lang="en-US" sz="1200">
                 <a:solidFill>
                   <a:srgbClr val="080808"/>
@@ -10702,9 +10829,8 @@
                 <a:ea typeface="Fira Code" pitchFamily="49" charset="0"/>
                 <a:cs typeface="Fira Code" pitchFamily="49" charset="0"/>
               </a:rPr>
-              <a:t>[Customer]: hi</a:t>
-            </a:r>
-            <a:br>
+            </a:br>
+            <a:r>
               <a:rPr lang="en-US" sz="1200">
                 <a:solidFill>
                   <a:srgbClr val="080808"/>
@@ -10714,8 +10840,9 @@
                 <a:ea typeface="Fira Code" pitchFamily="49" charset="0"/>
                 <a:cs typeface="Fira Code" pitchFamily="49" charset="0"/>
               </a:rPr>
-            </a:br>
-            <a:r>
+              <a:t>[     Bot]: Hmmm, tell me a little more so I can help you.</a:t>
+            </a:r>
+            <a:br>
               <a:rPr lang="en-US" sz="1200">
                 <a:solidFill>
                   <a:srgbClr val="080808"/>
@@ -10725,9 +10852,8 @@
                 <a:ea typeface="Fira Code" pitchFamily="49" charset="0"/>
                 <a:cs typeface="Fira Code" pitchFamily="49" charset="0"/>
               </a:rPr>
-              <a:t>[     Bot]: Hmmm, tell me a little more so I can help you.</a:t>
-            </a:r>
-            <a:br>
+            </a:br>
+            <a:r>
               <a:rPr lang="en-US" sz="1200">
                 <a:solidFill>
                   <a:srgbClr val="080808"/>
@@ -10737,8 +10863,9 @@
                 <a:ea typeface="Fira Code" pitchFamily="49" charset="0"/>
                 <a:cs typeface="Fira Code" pitchFamily="49" charset="0"/>
               </a:rPr>
-            </a:br>
-            <a:r>
+              <a:t>[        ]: What would you like to do today?</a:t>
+            </a:r>
+            <a:br>
               <a:rPr lang="en-US" sz="1200">
                 <a:solidFill>
                   <a:srgbClr val="080808"/>
@@ -10748,9 +10875,8 @@
                 <a:ea typeface="Fira Code" pitchFamily="49" charset="0"/>
                 <a:cs typeface="Fira Code" pitchFamily="49" charset="0"/>
               </a:rPr>
-              <a:t>[        ]: What would you like to do today?</a:t>
-            </a:r>
-            <a:br>
+            </a:br>
+            <a:r>
               <a:rPr lang="en-US" sz="1200">
                 <a:solidFill>
                   <a:srgbClr val="080808"/>
@@ -10760,8 +10886,9 @@
                 <a:ea typeface="Fira Code" pitchFamily="49" charset="0"/>
                 <a:cs typeface="Fira Code" pitchFamily="49" charset="0"/>
               </a:rPr>
-            </a:br>
-            <a:r>
+              <a:t>[Customer]: hi</a:t>
+            </a:r>
+            <a:br>
               <a:rPr lang="en-US" sz="1200">
                 <a:solidFill>
                   <a:srgbClr val="080808"/>
@@ -10771,9 +10898,8 @@
                 <a:ea typeface="Fira Code" pitchFamily="49" charset="0"/>
                 <a:cs typeface="Fira Code" pitchFamily="49" charset="0"/>
               </a:rPr>
-              <a:t>[Customer]: hi</a:t>
-            </a:r>
-            <a:br>
+            </a:br>
+            <a:r>
               <a:rPr lang="en-US" sz="1200">
                 <a:solidFill>
                   <a:srgbClr val="080808"/>
@@ -10783,8 +10909,9 @@
                 <a:ea typeface="Fira Code" pitchFamily="49" charset="0"/>
                 <a:cs typeface="Fira Code" pitchFamily="49" charset="0"/>
               </a:rPr>
-            </a:br>
-            <a:r>
+              <a:t>[     Bot]: Let me try to help you.</a:t>
+            </a:r>
+            <a:br>
               <a:rPr lang="en-US" sz="1200">
                 <a:solidFill>
                   <a:srgbClr val="080808"/>
@@ -10794,9 +10921,8 @@
                 <a:ea typeface="Fira Code" pitchFamily="49" charset="0"/>
                 <a:cs typeface="Fira Code" pitchFamily="49" charset="0"/>
               </a:rPr>
-              <a:t>[     Bot]: Let me try to help you.</a:t>
-            </a:r>
-            <a:br>
+            </a:br>
+            <a:r>
               <a:rPr lang="en-US" sz="1200">
                 <a:solidFill>
                   <a:srgbClr val="080808"/>
@@ -10806,8 +10932,9 @@
                 <a:ea typeface="Fira Code" pitchFamily="49" charset="0"/>
                 <a:cs typeface="Fira Code" pitchFamily="49" charset="0"/>
               </a:rPr>
-            </a:br>
-            <a:r>
+              <a:t>[     Bot]: Are you a customer?</a:t>
+            </a:r>
+            <a:br>
               <a:rPr lang="en-US" sz="1200">
                 <a:solidFill>
                   <a:srgbClr val="080808"/>
@@ -10817,9 +10944,8 @@
                 <a:ea typeface="Fira Code" pitchFamily="49" charset="0"/>
                 <a:cs typeface="Fira Code" pitchFamily="49" charset="0"/>
               </a:rPr>
-              <a:t>[     Bot]: Are you a customer?</a:t>
-            </a:r>
-            <a:br>
+            </a:br>
+            <a:r>
               <a:rPr lang="en-US" sz="1200">
                 <a:solidFill>
                   <a:srgbClr val="080808"/>
@@ -10829,8 +10955,9 @@
                 <a:ea typeface="Fira Code" pitchFamily="49" charset="0"/>
                 <a:cs typeface="Fira Code" pitchFamily="49" charset="0"/>
               </a:rPr>
-            </a:br>
-            <a:r>
+              <a:t>[        ]:   1) Yes, I'm a customer</a:t>
+            </a:r>
+            <a:br>
               <a:rPr lang="en-US" sz="1200">
                 <a:solidFill>
                   <a:srgbClr val="080808"/>
@@ -10840,9 +10967,8 @@
                 <a:ea typeface="Fira Code" pitchFamily="49" charset="0"/>
                 <a:cs typeface="Fira Code" pitchFamily="49" charset="0"/>
               </a:rPr>
-              <a:t>[        ]:   1) Yes, I'm a customer</a:t>
-            </a:r>
-            <a:br>
+            </a:br>
+            <a:r>
               <a:rPr lang="en-US" sz="1200">
                 <a:solidFill>
                   <a:srgbClr val="080808"/>
@@ -10852,18 +10978,46 @@
                 <a:ea typeface="Fira Code" pitchFamily="49" charset="0"/>
                 <a:cs typeface="Fira Code" pitchFamily="49" charset="0"/>
               </a:rPr>
-            </a:br>
-            <a:r>
-              <a:rPr lang="en-US" sz="1200">
-                <a:solidFill>
-                  <a:srgbClr val="080808"/>
-                </a:solidFill>
-                <a:effectLst/>
-                <a:latin typeface="Fira Code" pitchFamily="49" charset="0"/>
-                <a:ea typeface="Fira Code" pitchFamily="49" charset="0"/>
-                <a:cs typeface="Fira Code" pitchFamily="49" charset="0"/>
-              </a:rPr>
               <a:t>[        ]:   2) No, I'm not</a:t>
+            </a:r>
+          </a:p>
+        </p:txBody>
+      </p:sp>
+      <p:sp>
+        <p:nvSpPr>
+          <p:cNvPr id="4" name="TextBox 3">
+            <a:extLst>
+              <a:ext uri="{FF2B5EF4-FFF2-40B4-BE49-F238E27FC236}">
+                <a16:creationId xmlns:a16="http://schemas.microsoft.com/office/drawing/2014/main" id="{6DFE6258-8D69-96B4-1F2F-F84C5C72F778}"/>
+              </a:ext>
+            </a:extLst>
+          </p:cNvPr>
+          <p:cNvSpPr txBox="1"/>
+          <p:nvPr/>
+        </p:nvSpPr>
+        <p:spPr>
+          <a:xfrm>
+            <a:off x="8074152" y="6419088"/>
+            <a:ext cx="2991845" cy="369332"/>
+          </a:xfrm>
+          <a:prstGeom prst="rect">
+            <a:avLst/>
+          </a:prstGeom>
+          <a:noFill/>
+        </p:spPr>
+        <p:txBody>
+          <a:bodyPr wrap="none" rtlCol="0">
+            <a:spAutoFit/>
+          </a:bodyPr>
+          <a:lstStyle/>
+          <a:p>
+            <a:r>
+              <a:rPr lang="en-US">
+                <a:solidFill>
+                  <a:srgbClr val="FF0000"/>
+                </a:solidFill>
+              </a:rPr>
+              <a:t>Try more spacing – new lines?</a:t>
             </a:r>
           </a:p>
         </p:txBody>
@@ -12851,6 +13005,84 @@
           </p:txBody>
         </p:sp>
       </p:grpSp>
+      <p:sp>
+        <p:nvSpPr>
+          <p:cNvPr id="2" name="TextBox 1">
+            <a:extLst>
+              <a:ext uri="{FF2B5EF4-FFF2-40B4-BE49-F238E27FC236}">
+                <a16:creationId xmlns:a16="http://schemas.microsoft.com/office/drawing/2014/main" id="{72CE86A9-E530-29C9-1895-8E034A194C9F}"/>
+              </a:ext>
+            </a:extLst>
+          </p:cNvPr>
+          <p:cNvSpPr txBox="1"/>
+          <p:nvPr/>
+        </p:nvSpPr>
+        <p:spPr>
+          <a:xfrm>
+            <a:off x="5777000" y="6178705"/>
+            <a:ext cx="6250237" cy="369332"/>
+          </a:xfrm>
+          <a:prstGeom prst="rect">
+            <a:avLst/>
+          </a:prstGeom>
+          <a:noFill/>
+        </p:spPr>
+        <p:txBody>
+          <a:bodyPr wrap="none" rtlCol="0">
+            <a:spAutoFit/>
+          </a:bodyPr>
+          <a:lstStyle/>
+          <a:p>
+            <a:r>
+              <a:rPr lang="en-US">
+                <a:solidFill>
+                  <a:srgbClr val="FF0000"/>
+                </a:solidFill>
+              </a:rPr>
+              <a:t>Should we bring a point that testing json here is testing 2 things?</a:t>
+            </a:r>
+          </a:p>
+        </p:txBody>
+      </p:sp>
+      <p:sp>
+        <p:nvSpPr>
+          <p:cNvPr id="3" name="TextBox 2">
+            <a:extLst>
+              <a:ext uri="{FF2B5EF4-FFF2-40B4-BE49-F238E27FC236}">
+                <a16:creationId xmlns:a16="http://schemas.microsoft.com/office/drawing/2014/main" id="{ED977C48-40E8-611F-DD68-DAE8B3547C79}"/>
+              </a:ext>
+            </a:extLst>
+          </p:cNvPr>
+          <p:cNvSpPr txBox="1"/>
+          <p:nvPr/>
+        </p:nvSpPr>
+        <p:spPr>
+          <a:xfrm>
+            <a:off x="5777000" y="5809373"/>
+            <a:ext cx="4021165" cy="369332"/>
+          </a:xfrm>
+          <a:prstGeom prst="rect">
+            <a:avLst/>
+          </a:prstGeom>
+          <a:noFill/>
+        </p:spPr>
+        <p:txBody>
+          <a:bodyPr wrap="none" rtlCol="0">
+            <a:spAutoFit/>
+          </a:bodyPr>
+          <a:lstStyle/>
+          <a:p>
+            <a:r>
+              <a:rPr lang="en-US">
+                <a:solidFill>
+                  <a:srgbClr val="FF0000"/>
+                </a:solidFill>
+              </a:rPr>
+              <a:t>this is different tests – might not be clear</a:t>
+            </a:r>
+          </a:p>
+        </p:txBody>
+      </p:sp>
     </p:spTree>
     <p:extLst>
       <p:ext uri="{BB962C8B-B14F-4D97-AF65-F5344CB8AC3E}">
@@ -14935,7 +15167,12 @@
             <p:ph idx="1"/>
           </p:nvPr>
         </p:nvSpPr>
-        <p:spPr/>
+        <p:spPr>
+          <a:xfrm>
+            <a:off x="3398520" y="2554160"/>
+            <a:ext cx="5900928" cy="2444623"/>
+          </a:xfrm>
+        </p:spPr>
         <p:txBody>
           <a:bodyPr/>
           <a:lstStyle/>
@@ -14957,6 +15194,35 @@
               <a:t>until they see what they don’t.”</a:t>
             </a:r>
           </a:p>
+        </p:txBody>
+      </p:sp>
+      <p:sp>
+        <p:nvSpPr>
+          <p:cNvPr id="4" name="TextBox 3">
+            <a:extLst>
+              <a:ext uri="{FF2B5EF4-FFF2-40B4-BE49-F238E27FC236}">
+                <a16:creationId xmlns:a16="http://schemas.microsoft.com/office/drawing/2014/main" id="{780CFB4D-C420-10A0-7C91-09A9F0D9254F}"/>
+              </a:ext>
+            </a:extLst>
+          </p:cNvPr>
+          <p:cNvSpPr txBox="1"/>
+          <p:nvPr/>
+        </p:nvSpPr>
+        <p:spPr>
+          <a:xfrm>
+            <a:off x="6979158" y="3776471"/>
+            <a:ext cx="1917954" cy="369332"/>
+          </a:xfrm>
+          <a:prstGeom prst="rect">
+            <a:avLst/>
+          </a:prstGeom>
+          <a:noFill/>
+        </p:spPr>
+        <p:txBody>
+          <a:bodyPr wrap="square">
+            <a:spAutoFit/>
+          </a:bodyPr>
+          <a:lstStyle/>
           <a:p>
             <a:pPr marL="0" indent="0">
               <a:buNone/>
@@ -18089,20 +18355,25 @@
             <p:ph idx="1"/>
           </p:nvPr>
         </p:nvSpPr>
-        <p:spPr/>
+        <p:spPr>
+          <a:xfrm>
+            <a:off x="838200" y="1825625"/>
+            <a:ext cx="10856976" cy="4351338"/>
+          </a:xfrm>
+        </p:spPr>
         <p:txBody>
           <a:bodyPr/>
           <a:lstStyle/>
           <a:p>
             <a:r>
               <a:rPr lang="en-US"/>
-              <a:t>Lada: lead developer working on the message bot application</a:t>
+              <a:t>Lada: lead developer working on the messaging bot application</a:t>
             </a:r>
           </a:p>
           <a:p>
             <a:r>
               <a:rPr lang="en-US"/>
-              <a:t>Llewellyn: technical coach working with Lada and work on some tests</a:t>
+              <a:t>Llewellyn: technical coach working with Lada and working on some tests</a:t>
             </a:r>
           </a:p>
           <a:p>
@@ -18916,6 +19187,55 @@
           <a:p>
             <a:pPr algn="r"/>
             <a:endParaRPr lang="en-US"/>
+          </a:p>
+        </p:txBody>
+      </p:sp>
+      <p:sp>
+        <p:nvSpPr>
+          <p:cNvPr id="3" name="TextBox 2">
+            <a:extLst>
+              <a:ext uri="{FF2B5EF4-FFF2-40B4-BE49-F238E27FC236}">
+                <a16:creationId xmlns:a16="http://schemas.microsoft.com/office/drawing/2014/main" id="{B8E86DAE-270F-15AE-B59E-5FF7869A4BD5}"/>
+              </a:ext>
+            </a:extLst>
+          </p:cNvPr>
+          <p:cNvSpPr txBox="1"/>
+          <p:nvPr/>
+        </p:nvSpPr>
+        <p:spPr>
+          <a:xfrm>
+            <a:off x="8211312" y="6211669"/>
+            <a:ext cx="3332451" cy="646331"/>
+          </a:xfrm>
+          <a:prstGeom prst="rect">
+            <a:avLst/>
+          </a:prstGeom>
+          <a:noFill/>
+        </p:spPr>
+        <p:txBody>
+          <a:bodyPr wrap="none" rtlCol="0">
+            <a:spAutoFit/>
+          </a:bodyPr>
+          <a:lstStyle/>
+          <a:p>
+            <a:r>
+              <a:rPr lang="en-US">
+                <a:solidFill>
+                  <a:srgbClr val="FF0000"/>
+                </a:solidFill>
+              </a:rPr>
+              <a:t>Do animation here?</a:t>
+            </a:r>
+          </a:p>
+          <a:p>
+            <a:r>
+              <a:rPr lang="en-US">
+                <a:solidFill>
+                  <a:srgbClr val="FF0000"/>
+                </a:solidFill>
+              </a:rPr>
+              <a:t>Keep it in case code is not around</a:t>
+            </a:r>
           </a:p>
         </p:txBody>
       </p:sp>

</xml_diff>

<commit_message>
. d updated slides - week 1
Co-Authored-By: Llewellyn Falco <llewellyn.falco@gmail.com>
</commit_message>
<xml_diff>
--- a/slides/Testing Better with Approvals.pptx
+++ b/slides/Testing Better with Approvals.pptx
@@ -14,10 +14,10 @@
     <p:sldId id="324" r:id="rId5"/>
     <p:sldId id="303" r:id="rId6"/>
     <p:sldId id="307" r:id="rId7"/>
-    <p:sldId id="283" r:id="rId8"/>
-    <p:sldId id="325" r:id="rId9"/>
-    <p:sldId id="332" r:id="rId10"/>
-    <p:sldId id="293" r:id="rId11"/>
+    <p:sldId id="325" r:id="rId8"/>
+    <p:sldId id="332" r:id="rId9"/>
+    <p:sldId id="293" r:id="rId10"/>
+    <p:sldId id="283" r:id="rId11"/>
     <p:sldId id="326" r:id="rId12"/>
     <p:sldId id="327" r:id="rId13"/>
     <p:sldId id="328" r:id="rId14"/>
@@ -171,10 +171,10 @@
           <p14:sldIdLst>
             <p14:sldId id="303"/>
             <p14:sldId id="307"/>
-            <p14:sldId id="283"/>
             <p14:sldId id="325"/>
             <p14:sldId id="332"/>
             <p14:sldId id="293"/>
+            <p14:sldId id="283"/>
             <p14:sldId id="326"/>
             <p14:sldId id="327"/>
             <p14:sldId id="328"/>
@@ -2634,7 +2634,7 @@
           <a:p>
             <a:fld id="{FC5BBC2B-72B0-2542-8213-717906F3F32B}" type="slidenum">
               <a:rPr lang="en-US" smtClean="0"/>
-              <a:t>7</a:t>
+              <a:t>10</a:t>
             </a:fld>
             <a:endParaRPr lang="en-US"/>
           </a:p>
@@ -6580,217 +6580,73 @@
       </p:grpSpPr>
       <p:sp>
         <p:nvSpPr>
-          <p:cNvPr id="3" name="Curved Down Arrow 2"/>
+          <p:cNvPr id="5" name="Rounded Rectangle 4">
+            <a:extLst>
+              <a:ext uri="{FF2B5EF4-FFF2-40B4-BE49-F238E27FC236}">
+                <a16:creationId xmlns:a16="http://schemas.microsoft.com/office/drawing/2014/main" id="{BBFEEA9E-2477-D7C7-4CA4-1C8CD1A66441}"/>
+              </a:ext>
+            </a:extLst>
+          </p:cNvPr>
           <p:cNvSpPr/>
           <p:nvPr/>
         </p:nvSpPr>
-        <p:spPr bwMode="auto">
-          <a:xfrm rot="16200000">
-            <a:off x="2633387" y="3179948"/>
-            <a:ext cx="2718871" cy="1219200"/>
+        <p:spPr>
+          <a:xfrm>
+            <a:off x="3218688" y="1793116"/>
+            <a:ext cx="4937760" cy="3016628"/>
           </a:xfrm>
-          <a:prstGeom prst="curvedDownArrow">
-            <a:avLst/>
+          <a:prstGeom prst="roundRect">
+            <a:avLst>
+              <a:gd name="adj" fmla="val 5778"/>
+            </a:avLst>
           </a:prstGeom>
-          <a:ln>
-            <a:headEnd type="none" w="med" len="med"/>
-            <a:tailEnd type="none" w="med" len="med"/>
-          </a:ln>
+          <a:solidFill>
+            <a:schemeClr val="bg1">
+              <a:lumMod val="85000"/>
+            </a:schemeClr>
+          </a:solidFill>
         </p:spPr>
         <p:style>
           <a:lnRef idx="2">
-            <a:schemeClr val="dk1"/>
+            <a:schemeClr val="accent1">
+              <a:shade val="15000"/>
+            </a:schemeClr>
           </a:lnRef>
           <a:fillRef idx="1">
-            <a:schemeClr val="lt1"/>
+            <a:schemeClr val="accent1"/>
           </a:fillRef>
           <a:effectRef idx="0">
-            <a:schemeClr val="dk1"/>
+            <a:schemeClr val="accent1"/>
           </a:effectRef>
           <a:fontRef idx="minor">
-            <a:schemeClr val="dk1"/>
+            <a:schemeClr val="lt1"/>
           </a:fontRef>
         </p:style>
         <p:txBody>
-          <a:bodyPr vert="horz" wrap="square" lIns="121920" tIns="60960" rIns="121920" bIns="60960" numCol="1" rtlCol="0" anchor="t" anchorCtr="0" compatLnSpc="1">
-            <a:prstTxWarp prst="textNoShape">
-              <a:avLst/>
-            </a:prstTxWarp>
-          </a:bodyPr>
+          <a:bodyPr rtlCol="0" anchor="ctr"/>
           <a:lstStyle/>
           <a:p>
-            <a:pPr defTabSz="1219170" eaLnBrk="0" fontAlgn="base" hangingPunct="0">
-              <a:spcBef>
-                <a:spcPct val="0"/>
-              </a:spcBef>
-              <a:spcAft>
-                <a:spcPct val="0"/>
-              </a:spcAft>
-            </a:pPr>
-            <a:endParaRPr lang="en-US" sz="3200" b="1">
-              <a:solidFill>
-                <a:schemeClr val="tx1"/>
-              </a:solidFill>
-              <a:latin typeface="Arial" charset="0"/>
-            </a:endParaRPr>
+            <a:pPr algn="ctr"/>
+            <a:endParaRPr lang="en-US"/>
           </a:p>
         </p:txBody>
       </p:sp>
       <p:sp>
         <p:nvSpPr>
-          <p:cNvPr id="4" name="Curved Down Arrow 3"/>
-          <p:cNvSpPr/>
-          <p:nvPr/>
-        </p:nvSpPr>
-        <p:spPr bwMode="auto">
-          <a:xfrm rot="5400000">
-            <a:off x="6591606" y="3179949"/>
-            <a:ext cx="2718871" cy="1219200"/>
-          </a:xfrm>
-          <a:prstGeom prst="curvedDownArrow">
-            <a:avLst/>
-          </a:prstGeom>
-          <a:ln>
-            <a:headEnd type="none" w="med" len="med"/>
-            <a:tailEnd type="none" w="med" len="med"/>
-          </a:ln>
-        </p:spPr>
-        <p:style>
-          <a:lnRef idx="2">
-            <a:schemeClr val="dk1"/>
-          </a:lnRef>
-          <a:fillRef idx="1">
-            <a:schemeClr val="lt1"/>
-          </a:fillRef>
-          <a:effectRef idx="0">
-            <a:schemeClr val="dk1"/>
-          </a:effectRef>
-          <a:fontRef idx="minor">
-            <a:schemeClr val="dk1"/>
-          </a:fontRef>
-        </p:style>
-        <p:txBody>
-          <a:bodyPr vert="horz" wrap="square" lIns="121920" tIns="60960" rIns="121920" bIns="60960" numCol="1" rtlCol="0" anchor="t" anchorCtr="0" compatLnSpc="1">
-            <a:prstTxWarp prst="textNoShape">
-              <a:avLst/>
-            </a:prstTxWarp>
-          </a:bodyPr>
-          <a:lstStyle/>
-          <a:p>
-            <a:pPr defTabSz="1219170" eaLnBrk="0" fontAlgn="base" hangingPunct="0">
-              <a:spcBef>
-                <a:spcPct val="0"/>
-              </a:spcBef>
-              <a:spcAft>
-                <a:spcPct val="0"/>
-              </a:spcAft>
-            </a:pPr>
-            <a:endParaRPr lang="en-US" sz="3200" b="1">
-              <a:solidFill>
-                <a:schemeClr val="tx1"/>
-              </a:solidFill>
-              <a:latin typeface="Arial" charset="0"/>
-            </a:endParaRPr>
-          </a:p>
-        </p:txBody>
-      </p:sp>
-      <p:sp>
-        <p:nvSpPr>
-          <p:cNvPr id="5" name="Curved Down Arrow 4"/>
-          <p:cNvSpPr/>
-          <p:nvPr/>
-        </p:nvSpPr>
-        <p:spPr bwMode="auto">
-          <a:xfrm>
-            <a:off x="4622573" y="1217784"/>
-            <a:ext cx="2718871" cy="1219200"/>
-          </a:xfrm>
-          <a:prstGeom prst="curvedDownArrow">
-            <a:avLst/>
-          </a:prstGeom>
-          <a:ln>
-            <a:headEnd type="none" w="med" len="med"/>
-            <a:tailEnd type="none" w="med" len="med"/>
-          </a:ln>
-        </p:spPr>
-        <p:style>
-          <a:lnRef idx="2">
-            <a:schemeClr val="dk1"/>
-          </a:lnRef>
-          <a:fillRef idx="1">
-            <a:schemeClr val="lt1"/>
-          </a:fillRef>
-          <a:effectRef idx="0">
-            <a:schemeClr val="dk1"/>
-          </a:effectRef>
-          <a:fontRef idx="minor">
-            <a:schemeClr val="dk1"/>
-          </a:fontRef>
-        </p:style>
-        <p:txBody>
-          <a:bodyPr vert="horz" wrap="square" lIns="121920" tIns="60960" rIns="121920" bIns="60960" numCol="1" rtlCol="0" anchor="t" anchorCtr="0" compatLnSpc="1">
-            <a:prstTxWarp prst="textNoShape">
-              <a:avLst/>
-            </a:prstTxWarp>
-          </a:bodyPr>
-          <a:lstStyle/>
-          <a:p>
-            <a:pPr defTabSz="1219170" eaLnBrk="0" fontAlgn="base" hangingPunct="0">
-              <a:spcBef>
-                <a:spcPct val="0"/>
-              </a:spcBef>
-              <a:spcAft>
-                <a:spcPct val="0"/>
-              </a:spcAft>
-            </a:pPr>
-            <a:endParaRPr lang="en-US" sz="3200" b="1">
-              <a:solidFill>
-                <a:schemeClr val="tx1"/>
-              </a:solidFill>
-              <a:latin typeface="Arial" charset="0"/>
-            </a:endParaRPr>
-          </a:p>
-        </p:txBody>
-      </p:sp>
-      <p:sp>
-        <p:nvSpPr>
-          <p:cNvPr id="6" name="TextBox 5"/>
+          <p:cNvPr id="3" name="TextBox 2">
+            <a:extLst>
+              <a:ext uri="{FF2B5EF4-FFF2-40B4-BE49-F238E27FC236}">
+                <a16:creationId xmlns:a16="http://schemas.microsoft.com/office/drawing/2014/main" id="{5079FBDA-242C-0B58-2C06-3662E6CB21A6}"/>
+              </a:ext>
+            </a:extLst>
+          </p:cNvPr>
           <p:cNvSpPr txBox="1"/>
           <p:nvPr/>
         </p:nvSpPr>
         <p:spPr>
           <a:xfrm>
-            <a:off x="7315200" y="1905001"/>
-            <a:ext cx="1497760" cy="461665"/>
-          </a:xfrm>
-          <a:prstGeom prst="rect">
-            <a:avLst/>
-          </a:prstGeom>
-          <a:noFill/>
-        </p:spPr>
-        <p:txBody>
-          <a:bodyPr wrap="square" rtlCol="0">
-            <a:spAutoFit/>
-          </a:bodyPr>
-          <a:lstStyle/>
-          <a:p>
-            <a:r>
-              <a:rPr lang="en-US" sz="2400" dirty="0"/>
-              <a:t>English</a:t>
-            </a:r>
-          </a:p>
-        </p:txBody>
-      </p:sp>
-      <p:sp>
-        <p:nvSpPr>
-          <p:cNvPr id="7" name="TextBox 6"/>
-          <p:cNvSpPr txBox="1"/>
-          <p:nvPr/>
-        </p:nvSpPr>
-        <p:spPr>
-          <a:xfrm>
-            <a:off x="7341442" y="5107678"/>
-            <a:ext cx="825867" cy="461665"/>
+            <a:off x="6682213" y="2595434"/>
+            <a:ext cx="1234632" cy="646331"/>
           </a:xfrm>
           <a:prstGeom prst="rect">
             <a:avLst/>
@@ -6803,23 +6659,47 @@
           </a:bodyPr>
           <a:lstStyle/>
           <a:p>
-            <a:r>
-              <a:rPr lang="en-US" sz="2400" dirty="0"/>
-              <a:t>Code</a:t>
+            <a:pPr algn="r"/>
+            <a:r>
+              <a:rPr lang="en-US">
+                <a:solidFill>
+                  <a:srgbClr val="080808"/>
+                </a:solidFill>
+                <a:effectLst/>
+              </a:rPr>
+              <a:t>[Customer]</a:t>
+            </a:r>
+          </a:p>
+          <a:p>
+            <a:pPr algn="r"/>
+            <a:r>
+              <a:rPr lang="en-US">
+                <a:solidFill>
+                  <a:srgbClr val="080808"/>
+                </a:solidFill>
+                <a:effectLst/>
+              </a:rPr>
+              <a:t>hi</a:t>
             </a:r>
           </a:p>
         </p:txBody>
       </p:sp>
       <p:sp>
         <p:nvSpPr>
-          <p:cNvPr id="8" name="TextBox 7"/>
+          <p:cNvPr id="10" name="TextBox 9">
+            <a:extLst>
+              <a:ext uri="{FF2B5EF4-FFF2-40B4-BE49-F238E27FC236}">
+                <a16:creationId xmlns:a16="http://schemas.microsoft.com/office/drawing/2014/main" id="{728F629A-9BAE-8B62-70AE-F374671AFD4F}"/>
+              </a:ext>
+            </a:extLst>
+          </p:cNvPr>
           <p:cNvSpPr txBox="1"/>
           <p:nvPr/>
         </p:nvSpPr>
         <p:spPr>
           <a:xfrm>
-            <a:off x="3556000" y="5170319"/>
-            <a:ext cx="1026216" cy="461665"/>
+            <a:off x="3447288" y="2002540"/>
+            <a:ext cx="1271016" cy="722372"/>
           </a:xfrm>
           <a:prstGeom prst="rect">
             <a:avLst/>
@@ -6827,519 +6707,38 @@
           <a:noFill/>
         </p:spPr>
         <p:txBody>
-          <a:bodyPr wrap="square" rtlCol="0">
+          <a:bodyPr wrap="square">
             <a:spAutoFit/>
           </a:bodyPr>
           <a:lstStyle/>
           <a:p>
             <a:r>
-              <a:rPr lang="en-US" sz="2400" dirty="0"/>
-              <a:t>Result</a:t>
+              <a:rPr lang="en-US" sz="4000" b="1">
+                <a:solidFill>
+                  <a:schemeClr val="bg1"/>
+                </a:solidFill>
+              </a:rPr>
+              <a:t>Chat</a:t>
             </a:r>
           </a:p>
         </p:txBody>
       </p:sp>
       <p:sp>
         <p:nvSpPr>
-          <p:cNvPr id="9" name="TextBox 8"/>
+          <p:cNvPr id="4" name="TextBox 3">
+            <a:extLst>
+              <a:ext uri="{FF2B5EF4-FFF2-40B4-BE49-F238E27FC236}">
+                <a16:creationId xmlns:a16="http://schemas.microsoft.com/office/drawing/2014/main" id="{878989FB-36B9-C3FE-C716-508EC8621F48}"/>
+              </a:ext>
+            </a:extLst>
+          </p:cNvPr>
           <p:cNvSpPr txBox="1"/>
           <p:nvPr/>
         </p:nvSpPr>
         <p:spPr>
           <a:xfrm>
-            <a:off x="2844799" y="1923033"/>
-            <a:ext cx="1777772" cy="461665"/>
-          </a:xfrm>
-          <a:prstGeom prst="rect">
-            <a:avLst/>
-          </a:prstGeom>
-          <a:noFill/>
-        </p:spPr>
-        <p:txBody>
-          <a:bodyPr wrap="square" rtlCol="0">
-            <a:spAutoFit/>
-          </a:bodyPr>
-          <a:lstStyle/>
-          <a:p>
-            <a:r>
-              <a:rPr lang="en-US" sz="2400" dirty="0"/>
-              <a:t>Whiteboard</a:t>
-            </a:r>
-          </a:p>
-        </p:txBody>
-      </p:sp>
-      <p:grpSp>
-        <p:nvGrpSpPr>
-          <p:cNvPr id="10" name="Group 9"/>
-          <p:cNvGrpSpPr/>
-          <p:nvPr/>
-        </p:nvGrpSpPr>
-        <p:grpSpPr>
-          <a:xfrm>
-            <a:off x="1422400" y="279400"/>
-            <a:ext cx="1347536" cy="2802021"/>
-            <a:chOff x="635115" y="-227609"/>
-            <a:chExt cx="1010652" cy="2101516"/>
-          </a:xfrm>
-        </p:grpSpPr>
-        <p:sp>
-          <p:nvSpPr>
-            <p:cNvPr id="11" name="Rectangle 10"/>
-            <p:cNvSpPr/>
-            <p:nvPr/>
-          </p:nvSpPr>
-          <p:spPr bwMode="auto">
-            <a:xfrm>
-              <a:off x="635115" y="29065"/>
-              <a:ext cx="1010652" cy="1138989"/>
-            </a:xfrm>
-            <a:prstGeom prst="rect">
-              <a:avLst/>
-            </a:prstGeom>
-            <a:ln>
-              <a:headEnd type="none" w="med" len="med"/>
-              <a:tailEnd type="none" w="med" len="med"/>
-            </a:ln>
-          </p:spPr>
-          <p:style>
-            <a:lnRef idx="2">
-              <a:schemeClr val="dk1"/>
-            </a:lnRef>
-            <a:fillRef idx="1">
-              <a:schemeClr val="lt1"/>
-            </a:fillRef>
-            <a:effectRef idx="0">
-              <a:schemeClr val="dk1"/>
-            </a:effectRef>
-            <a:fontRef idx="minor">
-              <a:schemeClr val="dk1"/>
-            </a:fontRef>
-          </p:style>
-          <p:txBody>
-            <a:bodyPr vert="horz" wrap="square" lIns="121920" tIns="60960" rIns="121920" bIns="60960" numCol="1" rtlCol="0" anchor="t" anchorCtr="0" compatLnSpc="1">
-              <a:prstTxWarp prst="textNoShape">
-                <a:avLst/>
-              </a:prstTxWarp>
-            </a:bodyPr>
-            <a:lstStyle/>
-            <a:p>
-              <a:pPr defTabSz="1219170" eaLnBrk="0" fontAlgn="base" hangingPunct="0">
-                <a:spcBef>
-                  <a:spcPct val="0"/>
-                </a:spcBef>
-                <a:spcAft>
-                  <a:spcPct val="0"/>
-                </a:spcAft>
-              </a:pPr>
-              <a:endParaRPr lang="en-US" sz="3200" b="1">
-                <a:solidFill>
-                  <a:schemeClr val="tx1"/>
-                </a:solidFill>
-                <a:latin typeface="Arial" charset="0"/>
-              </a:endParaRPr>
-            </a:p>
-          </p:txBody>
-        </p:sp>
-        <p:cxnSp>
-          <p:nvCxnSpPr>
-            <p:cNvPr id="12" name="Straight Connector 11"/>
-            <p:cNvCxnSpPr/>
-            <p:nvPr/>
-          </p:nvCxnSpPr>
-          <p:spPr bwMode="auto">
-            <a:xfrm>
-              <a:off x="1140441" y="-227609"/>
-              <a:ext cx="0" cy="256674"/>
-            </a:xfrm>
-            <a:prstGeom prst="line">
-              <a:avLst/>
-            </a:prstGeom>
-            <a:solidFill>
-              <a:schemeClr val="accent1"/>
-            </a:solidFill>
-            <a:ln w="9525" cap="flat" cmpd="sng" algn="ctr">
-              <a:solidFill>
-                <a:schemeClr val="tx1"/>
-              </a:solidFill>
-              <a:prstDash val="solid"/>
-              <a:round/>
-              <a:headEnd type="none" w="med" len="med"/>
-              <a:tailEnd type="none" w="med" len="med"/>
-            </a:ln>
-            <a:effectLst/>
-          </p:spPr>
-        </p:cxnSp>
-        <p:cxnSp>
-          <p:nvCxnSpPr>
-            <p:cNvPr id="13" name="Straight Connector 12"/>
-            <p:cNvCxnSpPr/>
-            <p:nvPr/>
-          </p:nvCxnSpPr>
-          <p:spPr bwMode="auto">
-            <a:xfrm flipV="1">
-              <a:off x="819599" y="1168054"/>
-              <a:ext cx="184484" cy="705853"/>
-            </a:xfrm>
-            <a:prstGeom prst="line">
-              <a:avLst/>
-            </a:prstGeom>
-            <a:solidFill>
-              <a:schemeClr val="accent1"/>
-            </a:solidFill>
-            <a:ln w="9525" cap="flat" cmpd="sng" algn="ctr">
-              <a:solidFill>
-                <a:schemeClr val="tx1"/>
-              </a:solidFill>
-              <a:prstDash val="solid"/>
-              <a:round/>
-              <a:headEnd type="none" w="med" len="med"/>
-              <a:tailEnd type="none" w="med" len="med"/>
-            </a:ln>
-            <a:effectLst/>
-          </p:spPr>
-        </p:cxnSp>
-        <p:cxnSp>
-          <p:nvCxnSpPr>
-            <p:cNvPr id="14" name="Straight Connector 13"/>
-            <p:cNvCxnSpPr/>
-            <p:nvPr/>
-          </p:nvCxnSpPr>
-          <p:spPr bwMode="auto">
-            <a:xfrm flipV="1">
-              <a:off x="1140441" y="1168054"/>
-              <a:ext cx="0" cy="529390"/>
-            </a:xfrm>
-            <a:prstGeom prst="line">
-              <a:avLst/>
-            </a:prstGeom>
-            <a:solidFill>
-              <a:schemeClr val="accent1"/>
-            </a:solidFill>
-            <a:ln w="9525" cap="flat" cmpd="sng" algn="ctr">
-              <a:solidFill>
-                <a:schemeClr val="tx1"/>
-              </a:solidFill>
-              <a:prstDash val="solid"/>
-              <a:round/>
-              <a:headEnd type="none" w="med" len="med"/>
-              <a:tailEnd type="none" w="med" len="med"/>
-            </a:ln>
-            <a:effectLst/>
-          </p:spPr>
-        </p:cxnSp>
-        <p:cxnSp>
-          <p:nvCxnSpPr>
-            <p:cNvPr id="15" name="Straight Connector 14"/>
-            <p:cNvCxnSpPr/>
-            <p:nvPr/>
-          </p:nvCxnSpPr>
-          <p:spPr bwMode="auto">
-            <a:xfrm flipH="1" flipV="1">
-              <a:off x="1276799" y="1168054"/>
-              <a:ext cx="176463" cy="705853"/>
-            </a:xfrm>
-            <a:prstGeom prst="line">
-              <a:avLst/>
-            </a:prstGeom>
-            <a:solidFill>
-              <a:schemeClr val="accent1"/>
-            </a:solidFill>
-            <a:ln w="9525" cap="flat" cmpd="sng" algn="ctr">
-              <a:solidFill>
-                <a:schemeClr val="tx1"/>
-              </a:solidFill>
-              <a:prstDash val="solid"/>
-              <a:round/>
-              <a:headEnd type="none" w="med" len="med"/>
-              <a:tailEnd type="none" w="med" len="med"/>
-            </a:ln>
-            <a:effectLst/>
-          </p:spPr>
-        </p:cxnSp>
-        <p:cxnSp>
-          <p:nvCxnSpPr>
-            <p:cNvPr id="16" name="Straight Arrow Connector 15"/>
-            <p:cNvCxnSpPr/>
-            <p:nvPr/>
-          </p:nvCxnSpPr>
-          <p:spPr bwMode="auto">
-            <a:xfrm>
-              <a:off x="1140441" y="173520"/>
-              <a:ext cx="0" cy="842838"/>
-            </a:xfrm>
-            <a:prstGeom prst="straightConnector1">
-              <a:avLst/>
-            </a:prstGeom>
-            <a:solidFill>
-              <a:schemeClr val="accent1"/>
-            </a:solidFill>
-            <a:ln w="9525" cap="flat" cmpd="sng" algn="ctr">
-              <a:solidFill>
-                <a:schemeClr val="tx1"/>
-              </a:solidFill>
-              <a:prstDash val="solid"/>
-              <a:round/>
-              <a:headEnd type="arrow"/>
-              <a:tailEnd type="arrow"/>
-            </a:ln>
-            <a:effectLst/>
-          </p:spPr>
-        </p:cxnSp>
-        <p:cxnSp>
-          <p:nvCxnSpPr>
-            <p:cNvPr id="17" name="Straight Arrow Connector 16"/>
-            <p:cNvCxnSpPr/>
-            <p:nvPr/>
-          </p:nvCxnSpPr>
-          <p:spPr bwMode="auto">
-            <a:xfrm flipV="1">
-              <a:off x="762000" y="598559"/>
-              <a:ext cx="691262" cy="1"/>
-            </a:xfrm>
-            <a:prstGeom prst="straightConnector1">
-              <a:avLst/>
-            </a:prstGeom>
-            <a:solidFill>
-              <a:schemeClr val="accent1"/>
-            </a:solidFill>
-            <a:ln w="9525" cap="flat" cmpd="sng" algn="ctr">
-              <a:solidFill>
-                <a:schemeClr val="tx1"/>
-              </a:solidFill>
-              <a:prstDash val="solid"/>
-              <a:round/>
-              <a:headEnd type="arrow"/>
-              <a:tailEnd type="arrow"/>
-            </a:ln>
-            <a:effectLst/>
-          </p:spPr>
-        </p:cxnSp>
-        <p:cxnSp>
-          <p:nvCxnSpPr>
-            <p:cNvPr id="18" name="Straight Connector 17"/>
-            <p:cNvCxnSpPr/>
-            <p:nvPr/>
-          </p:nvCxnSpPr>
-          <p:spPr bwMode="auto">
-            <a:xfrm flipV="1">
-              <a:off x="1140441" y="380254"/>
-              <a:ext cx="224589" cy="218123"/>
-            </a:xfrm>
-            <a:prstGeom prst="line">
-              <a:avLst/>
-            </a:prstGeom>
-            <a:solidFill>
-              <a:schemeClr val="accent1"/>
-            </a:solidFill>
-            <a:ln w="34925" cap="flat" cmpd="sng" algn="ctr">
-              <a:solidFill>
-                <a:srgbClr val="FF0000"/>
-              </a:solidFill>
-              <a:prstDash val="solid"/>
-              <a:round/>
-              <a:headEnd type="none" w="med" len="med"/>
-              <a:tailEnd type="none" w="med" len="med"/>
-            </a:ln>
-            <a:effectLst/>
-          </p:spPr>
-        </p:cxnSp>
-      </p:grpSp>
-      <p:sp>
-        <p:nvSpPr>
-          <p:cNvPr id="19" name="TextBox 18"/>
-          <p:cNvSpPr txBox="1"/>
-          <p:nvPr/>
-        </p:nvSpPr>
-        <p:spPr>
-          <a:xfrm>
-            <a:off x="7620003" y="889002"/>
-            <a:ext cx="3555876" cy="830997"/>
-          </a:xfrm>
-          <a:prstGeom prst="rect">
-            <a:avLst/>
-          </a:prstGeom>
-          <a:solidFill>
-            <a:schemeClr val="bg1"/>
-          </a:solidFill>
-          <a:ln>
-            <a:solidFill>
-              <a:schemeClr val="tx1"/>
-            </a:solidFill>
-          </a:ln>
-        </p:spPr>
-        <p:txBody>
-          <a:bodyPr wrap="square" rtlCol="0">
-            <a:spAutoFit/>
-          </a:bodyPr>
-          <a:lstStyle/>
-          <a:p>
-            <a:r>
-              <a:rPr lang="en-US" sz="2400" dirty="0">
-                <a:solidFill>
-                  <a:srgbClr val="2AD122"/>
-                </a:solidFill>
-              </a:rPr>
-              <a:t>// Create side (0,0) – (3,4)</a:t>
-            </a:r>
-          </a:p>
-          <a:p>
-            <a:r>
-              <a:rPr lang="en-US" sz="2400" dirty="0">
-                <a:solidFill>
-                  <a:srgbClr val="2AD122"/>
-                </a:solidFill>
-              </a:rPr>
-              <a:t>// Verify length</a:t>
-            </a:r>
-          </a:p>
-        </p:txBody>
-      </p:sp>
-      <p:sp>
-        <p:nvSpPr>
-          <p:cNvPr id="20" name="TextBox 19"/>
-          <p:cNvSpPr txBox="1"/>
-          <p:nvPr/>
-        </p:nvSpPr>
-        <p:spPr>
-          <a:xfrm>
-            <a:off x="7010400" y="5867400"/>
-            <a:ext cx="5080000" cy="748795"/>
-          </a:xfrm>
-          <a:prstGeom prst="rect">
-            <a:avLst/>
-          </a:prstGeom>
-          <a:solidFill>
-            <a:schemeClr val="bg1"/>
-          </a:solidFill>
-          <a:ln>
-            <a:solidFill>
-              <a:schemeClr val="tx1"/>
-            </a:solidFill>
-          </a:ln>
-        </p:spPr>
-        <p:txBody>
-          <a:bodyPr wrap="square" rtlCol="0">
-            <a:spAutoFit/>
-          </a:bodyPr>
-          <a:lstStyle/>
-          <a:p>
-            <a:r>
-              <a:rPr lang="en-US" sz="2133" dirty="0"/>
-              <a:t>Side s = new Side(0,0,3,4);</a:t>
-            </a:r>
-          </a:p>
-          <a:p>
-            <a:r>
-              <a:rPr lang="en-US" sz="2133" dirty="0"/>
-              <a:t>Approvals.Verify(s + “ length = “ +s.Length);</a:t>
-            </a:r>
-          </a:p>
-        </p:txBody>
-      </p:sp>
-      <p:sp>
-        <p:nvSpPr>
-          <p:cNvPr id="21" name="TextBox 20"/>
-          <p:cNvSpPr txBox="1"/>
-          <p:nvPr/>
-        </p:nvSpPr>
-        <p:spPr>
-          <a:xfrm>
-            <a:off x="508000" y="5867401"/>
-            <a:ext cx="3984867" cy="502766"/>
-          </a:xfrm>
-          <a:prstGeom prst="rect">
-            <a:avLst/>
-          </a:prstGeom>
-          <a:solidFill>
-            <a:schemeClr val="bg1"/>
-          </a:solidFill>
-          <a:ln>
-            <a:solidFill>
-              <a:schemeClr val="tx1"/>
-            </a:solidFill>
-          </a:ln>
-        </p:spPr>
-        <p:txBody>
-          <a:bodyPr wrap="square" rtlCol="0">
-            <a:spAutoFit/>
-          </a:bodyPr>
-          <a:lstStyle/>
-          <a:p>
-            <a:r>
-              <a:rPr lang="en-US" sz="2667" dirty="0"/>
-              <a:t>Side (0,0) – (3,4) length = 5</a:t>
-            </a:r>
-          </a:p>
-        </p:txBody>
-      </p:sp>
-      <p:sp>
-        <p:nvSpPr>
-          <p:cNvPr id="22" name="Curved Down Arrow 21"/>
-          <p:cNvSpPr/>
-          <p:nvPr/>
-        </p:nvSpPr>
-        <p:spPr bwMode="auto">
-          <a:xfrm rot="10800000">
-            <a:off x="4590493" y="5025943"/>
-            <a:ext cx="2718871" cy="1219200"/>
-          </a:xfrm>
-          <a:prstGeom prst="curvedDownArrow">
-            <a:avLst/>
-          </a:prstGeom>
-          <a:ln>
-            <a:headEnd type="none" w="med" len="med"/>
-            <a:tailEnd type="none" w="med" len="med"/>
-          </a:ln>
-        </p:spPr>
-        <p:style>
-          <a:lnRef idx="2">
-            <a:schemeClr val="dk1"/>
-          </a:lnRef>
-          <a:fillRef idx="1">
-            <a:schemeClr val="lt1"/>
-          </a:fillRef>
-          <a:effectRef idx="0">
-            <a:schemeClr val="dk1"/>
-          </a:effectRef>
-          <a:fontRef idx="minor">
-            <a:schemeClr val="dk1"/>
-          </a:fontRef>
-        </p:style>
-        <p:txBody>
-          <a:bodyPr vert="horz" wrap="square" lIns="121920" tIns="60960" rIns="121920" bIns="60960" numCol="1" rtlCol="0" anchor="t" anchorCtr="0" compatLnSpc="1">
-            <a:prstTxWarp prst="textNoShape">
-              <a:avLst/>
-            </a:prstTxWarp>
-          </a:bodyPr>
-          <a:lstStyle/>
-          <a:p>
-            <a:pPr defTabSz="1219170" eaLnBrk="0" fontAlgn="base" hangingPunct="0">
-              <a:spcBef>
-                <a:spcPct val="0"/>
-              </a:spcBef>
-              <a:spcAft>
-                <a:spcPct val="0"/>
-              </a:spcAft>
-            </a:pPr>
-            <a:endParaRPr lang="en-US" sz="3200" b="1">
-              <a:solidFill>
-                <a:schemeClr val="tx1"/>
-              </a:solidFill>
-              <a:latin typeface="Arial" charset="0"/>
-            </a:endParaRPr>
-          </a:p>
-        </p:txBody>
-      </p:sp>
-      <p:sp>
-        <p:nvSpPr>
-          <p:cNvPr id="23" name="TextBox 22"/>
-          <p:cNvSpPr txBox="1"/>
-          <p:nvPr/>
-        </p:nvSpPr>
-        <p:spPr>
-          <a:xfrm>
-            <a:off x="4165604" y="3327402"/>
-            <a:ext cx="3453061" cy="830997"/>
+            <a:off x="3447288" y="3417286"/>
+            <a:ext cx="3415935" cy="923330"/>
           </a:xfrm>
           <a:prstGeom prst="rect">
             <a:avLst/>
@@ -7353,8 +6752,35 @@
           <a:lstStyle/>
           <a:p>
             <a:r>
-              <a:rPr lang="en-US" sz="4800" dirty="0"/>
-              <a:t>Testing Circle</a:t>
+              <a:rPr lang="en-US">
+                <a:solidFill>
+                  <a:srgbClr val="080808"/>
+                </a:solidFill>
+                <a:effectLst/>
+              </a:rPr>
+              <a:t>[Bot]</a:t>
+            </a:r>
+          </a:p>
+          <a:p>
+            <a:r>
+              <a:rPr lang="en-US">
+                <a:solidFill>
+                  <a:srgbClr val="080808"/>
+                </a:solidFill>
+                <a:effectLst/>
+              </a:rPr>
+              <a:t>Hi there! I'm your virtual assistant.</a:t>
+            </a:r>
+          </a:p>
+          <a:p>
+            <a:r>
+              <a:rPr lang="en-US">
+                <a:solidFill>
+                  <a:srgbClr val="080808"/>
+                </a:solidFill>
+                <a:effectLst/>
+              </a:rPr>
+              <a:t>What would you like to do today?</a:t>
             </a:r>
           </a:p>
         </p:txBody>
@@ -7362,13 +6788,153 @@
     </p:spTree>
     <p:extLst>
       <p:ext uri="{BB962C8B-B14F-4D97-AF65-F5344CB8AC3E}">
-        <p14:creationId xmlns:p14="http://schemas.microsoft.com/office/powerpoint/2010/main" val="4224351410"/>
+        <p14:creationId xmlns:p14="http://schemas.microsoft.com/office/powerpoint/2010/main" val="966899259"/>
       </p:ext>
     </p:extLst>
   </p:cSld>
   <p:clrMapOvr>
     <a:masterClrMapping/>
   </p:clrMapOvr>
+  <p:timing>
+    <p:tnLst>
+      <p:par>
+        <p:cTn id="1" dur="indefinite" restart="never" nodeType="tmRoot">
+          <p:childTnLst>
+            <p:seq concurrent="1" nextAc="seek">
+              <p:cTn id="2" dur="indefinite" nodeType="mainSeq">
+                <p:childTnLst>
+                  <p:par>
+                    <p:cTn id="3" fill="hold">
+                      <p:stCondLst>
+                        <p:cond delay="indefinite"/>
+                      </p:stCondLst>
+                      <p:childTnLst>
+                        <p:par>
+                          <p:cTn id="4" fill="hold">
+                            <p:stCondLst>
+                              <p:cond delay="0"/>
+                            </p:stCondLst>
+                            <p:childTnLst>
+                              <p:par>
+                                <p:cTn id="5" presetID="22" presetClass="entr" presetSubtype="8" fill="hold" grpId="0" nodeType="clickEffect">
+                                  <p:stCondLst>
+                                    <p:cond delay="0"/>
+                                  </p:stCondLst>
+                                  <p:childTnLst>
+                                    <p:set>
+                                      <p:cBhvr>
+                                        <p:cTn id="6" dur="1" fill="hold">
+                                          <p:stCondLst>
+                                            <p:cond delay="0"/>
+                                          </p:stCondLst>
+                                        </p:cTn>
+                                        <p:tgtEl>
+                                          <p:spTgt spid="3"/>
+                                        </p:tgtEl>
+                                        <p:attrNameLst>
+                                          <p:attrName>style.visibility</p:attrName>
+                                        </p:attrNameLst>
+                                      </p:cBhvr>
+                                      <p:to>
+                                        <p:strVal val="visible"/>
+                                      </p:to>
+                                    </p:set>
+                                    <p:animEffect transition="in" filter="wipe(left)">
+                                      <p:cBhvr>
+                                        <p:cTn id="7" dur="500"/>
+                                        <p:tgtEl>
+                                          <p:spTgt spid="3"/>
+                                        </p:tgtEl>
+                                      </p:cBhvr>
+                                    </p:animEffect>
+                                  </p:childTnLst>
+                                </p:cTn>
+                              </p:par>
+                            </p:childTnLst>
+                          </p:cTn>
+                        </p:par>
+                      </p:childTnLst>
+                    </p:cTn>
+                  </p:par>
+                  <p:par>
+                    <p:cTn id="8" fill="hold">
+                      <p:stCondLst>
+                        <p:cond delay="indefinite"/>
+                      </p:stCondLst>
+                      <p:childTnLst>
+                        <p:par>
+                          <p:cTn id="9" fill="hold">
+                            <p:stCondLst>
+                              <p:cond delay="0"/>
+                            </p:stCondLst>
+                            <p:childTnLst>
+                              <p:par>
+                                <p:cTn id="10" presetID="22" presetClass="entr" presetSubtype="8" fill="hold" grpId="0" nodeType="clickEffect">
+                                  <p:stCondLst>
+                                    <p:cond delay="0"/>
+                                  </p:stCondLst>
+                                  <p:childTnLst>
+                                    <p:set>
+                                      <p:cBhvr>
+                                        <p:cTn id="11" dur="1" fill="hold">
+                                          <p:stCondLst>
+                                            <p:cond delay="0"/>
+                                          </p:stCondLst>
+                                        </p:cTn>
+                                        <p:tgtEl>
+                                          <p:spTgt spid="4"/>
+                                        </p:tgtEl>
+                                        <p:attrNameLst>
+                                          <p:attrName>style.visibility</p:attrName>
+                                        </p:attrNameLst>
+                                      </p:cBhvr>
+                                      <p:to>
+                                        <p:strVal val="visible"/>
+                                      </p:to>
+                                    </p:set>
+                                    <p:animEffect transition="in" filter="wipe(left)">
+                                      <p:cBhvr>
+                                        <p:cTn id="12" dur="500"/>
+                                        <p:tgtEl>
+                                          <p:spTgt spid="4"/>
+                                        </p:tgtEl>
+                                      </p:cBhvr>
+                                    </p:animEffect>
+                                  </p:childTnLst>
+                                </p:cTn>
+                              </p:par>
+                            </p:childTnLst>
+                          </p:cTn>
+                        </p:par>
+                      </p:childTnLst>
+                    </p:cTn>
+                  </p:par>
+                </p:childTnLst>
+              </p:cTn>
+              <p:prevCondLst>
+                <p:cond evt="onPrev" delay="0">
+                  <p:tgtEl>
+                    <p:sldTgt/>
+                  </p:tgtEl>
+                </p:cond>
+              </p:prevCondLst>
+              <p:nextCondLst>
+                <p:cond evt="onNext" delay="0">
+                  <p:tgtEl>
+                    <p:sldTgt/>
+                  </p:tgtEl>
+                </p:cond>
+              </p:nextCondLst>
+            </p:seq>
+          </p:childTnLst>
+        </p:cTn>
+      </p:par>
+    </p:tnLst>
+    <p:bldLst>
+      <p:bldP spid="3" grpId="0"/>
+      <p:bldP spid="4" grpId="0"/>
+    </p:bldLst>
+  </p:timing>
 </p:sld>
 </file>
 
@@ -9021,42 +8587,6 @@
       </p:sp>
       <p:sp>
         <p:nvSpPr>
-          <p:cNvPr id="20" name="TextBox 19"/>
-          <p:cNvSpPr txBox="1"/>
-          <p:nvPr/>
-        </p:nvSpPr>
-        <p:spPr>
-          <a:xfrm>
-            <a:off x="7010400" y="5867400"/>
-            <a:ext cx="5080000" cy="420564"/>
-          </a:xfrm>
-          <a:prstGeom prst="rect">
-            <a:avLst/>
-          </a:prstGeom>
-          <a:solidFill>
-            <a:schemeClr val="bg1"/>
-          </a:solidFill>
-          <a:ln>
-            <a:solidFill>
-              <a:schemeClr val="tx1"/>
-            </a:solidFill>
-          </a:ln>
-        </p:spPr>
-        <p:txBody>
-          <a:bodyPr wrap="square" rtlCol="0">
-            <a:spAutoFit/>
-          </a:bodyPr>
-          <a:lstStyle/>
-          <a:p>
-            <a:r>
-              <a:rPr lang="en-US" sz="2133" dirty="0"/>
-              <a:t>verifyConversation(”hi”)</a:t>
-            </a:r>
-          </a:p>
-        </p:txBody>
-      </p:sp>
-      <p:sp>
-        <p:nvSpPr>
           <p:cNvPr id="22" name="Curved Down Arrow 21"/>
           <p:cNvSpPr/>
           <p:nvPr/>
@@ -9355,6 +8885,124 @@
           </p:txBody>
         </p:sp>
       </p:grpSp>
+      <p:sp>
+        <p:nvSpPr>
+          <p:cNvPr id="10" name="TextBox 9">
+            <a:extLst>
+              <a:ext uri="{FF2B5EF4-FFF2-40B4-BE49-F238E27FC236}">
+                <a16:creationId xmlns:a16="http://schemas.microsoft.com/office/drawing/2014/main" id="{AED0E781-0941-E05C-1E71-D2B13A39F191}"/>
+              </a:ext>
+            </a:extLst>
+          </p:cNvPr>
+          <p:cNvSpPr txBox="1"/>
+          <p:nvPr/>
+        </p:nvSpPr>
+        <p:spPr>
+          <a:xfrm>
+            <a:off x="7309364" y="5919200"/>
+            <a:ext cx="4781036" cy="830997"/>
+          </a:xfrm>
+          <a:prstGeom prst="rect">
+            <a:avLst/>
+          </a:prstGeom>
+          <a:solidFill>
+            <a:schemeClr val="bg1"/>
+          </a:solidFill>
+          <a:ln>
+            <a:solidFill>
+              <a:schemeClr val="tx1"/>
+            </a:solidFill>
+          </a:ln>
+        </p:spPr>
+        <p:txBody>
+          <a:bodyPr wrap="square" rtlCol="0">
+            <a:spAutoFit/>
+          </a:bodyPr>
+          <a:lstStyle/>
+          <a:p>
+            <a:r>
+              <a:rPr lang="en-US" sz="2400">
+                <a:solidFill>
+                  <a:srgbClr val="000000"/>
+                </a:solidFill>
+                <a:effectLst/>
+              </a:rPr>
+              <a:t>String userMessage </a:t>
+            </a:r>
+            <a:r>
+              <a:rPr lang="en-US" sz="2400">
+                <a:solidFill>
+                  <a:srgbClr val="080808"/>
+                </a:solidFill>
+                <a:effectLst/>
+              </a:rPr>
+              <a:t>= </a:t>
+            </a:r>
+            <a:r>
+              <a:rPr lang="en-US" sz="2400">
+                <a:solidFill>
+                  <a:srgbClr val="067D17"/>
+                </a:solidFill>
+                <a:effectLst/>
+              </a:rPr>
+              <a:t>"hi"</a:t>
+            </a:r>
+            <a:r>
+              <a:rPr lang="en-US" sz="2400">
+                <a:solidFill>
+                  <a:srgbClr val="080808"/>
+                </a:solidFill>
+                <a:effectLst/>
+              </a:rPr>
+              <a:t>;</a:t>
+            </a:r>
+            <a:br>
+              <a:rPr lang="en-US" sz="2400">
+                <a:solidFill>
+                  <a:srgbClr val="080808"/>
+                </a:solidFill>
+                <a:effectLst/>
+              </a:rPr>
+            </a:br>
+            <a:r>
+              <a:rPr lang="en-US" sz="2400" i="1">
+                <a:solidFill>
+                  <a:srgbClr val="080808"/>
+                </a:solidFill>
+                <a:effectLst/>
+              </a:rPr>
+              <a:t>verifyConversation</a:t>
+            </a:r>
+            <a:r>
+              <a:rPr lang="en-US" sz="2400">
+                <a:solidFill>
+                  <a:srgbClr val="080808"/>
+                </a:solidFill>
+                <a:effectLst/>
+              </a:rPr>
+              <a:t>(</a:t>
+            </a:r>
+            <a:r>
+              <a:rPr lang="en-US" sz="2400">
+                <a:solidFill>
+                  <a:srgbClr val="000000"/>
+                </a:solidFill>
+                <a:effectLst/>
+              </a:rPr>
+              <a:t>userMessage</a:t>
+            </a:r>
+            <a:r>
+              <a:rPr lang="en-US" sz="2400">
+                <a:solidFill>
+                  <a:srgbClr val="080808"/>
+                </a:solidFill>
+                <a:effectLst/>
+              </a:rPr>
+              <a:t>);</a:t>
+            </a:r>
+          </a:p>
+        </p:txBody>
+      </p:sp>
     </p:spTree>
     <p:extLst>
       <p:ext uri="{BB962C8B-B14F-4D97-AF65-F5344CB8AC3E}">
@@ -9886,8 +9534,8 @@
         </p:nvSpPr>
         <p:spPr>
           <a:xfrm>
-            <a:off x="7010400" y="5867400"/>
-            <a:ext cx="5080000" cy="420564"/>
+            <a:off x="7309364" y="5886856"/>
+            <a:ext cx="4781036" cy="830997"/>
           </a:xfrm>
           <a:prstGeom prst="rect">
             <a:avLst/>
@@ -9908,8 +9556,84 @@
           <a:lstStyle/>
           <a:p>
             <a:r>
-              <a:rPr lang="en-US" sz="2133" dirty="0"/>
-              <a:t>verifyConversation(”hi”)</a:t>
+              <a:rPr lang="en-US" sz="2400">
+                <a:solidFill>
+                  <a:srgbClr val="000000"/>
+                </a:solidFill>
+                <a:effectLst/>
+              </a:rPr>
+              <a:t>String userMessage </a:t>
+            </a:r>
+            <a:r>
+              <a:rPr lang="en-US" sz="2400">
+                <a:solidFill>
+                  <a:srgbClr val="080808"/>
+                </a:solidFill>
+                <a:effectLst/>
+              </a:rPr>
+              <a:t>= </a:t>
+            </a:r>
+            <a:r>
+              <a:rPr lang="en-US" sz="2400">
+                <a:solidFill>
+                  <a:srgbClr val="067D17"/>
+                </a:solidFill>
+                <a:effectLst/>
+              </a:rPr>
+              <a:t>"hi"</a:t>
+            </a:r>
+            <a:r>
+              <a:rPr lang="en-US" sz="2400">
+                <a:solidFill>
+                  <a:srgbClr val="080808"/>
+                </a:solidFill>
+                <a:effectLst/>
+              </a:rPr>
+              <a:t>;</a:t>
+            </a:r>
+            <a:br>
+              <a:rPr lang="en-US" sz="2400">
+                <a:solidFill>
+                  <a:srgbClr val="080808"/>
+                </a:solidFill>
+                <a:effectLst/>
+              </a:rPr>
+            </a:br>
+            <a:r>
+              <a:rPr lang="en-US" sz="2400" i="1">
+                <a:solidFill>
+                  <a:srgbClr val="080808"/>
+                </a:solidFill>
+                <a:effectLst/>
+              </a:rPr>
+              <a:t>verifyConversation</a:t>
+            </a:r>
+            <a:r>
+              <a:rPr lang="en-US" sz="2400">
+                <a:solidFill>
+                  <a:srgbClr val="080808"/>
+                </a:solidFill>
+                <a:effectLst/>
+              </a:rPr>
+              <a:t>(</a:t>
+            </a:r>
+            <a:r>
+              <a:rPr lang="en-US" sz="2400">
+                <a:solidFill>
+                  <a:srgbClr val="000000"/>
+                </a:solidFill>
+                <a:effectLst/>
+              </a:rPr>
+              <a:t>userMessage</a:t>
+            </a:r>
+            <a:r>
+              <a:rPr lang="en-US" sz="2400">
+                <a:solidFill>
+                  <a:srgbClr val="080808"/>
+                </a:solidFill>
+                <a:effectLst/>
+              </a:rPr>
+              <a:t>);</a:t>
             </a:r>
           </a:p>
         </p:txBody>
@@ -10616,42 +10340,6 @@
       </p:sp>
       <p:sp>
         <p:nvSpPr>
-          <p:cNvPr id="20" name="TextBox 19"/>
-          <p:cNvSpPr txBox="1"/>
-          <p:nvPr/>
-        </p:nvSpPr>
-        <p:spPr>
-          <a:xfrm>
-            <a:off x="7010400" y="5867400"/>
-            <a:ext cx="5080000" cy="420564"/>
-          </a:xfrm>
-          <a:prstGeom prst="rect">
-            <a:avLst/>
-          </a:prstGeom>
-          <a:solidFill>
-            <a:schemeClr val="bg1"/>
-          </a:solidFill>
-          <a:ln>
-            <a:solidFill>
-              <a:schemeClr val="tx1"/>
-            </a:solidFill>
-          </a:ln>
-        </p:spPr>
-        <p:txBody>
-          <a:bodyPr wrap="square" rtlCol="0">
-            <a:spAutoFit/>
-          </a:bodyPr>
-          <a:lstStyle/>
-          <a:p>
-            <a:r>
-              <a:rPr lang="en-US" sz="2133" dirty="0"/>
-              <a:t>verifyConversation(”hi”)</a:t>
-            </a:r>
-          </a:p>
-        </p:txBody>
-      </p:sp>
-      <p:sp>
-        <p:nvSpPr>
           <p:cNvPr id="22" name="Curved Down Arrow 21"/>
           <p:cNvSpPr/>
           <p:nvPr/>
@@ -11021,6 +10709,124 @@
           </a:p>
         </p:txBody>
       </p:sp>
+      <p:sp>
+        <p:nvSpPr>
+          <p:cNvPr id="11" name="TextBox 10">
+            <a:extLst>
+              <a:ext uri="{FF2B5EF4-FFF2-40B4-BE49-F238E27FC236}">
+                <a16:creationId xmlns:a16="http://schemas.microsoft.com/office/drawing/2014/main" id="{0F45086A-33F2-8DD5-186E-97584451FBAC}"/>
+              </a:ext>
+            </a:extLst>
+          </p:cNvPr>
+          <p:cNvSpPr txBox="1"/>
+          <p:nvPr/>
+        </p:nvSpPr>
+        <p:spPr>
+          <a:xfrm>
+            <a:off x="7309364" y="5919200"/>
+            <a:ext cx="4781036" cy="830997"/>
+          </a:xfrm>
+          <a:prstGeom prst="rect">
+            <a:avLst/>
+          </a:prstGeom>
+          <a:solidFill>
+            <a:schemeClr val="bg1"/>
+          </a:solidFill>
+          <a:ln>
+            <a:solidFill>
+              <a:schemeClr val="tx1"/>
+            </a:solidFill>
+          </a:ln>
+        </p:spPr>
+        <p:txBody>
+          <a:bodyPr wrap="square" rtlCol="0">
+            <a:spAutoFit/>
+          </a:bodyPr>
+          <a:lstStyle/>
+          <a:p>
+            <a:r>
+              <a:rPr lang="en-US" sz="2400">
+                <a:solidFill>
+                  <a:srgbClr val="000000"/>
+                </a:solidFill>
+                <a:effectLst/>
+              </a:rPr>
+              <a:t>String userMessage </a:t>
+            </a:r>
+            <a:r>
+              <a:rPr lang="en-US" sz="2400">
+                <a:solidFill>
+                  <a:srgbClr val="080808"/>
+                </a:solidFill>
+                <a:effectLst/>
+              </a:rPr>
+              <a:t>= </a:t>
+            </a:r>
+            <a:r>
+              <a:rPr lang="en-US" sz="2400">
+                <a:solidFill>
+                  <a:srgbClr val="067D17"/>
+                </a:solidFill>
+                <a:effectLst/>
+              </a:rPr>
+              <a:t>"hi"</a:t>
+            </a:r>
+            <a:r>
+              <a:rPr lang="en-US" sz="2400">
+                <a:solidFill>
+                  <a:srgbClr val="080808"/>
+                </a:solidFill>
+                <a:effectLst/>
+              </a:rPr>
+              <a:t>;</a:t>
+            </a:r>
+            <a:br>
+              <a:rPr lang="en-US" sz="2400">
+                <a:solidFill>
+                  <a:srgbClr val="080808"/>
+                </a:solidFill>
+                <a:effectLst/>
+              </a:rPr>
+            </a:br>
+            <a:r>
+              <a:rPr lang="en-US" sz="2400" i="1">
+                <a:solidFill>
+                  <a:srgbClr val="080808"/>
+                </a:solidFill>
+                <a:effectLst/>
+              </a:rPr>
+              <a:t>verifyConversation</a:t>
+            </a:r>
+            <a:r>
+              <a:rPr lang="en-US" sz="2400">
+                <a:solidFill>
+                  <a:srgbClr val="080808"/>
+                </a:solidFill>
+                <a:effectLst/>
+              </a:rPr>
+              <a:t>(</a:t>
+            </a:r>
+            <a:r>
+              <a:rPr lang="en-US" sz="2400">
+                <a:solidFill>
+                  <a:srgbClr val="000000"/>
+                </a:solidFill>
+                <a:effectLst/>
+              </a:rPr>
+              <a:t>userMessage</a:t>
+            </a:r>
+            <a:r>
+              <a:rPr lang="en-US" sz="2400">
+                <a:solidFill>
+                  <a:srgbClr val="080808"/>
+                </a:solidFill>
+                <a:effectLst/>
+              </a:rPr>
+              <a:t>);</a:t>
+            </a:r>
+          </a:p>
+        </p:txBody>
+      </p:sp>
     </p:spTree>
     <p:extLst>
       <p:ext uri="{BB962C8B-B14F-4D97-AF65-F5344CB8AC3E}">
@@ -11967,7 +11773,7 @@
           <a:p>
             <a:r>
               <a:rPr lang="en-US" sz="4400"/>
-              <a:t>Week 1 learnings</a:t>
+              <a:t>learnings</a:t>
             </a:r>
           </a:p>
         </p:txBody>
@@ -31200,383 +31006,6 @@
       </p:grpSpPr>
       <p:sp>
         <p:nvSpPr>
-          <p:cNvPr id="5" name="Rounded Rectangle 4">
-            <a:extLst>
-              <a:ext uri="{FF2B5EF4-FFF2-40B4-BE49-F238E27FC236}">
-                <a16:creationId xmlns:a16="http://schemas.microsoft.com/office/drawing/2014/main" id="{BBFEEA9E-2477-D7C7-4CA4-1C8CD1A66441}"/>
-              </a:ext>
-            </a:extLst>
-          </p:cNvPr>
-          <p:cNvSpPr/>
-          <p:nvPr/>
-        </p:nvSpPr>
-        <p:spPr>
-          <a:xfrm>
-            <a:off x="3218688" y="1793116"/>
-            <a:ext cx="4937760" cy="3016628"/>
-          </a:xfrm>
-          <a:prstGeom prst="roundRect">
-            <a:avLst>
-              <a:gd name="adj" fmla="val 5778"/>
-            </a:avLst>
-          </a:prstGeom>
-          <a:solidFill>
-            <a:schemeClr val="bg1">
-              <a:lumMod val="85000"/>
-            </a:schemeClr>
-          </a:solidFill>
-        </p:spPr>
-        <p:style>
-          <a:lnRef idx="2">
-            <a:schemeClr val="accent1">
-              <a:shade val="15000"/>
-            </a:schemeClr>
-          </a:lnRef>
-          <a:fillRef idx="1">
-            <a:schemeClr val="accent1"/>
-          </a:fillRef>
-          <a:effectRef idx="0">
-            <a:schemeClr val="accent1"/>
-          </a:effectRef>
-          <a:fontRef idx="minor">
-            <a:schemeClr val="lt1"/>
-          </a:fontRef>
-        </p:style>
-        <p:txBody>
-          <a:bodyPr rtlCol="0" anchor="ctr"/>
-          <a:lstStyle/>
-          <a:p>
-            <a:pPr algn="ctr"/>
-            <a:endParaRPr lang="en-US"/>
-          </a:p>
-        </p:txBody>
-      </p:sp>
-      <p:sp>
-        <p:nvSpPr>
-          <p:cNvPr id="3" name="TextBox 2">
-            <a:extLst>
-              <a:ext uri="{FF2B5EF4-FFF2-40B4-BE49-F238E27FC236}">
-                <a16:creationId xmlns:a16="http://schemas.microsoft.com/office/drawing/2014/main" id="{5079FBDA-242C-0B58-2C06-3662E6CB21A6}"/>
-              </a:ext>
-            </a:extLst>
-          </p:cNvPr>
-          <p:cNvSpPr txBox="1"/>
-          <p:nvPr/>
-        </p:nvSpPr>
-        <p:spPr>
-          <a:xfrm>
-            <a:off x="6682213" y="2595434"/>
-            <a:ext cx="1234632" cy="646331"/>
-          </a:xfrm>
-          <a:prstGeom prst="rect">
-            <a:avLst/>
-          </a:prstGeom>
-          <a:noFill/>
-        </p:spPr>
-        <p:txBody>
-          <a:bodyPr wrap="none" rtlCol="0">
-            <a:spAutoFit/>
-          </a:bodyPr>
-          <a:lstStyle/>
-          <a:p>
-            <a:pPr algn="r"/>
-            <a:r>
-              <a:rPr lang="en-US">
-                <a:solidFill>
-                  <a:srgbClr val="080808"/>
-                </a:solidFill>
-                <a:effectLst/>
-              </a:rPr>
-              <a:t>[Customer]</a:t>
-            </a:r>
-          </a:p>
-          <a:p>
-            <a:pPr algn="r"/>
-            <a:r>
-              <a:rPr lang="en-US">
-                <a:solidFill>
-                  <a:srgbClr val="080808"/>
-                </a:solidFill>
-                <a:effectLst/>
-              </a:rPr>
-              <a:t>hi</a:t>
-            </a:r>
-          </a:p>
-        </p:txBody>
-      </p:sp>
-      <p:sp>
-        <p:nvSpPr>
-          <p:cNvPr id="10" name="TextBox 9">
-            <a:extLst>
-              <a:ext uri="{FF2B5EF4-FFF2-40B4-BE49-F238E27FC236}">
-                <a16:creationId xmlns:a16="http://schemas.microsoft.com/office/drawing/2014/main" id="{728F629A-9BAE-8B62-70AE-F374671AFD4F}"/>
-              </a:ext>
-            </a:extLst>
-          </p:cNvPr>
-          <p:cNvSpPr txBox="1"/>
-          <p:nvPr/>
-        </p:nvSpPr>
-        <p:spPr>
-          <a:xfrm>
-            <a:off x="3447288" y="2002540"/>
-            <a:ext cx="1271016" cy="722372"/>
-          </a:xfrm>
-          <a:prstGeom prst="rect">
-            <a:avLst/>
-          </a:prstGeom>
-          <a:noFill/>
-        </p:spPr>
-        <p:txBody>
-          <a:bodyPr wrap="square">
-            <a:spAutoFit/>
-          </a:bodyPr>
-          <a:lstStyle/>
-          <a:p>
-            <a:r>
-              <a:rPr lang="en-US" sz="4000" b="1">
-                <a:solidFill>
-                  <a:schemeClr val="bg1"/>
-                </a:solidFill>
-              </a:rPr>
-              <a:t>Chat</a:t>
-            </a:r>
-          </a:p>
-        </p:txBody>
-      </p:sp>
-      <p:sp>
-        <p:nvSpPr>
-          <p:cNvPr id="4" name="TextBox 3">
-            <a:extLst>
-              <a:ext uri="{FF2B5EF4-FFF2-40B4-BE49-F238E27FC236}">
-                <a16:creationId xmlns:a16="http://schemas.microsoft.com/office/drawing/2014/main" id="{878989FB-36B9-C3FE-C716-508EC8621F48}"/>
-              </a:ext>
-            </a:extLst>
-          </p:cNvPr>
-          <p:cNvSpPr txBox="1"/>
-          <p:nvPr/>
-        </p:nvSpPr>
-        <p:spPr>
-          <a:xfrm>
-            <a:off x="3447288" y="3417286"/>
-            <a:ext cx="3415935" cy="923330"/>
-          </a:xfrm>
-          <a:prstGeom prst="rect">
-            <a:avLst/>
-          </a:prstGeom>
-          <a:noFill/>
-        </p:spPr>
-        <p:txBody>
-          <a:bodyPr wrap="none" rtlCol="0">
-            <a:spAutoFit/>
-          </a:bodyPr>
-          <a:lstStyle/>
-          <a:p>
-            <a:r>
-              <a:rPr lang="en-US">
-                <a:solidFill>
-                  <a:srgbClr val="080808"/>
-                </a:solidFill>
-                <a:effectLst/>
-              </a:rPr>
-              <a:t>[Bot]</a:t>
-            </a:r>
-          </a:p>
-          <a:p>
-            <a:r>
-              <a:rPr lang="en-US">
-                <a:solidFill>
-                  <a:srgbClr val="080808"/>
-                </a:solidFill>
-                <a:effectLst/>
-              </a:rPr>
-              <a:t>Hi there! I'm your virtual assistant.</a:t>
-            </a:r>
-          </a:p>
-          <a:p>
-            <a:r>
-              <a:rPr lang="en-US">
-                <a:solidFill>
-                  <a:srgbClr val="080808"/>
-                </a:solidFill>
-                <a:effectLst/>
-              </a:rPr>
-              <a:t>What would you like to do today?</a:t>
-            </a:r>
-          </a:p>
-        </p:txBody>
-      </p:sp>
-    </p:spTree>
-    <p:extLst>
-      <p:ext uri="{BB962C8B-B14F-4D97-AF65-F5344CB8AC3E}">
-        <p14:creationId xmlns:p14="http://schemas.microsoft.com/office/powerpoint/2010/main" val="966899259"/>
-      </p:ext>
-    </p:extLst>
-  </p:cSld>
-  <p:clrMapOvr>
-    <a:masterClrMapping/>
-  </p:clrMapOvr>
-  <p:timing>
-    <p:tnLst>
-      <p:par>
-        <p:cTn id="1" dur="indefinite" restart="never" nodeType="tmRoot">
-          <p:childTnLst>
-            <p:seq concurrent="1" nextAc="seek">
-              <p:cTn id="2" dur="indefinite" nodeType="mainSeq">
-                <p:childTnLst>
-                  <p:par>
-                    <p:cTn id="3" fill="hold">
-                      <p:stCondLst>
-                        <p:cond delay="indefinite"/>
-                      </p:stCondLst>
-                      <p:childTnLst>
-                        <p:par>
-                          <p:cTn id="4" fill="hold">
-                            <p:stCondLst>
-                              <p:cond delay="0"/>
-                            </p:stCondLst>
-                            <p:childTnLst>
-                              <p:par>
-                                <p:cTn id="5" presetID="22" presetClass="entr" presetSubtype="8" fill="hold" grpId="0" nodeType="clickEffect">
-                                  <p:stCondLst>
-                                    <p:cond delay="0"/>
-                                  </p:stCondLst>
-                                  <p:childTnLst>
-                                    <p:set>
-                                      <p:cBhvr>
-                                        <p:cTn id="6" dur="1" fill="hold">
-                                          <p:stCondLst>
-                                            <p:cond delay="0"/>
-                                          </p:stCondLst>
-                                        </p:cTn>
-                                        <p:tgtEl>
-                                          <p:spTgt spid="3"/>
-                                        </p:tgtEl>
-                                        <p:attrNameLst>
-                                          <p:attrName>style.visibility</p:attrName>
-                                        </p:attrNameLst>
-                                      </p:cBhvr>
-                                      <p:to>
-                                        <p:strVal val="visible"/>
-                                      </p:to>
-                                    </p:set>
-                                    <p:animEffect transition="in" filter="wipe(left)">
-                                      <p:cBhvr>
-                                        <p:cTn id="7" dur="500"/>
-                                        <p:tgtEl>
-                                          <p:spTgt spid="3"/>
-                                        </p:tgtEl>
-                                      </p:cBhvr>
-                                    </p:animEffect>
-                                  </p:childTnLst>
-                                </p:cTn>
-                              </p:par>
-                            </p:childTnLst>
-                          </p:cTn>
-                        </p:par>
-                      </p:childTnLst>
-                    </p:cTn>
-                  </p:par>
-                  <p:par>
-                    <p:cTn id="8" fill="hold">
-                      <p:stCondLst>
-                        <p:cond delay="indefinite"/>
-                      </p:stCondLst>
-                      <p:childTnLst>
-                        <p:par>
-                          <p:cTn id="9" fill="hold">
-                            <p:stCondLst>
-                              <p:cond delay="0"/>
-                            </p:stCondLst>
-                            <p:childTnLst>
-                              <p:par>
-                                <p:cTn id="10" presetID="22" presetClass="entr" presetSubtype="8" fill="hold" grpId="0" nodeType="clickEffect">
-                                  <p:stCondLst>
-                                    <p:cond delay="0"/>
-                                  </p:stCondLst>
-                                  <p:childTnLst>
-                                    <p:set>
-                                      <p:cBhvr>
-                                        <p:cTn id="11" dur="1" fill="hold">
-                                          <p:stCondLst>
-                                            <p:cond delay="0"/>
-                                          </p:stCondLst>
-                                        </p:cTn>
-                                        <p:tgtEl>
-                                          <p:spTgt spid="4"/>
-                                        </p:tgtEl>
-                                        <p:attrNameLst>
-                                          <p:attrName>style.visibility</p:attrName>
-                                        </p:attrNameLst>
-                                      </p:cBhvr>
-                                      <p:to>
-                                        <p:strVal val="visible"/>
-                                      </p:to>
-                                    </p:set>
-                                    <p:animEffect transition="in" filter="wipe(left)">
-                                      <p:cBhvr>
-                                        <p:cTn id="12" dur="500"/>
-                                        <p:tgtEl>
-                                          <p:spTgt spid="4"/>
-                                        </p:tgtEl>
-                                      </p:cBhvr>
-                                    </p:animEffect>
-                                  </p:childTnLst>
-                                </p:cTn>
-                              </p:par>
-                            </p:childTnLst>
-                          </p:cTn>
-                        </p:par>
-                      </p:childTnLst>
-                    </p:cTn>
-                  </p:par>
-                </p:childTnLst>
-              </p:cTn>
-              <p:prevCondLst>
-                <p:cond evt="onPrev" delay="0">
-                  <p:tgtEl>
-                    <p:sldTgt/>
-                  </p:tgtEl>
-                </p:cond>
-              </p:prevCondLst>
-              <p:nextCondLst>
-                <p:cond evt="onNext" delay="0">
-                  <p:tgtEl>
-                    <p:sldTgt/>
-                  </p:tgtEl>
-                </p:cond>
-              </p:nextCondLst>
-            </p:seq>
-          </p:childTnLst>
-        </p:cTn>
-      </p:par>
-    </p:tnLst>
-    <p:bldLst>
-      <p:bldP spid="3" grpId="0"/>
-      <p:bldP spid="4" grpId="0"/>
-    </p:bldLst>
-  </p:timing>
-</p:sld>
-</file>
-
-<file path=ppt/slides/slide8.xml><?xml version="1.0" encoding="utf-8"?>
-<p:sld xmlns:a="http://schemas.openxmlformats.org/drawingml/2006/main" xmlns:r="http://schemas.openxmlformats.org/officeDocument/2006/relationships" xmlns:p="http://schemas.openxmlformats.org/presentationml/2006/main">
-  <p:cSld>
-    <p:spTree>
-      <p:nvGrpSpPr>
-        <p:cNvPr id="1" name=""/>
-        <p:cNvGrpSpPr/>
-        <p:nvPr/>
-      </p:nvGrpSpPr>
-      <p:grpSpPr>
-        <a:xfrm>
-          <a:off x="0" y="0"/>
-          <a:ext cx="0" cy="0"/>
-          <a:chOff x="0" y="0"/>
-          <a:chExt cx="0" cy="0"/>
-        </a:xfrm>
-      </p:grpSpPr>
-      <p:sp>
-        <p:nvSpPr>
           <p:cNvPr id="3" name="TextBox 2">
             <a:extLst>
               <a:ext uri="{FF2B5EF4-FFF2-40B4-BE49-F238E27FC236}">
@@ -31629,7 +31058,7 @@
 </p:sld>
 </file>
 
-<file path=ppt/slides/slide9.xml><?xml version="1.0" encoding="utf-8"?>
+<file path=ppt/slides/slide8.xml><?xml version="1.0" encoding="utf-8"?>
 <p:sld xmlns:a="http://schemas.openxmlformats.org/drawingml/2006/main" xmlns:r="http://schemas.openxmlformats.org/officeDocument/2006/relationships" xmlns:p="http://schemas.openxmlformats.org/presentationml/2006/main">
   <p:cSld>
     <p:spTree>
@@ -31691,6 +31120,817 @@
     <p:extLst>
       <p:ext uri="{BB962C8B-B14F-4D97-AF65-F5344CB8AC3E}">
         <p14:creationId xmlns:p14="http://schemas.microsoft.com/office/powerpoint/2010/main" val="2772083382"/>
+      </p:ext>
+    </p:extLst>
+  </p:cSld>
+  <p:clrMapOvr>
+    <a:masterClrMapping/>
+  </p:clrMapOvr>
+</p:sld>
+</file>
+
+<file path=ppt/slides/slide9.xml><?xml version="1.0" encoding="utf-8"?>
+<p:sld xmlns:a="http://schemas.openxmlformats.org/drawingml/2006/main" xmlns:r="http://schemas.openxmlformats.org/officeDocument/2006/relationships" xmlns:p="http://schemas.openxmlformats.org/presentationml/2006/main">
+  <p:cSld>
+    <p:spTree>
+      <p:nvGrpSpPr>
+        <p:cNvPr id="1" name=""/>
+        <p:cNvGrpSpPr/>
+        <p:nvPr/>
+      </p:nvGrpSpPr>
+      <p:grpSpPr>
+        <a:xfrm>
+          <a:off x="0" y="0"/>
+          <a:ext cx="0" cy="0"/>
+          <a:chOff x="0" y="0"/>
+          <a:chExt cx="0" cy="0"/>
+        </a:xfrm>
+      </p:grpSpPr>
+      <p:sp>
+        <p:nvSpPr>
+          <p:cNvPr id="3" name="Curved Down Arrow 2"/>
+          <p:cNvSpPr/>
+          <p:nvPr/>
+        </p:nvSpPr>
+        <p:spPr bwMode="auto">
+          <a:xfrm rot="16200000">
+            <a:off x="2633387" y="3179948"/>
+            <a:ext cx="2718871" cy="1219200"/>
+          </a:xfrm>
+          <a:prstGeom prst="curvedDownArrow">
+            <a:avLst/>
+          </a:prstGeom>
+          <a:ln>
+            <a:headEnd type="none" w="med" len="med"/>
+            <a:tailEnd type="none" w="med" len="med"/>
+          </a:ln>
+        </p:spPr>
+        <p:style>
+          <a:lnRef idx="2">
+            <a:schemeClr val="dk1"/>
+          </a:lnRef>
+          <a:fillRef idx="1">
+            <a:schemeClr val="lt1"/>
+          </a:fillRef>
+          <a:effectRef idx="0">
+            <a:schemeClr val="dk1"/>
+          </a:effectRef>
+          <a:fontRef idx="minor">
+            <a:schemeClr val="dk1"/>
+          </a:fontRef>
+        </p:style>
+        <p:txBody>
+          <a:bodyPr vert="horz" wrap="square" lIns="121920" tIns="60960" rIns="121920" bIns="60960" numCol="1" rtlCol="0" anchor="t" anchorCtr="0" compatLnSpc="1">
+            <a:prstTxWarp prst="textNoShape">
+              <a:avLst/>
+            </a:prstTxWarp>
+          </a:bodyPr>
+          <a:lstStyle/>
+          <a:p>
+            <a:pPr defTabSz="1219170" eaLnBrk="0" fontAlgn="base" hangingPunct="0">
+              <a:spcBef>
+                <a:spcPct val="0"/>
+              </a:spcBef>
+              <a:spcAft>
+                <a:spcPct val="0"/>
+              </a:spcAft>
+            </a:pPr>
+            <a:endParaRPr lang="en-US" sz="3200" b="1">
+              <a:solidFill>
+                <a:schemeClr val="tx1"/>
+              </a:solidFill>
+              <a:latin typeface="Arial" charset="0"/>
+            </a:endParaRPr>
+          </a:p>
+        </p:txBody>
+      </p:sp>
+      <p:sp>
+        <p:nvSpPr>
+          <p:cNvPr id="4" name="Curved Down Arrow 3"/>
+          <p:cNvSpPr/>
+          <p:nvPr/>
+        </p:nvSpPr>
+        <p:spPr bwMode="auto">
+          <a:xfrm rot="5400000">
+            <a:off x="6591606" y="3179949"/>
+            <a:ext cx="2718871" cy="1219200"/>
+          </a:xfrm>
+          <a:prstGeom prst="curvedDownArrow">
+            <a:avLst/>
+          </a:prstGeom>
+          <a:ln>
+            <a:headEnd type="none" w="med" len="med"/>
+            <a:tailEnd type="none" w="med" len="med"/>
+          </a:ln>
+        </p:spPr>
+        <p:style>
+          <a:lnRef idx="2">
+            <a:schemeClr val="dk1"/>
+          </a:lnRef>
+          <a:fillRef idx="1">
+            <a:schemeClr val="lt1"/>
+          </a:fillRef>
+          <a:effectRef idx="0">
+            <a:schemeClr val="dk1"/>
+          </a:effectRef>
+          <a:fontRef idx="minor">
+            <a:schemeClr val="dk1"/>
+          </a:fontRef>
+        </p:style>
+        <p:txBody>
+          <a:bodyPr vert="horz" wrap="square" lIns="121920" tIns="60960" rIns="121920" bIns="60960" numCol="1" rtlCol="0" anchor="t" anchorCtr="0" compatLnSpc="1">
+            <a:prstTxWarp prst="textNoShape">
+              <a:avLst/>
+            </a:prstTxWarp>
+          </a:bodyPr>
+          <a:lstStyle/>
+          <a:p>
+            <a:pPr defTabSz="1219170" eaLnBrk="0" fontAlgn="base" hangingPunct="0">
+              <a:spcBef>
+                <a:spcPct val="0"/>
+              </a:spcBef>
+              <a:spcAft>
+                <a:spcPct val="0"/>
+              </a:spcAft>
+            </a:pPr>
+            <a:endParaRPr lang="en-US" sz="3200" b="1">
+              <a:solidFill>
+                <a:schemeClr val="tx1"/>
+              </a:solidFill>
+              <a:latin typeface="Arial" charset="0"/>
+            </a:endParaRPr>
+          </a:p>
+        </p:txBody>
+      </p:sp>
+      <p:sp>
+        <p:nvSpPr>
+          <p:cNvPr id="5" name="Curved Down Arrow 4"/>
+          <p:cNvSpPr/>
+          <p:nvPr/>
+        </p:nvSpPr>
+        <p:spPr bwMode="auto">
+          <a:xfrm>
+            <a:off x="4622573" y="1217784"/>
+            <a:ext cx="2718871" cy="1219200"/>
+          </a:xfrm>
+          <a:prstGeom prst="curvedDownArrow">
+            <a:avLst/>
+          </a:prstGeom>
+          <a:ln>
+            <a:headEnd type="none" w="med" len="med"/>
+            <a:tailEnd type="none" w="med" len="med"/>
+          </a:ln>
+        </p:spPr>
+        <p:style>
+          <a:lnRef idx="2">
+            <a:schemeClr val="dk1"/>
+          </a:lnRef>
+          <a:fillRef idx="1">
+            <a:schemeClr val="lt1"/>
+          </a:fillRef>
+          <a:effectRef idx="0">
+            <a:schemeClr val="dk1"/>
+          </a:effectRef>
+          <a:fontRef idx="minor">
+            <a:schemeClr val="dk1"/>
+          </a:fontRef>
+        </p:style>
+        <p:txBody>
+          <a:bodyPr vert="horz" wrap="square" lIns="121920" tIns="60960" rIns="121920" bIns="60960" numCol="1" rtlCol="0" anchor="t" anchorCtr="0" compatLnSpc="1">
+            <a:prstTxWarp prst="textNoShape">
+              <a:avLst/>
+            </a:prstTxWarp>
+          </a:bodyPr>
+          <a:lstStyle/>
+          <a:p>
+            <a:pPr defTabSz="1219170" eaLnBrk="0" fontAlgn="base" hangingPunct="0">
+              <a:spcBef>
+                <a:spcPct val="0"/>
+              </a:spcBef>
+              <a:spcAft>
+                <a:spcPct val="0"/>
+              </a:spcAft>
+            </a:pPr>
+            <a:endParaRPr lang="en-US" sz="3200" b="1">
+              <a:solidFill>
+                <a:schemeClr val="tx1"/>
+              </a:solidFill>
+              <a:latin typeface="Arial" charset="0"/>
+            </a:endParaRPr>
+          </a:p>
+        </p:txBody>
+      </p:sp>
+      <p:sp>
+        <p:nvSpPr>
+          <p:cNvPr id="6" name="TextBox 5"/>
+          <p:cNvSpPr txBox="1"/>
+          <p:nvPr/>
+        </p:nvSpPr>
+        <p:spPr>
+          <a:xfrm>
+            <a:off x="7315200" y="1905001"/>
+            <a:ext cx="1497760" cy="461665"/>
+          </a:xfrm>
+          <a:prstGeom prst="rect">
+            <a:avLst/>
+          </a:prstGeom>
+          <a:noFill/>
+        </p:spPr>
+        <p:txBody>
+          <a:bodyPr wrap="square" rtlCol="0">
+            <a:spAutoFit/>
+          </a:bodyPr>
+          <a:lstStyle/>
+          <a:p>
+            <a:r>
+              <a:rPr lang="en-US" sz="2400" dirty="0"/>
+              <a:t>English</a:t>
+            </a:r>
+          </a:p>
+        </p:txBody>
+      </p:sp>
+      <p:sp>
+        <p:nvSpPr>
+          <p:cNvPr id="7" name="TextBox 6"/>
+          <p:cNvSpPr txBox="1"/>
+          <p:nvPr/>
+        </p:nvSpPr>
+        <p:spPr>
+          <a:xfrm>
+            <a:off x="7341442" y="5107678"/>
+            <a:ext cx="825867" cy="461665"/>
+          </a:xfrm>
+          <a:prstGeom prst="rect">
+            <a:avLst/>
+          </a:prstGeom>
+          <a:noFill/>
+        </p:spPr>
+        <p:txBody>
+          <a:bodyPr wrap="none" rtlCol="0">
+            <a:spAutoFit/>
+          </a:bodyPr>
+          <a:lstStyle/>
+          <a:p>
+            <a:r>
+              <a:rPr lang="en-US" sz="2400" dirty="0"/>
+              <a:t>Code</a:t>
+            </a:r>
+          </a:p>
+        </p:txBody>
+      </p:sp>
+      <p:sp>
+        <p:nvSpPr>
+          <p:cNvPr id="8" name="TextBox 7"/>
+          <p:cNvSpPr txBox="1"/>
+          <p:nvPr/>
+        </p:nvSpPr>
+        <p:spPr>
+          <a:xfrm>
+            <a:off x="3556000" y="5170319"/>
+            <a:ext cx="1026216" cy="461665"/>
+          </a:xfrm>
+          <a:prstGeom prst="rect">
+            <a:avLst/>
+          </a:prstGeom>
+          <a:noFill/>
+        </p:spPr>
+        <p:txBody>
+          <a:bodyPr wrap="square" rtlCol="0">
+            <a:spAutoFit/>
+          </a:bodyPr>
+          <a:lstStyle/>
+          <a:p>
+            <a:r>
+              <a:rPr lang="en-US" sz="2400" dirty="0"/>
+              <a:t>Result</a:t>
+            </a:r>
+          </a:p>
+        </p:txBody>
+      </p:sp>
+      <p:sp>
+        <p:nvSpPr>
+          <p:cNvPr id="9" name="TextBox 8"/>
+          <p:cNvSpPr txBox="1"/>
+          <p:nvPr/>
+        </p:nvSpPr>
+        <p:spPr>
+          <a:xfrm>
+            <a:off x="2844799" y="1923033"/>
+            <a:ext cx="1777772" cy="461665"/>
+          </a:xfrm>
+          <a:prstGeom prst="rect">
+            <a:avLst/>
+          </a:prstGeom>
+          <a:noFill/>
+        </p:spPr>
+        <p:txBody>
+          <a:bodyPr wrap="square" rtlCol="0">
+            <a:spAutoFit/>
+          </a:bodyPr>
+          <a:lstStyle/>
+          <a:p>
+            <a:r>
+              <a:rPr lang="en-US" sz="2400" dirty="0"/>
+              <a:t>Whiteboard</a:t>
+            </a:r>
+          </a:p>
+        </p:txBody>
+      </p:sp>
+      <p:grpSp>
+        <p:nvGrpSpPr>
+          <p:cNvPr id="10" name="Group 9"/>
+          <p:cNvGrpSpPr/>
+          <p:nvPr/>
+        </p:nvGrpSpPr>
+        <p:grpSpPr>
+          <a:xfrm>
+            <a:off x="1422400" y="279400"/>
+            <a:ext cx="1347536" cy="2802021"/>
+            <a:chOff x="635115" y="-227609"/>
+            <a:chExt cx="1010652" cy="2101516"/>
+          </a:xfrm>
+        </p:grpSpPr>
+        <p:sp>
+          <p:nvSpPr>
+            <p:cNvPr id="11" name="Rectangle 10"/>
+            <p:cNvSpPr/>
+            <p:nvPr/>
+          </p:nvSpPr>
+          <p:spPr bwMode="auto">
+            <a:xfrm>
+              <a:off x="635115" y="29065"/>
+              <a:ext cx="1010652" cy="1138989"/>
+            </a:xfrm>
+            <a:prstGeom prst="rect">
+              <a:avLst/>
+            </a:prstGeom>
+            <a:ln>
+              <a:headEnd type="none" w="med" len="med"/>
+              <a:tailEnd type="none" w="med" len="med"/>
+            </a:ln>
+          </p:spPr>
+          <p:style>
+            <a:lnRef idx="2">
+              <a:schemeClr val="dk1"/>
+            </a:lnRef>
+            <a:fillRef idx="1">
+              <a:schemeClr val="lt1"/>
+            </a:fillRef>
+            <a:effectRef idx="0">
+              <a:schemeClr val="dk1"/>
+            </a:effectRef>
+            <a:fontRef idx="minor">
+              <a:schemeClr val="dk1"/>
+            </a:fontRef>
+          </p:style>
+          <p:txBody>
+            <a:bodyPr vert="horz" wrap="square" lIns="121920" tIns="60960" rIns="121920" bIns="60960" numCol="1" rtlCol="0" anchor="t" anchorCtr="0" compatLnSpc="1">
+              <a:prstTxWarp prst="textNoShape">
+                <a:avLst/>
+              </a:prstTxWarp>
+            </a:bodyPr>
+            <a:lstStyle/>
+            <a:p>
+              <a:pPr defTabSz="1219170" eaLnBrk="0" fontAlgn="base" hangingPunct="0">
+                <a:spcBef>
+                  <a:spcPct val="0"/>
+                </a:spcBef>
+                <a:spcAft>
+                  <a:spcPct val="0"/>
+                </a:spcAft>
+              </a:pPr>
+              <a:endParaRPr lang="en-US" sz="3200" b="1">
+                <a:solidFill>
+                  <a:schemeClr val="tx1"/>
+                </a:solidFill>
+                <a:latin typeface="Arial" charset="0"/>
+              </a:endParaRPr>
+            </a:p>
+          </p:txBody>
+        </p:sp>
+        <p:cxnSp>
+          <p:nvCxnSpPr>
+            <p:cNvPr id="12" name="Straight Connector 11"/>
+            <p:cNvCxnSpPr/>
+            <p:nvPr/>
+          </p:nvCxnSpPr>
+          <p:spPr bwMode="auto">
+            <a:xfrm>
+              <a:off x="1140441" y="-227609"/>
+              <a:ext cx="0" cy="256674"/>
+            </a:xfrm>
+            <a:prstGeom prst="line">
+              <a:avLst/>
+            </a:prstGeom>
+            <a:solidFill>
+              <a:schemeClr val="accent1"/>
+            </a:solidFill>
+            <a:ln w="9525" cap="flat" cmpd="sng" algn="ctr">
+              <a:solidFill>
+                <a:schemeClr val="tx1"/>
+              </a:solidFill>
+              <a:prstDash val="solid"/>
+              <a:round/>
+              <a:headEnd type="none" w="med" len="med"/>
+              <a:tailEnd type="none" w="med" len="med"/>
+            </a:ln>
+            <a:effectLst/>
+          </p:spPr>
+        </p:cxnSp>
+        <p:cxnSp>
+          <p:nvCxnSpPr>
+            <p:cNvPr id="13" name="Straight Connector 12"/>
+            <p:cNvCxnSpPr/>
+            <p:nvPr/>
+          </p:nvCxnSpPr>
+          <p:spPr bwMode="auto">
+            <a:xfrm flipV="1">
+              <a:off x="819599" y="1168054"/>
+              <a:ext cx="184484" cy="705853"/>
+            </a:xfrm>
+            <a:prstGeom prst="line">
+              <a:avLst/>
+            </a:prstGeom>
+            <a:solidFill>
+              <a:schemeClr val="accent1"/>
+            </a:solidFill>
+            <a:ln w="9525" cap="flat" cmpd="sng" algn="ctr">
+              <a:solidFill>
+                <a:schemeClr val="tx1"/>
+              </a:solidFill>
+              <a:prstDash val="solid"/>
+              <a:round/>
+              <a:headEnd type="none" w="med" len="med"/>
+              <a:tailEnd type="none" w="med" len="med"/>
+            </a:ln>
+            <a:effectLst/>
+          </p:spPr>
+        </p:cxnSp>
+        <p:cxnSp>
+          <p:nvCxnSpPr>
+            <p:cNvPr id="14" name="Straight Connector 13"/>
+            <p:cNvCxnSpPr/>
+            <p:nvPr/>
+          </p:nvCxnSpPr>
+          <p:spPr bwMode="auto">
+            <a:xfrm flipV="1">
+              <a:off x="1140441" y="1168054"/>
+              <a:ext cx="0" cy="529390"/>
+            </a:xfrm>
+            <a:prstGeom prst="line">
+              <a:avLst/>
+            </a:prstGeom>
+            <a:solidFill>
+              <a:schemeClr val="accent1"/>
+            </a:solidFill>
+            <a:ln w="9525" cap="flat" cmpd="sng" algn="ctr">
+              <a:solidFill>
+                <a:schemeClr val="tx1"/>
+              </a:solidFill>
+              <a:prstDash val="solid"/>
+              <a:round/>
+              <a:headEnd type="none" w="med" len="med"/>
+              <a:tailEnd type="none" w="med" len="med"/>
+            </a:ln>
+            <a:effectLst/>
+          </p:spPr>
+        </p:cxnSp>
+        <p:cxnSp>
+          <p:nvCxnSpPr>
+            <p:cNvPr id="15" name="Straight Connector 14"/>
+            <p:cNvCxnSpPr/>
+            <p:nvPr/>
+          </p:nvCxnSpPr>
+          <p:spPr bwMode="auto">
+            <a:xfrm flipH="1" flipV="1">
+              <a:off x="1276799" y="1168054"/>
+              <a:ext cx="176463" cy="705853"/>
+            </a:xfrm>
+            <a:prstGeom prst="line">
+              <a:avLst/>
+            </a:prstGeom>
+            <a:solidFill>
+              <a:schemeClr val="accent1"/>
+            </a:solidFill>
+            <a:ln w="9525" cap="flat" cmpd="sng" algn="ctr">
+              <a:solidFill>
+                <a:schemeClr val="tx1"/>
+              </a:solidFill>
+              <a:prstDash val="solid"/>
+              <a:round/>
+              <a:headEnd type="none" w="med" len="med"/>
+              <a:tailEnd type="none" w="med" len="med"/>
+            </a:ln>
+            <a:effectLst/>
+          </p:spPr>
+        </p:cxnSp>
+        <p:cxnSp>
+          <p:nvCxnSpPr>
+            <p:cNvPr id="16" name="Straight Arrow Connector 15"/>
+            <p:cNvCxnSpPr/>
+            <p:nvPr/>
+          </p:nvCxnSpPr>
+          <p:spPr bwMode="auto">
+            <a:xfrm>
+              <a:off x="1140441" y="173520"/>
+              <a:ext cx="0" cy="842838"/>
+            </a:xfrm>
+            <a:prstGeom prst="straightConnector1">
+              <a:avLst/>
+            </a:prstGeom>
+            <a:solidFill>
+              <a:schemeClr val="accent1"/>
+            </a:solidFill>
+            <a:ln w="9525" cap="flat" cmpd="sng" algn="ctr">
+              <a:solidFill>
+                <a:schemeClr val="tx1"/>
+              </a:solidFill>
+              <a:prstDash val="solid"/>
+              <a:round/>
+              <a:headEnd type="arrow"/>
+              <a:tailEnd type="arrow"/>
+            </a:ln>
+            <a:effectLst/>
+          </p:spPr>
+        </p:cxnSp>
+        <p:cxnSp>
+          <p:nvCxnSpPr>
+            <p:cNvPr id="17" name="Straight Arrow Connector 16"/>
+            <p:cNvCxnSpPr/>
+            <p:nvPr/>
+          </p:nvCxnSpPr>
+          <p:spPr bwMode="auto">
+            <a:xfrm flipV="1">
+              <a:off x="762000" y="598559"/>
+              <a:ext cx="691262" cy="1"/>
+            </a:xfrm>
+            <a:prstGeom prst="straightConnector1">
+              <a:avLst/>
+            </a:prstGeom>
+            <a:solidFill>
+              <a:schemeClr val="accent1"/>
+            </a:solidFill>
+            <a:ln w="9525" cap="flat" cmpd="sng" algn="ctr">
+              <a:solidFill>
+                <a:schemeClr val="tx1"/>
+              </a:solidFill>
+              <a:prstDash val="solid"/>
+              <a:round/>
+              <a:headEnd type="arrow"/>
+              <a:tailEnd type="arrow"/>
+            </a:ln>
+            <a:effectLst/>
+          </p:spPr>
+        </p:cxnSp>
+        <p:cxnSp>
+          <p:nvCxnSpPr>
+            <p:cNvPr id="18" name="Straight Connector 17"/>
+            <p:cNvCxnSpPr/>
+            <p:nvPr/>
+          </p:nvCxnSpPr>
+          <p:spPr bwMode="auto">
+            <a:xfrm flipV="1">
+              <a:off x="1140441" y="380254"/>
+              <a:ext cx="224589" cy="218123"/>
+            </a:xfrm>
+            <a:prstGeom prst="line">
+              <a:avLst/>
+            </a:prstGeom>
+            <a:solidFill>
+              <a:schemeClr val="accent1"/>
+            </a:solidFill>
+            <a:ln w="34925" cap="flat" cmpd="sng" algn="ctr">
+              <a:solidFill>
+                <a:srgbClr val="FF0000"/>
+              </a:solidFill>
+              <a:prstDash val="solid"/>
+              <a:round/>
+              <a:headEnd type="none" w="med" len="med"/>
+              <a:tailEnd type="none" w="med" len="med"/>
+            </a:ln>
+            <a:effectLst/>
+          </p:spPr>
+        </p:cxnSp>
+      </p:grpSp>
+      <p:sp>
+        <p:nvSpPr>
+          <p:cNvPr id="19" name="TextBox 18"/>
+          <p:cNvSpPr txBox="1"/>
+          <p:nvPr/>
+        </p:nvSpPr>
+        <p:spPr>
+          <a:xfrm>
+            <a:off x="7620003" y="889002"/>
+            <a:ext cx="3555876" cy="830997"/>
+          </a:xfrm>
+          <a:prstGeom prst="rect">
+            <a:avLst/>
+          </a:prstGeom>
+          <a:solidFill>
+            <a:schemeClr val="bg1"/>
+          </a:solidFill>
+          <a:ln>
+            <a:solidFill>
+              <a:schemeClr val="tx1"/>
+            </a:solidFill>
+          </a:ln>
+        </p:spPr>
+        <p:txBody>
+          <a:bodyPr wrap="square" rtlCol="0">
+            <a:spAutoFit/>
+          </a:bodyPr>
+          <a:lstStyle/>
+          <a:p>
+            <a:r>
+              <a:rPr lang="en-US" sz="2400" dirty="0">
+                <a:solidFill>
+                  <a:srgbClr val="2AD122"/>
+                </a:solidFill>
+              </a:rPr>
+              <a:t>// Create side (0,0) – (3,4)</a:t>
+            </a:r>
+          </a:p>
+          <a:p>
+            <a:r>
+              <a:rPr lang="en-US" sz="2400" dirty="0">
+                <a:solidFill>
+                  <a:srgbClr val="2AD122"/>
+                </a:solidFill>
+              </a:rPr>
+              <a:t>// Verify length</a:t>
+            </a:r>
+          </a:p>
+        </p:txBody>
+      </p:sp>
+      <p:sp>
+        <p:nvSpPr>
+          <p:cNvPr id="20" name="TextBox 19"/>
+          <p:cNvSpPr txBox="1"/>
+          <p:nvPr/>
+        </p:nvSpPr>
+        <p:spPr>
+          <a:xfrm>
+            <a:off x="7010400" y="5867400"/>
+            <a:ext cx="5080000" cy="748795"/>
+          </a:xfrm>
+          <a:prstGeom prst="rect">
+            <a:avLst/>
+          </a:prstGeom>
+          <a:solidFill>
+            <a:schemeClr val="bg1"/>
+          </a:solidFill>
+          <a:ln>
+            <a:solidFill>
+              <a:schemeClr val="tx1"/>
+            </a:solidFill>
+          </a:ln>
+        </p:spPr>
+        <p:txBody>
+          <a:bodyPr wrap="square" rtlCol="0">
+            <a:spAutoFit/>
+          </a:bodyPr>
+          <a:lstStyle/>
+          <a:p>
+            <a:r>
+              <a:rPr lang="en-US" sz="2133" dirty="0"/>
+              <a:t>Side s = new Side(0,0,3,4);</a:t>
+            </a:r>
+          </a:p>
+          <a:p>
+            <a:r>
+              <a:rPr lang="en-US" sz="2133" dirty="0"/>
+              <a:t>Approvals.Verify(s + “ length = “ +s.Length);</a:t>
+            </a:r>
+          </a:p>
+        </p:txBody>
+      </p:sp>
+      <p:sp>
+        <p:nvSpPr>
+          <p:cNvPr id="21" name="TextBox 20"/>
+          <p:cNvSpPr txBox="1"/>
+          <p:nvPr/>
+        </p:nvSpPr>
+        <p:spPr>
+          <a:xfrm>
+            <a:off x="508000" y="5867401"/>
+            <a:ext cx="3984867" cy="502766"/>
+          </a:xfrm>
+          <a:prstGeom prst="rect">
+            <a:avLst/>
+          </a:prstGeom>
+          <a:solidFill>
+            <a:schemeClr val="bg1"/>
+          </a:solidFill>
+          <a:ln>
+            <a:solidFill>
+              <a:schemeClr val="tx1"/>
+            </a:solidFill>
+          </a:ln>
+        </p:spPr>
+        <p:txBody>
+          <a:bodyPr wrap="square" rtlCol="0">
+            <a:spAutoFit/>
+          </a:bodyPr>
+          <a:lstStyle/>
+          <a:p>
+            <a:r>
+              <a:rPr lang="en-US" sz="2667" dirty="0"/>
+              <a:t>Side (0,0) – (3,4) length = 5</a:t>
+            </a:r>
+          </a:p>
+        </p:txBody>
+      </p:sp>
+      <p:sp>
+        <p:nvSpPr>
+          <p:cNvPr id="22" name="Curved Down Arrow 21"/>
+          <p:cNvSpPr/>
+          <p:nvPr/>
+        </p:nvSpPr>
+        <p:spPr bwMode="auto">
+          <a:xfrm rot="10800000">
+            <a:off x="4590493" y="5025943"/>
+            <a:ext cx="2718871" cy="1219200"/>
+          </a:xfrm>
+          <a:prstGeom prst="curvedDownArrow">
+            <a:avLst/>
+          </a:prstGeom>
+          <a:ln>
+            <a:headEnd type="none" w="med" len="med"/>
+            <a:tailEnd type="none" w="med" len="med"/>
+          </a:ln>
+        </p:spPr>
+        <p:style>
+          <a:lnRef idx="2">
+            <a:schemeClr val="dk1"/>
+          </a:lnRef>
+          <a:fillRef idx="1">
+            <a:schemeClr val="lt1"/>
+          </a:fillRef>
+          <a:effectRef idx="0">
+            <a:schemeClr val="dk1"/>
+          </a:effectRef>
+          <a:fontRef idx="minor">
+            <a:schemeClr val="dk1"/>
+          </a:fontRef>
+        </p:style>
+        <p:txBody>
+          <a:bodyPr vert="horz" wrap="square" lIns="121920" tIns="60960" rIns="121920" bIns="60960" numCol="1" rtlCol="0" anchor="t" anchorCtr="0" compatLnSpc="1">
+            <a:prstTxWarp prst="textNoShape">
+              <a:avLst/>
+            </a:prstTxWarp>
+          </a:bodyPr>
+          <a:lstStyle/>
+          <a:p>
+            <a:pPr defTabSz="1219170" eaLnBrk="0" fontAlgn="base" hangingPunct="0">
+              <a:spcBef>
+                <a:spcPct val="0"/>
+              </a:spcBef>
+              <a:spcAft>
+                <a:spcPct val="0"/>
+              </a:spcAft>
+            </a:pPr>
+            <a:endParaRPr lang="en-US" sz="3200" b="1">
+              <a:solidFill>
+                <a:schemeClr val="tx1"/>
+              </a:solidFill>
+              <a:latin typeface="Arial" charset="0"/>
+            </a:endParaRPr>
+          </a:p>
+        </p:txBody>
+      </p:sp>
+      <p:sp>
+        <p:nvSpPr>
+          <p:cNvPr id="23" name="TextBox 22"/>
+          <p:cNvSpPr txBox="1"/>
+          <p:nvPr/>
+        </p:nvSpPr>
+        <p:spPr>
+          <a:xfrm>
+            <a:off x="4165604" y="3327402"/>
+            <a:ext cx="3453061" cy="830997"/>
+          </a:xfrm>
+          <a:prstGeom prst="rect">
+            <a:avLst/>
+          </a:prstGeom>
+          <a:noFill/>
+        </p:spPr>
+        <p:txBody>
+          <a:bodyPr wrap="none" rtlCol="0">
+            <a:spAutoFit/>
+          </a:bodyPr>
+          <a:lstStyle/>
+          <a:p>
+            <a:r>
+              <a:rPr lang="en-US" sz="4800" dirty="0"/>
+              <a:t>Testing Circle</a:t>
+            </a:r>
+          </a:p>
+        </p:txBody>
+      </p:sp>
+    </p:spTree>
+    <p:extLst>
+      <p:ext uri="{BB962C8B-B14F-4D97-AF65-F5344CB8AC3E}">
+        <p14:creationId xmlns:p14="http://schemas.microsoft.com/office/powerpoint/2010/main" val="4224351410"/>
       </p:ext>
     </p:extLst>
   </p:cSld>

</xml_diff>

<commit_message>
. d sample code and slides
</commit_message>
<xml_diff>
--- a/slides/Testing Better with Approvals.pptx
+++ b/slides/Testing Better with Approvals.pptx
@@ -5,7 +5,7 @@
     <p:sldMasterId id="2147483648" r:id="rId1"/>
   </p:sldMasterIdLst>
   <p:notesMasterIdLst>
-    <p:notesMasterId r:id="rId58"/>
+    <p:notesMasterId r:id="rId59"/>
   </p:notesMasterIdLst>
   <p:sldIdLst>
     <p:sldId id="300" r:id="rId2"/>
@@ -45,25 +45,26 @@
     <p:sldId id="315" r:id="rId36"/>
     <p:sldId id="345" r:id="rId37"/>
     <p:sldId id="346" r:id="rId38"/>
-    <p:sldId id="316" r:id="rId39"/>
-    <p:sldId id="268" r:id="rId40"/>
-    <p:sldId id="319" r:id="rId41"/>
-    <p:sldId id="317" r:id="rId42"/>
-    <p:sldId id="318" r:id="rId43"/>
-    <p:sldId id="322" r:id="rId44"/>
-    <p:sldId id="290" r:id="rId45"/>
-    <p:sldId id="320" r:id="rId46"/>
-    <p:sldId id="321" r:id="rId47"/>
-    <p:sldId id="323" r:id="rId48"/>
-    <p:sldId id="276" r:id="rId49"/>
-    <p:sldId id="279" r:id="rId50"/>
-    <p:sldId id="281" r:id="rId51"/>
-    <p:sldId id="280" r:id="rId52"/>
-    <p:sldId id="291" r:id="rId53"/>
-    <p:sldId id="264" r:id="rId54"/>
-    <p:sldId id="257" r:id="rId55"/>
-    <p:sldId id="282" r:id="rId56"/>
-    <p:sldId id="259" r:id="rId57"/>
+    <p:sldId id="347" r:id="rId39"/>
+    <p:sldId id="316" r:id="rId40"/>
+    <p:sldId id="268" r:id="rId41"/>
+    <p:sldId id="319" r:id="rId42"/>
+    <p:sldId id="317" r:id="rId43"/>
+    <p:sldId id="318" r:id="rId44"/>
+    <p:sldId id="322" r:id="rId45"/>
+    <p:sldId id="290" r:id="rId46"/>
+    <p:sldId id="320" r:id="rId47"/>
+    <p:sldId id="321" r:id="rId48"/>
+    <p:sldId id="323" r:id="rId49"/>
+    <p:sldId id="276" r:id="rId50"/>
+    <p:sldId id="279" r:id="rId51"/>
+    <p:sldId id="281" r:id="rId52"/>
+    <p:sldId id="280" r:id="rId53"/>
+    <p:sldId id="291" r:id="rId54"/>
+    <p:sldId id="264" r:id="rId55"/>
+    <p:sldId id="257" r:id="rId56"/>
+    <p:sldId id="282" r:id="rId57"/>
+    <p:sldId id="259" r:id="rId58"/>
   </p:sldIdLst>
   <p:sldSz cx="12192000" cy="6858000"/>
   <p:notesSz cx="6858000" cy="9144000"/>
@@ -216,6 +217,7 @@
             <p14:sldId id="315"/>
             <p14:sldId id="345"/>
             <p14:sldId id="346"/>
+            <p14:sldId id="347"/>
             <p14:sldId id="316"/>
             <p14:sldId id="268"/>
           </p14:sldIdLst>
@@ -1022,7 +1024,7 @@
           <a:p>
             <a:fld id="{FC5BBC2B-72B0-2542-8213-717906F3F32B}" type="slidenum">
               <a:rPr lang="en-US" smtClean="0"/>
-              <a:t>38</a:t>
+              <a:t>39</a:t>
             </a:fld>
             <a:endParaRPr lang="en-US"/>
           </a:p>
@@ -1130,7 +1132,7 @@
           <a:p>
             <a:fld id="{FC5BBC2B-72B0-2542-8213-717906F3F32B}" type="slidenum">
               <a:rPr lang="en-US" smtClean="0"/>
-              <a:t>39</a:t>
+              <a:t>40</a:t>
             </a:fld>
             <a:endParaRPr lang="en-US"/>
           </a:p>
@@ -1217,7 +1219,7 @@
           <a:p>
             <a:fld id="{FC5BBC2B-72B0-2542-8213-717906F3F32B}" type="slidenum">
               <a:rPr lang="en-US" smtClean="0"/>
-              <a:t>41</a:t>
+              <a:t>42</a:t>
             </a:fld>
             <a:endParaRPr lang="en-US"/>
           </a:p>
@@ -1328,7 +1330,7 @@
           <a:p>
             <a:fld id="{FC5BBC2B-72B0-2542-8213-717906F3F32B}" type="slidenum">
               <a:rPr lang="en-US" smtClean="0"/>
-              <a:t>42</a:t>
+              <a:t>43</a:t>
             </a:fld>
             <a:endParaRPr lang="en-US"/>
           </a:p>
@@ -1439,7 +1441,7 @@
           <a:p>
             <a:fld id="{FC5BBC2B-72B0-2542-8213-717906F3F32B}" type="slidenum">
               <a:rPr lang="en-US" smtClean="0"/>
-              <a:t>45</a:t>
+              <a:t>46</a:t>
             </a:fld>
             <a:endParaRPr lang="en-US"/>
           </a:p>
@@ -1550,7 +1552,7 @@
           <a:p>
             <a:fld id="{FC5BBC2B-72B0-2542-8213-717906F3F32B}" type="slidenum">
               <a:rPr lang="en-US" smtClean="0"/>
-              <a:t>46</a:t>
+              <a:t>47</a:t>
             </a:fld>
             <a:endParaRPr lang="en-US"/>
           </a:p>
@@ -1658,7 +1660,7 @@
           <a:p>
             <a:fld id="{FC5BBC2B-72B0-2542-8213-717906F3F32B}" type="slidenum">
               <a:rPr lang="en-US" smtClean="0"/>
-              <a:t>48</a:t>
+              <a:t>49</a:t>
             </a:fld>
             <a:endParaRPr lang="en-US"/>
           </a:p>
@@ -1766,7 +1768,7 @@
           <a:p>
             <a:fld id="{FC5BBC2B-72B0-2542-8213-717906F3F32B}" type="slidenum">
               <a:rPr lang="en-US" smtClean="0"/>
-              <a:t>49</a:t>
+              <a:t>50</a:t>
             </a:fld>
             <a:endParaRPr lang="en-US"/>
           </a:p>
@@ -1961,7 +1963,7 @@
           <a:p>
             <a:fld id="{FC5BBC2B-72B0-2542-8213-717906F3F32B}" type="slidenum">
               <a:rPr lang="en-US" smtClean="0"/>
-              <a:t>50</a:t>
+              <a:t>51</a:t>
             </a:fld>
             <a:endParaRPr lang="en-US"/>
           </a:p>
@@ -2069,7 +2071,7 @@
           <a:p>
             <a:fld id="{FC5BBC2B-72B0-2542-8213-717906F3F32B}" type="slidenum">
               <a:rPr lang="en-US" smtClean="0"/>
-              <a:t>51</a:t>
+              <a:t>52</a:t>
             </a:fld>
             <a:endParaRPr lang="en-US"/>
           </a:p>
@@ -2177,7 +2179,7 @@
           <a:p>
             <a:fld id="{FC5BBC2B-72B0-2542-8213-717906F3F32B}" type="slidenum">
               <a:rPr lang="en-US" smtClean="0"/>
-              <a:t>52</a:t>
+              <a:t>53</a:t>
             </a:fld>
             <a:endParaRPr lang="en-US"/>
           </a:p>
@@ -2261,7 +2263,7 @@
           <a:p>
             <a:fld id="{FC5BBC2B-72B0-2542-8213-717906F3F32B}" type="slidenum">
               <a:rPr lang="en-US" smtClean="0"/>
-              <a:t>54</a:t>
+              <a:t>55</a:t>
             </a:fld>
             <a:endParaRPr lang="en-US"/>
           </a:p>
@@ -2369,7 +2371,7 @@
           <a:p>
             <a:fld id="{FC5BBC2B-72B0-2542-8213-717906F3F32B}" type="slidenum">
               <a:rPr lang="en-US" smtClean="0"/>
-              <a:t>55</a:t>
+              <a:t>56</a:t>
             </a:fld>
             <a:endParaRPr lang="en-US"/>
           </a:p>
@@ -2453,7 +2455,7 @@
           <a:p>
             <a:fld id="{FC5BBC2B-72B0-2542-8213-717906F3F32B}" type="slidenum">
               <a:rPr lang="en-US" smtClean="0"/>
-              <a:t>56</a:t>
+              <a:t>57</a:t>
             </a:fld>
             <a:endParaRPr lang="en-US"/>
           </a:p>
@@ -18864,6 +18866,1202 @@
   <p:cSld>
     <p:spTree>
       <p:nvGrpSpPr>
+        <p:cNvPr id="1" name=""/>
+        <p:cNvGrpSpPr/>
+        <p:nvPr/>
+      </p:nvGrpSpPr>
+      <p:grpSpPr>
+        <a:xfrm>
+          <a:off x="0" y="0"/>
+          <a:ext cx="0" cy="0"/>
+          <a:chOff x="0" y="0"/>
+          <a:chExt cx="0" cy="0"/>
+        </a:xfrm>
+      </p:grpSpPr>
+      <p:sp>
+        <p:nvSpPr>
+          <p:cNvPr id="3" name="TextBox 2">
+            <a:extLst>
+              <a:ext uri="{FF2B5EF4-FFF2-40B4-BE49-F238E27FC236}">
+                <a16:creationId xmlns:a16="http://schemas.microsoft.com/office/drawing/2014/main" id="{F453BE4E-85AA-F142-DC28-C8C6E1DF380C}"/>
+              </a:ext>
+            </a:extLst>
+          </p:cNvPr>
+          <p:cNvSpPr txBox="1"/>
+          <p:nvPr/>
+        </p:nvSpPr>
+        <p:spPr>
+          <a:xfrm>
+            <a:off x="219067" y="173515"/>
+            <a:ext cx="4080558" cy="1046440"/>
+          </a:xfrm>
+          <a:prstGeom prst="rect">
+            <a:avLst/>
+          </a:prstGeom>
+          <a:noFill/>
+        </p:spPr>
+        <p:txBody>
+          <a:bodyPr wrap="square" rtlCol="0">
+            <a:spAutoFit/>
+          </a:bodyPr>
+          <a:lstStyle/>
+          <a:p>
+            <a:r>
+              <a:rPr lang="en-US"/>
+              <a:t>New Concept: </a:t>
+            </a:r>
+          </a:p>
+          <a:p>
+            <a:r>
+              <a:rPr lang="en-US" sz="4400"/>
+              <a:t>Inline Approvals</a:t>
+            </a:r>
+          </a:p>
+        </p:txBody>
+      </p:sp>
+      <p:pic>
+        <p:nvPicPr>
+          <p:cNvPr id="9" name="Picture 8" descr="A screenshot of a computer&#10;&#10;Description automatically generated">
+            <a:extLst>
+              <a:ext uri="{FF2B5EF4-FFF2-40B4-BE49-F238E27FC236}">
+                <a16:creationId xmlns:a16="http://schemas.microsoft.com/office/drawing/2014/main" id="{902C3009-03BB-1EB0-86FD-2613C98AB1CA}"/>
+              </a:ext>
+            </a:extLst>
+          </p:cNvPr>
+          <p:cNvPicPr>
+            <a:picLocks noChangeAspect="1"/>
+          </p:cNvPicPr>
+          <p:nvPr/>
+        </p:nvPicPr>
+        <p:blipFill>
+          <a:blip r:embed="rId2"/>
+          <a:stretch>
+            <a:fillRect/>
+          </a:stretch>
+        </p:blipFill>
+        <p:spPr>
+          <a:xfrm>
+            <a:off x="6310319" y="2059090"/>
+            <a:ext cx="5536066" cy="2739820"/>
+          </a:xfrm>
+          <a:prstGeom prst="rect">
+            <a:avLst/>
+          </a:prstGeom>
+        </p:spPr>
+      </p:pic>
+      <p:cxnSp>
+        <p:nvCxnSpPr>
+          <p:cNvPr id="10" name="Straight Connector 9">
+            <a:extLst>
+              <a:ext uri="{FF2B5EF4-FFF2-40B4-BE49-F238E27FC236}">
+                <a16:creationId xmlns:a16="http://schemas.microsoft.com/office/drawing/2014/main" id="{A078C818-46D0-59BC-DB55-2B66DC035F9D}"/>
+              </a:ext>
+            </a:extLst>
+          </p:cNvPr>
+          <p:cNvCxnSpPr>
+            <a:cxnSpLocks/>
+          </p:cNvCxnSpPr>
+          <p:nvPr/>
+        </p:nvCxnSpPr>
+        <p:spPr>
+          <a:xfrm>
+            <a:off x="5962472" y="522250"/>
+            <a:ext cx="0" cy="6025896"/>
+          </a:xfrm>
+          <a:prstGeom prst="line">
+            <a:avLst/>
+          </a:prstGeom>
+          <a:ln w="38100"/>
+        </p:spPr>
+        <p:style>
+          <a:lnRef idx="1">
+            <a:schemeClr val="dk1"/>
+          </a:lnRef>
+          <a:fillRef idx="0">
+            <a:schemeClr val="dk1"/>
+          </a:fillRef>
+          <a:effectRef idx="0">
+            <a:schemeClr val="dk1"/>
+          </a:effectRef>
+          <a:fontRef idx="minor">
+            <a:schemeClr val="tx1"/>
+          </a:fontRef>
+        </p:style>
+      </p:cxnSp>
+      <p:pic>
+        <p:nvPicPr>
+          <p:cNvPr id="13" name="Picture 12" descr="A close-up of a word&#10;&#10;Description automatically generated">
+            <a:extLst>
+              <a:ext uri="{FF2B5EF4-FFF2-40B4-BE49-F238E27FC236}">
+                <a16:creationId xmlns:a16="http://schemas.microsoft.com/office/drawing/2014/main" id="{1285C983-BE1C-4827-82B6-6E225B299E68}"/>
+              </a:ext>
+            </a:extLst>
+          </p:cNvPr>
+          <p:cNvPicPr>
+            <a:picLocks noChangeAspect="1"/>
+          </p:cNvPicPr>
+          <p:nvPr/>
+        </p:nvPicPr>
+        <p:blipFill>
+          <a:blip r:embed="rId3"/>
+          <a:stretch>
+            <a:fillRect/>
+          </a:stretch>
+        </p:blipFill>
+        <p:spPr>
+          <a:xfrm>
+            <a:off x="219067" y="3138149"/>
+            <a:ext cx="5487214" cy="794098"/>
+          </a:xfrm>
+          <a:prstGeom prst="rect">
+            <a:avLst/>
+          </a:prstGeom>
+        </p:spPr>
+      </p:pic>
+      <p:grpSp>
+        <p:nvGrpSpPr>
+          <p:cNvPr id="57" name="Group 56">
+            <a:extLst>
+              <a:ext uri="{FF2B5EF4-FFF2-40B4-BE49-F238E27FC236}">
+                <a16:creationId xmlns:a16="http://schemas.microsoft.com/office/drawing/2014/main" id="{6301EF46-AB34-4731-D6C8-AB9CA18FDAF2}"/>
+              </a:ext>
+            </a:extLst>
+          </p:cNvPr>
+          <p:cNvGrpSpPr/>
+          <p:nvPr/>
+        </p:nvGrpSpPr>
+        <p:grpSpPr>
+          <a:xfrm>
+            <a:off x="145916" y="2301251"/>
+            <a:ext cx="2577810" cy="1404988"/>
+            <a:chOff x="145916" y="2301251"/>
+            <a:chExt cx="2577810" cy="1404988"/>
+          </a:xfrm>
+        </p:grpSpPr>
+        <p:sp>
+          <p:nvSpPr>
+            <p:cNvPr id="11" name="Rounded Rectangle 10">
+              <a:extLst>
+                <a:ext uri="{FF2B5EF4-FFF2-40B4-BE49-F238E27FC236}">
+                  <a16:creationId xmlns:a16="http://schemas.microsoft.com/office/drawing/2014/main" id="{6C4D60C6-5EBC-B24F-D7BC-735D45C695A5}"/>
+                </a:ext>
+              </a:extLst>
+            </p:cNvPr>
+            <p:cNvSpPr/>
+            <p:nvPr/>
+          </p:nvSpPr>
+          <p:spPr>
+            <a:xfrm>
+              <a:off x="145916" y="3083670"/>
+              <a:ext cx="1663425" cy="622569"/>
+            </a:xfrm>
+            <a:prstGeom prst="roundRect">
+              <a:avLst/>
+            </a:prstGeom>
+            <a:noFill/>
+            <a:ln w="57150">
+              <a:solidFill>
+                <a:srgbClr val="C00000"/>
+              </a:solidFill>
+            </a:ln>
+          </p:spPr>
+          <p:style>
+            <a:lnRef idx="2">
+              <a:schemeClr val="accent1">
+                <a:shade val="15000"/>
+              </a:schemeClr>
+            </a:lnRef>
+            <a:fillRef idx="1">
+              <a:schemeClr val="accent1"/>
+            </a:fillRef>
+            <a:effectRef idx="0">
+              <a:schemeClr val="accent1"/>
+            </a:effectRef>
+            <a:fontRef idx="minor">
+              <a:schemeClr val="lt1"/>
+            </a:fontRef>
+          </p:style>
+          <p:txBody>
+            <a:bodyPr rtlCol="0" anchor="ctr"/>
+            <a:lstStyle/>
+            <a:p>
+              <a:pPr algn="ctr"/>
+              <a:endParaRPr lang="en-US">
+                <a:solidFill>
+                  <a:srgbClr val="C00000"/>
+                </a:solidFill>
+              </a:endParaRPr>
+            </a:p>
+          </p:txBody>
+        </p:sp>
+        <p:cxnSp>
+          <p:nvCxnSpPr>
+            <p:cNvPr id="20" name="Straight Arrow Connector 19">
+              <a:extLst>
+                <a:ext uri="{FF2B5EF4-FFF2-40B4-BE49-F238E27FC236}">
+                  <a16:creationId xmlns:a16="http://schemas.microsoft.com/office/drawing/2014/main" id="{55DC5B42-EF86-A659-41BE-FE5BDFA24CDB}"/>
+                </a:ext>
+              </a:extLst>
+            </p:cNvPr>
+            <p:cNvCxnSpPr>
+              <a:cxnSpLocks/>
+            </p:cNvCxnSpPr>
+            <p:nvPr/>
+          </p:nvCxnSpPr>
+          <p:spPr>
+            <a:xfrm flipH="1">
+              <a:off x="1468877" y="2577830"/>
+              <a:ext cx="447472" cy="437744"/>
+            </a:xfrm>
+            <a:prstGeom prst="straightConnector1">
+              <a:avLst/>
+            </a:prstGeom>
+            <a:ln w="19050">
+              <a:solidFill>
+                <a:srgbClr val="C00000"/>
+              </a:solidFill>
+              <a:tailEnd type="triangle"/>
+            </a:ln>
+          </p:spPr>
+          <p:style>
+            <a:lnRef idx="1">
+              <a:schemeClr val="accent1"/>
+            </a:lnRef>
+            <a:fillRef idx="0">
+              <a:schemeClr val="accent1"/>
+            </a:fillRef>
+            <a:effectRef idx="0">
+              <a:schemeClr val="accent1"/>
+            </a:effectRef>
+            <a:fontRef idx="minor">
+              <a:schemeClr val="tx1"/>
+            </a:fontRef>
+          </p:style>
+        </p:cxnSp>
+        <p:sp>
+          <p:nvSpPr>
+            <p:cNvPr id="17" name="Approved output">
+              <a:extLst>
+                <a:ext uri="{FF2B5EF4-FFF2-40B4-BE49-F238E27FC236}">
+                  <a16:creationId xmlns:a16="http://schemas.microsoft.com/office/drawing/2014/main" id="{5BFE5EC7-70AA-0AE7-98EE-366F5BCE6CE2}"/>
+                </a:ext>
+              </a:extLst>
+            </p:cNvPr>
+            <p:cNvSpPr txBox="1"/>
+            <p:nvPr/>
+          </p:nvSpPr>
+          <p:spPr>
+            <a:xfrm>
+              <a:off x="894956" y="2301251"/>
+              <a:ext cx="1828770" cy="369332"/>
+            </a:xfrm>
+            <a:prstGeom prst="rect">
+              <a:avLst/>
+            </a:prstGeom>
+            <a:noFill/>
+          </p:spPr>
+          <p:txBody>
+            <a:bodyPr wrap="none" rtlCol="0">
+              <a:spAutoFit/>
+            </a:bodyPr>
+            <a:lstStyle/>
+            <a:p>
+              <a:r>
+                <a:rPr lang="en-US" u="sng">
+                  <a:solidFill>
+                    <a:srgbClr val="C00000"/>
+                  </a:solidFill>
+                  <a:latin typeface="Ink Free" panose="020F0502020204030204" pitchFamily="34" charset="0"/>
+                  <a:ea typeface="Heiti TC Medium" pitchFamily="2" charset="-128"/>
+                </a:rPr>
+                <a:t>Approved</a:t>
+              </a:r>
+              <a:r>
+                <a:rPr lang="en-US" u="sng">
+                  <a:solidFill>
+                    <a:srgbClr val="C00000"/>
+                  </a:solidFill>
+                </a:rPr>
+                <a:t> </a:t>
+              </a:r>
+              <a:r>
+                <a:rPr lang="en-US" u="sng">
+                  <a:solidFill>
+                    <a:srgbClr val="C00000"/>
+                  </a:solidFill>
+                  <a:latin typeface="Ink Free" panose="020F0502020204030204" pitchFamily="34" charset="0"/>
+                  <a:ea typeface="Heiti TC Medium" pitchFamily="2" charset="-128"/>
+                </a:rPr>
+                <a:t>output</a:t>
+              </a:r>
+            </a:p>
+          </p:txBody>
+        </p:sp>
+      </p:grpSp>
+      <p:grpSp>
+        <p:nvGrpSpPr>
+          <p:cNvPr id="58" name="Group 57">
+            <a:extLst>
+              <a:ext uri="{FF2B5EF4-FFF2-40B4-BE49-F238E27FC236}">
+                <a16:creationId xmlns:a16="http://schemas.microsoft.com/office/drawing/2014/main" id="{578A1A1B-BE88-53ED-4244-67820DE33E3F}"/>
+              </a:ext>
+            </a:extLst>
+          </p:cNvPr>
+          <p:cNvGrpSpPr/>
+          <p:nvPr/>
+        </p:nvGrpSpPr>
+        <p:grpSpPr>
+          <a:xfrm>
+            <a:off x="3073656" y="3535198"/>
+            <a:ext cx="2540970" cy="1448378"/>
+            <a:chOff x="3073656" y="3535198"/>
+            <a:chExt cx="2540970" cy="1448378"/>
+          </a:xfrm>
+        </p:grpSpPr>
+        <p:sp>
+          <p:nvSpPr>
+            <p:cNvPr id="14" name="Rounded Rectangle 13">
+              <a:extLst>
+                <a:ext uri="{FF2B5EF4-FFF2-40B4-BE49-F238E27FC236}">
+                  <a16:creationId xmlns:a16="http://schemas.microsoft.com/office/drawing/2014/main" id="{27FC7D83-39B3-B837-C42E-64A6974ACB42}"/>
+                </a:ext>
+              </a:extLst>
+            </p:cNvPr>
+            <p:cNvSpPr/>
+            <p:nvPr/>
+          </p:nvSpPr>
+          <p:spPr>
+            <a:xfrm>
+              <a:off x="3073656" y="3535198"/>
+              <a:ext cx="2540970" cy="432071"/>
+            </a:xfrm>
+            <a:prstGeom prst="roundRect">
+              <a:avLst/>
+            </a:prstGeom>
+            <a:noFill/>
+            <a:ln w="57150">
+              <a:solidFill>
+                <a:srgbClr val="C00000"/>
+              </a:solidFill>
+            </a:ln>
+          </p:spPr>
+          <p:style>
+            <a:lnRef idx="2">
+              <a:schemeClr val="accent1">
+                <a:shade val="15000"/>
+              </a:schemeClr>
+            </a:lnRef>
+            <a:fillRef idx="1">
+              <a:schemeClr val="accent1"/>
+            </a:fillRef>
+            <a:effectRef idx="0">
+              <a:schemeClr val="accent1"/>
+            </a:effectRef>
+            <a:fontRef idx="minor">
+              <a:schemeClr val="lt1"/>
+            </a:fontRef>
+          </p:style>
+          <p:txBody>
+            <a:bodyPr rtlCol="0" anchor="ctr"/>
+            <a:lstStyle/>
+            <a:p>
+              <a:pPr algn="ctr"/>
+              <a:endParaRPr lang="en-US">
+                <a:solidFill>
+                  <a:srgbClr val="C00000"/>
+                </a:solidFill>
+              </a:endParaRPr>
+            </a:p>
+          </p:txBody>
+        </p:sp>
+        <p:sp>
+          <p:nvSpPr>
+            <p:cNvPr id="35" name="TextBox 34">
+              <a:extLst>
+                <a:ext uri="{FF2B5EF4-FFF2-40B4-BE49-F238E27FC236}">
+                  <a16:creationId xmlns:a16="http://schemas.microsoft.com/office/drawing/2014/main" id="{116AD822-BBB0-36AF-B3DE-CD3195ABF755}"/>
+                </a:ext>
+              </a:extLst>
+            </p:cNvPr>
+            <p:cNvSpPr txBox="1"/>
+            <p:nvPr/>
+          </p:nvSpPr>
+          <p:spPr>
+            <a:xfrm>
+              <a:off x="3726601" y="4614244"/>
+              <a:ext cx="1548822" cy="369332"/>
+            </a:xfrm>
+            <a:prstGeom prst="rect">
+              <a:avLst/>
+            </a:prstGeom>
+            <a:noFill/>
+          </p:spPr>
+          <p:txBody>
+            <a:bodyPr wrap="none" rtlCol="0">
+              <a:spAutoFit/>
+            </a:bodyPr>
+            <a:lstStyle/>
+            <a:p>
+              <a:r>
+                <a:rPr lang="en-US" u="sng">
+                  <a:solidFill>
+                    <a:srgbClr val="C00000"/>
+                  </a:solidFill>
+                  <a:latin typeface="Ink Free" panose="020F0502020204030204" pitchFamily="34" charset="0"/>
+                  <a:ea typeface="Heiti TC Medium" pitchFamily="2" charset="-128"/>
+                </a:rPr>
+                <a:t>How to invoke</a:t>
+              </a:r>
+            </a:p>
+          </p:txBody>
+        </p:sp>
+        <p:cxnSp>
+          <p:nvCxnSpPr>
+            <p:cNvPr id="36" name="Straight Arrow Connector 35">
+              <a:extLst>
+                <a:ext uri="{FF2B5EF4-FFF2-40B4-BE49-F238E27FC236}">
+                  <a16:creationId xmlns:a16="http://schemas.microsoft.com/office/drawing/2014/main" id="{E9D6416C-1AC8-AAD5-0EE0-7A6A8832D03F}"/>
+                </a:ext>
+              </a:extLst>
+            </p:cNvPr>
+            <p:cNvCxnSpPr>
+              <a:cxnSpLocks/>
+              <a:stCxn id="35" idx="0"/>
+            </p:cNvCxnSpPr>
+            <p:nvPr/>
+          </p:nvCxnSpPr>
+          <p:spPr>
+            <a:xfrm flipH="1" flipV="1">
+              <a:off x="4173166" y="4134255"/>
+              <a:ext cx="327846" cy="479989"/>
+            </a:xfrm>
+            <a:prstGeom prst="straightConnector1">
+              <a:avLst/>
+            </a:prstGeom>
+            <a:ln w="19050">
+              <a:solidFill>
+                <a:srgbClr val="C00000"/>
+              </a:solidFill>
+              <a:tailEnd type="triangle"/>
+            </a:ln>
+          </p:spPr>
+          <p:style>
+            <a:lnRef idx="1">
+              <a:schemeClr val="accent1"/>
+            </a:lnRef>
+            <a:fillRef idx="0">
+              <a:schemeClr val="accent1"/>
+            </a:fillRef>
+            <a:effectRef idx="0">
+              <a:schemeClr val="accent1"/>
+            </a:effectRef>
+            <a:fontRef idx="minor">
+              <a:schemeClr val="tx1"/>
+            </a:fontRef>
+          </p:style>
+        </p:cxnSp>
+      </p:grpSp>
+      <p:grpSp>
+        <p:nvGrpSpPr>
+          <p:cNvPr id="60" name="Group 59">
+            <a:extLst>
+              <a:ext uri="{FF2B5EF4-FFF2-40B4-BE49-F238E27FC236}">
+                <a16:creationId xmlns:a16="http://schemas.microsoft.com/office/drawing/2014/main" id="{9C91740B-D697-2B51-EC71-BA1C2FB1F758}"/>
+              </a:ext>
+            </a:extLst>
+          </p:cNvPr>
+          <p:cNvGrpSpPr/>
+          <p:nvPr/>
+        </p:nvGrpSpPr>
+        <p:grpSpPr>
+          <a:xfrm>
+            <a:off x="10044572" y="1340302"/>
+            <a:ext cx="1981633" cy="1466128"/>
+            <a:chOff x="10044572" y="1340302"/>
+            <a:chExt cx="1981633" cy="1466128"/>
+          </a:xfrm>
+        </p:grpSpPr>
+        <p:sp>
+          <p:nvSpPr>
+            <p:cNvPr id="40" name="TextBox 39">
+              <a:extLst>
+                <a:ext uri="{FF2B5EF4-FFF2-40B4-BE49-F238E27FC236}">
+                  <a16:creationId xmlns:a16="http://schemas.microsoft.com/office/drawing/2014/main" id="{98C71106-7EFF-1B8D-6706-FD1FFE862C59}"/>
+                </a:ext>
+              </a:extLst>
+            </p:cNvPr>
+            <p:cNvSpPr txBox="1"/>
+            <p:nvPr/>
+          </p:nvSpPr>
+          <p:spPr>
+            <a:xfrm>
+              <a:off x="10044572" y="1340302"/>
+              <a:ext cx="1981633" cy="369332"/>
+            </a:xfrm>
+            <a:prstGeom prst="rect">
+              <a:avLst/>
+            </a:prstGeom>
+            <a:noFill/>
+          </p:spPr>
+          <p:txBody>
+            <a:bodyPr wrap="none" rtlCol="0">
+              <a:spAutoFit/>
+            </a:bodyPr>
+            <a:lstStyle/>
+            <a:p>
+              <a:r>
+                <a:rPr lang="en-US" u="sng">
+                  <a:solidFill>
+                    <a:srgbClr val="C00000"/>
+                  </a:solidFill>
+                  <a:latin typeface="Ink Free" panose="020F0502020204030204" pitchFamily="34" charset="0"/>
+                  <a:ea typeface="Heiti TC Medium" pitchFamily="2" charset="-128"/>
+                </a:rPr>
+                <a:t>Original source file</a:t>
+              </a:r>
+            </a:p>
+          </p:txBody>
+        </p:sp>
+        <p:cxnSp>
+          <p:nvCxnSpPr>
+            <p:cNvPr id="41" name="Straight Arrow Connector 40">
+              <a:extLst>
+                <a:ext uri="{FF2B5EF4-FFF2-40B4-BE49-F238E27FC236}">
+                  <a16:creationId xmlns:a16="http://schemas.microsoft.com/office/drawing/2014/main" id="{65D701C4-3201-A654-BCB1-69D2F5918589}"/>
+                </a:ext>
+              </a:extLst>
+            </p:cNvPr>
+            <p:cNvCxnSpPr>
+              <a:cxnSpLocks/>
+            </p:cNvCxnSpPr>
+            <p:nvPr/>
+          </p:nvCxnSpPr>
+          <p:spPr>
+            <a:xfrm flipH="1">
+              <a:off x="10573461" y="1614014"/>
+              <a:ext cx="450282" cy="1192416"/>
+            </a:xfrm>
+            <a:prstGeom prst="straightConnector1">
+              <a:avLst/>
+            </a:prstGeom>
+            <a:ln w="19050">
+              <a:solidFill>
+                <a:srgbClr val="C00000"/>
+              </a:solidFill>
+              <a:tailEnd type="triangle"/>
+            </a:ln>
+          </p:spPr>
+          <p:style>
+            <a:lnRef idx="1">
+              <a:schemeClr val="accent1"/>
+            </a:lnRef>
+            <a:fillRef idx="0">
+              <a:schemeClr val="accent1"/>
+            </a:fillRef>
+            <a:effectRef idx="0">
+              <a:schemeClr val="accent1"/>
+            </a:effectRef>
+            <a:fontRef idx="minor">
+              <a:schemeClr val="tx1"/>
+            </a:fontRef>
+          </p:style>
+        </p:cxnSp>
+      </p:grpSp>
+      <p:grpSp>
+        <p:nvGrpSpPr>
+          <p:cNvPr id="59" name="Group 58">
+            <a:extLst>
+              <a:ext uri="{FF2B5EF4-FFF2-40B4-BE49-F238E27FC236}">
+                <a16:creationId xmlns:a16="http://schemas.microsoft.com/office/drawing/2014/main" id="{457B8AE5-EC64-5FE7-F388-4E46CBFC613D}"/>
+              </a:ext>
+            </a:extLst>
+          </p:cNvPr>
+          <p:cNvGrpSpPr/>
+          <p:nvPr/>
+        </p:nvGrpSpPr>
+        <p:grpSpPr>
+          <a:xfrm>
+            <a:off x="6491362" y="1340302"/>
+            <a:ext cx="2419252" cy="1456400"/>
+            <a:chOff x="6491362" y="1340302"/>
+            <a:chExt cx="2419252" cy="1456400"/>
+          </a:xfrm>
+        </p:grpSpPr>
+        <p:sp>
+          <p:nvSpPr>
+            <p:cNvPr id="47" name="TextBox 46">
+              <a:extLst>
+                <a:ext uri="{FF2B5EF4-FFF2-40B4-BE49-F238E27FC236}">
+                  <a16:creationId xmlns:a16="http://schemas.microsoft.com/office/drawing/2014/main" id="{51B3F630-FECB-82E5-902C-26EE856C8BD0}"/>
+                </a:ext>
+              </a:extLst>
+            </p:cNvPr>
+            <p:cNvSpPr txBox="1"/>
+            <p:nvPr/>
+          </p:nvSpPr>
+          <p:spPr>
+            <a:xfrm>
+              <a:off x="6491362" y="1340302"/>
+              <a:ext cx="2419252" cy="369332"/>
+            </a:xfrm>
+            <a:prstGeom prst="rect">
+              <a:avLst/>
+            </a:prstGeom>
+            <a:noFill/>
+          </p:spPr>
+          <p:txBody>
+            <a:bodyPr wrap="none" rtlCol="0">
+              <a:spAutoFit/>
+            </a:bodyPr>
+            <a:lstStyle/>
+            <a:p>
+              <a:r>
+                <a:rPr lang="en-US" u="sng">
+                  <a:solidFill>
+                    <a:srgbClr val="C00000"/>
+                  </a:solidFill>
+                  <a:latin typeface="Ink Free" panose="020F0502020204030204" pitchFamily="34" charset="0"/>
+                  <a:ea typeface="Heiti TC Medium" pitchFamily="2" charset="-128"/>
+                </a:rPr>
+                <a:t>Possible new source file</a:t>
+              </a:r>
+            </a:p>
+          </p:txBody>
+        </p:sp>
+        <p:cxnSp>
+          <p:nvCxnSpPr>
+            <p:cNvPr id="48" name="Straight Arrow Connector 47">
+              <a:extLst>
+                <a:ext uri="{FF2B5EF4-FFF2-40B4-BE49-F238E27FC236}">
+                  <a16:creationId xmlns:a16="http://schemas.microsoft.com/office/drawing/2014/main" id="{EE9FA149-D08E-1DED-AB07-4E28DB81F0C3}"/>
+                </a:ext>
+              </a:extLst>
+            </p:cNvPr>
+            <p:cNvCxnSpPr>
+              <a:cxnSpLocks/>
+            </p:cNvCxnSpPr>
+            <p:nvPr/>
+          </p:nvCxnSpPr>
+          <p:spPr>
+            <a:xfrm>
+              <a:off x="7625320" y="1614014"/>
+              <a:ext cx="302723" cy="1182688"/>
+            </a:xfrm>
+            <a:prstGeom prst="straightConnector1">
+              <a:avLst/>
+            </a:prstGeom>
+            <a:ln w="19050">
+              <a:solidFill>
+                <a:srgbClr val="C00000"/>
+              </a:solidFill>
+              <a:tailEnd type="triangle"/>
+            </a:ln>
+          </p:spPr>
+          <p:style>
+            <a:lnRef idx="1">
+              <a:schemeClr val="accent1"/>
+            </a:lnRef>
+            <a:fillRef idx="0">
+              <a:schemeClr val="accent1"/>
+            </a:fillRef>
+            <a:effectRef idx="0">
+              <a:schemeClr val="accent1"/>
+            </a:effectRef>
+            <a:fontRef idx="minor">
+              <a:schemeClr val="tx1"/>
+            </a:fontRef>
+          </p:style>
+        </p:cxnSp>
+      </p:grpSp>
+      <p:grpSp>
+        <p:nvGrpSpPr>
+          <p:cNvPr id="61" name="Group 60">
+            <a:extLst>
+              <a:ext uri="{FF2B5EF4-FFF2-40B4-BE49-F238E27FC236}">
+                <a16:creationId xmlns:a16="http://schemas.microsoft.com/office/drawing/2014/main" id="{879C08EF-7847-E5C1-0E66-23A2CC9DFBFF}"/>
+              </a:ext>
+            </a:extLst>
+          </p:cNvPr>
+          <p:cNvGrpSpPr/>
+          <p:nvPr/>
+        </p:nvGrpSpPr>
+        <p:grpSpPr>
+          <a:xfrm>
+            <a:off x="6443454" y="3593000"/>
+            <a:ext cx="2471667" cy="2513172"/>
+            <a:chOff x="6443454" y="3593000"/>
+            <a:chExt cx="2471667" cy="2513172"/>
+          </a:xfrm>
+        </p:grpSpPr>
+        <p:sp>
+          <p:nvSpPr>
+            <p:cNvPr id="52" name="Rounded Rectangle 51">
+              <a:extLst>
+                <a:ext uri="{FF2B5EF4-FFF2-40B4-BE49-F238E27FC236}">
+                  <a16:creationId xmlns:a16="http://schemas.microsoft.com/office/drawing/2014/main" id="{0C51FD76-9C43-CEF9-363B-F38EF4FFBA32}"/>
+                </a:ext>
+              </a:extLst>
+            </p:cNvPr>
+            <p:cNvSpPr/>
+            <p:nvPr/>
+          </p:nvSpPr>
+          <p:spPr>
+            <a:xfrm>
+              <a:off x="6443454" y="3593000"/>
+              <a:ext cx="435487" cy="275210"/>
+            </a:xfrm>
+            <a:prstGeom prst="roundRect">
+              <a:avLst/>
+            </a:prstGeom>
+            <a:noFill/>
+            <a:ln w="57150">
+              <a:solidFill>
+                <a:srgbClr val="C00000"/>
+              </a:solidFill>
+            </a:ln>
+          </p:spPr>
+          <p:style>
+            <a:lnRef idx="2">
+              <a:schemeClr val="accent1">
+                <a:shade val="15000"/>
+              </a:schemeClr>
+            </a:lnRef>
+            <a:fillRef idx="1">
+              <a:schemeClr val="accent1"/>
+            </a:fillRef>
+            <a:effectRef idx="0">
+              <a:schemeClr val="accent1"/>
+            </a:effectRef>
+            <a:fontRef idx="minor">
+              <a:schemeClr val="lt1"/>
+            </a:fontRef>
+          </p:style>
+          <p:txBody>
+            <a:bodyPr rtlCol="0" anchor="ctr"/>
+            <a:lstStyle/>
+            <a:p>
+              <a:pPr algn="ctr"/>
+              <a:endParaRPr lang="en-US">
+                <a:solidFill>
+                  <a:srgbClr val="C00000"/>
+                </a:solidFill>
+              </a:endParaRPr>
+            </a:p>
+          </p:txBody>
+        </p:sp>
+        <p:sp>
+          <p:nvSpPr>
+            <p:cNvPr id="53" name="TextBox 52">
+              <a:extLst>
+                <a:ext uri="{FF2B5EF4-FFF2-40B4-BE49-F238E27FC236}">
+                  <a16:creationId xmlns:a16="http://schemas.microsoft.com/office/drawing/2014/main" id="{105A32AF-4C7B-7A6A-61EB-0CDEDAC06CE9}"/>
+                </a:ext>
+              </a:extLst>
+            </p:cNvPr>
+            <p:cNvSpPr txBox="1"/>
+            <p:nvPr/>
+          </p:nvSpPr>
+          <p:spPr>
+            <a:xfrm>
+              <a:off x="6600064" y="5459841"/>
+              <a:ext cx="2315057" cy="646331"/>
+            </a:xfrm>
+            <a:prstGeom prst="rect">
+              <a:avLst/>
+            </a:prstGeom>
+            <a:noFill/>
+          </p:spPr>
+          <p:txBody>
+            <a:bodyPr wrap="none" rtlCol="0">
+              <a:spAutoFit/>
+            </a:bodyPr>
+            <a:lstStyle/>
+            <a:p>
+              <a:r>
+                <a:rPr lang="en-US" u="sng">
+                  <a:solidFill>
+                    <a:srgbClr val="C00000"/>
+                  </a:solidFill>
+                  <a:latin typeface="Ink Free" panose="020F0502020204030204" pitchFamily="34" charset="0"/>
+                  <a:ea typeface="Heiti TC Medium" pitchFamily="2" charset="-128"/>
+                </a:rPr>
+                <a:t>Pressing this modifies</a:t>
+              </a:r>
+            </a:p>
+            <a:p>
+              <a:r>
+                <a:rPr lang="en-US" u="sng">
+                  <a:solidFill>
+                    <a:srgbClr val="C00000"/>
+                  </a:solidFill>
+                  <a:latin typeface="Ink Free" panose="020F0502020204030204" pitchFamily="34" charset="0"/>
+                  <a:ea typeface="Heiti TC Medium" pitchFamily="2" charset="-128"/>
+                </a:rPr>
+                <a:t>your source code</a:t>
+              </a:r>
+            </a:p>
+          </p:txBody>
+        </p:sp>
+        <p:cxnSp>
+          <p:nvCxnSpPr>
+            <p:cNvPr id="54" name="Straight Arrow Connector 53">
+              <a:extLst>
+                <a:ext uri="{FF2B5EF4-FFF2-40B4-BE49-F238E27FC236}">
+                  <a16:creationId xmlns:a16="http://schemas.microsoft.com/office/drawing/2014/main" id="{34747D4D-0D6B-4379-3DD6-0119D55F477C}"/>
+                </a:ext>
+              </a:extLst>
+            </p:cNvPr>
+            <p:cNvCxnSpPr>
+              <a:cxnSpLocks/>
+              <a:stCxn id="53" idx="0"/>
+            </p:cNvCxnSpPr>
+            <p:nvPr/>
+          </p:nvCxnSpPr>
+          <p:spPr>
+            <a:xfrm flipH="1" flipV="1">
+              <a:off x="6780179" y="3932247"/>
+              <a:ext cx="977414" cy="1527594"/>
+            </a:xfrm>
+            <a:prstGeom prst="straightConnector1">
+              <a:avLst/>
+            </a:prstGeom>
+            <a:ln w="19050">
+              <a:solidFill>
+                <a:srgbClr val="C00000"/>
+              </a:solidFill>
+              <a:tailEnd type="triangle"/>
+            </a:ln>
+          </p:spPr>
+          <p:style>
+            <a:lnRef idx="1">
+              <a:schemeClr val="accent1"/>
+            </a:lnRef>
+            <a:fillRef idx="0">
+              <a:schemeClr val="accent1"/>
+            </a:fillRef>
+            <a:effectRef idx="0">
+              <a:schemeClr val="accent1"/>
+            </a:effectRef>
+            <a:fontRef idx="minor">
+              <a:schemeClr val="tx1"/>
+            </a:fontRef>
+          </p:style>
+        </p:cxnSp>
+      </p:grpSp>
+      <p:sp>
+        <p:nvSpPr>
+          <p:cNvPr id="62" name="Approved output">
+            <a:extLst>
+              <a:ext uri="{FF2B5EF4-FFF2-40B4-BE49-F238E27FC236}">
+                <a16:creationId xmlns:a16="http://schemas.microsoft.com/office/drawing/2014/main" id="{C224622B-F96E-63D9-0AD5-B13DFA2B46E9}"/>
+              </a:ext>
+            </a:extLst>
+          </p:cNvPr>
+          <p:cNvSpPr txBox="1"/>
+          <p:nvPr/>
+        </p:nvSpPr>
+        <p:spPr>
+          <a:xfrm>
+            <a:off x="271223" y="1184728"/>
+            <a:ext cx="2143536" cy="369332"/>
+          </a:xfrm>
+          <a:prstGeom prst="rect">
+            <a:avLst/>
+          </a:prstGeom>
+          <a:noFill/>
+        </p:spPr>
+        <p:txBody>
+          <a:bodyPr wrap="none" rtlCol="0">
+            <a:spAutoFit/>
+          </a:bodyPr>
+          <a:lstStyle/>
+          <a:p>
+            <a:r>
+              <a:rPr lang="en-US">
+                <a:solidFill>
+                  <a:srgbClr val="C00000"/>
+                </a:solidFill>
+                <a:latin typeface="Ink Free" panose="020F0502020204030204" pitchFamily="34" charset="0"/>
+                <a:ea typeface="Heiti TC Medium" pitchFamily="2" charset="-128"/>
+              </a:rPr>
+              <a:t>“Look mom, no files!”</a:t>
+            </a:r>
+          </a:p>
+        </p:txBody>
+      </p:sp>
+    </p:spTree>
+    <p:extLst>
+      <p:ext uri="{BB962C8B-B14F-4D97-AF65-F5344CB8AC3E}">
+        <p14:creationId xmlns:p14="http://schemas.microsoft.com/office/powerpoint/2010/main" val="2210612421"/>
+      </p:ext>
+    </p:extLst>
+  </p:cSld>
+  <p:clrMapOvr>
+    <a:masterClrMapping/>
+  </p:clrMapOvr>
+  <p:timing>
+    <p:tnLst>
+      <p:par>
+        <p:cTn id="1" dur="indefinite" restart="never" nodeType="tmRoot">
+          <p:childTnLst>
+            <p:seq concurrent="1" nextAc="seek">
+              <p:cTn id="2" dur="indefinite" nodeType="mainSeq">
+                <p:childTnLst>
+                  <p:par>
+                    <p:cTn id="3" fill="hold">
+                      <p:stCondLst>
+                        <p:cond delay="indefinite"/>
+                      </p:stCondLst>
+                      <p:childTnLst>
+                        <p:par>
+                          <p:cTn id="4" fill="hold">
+                            <p:stCondLst>
+                              <p:cond delay="0"/>
+                            </p:stCondLst>
+                            <p:childTnLst>
+                              <p:par>
+                                <p:cTn id="5" presetID="1" presetClass="entr" presetSubtype="0" fill="hold" nodeType="clickEffect">
+                                  <p:stCondLst>
+                                    <p:cond delay="0"/>
+                                  </p:stCondLst>
+                                  <p:childTnLst>
+                                    <p:set>
+                                      <p:cBhvr>
+                                        <p:cTn id="6" dur="1" fill="hold">
+                                          <p:stCondLst>
+                                            <p:cond delay="0"/>
+                                          </p:stCondLst>
+                                        </p:cTn>
+                                        <p:tgtEl>
+                                          <p:spTgt spid="58"/>
+                                        </p:tgtEl>
+                                        <p:attrNameLst>
+                                          <p:attrName>style.visibility</p:attrName>
+                                        </p:attrNameLst>
+                                      </p:cBhvr>
+                                      <p:to>
+                                        <p:strVal val="visible"/>
+                                      </p:to>
+                                    </p:set>
+                                  </p:childTnLst>
+                                </p:cTn>
+                              </p:par>
+                            </p:childTnLst>
+                          </p:cTn>
+                        </p:par>
+                      </p:childTnLst>
+                    </p:cTn>
+                  </p:par>
+                  <p:par>
+                    <p:cTn id="7" fill="hold">
+                      <p:stCondLst>
+                        <p:cond delay="indefinite"/>
+                      </p:stCondLst>
+                      <p:childTnLst>
+                        <p:par>
+                          <p:cTn id="8" fill="hold">
+                            <p:stCondLst>
+                              <p:cond delay="0"/>
+                            </p:stCondLst>
+                            <p:childTnLst>
+                              <p:par>
+                                <p:cTn id="9" presetID="1" presetClass="entr" presetSubtype="0" fill="hold" nodeType="clickEffect">
+                                  <p:stCondLst>
+                                    <p:cond delay="0"/>
+                                  </p:stCondLst>
+                                  <p:childTnLst>
+                                    <p:set>
+                                      <p:cBhvr>
+                                        <p:cTn id="10" dur="1" fill="hold">
+                                          <p:stCondLst>
+                                            <p:cond delay="0"/>
+                                          </p:stCondLst>
+                                        </p:cTn>
+                                        <p:tgtEl>
+                                          <p:spTgt spid="57"/>
+                                        </p:tgtEl>
+                                        <p:attrNameLst>
+                                          <p:attrName>style.visibility</p:attrName>
+                                        </p:attrNameLst>
+                                      </p:cBhvr>
+                                      <p:to>
+                                        <p:strVal val="visible"/>
+                                      </p:to>
+                                    </p:set>
+                                  </p:childTnLst>
+                                </p:cTn>
+                              </p:par>
+                            </p:childTnLst>
+                          </p:cTn>
+                        </p:par>
+                      </p:childTnLst>
+                    </p:cTn>
+                  </p:par>
+                  <p:par>
+                    <p:cTn id="11" fill="hold">
+                      <p:stCondLst>
+                        <p:cond delay="indefinite"/>
+                      </p:stCondLst>
+                      <p:childTnLst>
+                        <p:par>
+                          <p:cTn id="12" fill="hold">
+                            <p:stCondLst>
+                              <p:cond delay="0"/>
+                            </p:stCondLst>
+                            <p:childTnLst>
+                              <p:par>
+                                <p:cTn id="13" presetID="1" presetClass="entr" presetSubtype="0" fill="hold" nodeType="clickEffect">
+                                  <p:stCondLst>
+                                    <p:cond delay="0"/>
+                                  </p:stCondLst>
+                                  <p:childTnLst>
+                                    <p:set>
+                                      <p:cBhvr>
+                                        <p:cTn id="14" dur="1" fill="hold">
+                                          <p:stCondLst>
+                                            <p:cond delay="0"/>
+                                          </p:stCondLst>
+                                        </p:cTn>
+                                        <p:tgtEl>
+                                          <p:spTgt spid="60"/>
+                                        </p:tgtEl>
+                                        <p:attrNameLst>
+                                          <p:attrName>style.visibility</p:attrName>
+                                        </p:attrNameLst>
+                                      </p:cBhvr>
+                                      <p:to>
+                                        <p:strVal val="visible"/>
+                                      </p:to>
+                                    </p:set>
+                                  </p:childTnLst>
+                                </p:cTn>
+                              </p:par>
+                            </p:childTnLst>
+                          </p:cTn>
+                        </p:par>
+                      </p:childTnLst>
+                    </p:cTn>
+                  </p:par>
+                  <p:par>
+                    <p:cTn id="15" fill="hold">
+                      <p:stCondLst>
+                        <p:cond delay="indefinite"/>
+                      </p:stCondLst>
+                      <p:childTnLst>
+                        <p:par>
+                          <p:cTn id="16" fill="hold">
+                            <p:stCondLst>
+                              <p:cond delay="0"/>
+                            </p:stCondLst>
+                            <p:childTnLst>
+                              <p:par>
+                                <p:cTn id="17" presetID="1" presetClass="entr" presetSubtype="0" fill="hold" nodeType="clickEffect">
+                                  <p:stCondLst>
+                                    <p:cond delay="0"/>
+                                  </p:stCondLst>
+                                  <p:childTnLst>
+                                    <p:set>
+                                      <p:cBhvr>
+                                        <p:cTn id="18" dur="1" fill="hold">
+                                          <p:stCondLst>
+                                            <p:cond delay="0"/>
+                                          </p:stCondLst>
+                                        </p:cTn>
+                                        <p:tgtEl>
+                                          <p:spTgt spid="59"/>
+                                        </p:tgtEl>
+                                        <p:attrNameLst>
+                                          <p:attrName>style.visibility</p:attrName>
+                                        </p:attrNameLst>
+                                      </p:cBhvr>
+                                      <p:to>
+                                        <p:strVal val="visible"/>
+                                      </p:to>
+                                    </p:set>
+                                  </p:childTnLst>
+                                </p:cTn>
+                              </p:par>
+                            </p:childTnLst>
+                          </p:cTn>
+                        </p:par>
+                      </p:childTnLst>
+                    </p:cTn>
+                  </p:par>
+                  <p:par>
+                    <p:cTn id="19" fill="hold">
+                      <p:stCondLst>
+                        <p:cond delay="indefinite"/>
+                      </p:stCondLst>
+                      <p:childTnLst>
+                        <p:par>
+                          <p:cTn id="20" fill="hold">
+                            <p:stCondLst>
+                              <p:cond delay="0"/>
+                            </p:stCondLst>
+                            <p:childTnLst>
+                              <p:par>
+                                <p:cTn id="21" presetID="1" presetClass="entr" presetSubtype="0" fill="hold" nodeType="clickEffect">
+                                  <p:stCondLst>
+                                    <p:cond delay="0"/>
+                                  </p:stCondLst>
+                                  <p:childTnLst>
+                                    <p:set>
+                                      <p:cBhvr>
+                                        <p:cTn id="22" dur="1" fill="hold">
+                                          <p:stCondLst>
+                                            <p:cond delay="0"/>
+                                          </p:stCondLst>
+                                        </p:cTn>
+                                        <p:tgtEl>
+                                          <p:spTgt spid="61"/>
+                                        </p:tgtEl>
+                                        <p:attrNameLst>
+                                          <p:attrName>style.visibility</p:attrName>
+                                        </p:attrNameLst>
+                                      </p:cBhvr>
+                                      <p:to>
+                                        <p:strVal val="visible"/>
+                                      </p:to>
+                                    </p:set>
+                                  </p:childTnLst>
+                                </p:cTn>
+                              </p:par>
+                            </p:childTnLst>
+                          </p:cTn>
+                        </p:par>
+                      </p:childTnLst>
+                    </p:cTn>
+                  </p:par>
+                </p:childTnLst>
+              </p:cTn>
+              <p:prevCondLst>
+                <p:cond evt="onPrev" delay="0">
+                  <p:tgtEl>
+                    <p:sldTgt/>
+                  </p:tgtEl>
+                </p:cond>
+              </p:prevCondLst>
+              <p:nextCondLst>
+                <p:cond evt="onNext" delay="0">
+                  <p:tgtEl>
+                    <p:sldTgt/>
+                  </p:tgtEl>
+                </p:cond>
+              </p:nextCondLst>
+            </p:seq>
+          </p:childTnLst>
+        </p:cTn>
+      </p:par>
+    </p:tnLst>
+  </p:timing>
+</p:sld>
+</file>
+
+<file path=ppt/slides/slide39.xml><?xml version="1.0" encoding="utf-8"?>
+<p:sld xmlns:a="http://schemas.openxmlformats.org/drawingml/2006/main" xmlns:r="http://schemas.openxmlformats.org/officeDocument/2006/relationships" xmlns:p="http://schemas.openxmlformats.org/presentationml/2006/main">
+  <p:cSld>
+    <p:spTree>
+      <p:nvGrpSpPr>
         <p:cNvPr id="1" name="">
           <a:extLst>
             <a:ext uri="{FF2B5EF4-FFF2-40B4-BE49-F238E27FC236}">
@@ -18969,107 +20167,6 @@
     <p:extLst>
       <p:ext uri="{BB962C8B-B14F-4D97-AF65-F5344CB8AC3E}">
         <p14:creationId xmlns:p14="http://schemas.microsoft.com/office/powerpoint/2010/main" val="1076691476"/>
-      </p:ext>
-    </p:extLst>
-  </p:cSld>
-  <p:clrMapOvr>
-    <a:masterClrMapping/>
-  </p:clrMapOvr>
-</p:sld>
-</file>
-
-<file path=ppt/slides/slide39.xml><?xml version="1.0" encoding="utf-8"?>
-<p:sld xmlns:a="http://schemas.openxmlformats.org/drawingml/2006/main" xmlns:r="http://schemas.openxmlformats.org/officeDocument/2006/relationships" xmlns:p="http://schemas.openxmlformats.org/presentationml/2006/main">
-  <p:cSld>
-    <p:spTree>
-      <p:nvGrpSpPr>
-        <p:cNvPr id="1" name="">
-          <a:extLst>
-            <a:ext uri="{FF2B5EF4-FFF2-40B4-BE49-F238E27FC236}">
-              <a16:creationId xmlns:a16="http://schemas.microsoft.com/office/drawing/2014/main" id="{A4F28ADF-F9A1-BE76-B5A1-DBEEFECEB3D7}"/>
-            </a:ext>
-          </a:extLst>
-        </p:cNvPr>
-        <p:cNvGrpSpPr/>
-        <p:nvPr/>
-      </p:nvGrpSpPr>
-      <p:grpSpPr>
-        <a:xfrm>
-          <a:off x="0" y="0"/>
-          <a:ext cx="0" cy="0"/>
-          <a:chOff x="0" y="0"/>
-          <a:chExt cx="0" cy="0"/>
-        </a:xfrm>
-      </p:grpSpPr>
-      <p:sp>
-        <p:nvSpPr>
-          <p:cNvPr id="5" name="TextBox 4">
-            <a:extLst>
-              <a:ext uri="{FF2B5EF4-FFF2-40B4-BE49-F238E27FC236}">
-                <a16:creationId xmlns:a16="http://schemas.microsoft.com/office/drawing/2014/main" id="{90784A3B-234D-FF43-0E64-C54043738401}"/>
-              </a:ext>
-            </a:extLst>
-          </p:cNvPr>
-          <p:cNvSpPr txBox="1"/>
-          <p:nvPr/>
-        </p:nvSpPr>
-        <p:spPr>
-          <a:xfrm>
-            <a:off x="4759709" y="314328"/>
-            <a:ext cx="2514086" cy="369332"/>
-          </a:xfrm>
-          <a:prstGeom prst="rect">
-            <a:avLst/>
-          </a:prstGeom>
-          <a:noFill/>
-        </p:spPr>
-        <p:txBody>
-          <a:bodyPr wrap="none" rtlCol="0">
-            <a:spAutoFit/>
-          </a:bodyPr>
-          <a:lstStyle/>
-          <a:p>
-            <a:r>
-              <a:rPr lang="en-US"/>
-              <a:t>inline - everything in test</a:t>
-            </a:r>
-          </a:p>
-        </p:txBody>
-      </p:sp>
-      <p:pic>
-        <p:nvPicPr>
-          <p:cNvPr id="6" name="Picture 5" descr="A screenshot of a computer program&#10;&#10;Description automatically generated">
-            <a:extLst>
-              <a:ext uri="{FF2B5EF4-FFF2-40B4-BE49-F238E27FC236}">
-                <a16:creationId xmlns:a16="http://schemas.microsoft.com/office/drawing/2014/main" id="{7C8E284A-9496-CACB-AFC3-7C221A951ABC}"/>
-              </a:ext>
-            </a:extLst>
-          </p:cNvPr>
-          <p:cNvPicPr>
-            <a:picLocks noChangeAspect="1"/>
-          </p:cNvPicPr>
-          <p:nvPr/>
-        </p:nvPicPr>
-        <p:blipFill>
-          <a:blip r:embed="rId3"/>
-          <a:stretch>
-            <a:fillRect/>
-          </a:stretch>
-        </p:blipFill>
-        <p:spPr>
-          <a:xfrm>
-            <a:off x="3470656" y="1497900"/>
-            <a:ext cx="5426183" cy="2980944"/>
-          </a:xfrm>
-          <a:prstGeom prst="rect">
-            <a:avLst/>
-          </a:prstGeom>
-        </p:spPr>
-      </p:pic>
-    </p:spTree>
-    <p:extLst>
-      <p:ext uri="{BB962C8B-B14F-4D97-AF65-F5344CB8AC3E}">
-        <p14:creationId xmlns:p14="http://schemas.microsoft.com/office/powerpoint/2010/main" val="580460432"/>
       </p:ext>
     </p:extLst>
   </p:cSld>
@@ -28773,6 +29870,107 @@
 </file>
 
 <file path=ppt/slides/slide40.xml><?xml version="1.0" encoding="utf-8"?>
+<p:sld xmlns:a="http://schemas.openxmlformats.org/drawingml/2006/main" xmlns:r="http://schemas.openxmlformats.org/officeDocument/2006/relationships" xmlns:p="http://schemas.openxmlformats.org/presentationml/2006/main">
+  <p:cSld>
+    <p:spTree>
+      <p:nvGrpSpPr>
+        <p:cNvPr id="1" name="">
+          <a:extLst>
+            <a:ext uri="{FF2B5EF4-FFF2-40B4-BE49-F238E27FC236}">
+              <a16:creationId xmlns:a16="http://schemas.microsoft.com/office/drawing/2014/main" id="{A4F28ADF-F9A1-BE76-B5A1-DBEEFECEB3D7}"/>
+            </a:ext>
+          </a:extLst>
+        </p:cNvPr>
+        <p:cNvGrpSpPr/>
+        <p:nvPr/>
+      </p:nvGrpSpPr>
+      <p:grpSpPr>
+        <a:xfrm>
+          <a:off x="0" y="0"/>
+          <a:ext cx="0" cy="0"/>
+          <a:chOff x="0" y="0"/>
+          <a:chExt cx="0" cy="0"/>
+        </a:xfrm>
+      </p:grpSpPr>
+      <p:sp>
+        <p:nvSpPr>
+          <p:cNvPr id="5" name="TextBox 4">
+            <a:extLst>
+              <a:ext uri="{FF2B5EF4-FFF2-40B4-BE49-F238E27FC236}">
+                <a16:creationId xmlns:a16="http://schemas.microsoft.com/office/drawing/2014/main" id="{90784A3B-234D-FF43-0E64-C54043738401}"/>
+              </a:ext>
+            </a:extLst>
+          </p:cNvPr>
+          <p:cNvSpPr txBox="1"/>
+          <p:nvPr/>
+        </p:nvSpPr>
+        <p:spPr>
+          <a:xfrm>
+            <a:off x="4759709" y="314328"/>
+            <a:ext cx="2514086" cy="369332"/>
+          </a:xfrm>
+          <a:prstGeom prst="rect">
+            <a:avLst/>
+          </a:prstGeom>
+          <a:noFill/>
+        </p:spPr>
+        <p:txBody>
+          <a:bodyPr wrap="none" rtlCol="0">
+            <a:spAutoFit/>
+          </a:bodyPr>
+          <a:lstStyle/>
+          <a:p>
+            <a:r>
+              <a:rPr lang="en-US"/>
+              <a:t>inline - everything in test</a:t>
+            </a:r>
+          </a:p>
+        </p:txBody>
+      </p:sp>
+      <p:pic>
+        <p:nvPicPr>
+          <p:cNvPr id="6" name="Picture 5" descr="A screenshot of a computer program&#10;&#10;Description automatically generated">
+            <a:extLst>
+              <a:ext uri="{FF2B5EF4-FFF2-40B4-BE49-F238E27FC236}">
+                <a16:creationId xmlns:a16="http://schemas.microsoft.com/office/drawing/2014/main" id="{7C8E284A-9496-CACB-AFC3-7C221A951ABC}"/>
+              </a:ext>
+            </a:extLst>
+          </p:cNvPr>
+          <p:cNvPicPr>
+            <a:picLocks noChangeAspect="1"/>
+          </p:cNvPicPr>
+          <p:nvPr/>
+        </p:nvPicPr>
+        <p:blipFill>
+          <a:blip r:embed="rId3"/>
+          <a:stretch>
+            <a:fillRect/>
+          </a:stretch>
+        </p:blipFill>
+        <p:spPr>
+          <a:xfrm>
+            <a:off x="3470656" y="1497900"/>
+            <a:ext cx="5426183" cy="2980944"/>
+          </a:xfrm>
+          <a:prstGeom prst="rect">
+            <a:avLst/>
+          </a:prstGeom>
+        </p:spPr>
+      </p:pic>
+    </p:spTree>
+    <p:extLst>
+      <p:ext uri="{BB962C8B-B14F-4D97-AF65-F5344CB8AC3E}">
+        <p14:creationId xmlns:p14="http://schemas.microsoft.com/office/powerpoint/2010/main" val="580460432"/>
+      </p:ext>
+    </p:extLst>
+  </p:cSld>
+  <p:clrMapOvr>
+    <a:masterClrMapping/>
+  </p:clrMapOvr>
+</p:sld>
+</file>
+
+<file path=ppt/slides/slide41.xml><?xml version="1.0" encoding="utf-8"?>
 <p:sld xmlns:a="http://schemas.openxmlformats.org/drawingml/2006/main" xmlns:r="http://schemas.openxmlformats.org/officeDocument/2006/relationships" xmlns:p="http://schemas.openxmlformats.org/presentationml/2006/main">
   <p:cSld>
     <p:spTree>
@@ -28919,7 +30117,7 @@
 </p:sld>
 </file>
 
-<file path=ppt/slides/slide41.xml><?xml version="1.0" encoding="utf-8"?>
+<file path=ppt/slides/slide42.xml><?xml version="1.0" encoding="utf-8"?>
 <p:sld xmlns:a="http://schemas.openxmlformats.org/drawingml/2006/main" xmlns:r="http://schemas.openxmlformats.org/officeDocument/2006/relationships" xmlns:p="http://schemas.openxmlformats.org/presentationml/2006/main">
   <p:cSld>
     <p:spTree>
@@ -29027,7 +30225,7 @@
 </p:sld>
 </file>
 
-<file path=ppt/slides/slide42.xml><?xml version="1.0" encoding="utf-8"?>
+<file path=ppt/slides/slide43.xml><?xml version="1.0" encoding="utf-8"?>
 <p:sld xmlns:a="http://schemas.openxmlformats.org/drawingml/2006/main" xmlns:r="http://schemas.openxmlformats.org/officeDocument/2006/relationships" xmlns:p="http://schemas.openxmlformats.org/presentationml/2006/main">
   <p:cSld>
     <p:spTree>
@@ -29146,7 +30344,7 @@
 </p:sld>
 </file>
 
-<file path=ppt/slides/slide43.xml><?xml version="1.0" encoding="utf-8"?>
+<file path=ppt/slides/slide44.xml><?xml version="1.0" encoding="utf-8"?>
 <p:sld xmlns:a="http://schemas.openxmlformats.org/drawingml/2006/main" xmlns:r="http://schemas.openxmlformats.org/officeDocument/2006/relationships" xmlns:p="http://schemas.openxmlformats.org/presentationml/2006/main">
   <p:cSld>
     <p:spTree>
@@ -29206,7 +30404,7 @@
 </p:sld>
 </file>
 
-<file path=ppt/slides/slide44.xml><?xml version="1.0" encoding="utf-8"?>
+<file path=ppt/slides/slide45.xml><?xml version="1.0" encoding="utf-8"?>
 <p:sld xmlns:a="http://schemas.openxmlformats.org/drawingml/2006/main" xmlns:r="http://schemas.openxmlformats.org/officeDocument/2006/relationships" xmlns:p="http://schemas.openxmlformats.org/presentationml/2006/main">
   <p:cSld>
     <p:spTree>
@@ -29347,7 +30545,7 @@
 </p:sld>
 </file>
 
-<file path=ppt/slides/slide45.xml><?xml version="1.0" encoding="utf-8"?>
+<file path=ppt/slides/slide46.xml><?xml version="1.0" encoding="utf-8"?>
 <p:sld xmlns:a="http://schemas.openxmlformats.org/drawingml/2006/main" xmlns:r="http://schemas.openxmlformats.org/officeDocument/2006/relationships" xmlns:p="http://schemas.openxmlformats.org/presentationml/2006/main">
   <p:cSld>
     <p:spTree>
@@ -29455,7 +30653,7 @@
 </p:sld>
 </file>
 
-<file path=ppt/slides/slide46.xml><?xml version="1.0" encoding="utf-8"?>
+<file path=ppt/slides/slide47.xml><?xml version="1.0" encoding="utf-8"?>
 <p:sld xmlns:a="http://schemas.openxmlformats.org/drawingml/2006/main" xmlns:r="http://schemas.openxmlformats.org/officeDocument/2006/relationships" xmlns:p="http://schemas.openxmlformats.org/presentationml/2006/main">
   <p:cSld>
     <p:spTree>
@@ -29574,7 +30772,7 @@
 </p:sld>
 </file>
 
-<file path=ppt/slides/slide47.xml><?xml version="1.0" encoding="utf-8"?>
+<file path=ppt/slides/slide48.xml><?xml version="1.0" encoding="utf-8"?>
 <p:sld xmlns:a="http://schemas.openxmlformats.org/drawingml/2006/main" xmlns:r="http://schemas.openxmlformats.org/officeDocument/2006/relationships" xmlns:p="http://schemas.openxmlformats.org/presentationml/2006/main">
   <p:cSld>
     <p:spTree>
@@ -29604,7 +30802,7 @@
 </p:sld>
 </file>
 
-<file path=ppt/slides/slide48.xml><?xml version="1.0" encoding="utf-8"?>
+<file path=ppt/slides/slide49.xml><?xml version="1.0" encoding="utf-8"?>
 <p:sld xmlns:a="http://schemas.openxmlformats.org/drawingml/2006/main" xmlns:r="http://schemas.openxmlformats.org/officeDocument/2006/relationships" xmlns:p="http://schemas.openxmlformats.org/presentationml/2006/main">
   <p:cSld>
     <p:spTree>
@@ -29792,7 +30990,154 @@
 </p:sld>
 </file>
 
-<file path=ppt/slides/slide49.xml><?xml version="1.0" encoding="utf-8"?>
+<file path=ppt/slides/slide5.xml><?xml version="1.0" encoding="utf-8"?>
+<p:sld xmlns:a="http://schemas.openxmlformats.org/drawingml/2006/main" xmlns:r="http://schemas.openxmlformats.org/officeDocument/2006/relationships" xmlns:p="http://schemas.openxmlformats.org/presentationml/2006/main">
+  <p:cSld>
+    <p:spTree>
+      <p:nvGrpSpPr>
+        <p:cNvPr id="1" name="">
+          <a:extLst>
+            <a:ext uri="{FF2B5EF4-FFF2-40B4-BE49-F238E27FC236}">
+              <a16:creationId xmlns:a16="http://schemas.microsoft.com/office/drawing/2014/main" id="{7402D65F-B89F-9DC7-9C7C-A516C704E01D}"/>
+            </a:ext>
+          </a:extLst>
+        </p:cNvPr>
+        <p:cNvGrpSpPr/>
+        <p:nvPr/>
+      </p:nvGrpSpPr>
+      <p:grpSpPr>
+        <a:xfrm>
+          <a:off x="0" y="0"/>
+          <a:ext cx="0" cy="0"/>
+          <a:chOff x="0" y="0"/>
+          <a:chExt cx="0" cy="0"/>
+        </a:xfrm>
+      </p:grpSpPr>
+      <p:pic>
+        <p:nvPicPr>
+          <p:cNvPr id="1028" name="Picture 4" descr="Silent Movie Silent Film Title Card: Free Download — CopyCatFilms">
+            <a:extLst>
+              <a:ext uri="{FF2B5EF4-FFF2-40B4-BE49-F238E27FC236}">
+                <a16:creationId xmlns:a16="http://schemas.microsoft.com/office/drawing/2014/main" id="{B4DAB7B7-9CB9-FDCA-570C-A59439CF72B3}"/>
+              </a:ext>
+            </a:extLst>
+          </p:cNvPr>
+          <p:cNvPicPr>
+            <a:picLocks noChangeAspect="1" noChangeArrowheads="1"/>
+          </p:cNvPicPr>
+          <p:nvPr/>
+        </p:nvPicPr>
+        <p:blipFill>
+          <a:blip r:embed="rId2">
+            <a:extLst>
+              <a:ext uri="{28A0092B-C50C-407E-A947-70E740481C1C}">
+                <a14:useLocalDpi xmlns:a14="http://schemas.microsoft.com/office/drawing/2010/main" val="0"/>
+              </a:ext>
+            </a:extLst>
+          </a:blip>
+          <a:srcRect/>
+          <a:stretch>
+            <a:fillRect/>
+          </a:stretch>
+        </p:blipFill>
+        <p:spPr bwMode="auto">
+          <a:xfrm>
+            <a:off x="0" y="4261"/>
+            <a:ext cx="12192000" cy="6853739"/>
+          </a:xfrm>
+          <a:prstGeom prst="rect">
+            <a:avLst/>
+          </a:prstGeom>
+          <a:noFill/>
+          <a:extLst>
+            <a:ext uri="{909E8E84-426E-40DD-AFC4-6F175D3DCCD1}">
+              <a14:hiddenFill xmlns:a14="http://schemas.microsoft.com/office/drawing/2010/main">
+                <a:solidFill>
+                  <a:srgbClr val="FFFFFF"/>
+                </a:solidFill>
+              </a14:hiddenFill>
+            </a:ext>
+          </a:extLst>
+        </p:spPr>
+      </p:pic>
+      <p:sp>
+        <p:nvSpPr>
+          <p:cNvPr id="2" name="TextBox 1">
+            <a:extLst>
+              <a:ext uri="{FF2B5EF4-FFF2-40B4-BE49-F238E27FC236}">
+                <a16:creationId xmlns:a16="http://schemas.microsoft.com/office/drawing/2014/main" id="{15F32C8C-1A9B-484E-550F-6DE9FAEE8595}"/>
+              </a:ext>
+            </a:extLst>
+          </p:cNvPr>
+          <p:cNvSpPr txBox="1"/>
+          <p:nvPr/>
+        </p:nvSpPr>
+        <p:spPr>
+          <a:xfrm>
+            <a:off x="3565594" y="2876443"/>
+            <a:ext cx="5297990" cy="769441"/>
+          </a:xfrm>
+          <a:prstGeom prst="rect">
+            <a:avLst/>
+          </a:prstGeom>
+          <a:noFill/>
+        </p:spPr>
+        <p:txBody>
+          <a:bodyPr wrap="none" rtlCol="0">
+            <a:spAutoFit/>
+          </a:bodyPr>
+          <a:lstStyle/>
+          <a:p>
+            <a:pPr algn="ctr"/>
+            <a:r>
+              <a:rPr lang="en-US" sz="4400" b="1">
+                <a:gradFill flip="none" rotWithShape="1">
+                  <a:gsLst>
+                    <a:gs pos="0">
+                      <a:schemeClr val="bg1">
+                        <a:shade val="30000"/>
+                        <a:satMod val="115000"/>
+                      </a:schemeClr>
+                    </a:gs>
+                    <a:gs pos="50000">
+                      <a:schemeClr val="bg1">
+                        <a:shade val="67500"/>
+                        <a:satMod val="115000"/>
+                      </a:schemeClr>
+                    </a:gs>
+                    <a:gs pos="100000">
+                      <a:schemeClr val="bg1">
+                        <a:shade val="100000"/>
+                        <a:satMod val="115000"/>
+                      </a:schemeClr>
+                    </a:gs>
+                  </a:gsLst>
+                  <a:path path="circle">
+                    <a:fillToRect t="100000" r="100000"/>
+                  </a:path>
+                  <a:tileRect l="-100000" b="-100000"/>
+                </a:gradFill>
+                <a:latin typeface="Rockwell" panose="02060603020205020403" pitchFamily="18" charset="77"/>
+              </a:rPr>
+              <a:t>In the beginning...</a:t>
+            </a:r>
+          </a:p>
+        </p:txBody>
+      </p:sp>
+    </p:spTree>
+    <p:extLst>
+      <p:ext uri="{BB962C8B-B14F-4D97-AF65-F5344CB8AC3E}">
+        <p14:creationId xmlns:p14="http://schemas.microsoft.com/office/powerpoint/2010/main" val="440692669"/>
+      </p:ext>
+    </p:extLst>
+  </p:cSld>
+  <p:clrMapOvr>
+    <a:masterClrMapping/>
+  </p:clrMapOvr>
+</p:sld>
+</file>
+
+<file path=ppt/slides/slide50.xml><?xml version="1.0" encoding="utf-8"?>
 <p:sld xmlns:a="http://schemas.openxmlformats.org/drawingml/2006/main" xmlns:r="http://schemas.openxmlformats.org/officeDocument/2006/relationships" xmlns:p="http://schemas.openxmlformats.org/presentationml/2006/main">
   <p:cSld>
     <p:spTree>
@@ -29896,154 +31241,7 @@
 </p:sld>
 </file>
 
-<file path=ppt/slides/slide5.xml><?xml version="1.0" encoding="utf-8"?>
-<p:sld xmlns:a="http://schemas.openxmlformats.org/drawingml/2006/main" xmlns:r="http://schemas.openxmlformats.org/officeDocument/2006/relationships" xmlns:p="http://schemas.openxmlformats.org/presentationml/2006/main">
-  <p:cSld>
-    <p:spTree>
-      <p:nvGrpSpPr>
-        <p:cNvPr id="1" name="">
-          <a:extLst>
-            <a:ext uri="{FF2B5EF4-FFF2-40B4-BE49-F238E27FC236}">
-              <a16:creationId xmlns:a16="http://schemas.microsoft.com/office/drawing/2014/main" id="{7402D65F-B89F-9DC7-9C7C-A516C704E01D}"/>
-            </a:ext>
-          </a:extLst>
-        </p:cNvPr>
-        <p:cNvGrpSpPr/>
-        <p:nvPr/>
-      </p:nvGrpSpPr>
-      <p:grpSpPr>
-        <a:xfrm>
-          <a:off x="0" y="0"/>
-          <a:ext cx="0" cy="0"/>
-          <a:chOff x="0" y="0"/>
-          <a:chExt cx="0" cy="0"/>
-        </a:xfrm>
-      </p:grpSpPr>
-      <p:pic>
-        <p:nvPicPr>
-          <p:cNvPr id="1028" name="Picture 4" descr="Silent Movie Silent Film Title Card: Free Download — CopyCatFilms">
-            <a:extLst>
-              <a:ext uri="{FF2B5EF4-FFF2-40B4-BE49-F238E27FC236}">
-                <a16:creationId xmlns:a16="http://schemas.microsoft.com/office/drawing/2014/main" id="{B4DAB7B7-9CB9-FDCA-570C-A59439CF72B3}"/>
-              </a:ext>
-            </a:extLst>
-          </p:cNvPr>
-          <p:cNvPicPr>
-            <a:picLocks noChangeAspect="1" noChangeArrowheads="1"/>
-          </p:cNvPicPr>
-          <p:nvPr/>
-        </p:nvPicPr>
-        <p:blipFill>
-          <a:blip r:embed="rId2">
-            <a:extLst>
-              <a:ext uri="{28A0092B-C50C-407E-A947-70E740481C1C}">
-                <a14:useLocalDpi xmlns:a14="http://schemas.microsoft.com/office/drawing/2010/main" val="0"/>
-              </a:ext>
-            </a:extLst>
-          </a:blip>
-          <a:srcRect/>
-          <a:stretch>
-            <a:fillRect/>
-          </a:stretch>
-        </p:blipFill>
-        <p:spPr bwMode="auto">
-          <a:xfrm>
-            <a:off x="0" y="4261"/>
-            <a:ext cx="12192000" cy="6853739"/>
-          </a:xfrm>
-          <a:prstGeom prst="rect">
-            <a:avLst/>
-          </a:prstGeom>
-          <a:noFill/>
-          <a:extLst>
-            <a:ext uri="{909E8E84-426E-40DD-AFC4-6F175D3DCCD1}">
-              <a14:hiddenFill xmlns:a14="http://schemas.microsoft.com/office/drawing/2010/main">
-                <a:solidFill>
-                  <a:srgbClr val="FFFFFF"/>
-                </a:solidFill>
-              </a14:hiddenFill>
-            </a:ext>
-          </a:extLst>
-        </p:spPr>
-      </p:pic>
-      <p:sp>
-        <p:nvSpPr>
-          <p:cNvPr id="2" name="TextBox 1">
-            <a:extLst>
-              <a:ext uri="{FF2B5EF4-FFF2-40B4-BE49-F238E27FC236}">
-                <a16:creationId xmlns:a16="http://schemas.microsoft.com/office/drawing/2014/main" id="{15F32C8C-1A9B-484E-550F-6DE9FAEE8595}"/>
-              </a:ext>
-            </a:extLst>
-          </p:cNvPr>
-          <p:cNvSpPr txBox="1"/>
-          <p:nvPr/>
-        </p:nvSpPr>
-        <p:spPr>
-          <a:xfrm>
-            <a:off x="3565594" y="2876443"/>
-            <a:ext cx="5297990" cy="769441"/>
-          </a:xfrm>
-          <a:prstGeom prst="rect">
-            <a:avLst/>
-          </a:prstGeom>
-          <a:noFill/>
-        </p:spPr>
-        <p:txBody>
-          <a:bodyPr wrap="none" rtlCol="0">
-            <a:spAutoFit/>
-          </a:bodyPr>
-          <a:lstStyle/>
-          <a:p>
-            <a:pPr algn="ctr"/>
-            <a:r>
-              <a:rPr lang="en-US" sz="4400" b="1">
-                <a:gradFill flip="none" rotWithShape="1">
-                  <a:gsLst>
-                    <a:gs pos="0">
-                      <a:schemeClr val="bg1">
-                        <a:shade val="30000"/>
-                        <a:satMod val="115000"/>
-                      </a:schemeClr>
-                    </a:gs>
-                    <a:gs pos="50000">
-                      <a:schemeClr val="bg1">
-                        <a:shade val="67500"/>
-                        <a:satMod val="115000"/>
-                      </a:schemeClr>
-                    </a:gs>
-                    <a:gs pos="100000">
-                      <a:schemeClr val="bg1">
-                        <a:shade val="100000"/>
-                        <a:satMod val="115000"/>
-                      </a:schemeClr>
-                    </a:gs>
-                  </a:gsLst>
-                  <a:path path="circle">
-                    <a:fillToRect t="100000" r="100000"/>
-                  </a:path>
-                  <a:tileRect l="-100000" b="-100000"/>
-                </a:gradFill>
-                <a:latin typeface="Rockwell" panose="02060603020205020403" pitchFamily="18" charset="77"/>
-              </a:rPr>
-              <a:t>In the beginning...</a:t>
-            </a:r>
-          </a:p>
-        </p:txBody>
-      </p:sp>
-    </p:spTree>
-    <p:extLst>
-      <p:ext uri="{BB962C8B-B14F-4D97-AF65-F5344CB8AC3E}">
-        <p14:creationId xmlns:p14="http://schemas.microsoft.com/office/powerpoint/2010/main" val="440692669"/>
-      </p:ext>
-    </p:extLst>
-  </p:cSld>
-  <p:clrMapOvr>
-    <a:masterClrMapping/>
-  </p:clrMapOvr>
-</p:sld>
-</file>
-
-<file path=ppt/slides/slide50.xml><?xml version="1.0" encoding="utf-8"?>
+<file path=ppt/slides/slide51.xml><?xml version="1.0" encoding="utf-8"?>
 <p:sld xmlns:a="http://schemas.openxmlformats.org/drawingml/2006/main" xmlns:r="http://schemas.openxmlformats.org/officeDocument/2006/relationships" xmlns:p="http://schemas.openxmlformats.org/presentationml/2006/main">
   <p:cSld>
     <p:spTree>
@@ -30079,7 +31277,7 @@
 </p:sld>
 </file>
 
-<file path=ppt/slides/slide51.xml><?xml version="1.0" encoding="utf-8"?>
+<file path=ppt/slides/slide52.xml><?xml version="1.0" encoding="utf-8"?>
 <p:sld xmlns:a="http://schemas.openxmlformats.org/drawingml/2006/main" xmlns:r="http://schemas.openxmlformats.org/officeDocument/2006/relationships" xmlns:p="http://schemas.openxmlformats.org/presentationml/2006/main" show="0">
   <p:cSld>
     <p:spTree>
@@ -30145,7 +31343,7 @@
 </p:sld>
 </file>
 
-<file path=ppt/slides/slide52.xml><?xml version="1.0" encoding="utf-8"?>
+<file path=ppt/slides/slide53.xml><?xml version="1.0" encoding="utf-8"?>
 <p:sld xmlns:a="http://schemas.openxmlformats.org/drawingml/2006/main" xmlns:r="http://schemas.openxmlformats.org/officeDocument/2006/relationships" xmlns:p="http://schemas.openxmlformats.org/presentationml/2006/main" show="0">
   <p:cSld>
     <p:spTree>
@@ -30239,7 +31437,7 @@
 </p:sld>
 </file>
 
-<file path=ppt/slides/slide53.xml><?xml version="1.0" encoding="utf-8"?>
+<file path=ppt/slides/slide54.xml><?xml version="1.0" encoding="utf-8"?>
 <p:sld xmlns:a="http://schemas.openxmlformats.org/drawingml/2006/main" xmlns:r="http://schemas.openxmlformats.org/officeDocument/2006/relationships" xmlns:p="http://schemas.openxmlformats.org/presentationml/2006/main" show="0">
   <p:cSld>
     <p:spTree>
@@ -30376,7 +31574,7 @@
 </p:sld>
 </file>
 
-<file path=ppt/slides/slide54.xml><?xml version="1.0" encoding="utf-8"?>
+<file path=ppt/slides/slide55.xml><?xml version="1.0" encoding="utf-8"?>
 <p:sld xmlns:a="http://schemas.openxmlformats.org/drawingml/2006/main" xmlns:r="http://schemas.openxmlformats.org/officeDocument/2006/relationships" xmlns:p="http://schemas.openxmlformats.org/presentationml/2006/main" show="0">
   <p:cSld>
     <p:spTree>
@@ -31952,7 +33150,7 @@
 </p:sld>
 </file>
 
-<file path=ppt/slides/slide55.xml><?xml version="1.0" encoding="utf-8"?>
+<file path=ppt/slides/slide56.xml><?xml version="1.0" encoding="utf-8"?>
 <p:sld xmlns:a="http://schemas.openxmlformats.org/drawingml/2006/main" xmlns:r="http://schemas.openxmlformats.org/officeDocument/2006/relationships" xmlns:p="http://schemas.openxmlformats.org/presentationml/2006/main" show="0">
   <p:cSld>
     <p:spTree>
@@ -33240,7 +34438,7 @@
 </p:sld>
 </file>
 
-<file path=ppt/slides/slide56.xml><?xml version="1.0" encoding="utf-8"?>
+<file path=ppt/slides/slide57.xml><?xml version="1.0" encoding="utf-8"?>
 <p:sld xmlns:a="http://schemas.openxmlformats.org/drawingml/2006/main" xmlns:r="http://schemas.openxmlformats.org/officeDocument/2006/relationships" xmlns:p="http://schemas.openxmlformats.org/presentationml/2006/main" show="0">
   <p:cSld>
     <p:spTree>

</xml_diff>

<commit_message>
. d slides ->
</commit_message>
<xml_diff>
--- a/slides/Testing Better with Approvals.pptx
+++ b/slides/Testing Better with Approvals.pptx
@@ -366,7 +366,7 @@
           <a:p>
             <a:fld id="{35701875-5BC7-1E49-AF4C-96F7D9E7474C}" type="datetimeFigureOut">
               <a:rPr lang="en-US" smtClean="0"/>
-              <a:t>2/18/24</a:t>
+              <a:t>2/20/24</a:t>
             </a:fld>
             <a:endParaRPr lang="en-US"/>
           </a:p>
@@ -3400,7 +3400,7 @@
           <a:p>
             <a:fld id="{75A66788-8C42-AF46-A5E8-A812D6157D58}" type="datetimeFigureOut">
               <a:rPr lang="en-US" smtClean="0"/>
-              <a:t>2/18/24</a:t>
+              <a:t>2/20/24</a:t>
             </a:fld>
             <a:endParaRPr lang="en-US"/>
           </a:p>
@@ -3598,7 +3598,7 @@
           <a:p>
             <a:fld id="{75A66788-8C42-AF46-A5E8-A812D6157D58}" type="datetimeFigureOut">
               <a:rPr lang="en-US" smtClean="0"/>
-              <a:t>2/18/24</a:t>
+              <a:t>2/20/24</a:t>
             </a:fld>
             <a:endParaRPr lang="en-US"/>
           </a:p>
@@ -3806,7 +3806,7 @@
           <a:p>
             <a:fld id="{75A66788-8C42-AF46-A5E8-A812D6157D58}" type="datetimeFigureOut">
               <a:rPr lang="en-US" smtClean="0"/>
-              <a:t>2/18/24</a:t>
+              <a:t>2/20/24</a:t>
             </a:fld>
             <a:endParaRPr lang="en-US"/>
           </a:p>
@@ -4004,7 +4004,7 @@
           <a:p>
             <a:fld id="{75A66788-8C42-AF46-A5E8-A812D6157D58}" type="datetimeFigureOut">
               <a:rPr lang="en-US" smtClean="0"/>
-              <a:t>2/18/24</a:t>
+              <a:t>2/20/24</a:t>
             </a:fld>
             <a:endParaRPr lang="en-US"/>
           </a:p>
@@ -4279,7 +4279,7 @@
           <a:p>
             <a:fld id="{75A66788-8C42-AF46-A5E8-A812D6157D58}" type="datetimeFigureOut">
               <a:rPr lang="en-US" smtClean="0"/>
-              <a:t>2/18/24</a:t>
+              <a:t>2/20/24</a:t>
             </a:fld>
             <a:endParaRPr lang="en-US"/>
           </a:p>
@@ -4544,7 +4544,7 @@
           <a:p>
             <a:fld id="{75A66788-8C42-AF46-A5E8-A812D6157D58}" type="datetimeFigureOut">
               <a:rPr lang="en-US" smtClean="0"/>
-              <a:t>2/18/24</a:t>
+              <a:t>2/20/24</a:t>
             </a:fld>
             <a:endParaRPr lang="en-US"/>
           </a:p>
@@ -4956,7 +4956,7 @@
           <a:p>
             <a:fld id="{75A66788-8C42-AF46-A5E8-A812D6157D58}" type="datetimeFigureOut">
               <a:rPr lang="en-US" smtClean="0"/>
-              <a:t>2/18/24</a:t>
+              <a:t>2/20/24</a:t>
             </a:fld>
             <a:endParaRPr lang="en-US"/>
           </a:p>
@@ -5097,7 +5097,7 @@
           <a:p>
             <a:fld id="{75A66788-8C42-AF46-A5E8-A812D6157D58}" type="datetimeFigureOut">
               <a:rPr lang="en-US" smtClean="0"/>
-              <a:t>2/18/24</a:t>
+              <a:t>2/20/24</a:t>
             </a:fld>
             <a:endParaRPr lang="en-US"/>
           </a:p>
@@ -5210,7 +5210,7 @@
           <a:p>
             <a:fld id="{75A66788-8C42-AF46-A5E8-A812D6157D58}" type="datetimeFigureOut">
               <a:rPr lang="en-US" smtClean="0"/>
-              <a:t>2/18/24</a:t>
+              <a:t>2/20/24</a:t>
             </a:fld>
             <a:endParaRPr lang="en-US"/>
           </a:p>
@@ -5521,7 +5521,7 @@
           <a:p>
             <a:fld id="{75A66788-8C42-AF46-A5E8-A812D6157D58}" type="datetimeFigureOut">
               <a:rPr lang="en-US" smtClean="0"/>
-              <a:t>2/18/24</a:t>
+              <a:t>2/20/24</a:t>
             </a:fld>
             <a:endParaRPr lang="en-US"/>
           </a:p>
@@ -5809,7 +5809,7 @@
           <a:p>
             <a:fld id="{75A66788-8C42-AF46-A5E8-A812D6157D58}" type="datetimeFigureOut">
               <a:rPr lang="en-US" smtClean="0"/>
-              <a:t>2/18/24</a:t>
+              <a:t>2/20/24</a:t>
             </a:fld>
             <a:endParaRPr lang="en-US"/>
           </a:p>
@@ -6050,7 +6050,7 @@
           <a:p>
             <a:fld id="{75A66788-8C42-AF46-A5E8-A812D6157D58}" type="datetimeFigureOut">
               <a:rPr lang="en-US" smtClean="0"/>
-              <a:t>2/18/24</a:t>
+              <a:t>2/20/24</a:t>
             </a:fld>
             <a:endParaRPr lang="en-US"/>
           </a:p>
@@ -11602,12 +11602,42 @@
           </a:ln>
         </p:spPr>
       </p:pic>
+      <p:pic>
+        <p:nvPicPr>
+          <p:cNvPr id="17" name="Picture 16" descr="A screenshot of a message&#10;&#10;Description automatically generated">
+            <a:extLst>
+              <a:ext uri="{FF2B5EF4-FFF2-40B4-BE49-F238E27FC236}">
+                <a16:creationId xmlns:a16="http://schemas.microsoft.com/office/drawing/2014/main" id="{43A1B801-FD97-CBD9-7C33-20A0F8791745}"/>
+              </a:ext>
+            </a:extLst>
+          </p:cNvPr>
+          <p:cNvPicPr>
+            <a:picLocks noChangeAspect="1"/>
+          </p:cNvPicPr>
+          <p:nvPr/>
+        </p:nvPicPr>
+        <p:blipFill>
+          <a:blip r:embed="rId5"/>
+          <a:stretch>
+            <a:fillRect/>
+          </a:stretch>
+        </p:blipFill>
+        <p:spPr>
+          <a:xfrm>
+            <a:off x="7208324" y="3951722"/>
+            <a:ext cx="4389850" cy="684020"/>
+          </a:xfrm>
+          <a:prstGeom prst="rect">
+            <a:avLst/>
+          </a:prstGeom>
+        </p:spPr>
+      </p:pic>
       <p:sp>
         <p:nvSpPr>
-          <p:cNvPr id="14" name="Freeform 13">
+          <p:cNvPr id="2" name="Freeform 1">
             <a:extLst>
               <a:ext uri="{FF2B5EF4-FFF2-40B4-BE49-F238E27FC236}">
-                <a16:creationId xmlns:a16="http://schemas.microsoft.com/office/drawing/2014/main" id="{1A33C4B2-063F-7524-DE78-E03D4FC17897}"/>
+                <a16:creationId xmlns:a16="http://schemas.microsoft.com/office/drawing/2014/main" id="{6C67DE7E-7957-456C-9100-F3A6BF03BCD9}"/>
               </a:ext>
             </a:extLst>
           </p:cNvPr>
@@ -11616,8 +11646,8 @@
         </p:nvSpPr>
         <p:spPr>
           <a:xfrm>
-            <a:off x="6400218" y="238327"/>
-            <a:ext cx="272956" cy="6391073"/>
+            <a:off x="6400217" y="1420428"/>
+            <a:ext cx="213647" cy="4009116"/>
           </a:xfrm>
           <a:custGeom>
             <a:avLst/>
@@ -11683,13 +11713,13 @@
           </a:custGeom>
           <a:solidFill>
             <a:schemeClr val="bg1">
-              <a:lumMod val="85000"/>
+              <a:lumMod val="65000"/>
             </a:schemeClr>
           </a:solidFill>
           <a:ln w="28575">
             <a:solidFill>
               <a:schemeClr val="bg1">
-                <a:lumMod val="65000"/>
+                <a:lumMod val="75000"/>
               </a:schemeClr>
             </a:solidFill>
           </a:ln>
@@ -11721,36 +11751,51 @@
           </a:p>
         </p:txBody>
       </p:sp>
-      <p:pic>
-        <p:nvPicPr>
-          <p:cNvPr id="17" name="Picture 16" descr="A screenshot of a message&#10;&#10;Description automatically generated">
+      <p:cxnSp>
+        <p:nvCxnSpPr>
+          <p:cNvPr id="3" name="Straight Connector 2">
             <a:extLst>
               <a:ext uri="{FF2B5EF4-FFF2-40B4-BE49-F238E27FC236}">
-                <a16:creationId xmlns:a16="http://schemas.microsoft.com/office/drawing/2014/main" id="{43A1B801-FD97-CBD9-7C33-20A0F8791745}"/>
+                <a16:creationId xmlns:a16="http://schemas.microsoft.com/office/drawing/2014/main" id="{E7E30299-DD31-9328-8B81-1C15A2EA192A}"/>
               </a:ext>
             </a:extLst>
           </p:cNvPr>
-          <p:cNvPicPr>
-            <a:picLocks noChangeAspect="1"/>
-          </p:cNvPicPr>
+          <p:cNvCxnSpPr>
+            <a:cxnSpLocks/>
+          </p:cNvCxnSpPr>
           <p:nvPr/>
-        </p:nvPicPr>
-        <p:blipFill>
-          <a:blip r:embed="rId5"/>
-          <a:stretch>
-            <a:fillRect/>
-          </a:stretch>
-        </p:blipFill>
+        </p:nvCxnSpPr>
         <p:spPr>
           <a:xfrm>
-            <a:off x="7208324" y="3951722"/>
-            <a:ext cx="4389850" cy="684020"/>
+            <a:off x="6400217" y="594360"/>
+            <a:ext cx="0" cy="6025896"/>
           </a:xfrm>
-          <a:prstGeom prst="rect">
+          <a:prstGeom prst="line">
             <a:avLst/>
           </a:prstGeom>
+          <a:ln w="38100">
+            <a:solidFill>
+              <a:schemeClr val="bg1">
+                <a:lumMod val="75000"/>
+              </a:schemeClr>
+            </a:solidFill>
+          </a:ln>
         </p:spPr>
-      </p:pic>
+        <p:style>
+          <a:lnRef idx="1">
+            <a:schemeClr val="dk1"/>
+          </a:lnRef>
+          <a:fillRef idx="0">
+            <a:schemeClr val="dk1"/>
+          </a:fillRef>
+          <a:effectRef idx="0">
+            <a:schemeClr val="dk1"/>
+          </a:effectRef>
+          <a:fontRef idx="minor">
+            <a:schemeClr val="tx1"/>
+          </a:fontRef>
+        </p:style>
+      </p:cxnSp>
     </p:spTree>
     <p:extLst>
       <p:ext uri="{BB962C8B-B14F-4D97-AF65-F5344CB8AC3E}">
@@ -30186,45 +30231,6 @@
           </a:prstGeom>
         </p:spPr>
       </p:pic>
-      <p:cxnSp>
-        <p:nvCxnSpPr>
-          <p:cNvPr id="11" name="Straight Connector 10">
-            <a:extLst>
-              <a:ext uri="{FF2B5EF4-FFF2-40B4-BE49-F238E27FC236}">
-                <a16:creationId xmlns:a16="http://schemas.microsoft.com/office/drawing/2014/main" id="{D9E4D42A-0BE5-BD54-8E03-FEE0DC8619A7}"/>
-              </a:ext>
-            </a:extLst>
-          </p:cNvPr>
-          <p:cNvCxnSpPr>
-            <a:cxnSpLocks/>
-          </p:cNvCxnSpPr>
-          <p:nvPr/>
-        </p:nvCxnSpPr>
-        <p:spPr>
-          <a:xfrm>
-            <a:off x="4941067" y="356681"/>
-            <a:ext cx="0" cy="6025896"/>
-          </a:xfrm>
-          <a:prstGeom prst="line">
-            <a:avLst/>
-          </a:prstGeom>
-          <a:ln w="38100"/>
-        </p:spPr>
-        <p:style>
-          <a:lnRef idx="1">
-            <a:schemeClr val="dk1"/>
-          </a:lnRef>
-          <a:fillRef idx="0">
-            <a:schemeClr val="dk1"/>
-          </a:fillRef>
-          <a:effectRef idx="0">
-            <a:schemeClr val="dk1"/>
-          </a:effectRef>
-          <a:fontRef idx="minor">
-            <a:schemeClr val="tx1"/>
-          </a:fontRef>
-        </p:style>
-      </p:cxnSp>
       <p:sp>
         <p:nvSpPr>
           <p:cNvPr id="5" name="Cross 4">
@@ -30347,6 +30353,170 @@
           </a:effectLst>
         </p:spPr>
       </p:pic>
+      <p:sp>
+        <p:nvSpPr>
+          <p:cNvPr id="2" name="Freeform 1">
+            <a:extLst>
+              <a:ext uri="{FF2B5EF4-FFF2-40B4-BE49-F238E27FC236}">
+                <a16:creationId xmlns:a16="http://schemas.microsoft.com/office/drawing/2014/main" id="{897ABB19-69E8-A43F-92BF-7D4D0FA12BA6}"/>
+              </a:ext>
+            </a:extLst>
+          </p:cNvPr>
+          <p:cNvSpPr/>
+          <p:nvPr/>
+        </p:nvSpPr>
+        <p:spPr>
+          <a:xfrm>
+            <a:off x="4835187" y="1209414"/>
+            <a:ext cx="213647" cy="4009116"/>
+          </a:xfrm>
+          <a:custGeom>
+            <a:avLst/>
+            <a:gdLst>
+              <a:gd name="connsiteX0" fmla="*/ 0 w 461481"/>
+              <a:gd name="connsiteY0" fmla="*/ 0 h 6391073"/>
+              <a:gd name="connsiteX1" fmla="*/ 455811 w 461481"/>
+              <a:gd name="connsiteY1" fmla="*/ 3190673 h 6391073"/>
+              <a:gd name="connsiteX2" fmla="*/ 461481 w 461481"/>
+              <a:gd name="connsiteY2" fmla="*/ 3190673 h 6391073"/>
+              <a:gd name="connsiteX3" fmla="*/ 4281 w 461481"/>
+              <a:gd name="connsiteY3" fmla="*/ 6391073 h 6391073"/>
+              <a:gd name="connsiteX4" fmla="*/ 4281 w 461481"/>
+              <a:gd name="connsiteY4" fmla="*/ 3200400 h 6391073"/>
+              <a:gd name="connsiteX5" fmla="*/ 0 w 461481"/>
+              <a:gd name="connsiteY5" fmla="*/ 3200400 h 6391073"/>
+            </a:gdLst>
+            <a:ahLst/>
+            <a:cxnLst>
+              <a:cxn ang="0">
+                <a:pos x="connsiteX0" y="connsiteY0"/>
+              </a:cxn>
+              <a:cxn ang="0">
+                <a:pos x="connsiteX1" y="connsiteY1"/>
+              </a:cxn>
+              <a:cxn ang="0">
+                <a:pos x="connsiteX2" y="connsiteY2"/>
+              </a:cxn>
+              <a:cxn ang="0">
+                <a:pos x="connsiteX3" y="connsiteY3"/>
+              </a:cxn>
+              <a:cxn ang="0">
+                <a:pos x="connsiteX4" y="connsiteY4"/>
+              </a:cxn>
+              <a:cxn ang="0">
+                <a:pos x="connsiteX5" y="connsiteY5"/>
+              </a:cxn>
+            </a:cxnLst>
+            <a:rect l="l" t="t" r="r" b="b"/>
+            <a:pathLst>
+              <a:path w="461481" h="6391073">
+                <a:moveTo>
+                  <a:pt x="0" y="0"/>
+                </a:moveTo>
+                <a:lnTo>
+                  <a:pt x="455811" y="3190673"/>
+                </a:lnTo>
+                <a:lnTo>
+                  <a:pt x="461481" y="3190673"/>
+                </a:lnTo>
+                <a:lnTo>
+                  <a:pt x="4281" y="6391073"/>
+                </a:lnTo>
+                <a:lnTo>
+                  <a:pt x="4281" y="3200400"/>
+                </a:lnTo>
+                <a:lnTo>
+                  <a:pt x="0" y="3200400"/>
+                </a:lnTo>
+                <a:close/>
+              </a:path>
+            </a:pathLst>
+          </a:custGeom>
+          <a:solidFill>
+            <a:schemeClr val="bg1">
+              <a:lumMod val="65000"/>
+            </a:schemeClr>
+          </a:solidFill>
+          <a:ln w="28575">
+            <a:solidFill>
+              <a:schemeClr val="bg1">
+                <a:lumMod val="75000"/>
+              </a:schemeClr>
+            </a:solidFill>
+          </a:ln>
+        </p:spPr>
+        <p:style>
+          <a:lnRef idx="2">
+            <a:schemeClr val="accent1">
+              <a:shade val="15000"/>
+            </a:schemeClr>
+          </a:lnRef>
+          <a:fillRef idx="1">
+            <a:schemeClr val="accent1"/>
+          </a:fillRef>
+          <a:effectRef idx="0">
+            <a:schemeClr val="accent1"/>
+          </a:effectRef>
+          <a:fontRef idx="minor">
+            <a:schemeClr val="lt1"/>
+          </a:fontRef>
+        </p:style>
+        <p:txBody>
+          <a:bodyPr wrap="square" rtlCol="0" anchor="ctr">
+            <a:noAutofit/>
+          </a:bodyPr>
+          <a:lstStyle/>
+          <a:p>
+            <a:pPr algn="ctr"/>
+            <a:endParaRPr lang="en-US"/>
+          </a:p>
+        </p:txBody>
+      </p:sp>
+      <p:cxnSp>
+        <p:nvCxnSpPr>
+          <p:cNvPr id="4" name="Straight Connector 3">
+            <a:extLst>
+              <a:ext uri="{FF2B5EF4-FFF2-40B4-BE49-F238E27FC236}">
+                <a16:creationId xmlns:a16="http://schemas.microsoft.com/office/drawing/2014/main" id="{BE8A29BC-8ACB-F18A-D1FD-E81CA80404E9}"/>
+              </a:ext>
+            </a:extLst>
+          </p:cNvPr>
+          <p:cNvCxnSpPr>
+            <a:cxnSpLocks/>
+          </p:cNvCxnSpPr>
+          <p:nvPr/>
+        </p:nvCxnSpPr>
+        <p:spPr>
+          <a:xfrm>
+            <a:off x="4835187" y="383346"/>
+            <a:ext cx="0" cy="6025896"/>
+          </a:xfrm>
+          <a:prstGeom prst="line">
+            <a:avLst/>
+          </a:prstGeom>
+          <a:ln w="38100">
+            <a:solidFill>
+              <a:schemeClr val="bg1">
+                <a:lumMod val="75000"/>
+              </a:schemeClr>
+            </a:solidFill>
+          </a:ln>
+        </p:spPr>
+        <p:style>
+          <a:lnRef idx="1">
+            <a:schemeClr val="dk1"/>
+          </a:lnRef>
+          <a:fillRef idx="0">
+            <a:schemeClr val="dk1"/>
+          </a:fillRef>
+          <a:effectRef idx="0">
+            <a:schemeClr val="dk1"/>
+          </a:effectRef>
+          <a:fontRef idx="minor">
+            <a:schemeClr val="tx1"/>
+          </a:fontRef>
+        </p:style>
+      </p:cxnSp>
     </p:spTree>
     <p:extLst>
       <p:ext uri="{BB962C8B-B14F-4D97-AF65-F5344CB8AC3E}">

</xml_diff>